<commit_message>
Added a ReadMe.md for the repository. Updated the PPT. Added a couple of DALL-E generated pictures
</commit_message>
<xml_diff>
--- a/Presentation material/Databases APP.pptx
+++ b/Presentation material/Databases APP.pptx
@@ -5,7 +5,7 @@
     <p:sldMasterId id="2147483648" r:id="rId4"/>
   </p:sldMasterIdLst>
   <p:notesMasterIdLst>
-    <p:notesMasterId r:id="rId15"/>
+    <p:notesMasterId r:id="rId16"/>
   </p:notesMasterIdLst>
   <p:sldIdLst>
     <p:sldId id="256" r:id="rId5"/>
@@ -14,10 +14,11 @@
     <p:sldId id="261" r:id="rId8"/>
     <p:sldId id="263" r:id="rId9"/>
     <p:sldId id="264" r:id="rId10"/>
-    <p:sldId id="266" r:id="rId11"/>
-    <p:sldId id="277" r:id="rId12"/>
-    <p:sldId id="275" r:id="rId13"/>
-    <p:sldId id="276" r:id="rId14"/>
+    <p:sldId id="275" r:id="rId11"/>
+    <p:sldId id="266" r:id="rId12"/>
+    <p:sldId id="277" r:id="rId13"/>
+    <p:sldId id="279" r:id="rId14"/>
+    <p:sldId id="276" r:id="rId15"/>
   </p:sldIdLst>
   <p:sldSz cx="12192000" cy="6858000"/>
   <p:notesSz cx="6858000" cy="9144000"/>
@@ -138,1363 +139,9 @@
 <file path=ppt/revisionInfo.xml><?xml version="1.0" encoding="utf-8"?>
 <p1510:revInfo xmlns:a="http://schemas.openxmlformats.org/drawingml/2006/main" xmlns:r="http://schemas.openxmlformats.org/officeDocument/2006/relationships" xmlns:p1510="http://schemas.microsoft.com/office/powerpoint/2015/10/main">
   <p1510:revLst>
-    <p1510:client id="{BE503A25-7BF5-46D1-ACBB-CB53CA58F582}" v="49" dt="2023-09-29T12:25:09.223"/>
+    <p1510:client id="{80D045E6-A491-4B81-B682-BCC94C631638}" v="9" dt="2024-02-04T14:21:43.651"/>
   </p1510:revLst>
 </p1510:revInfo>
-</file>
-
-<file path=ppt/changesInfos/changesInfo1.xml><?xml version="1.0" encoding="utf-8"?>
-<pc:chgInfo xmlns:a="http://schemas.openxmlformats.org/drawingml/2006/main" xmlns:r="http://schemas.openxmlformats.org/officeDocument/2006/relationships" xmlns:ac="http://schemas.microsoft.com/office/drawing/2013/main/command" xmlns:pc="http://schemas.microsoft.com/office/powerpoint/2013/main/command">
-  <pc:docChgLst>
-    <pc:chgData name="Eivind Jahr Kirkeby" userId="edd961ea-506c-4dfc-8bc9-07eb7d0ab3a4" providerId="ADAL" clId="{BE503A25-7BF5-46D1-ACBB-CB53CA58F582}"/>
-    <pc:docChg chg="undo redo custSel addSld delSld modSld">
-      <pc:chgData name="Eivind Jahr Kirkeby" userId="edd961ea-506c-4dfc-8bc9-07eb7d0ab3a4" providerId="ADAL" clId="{BE503A25-7BF5-46D1-ACBB-CB53CA58F582}" dt="2023-09-29T13:09:49.993" v="2349" actId="20577"/>
-      <pc:docMkLst>
-        <pc:docMk/>
-      </pc:docMkLst>
-      <pc:sldChg chg="modSp mod modNotesTx">
-        <pc:chgData name="Eivind Jahr Kirkeby" userId="edd961ea-506c-4dfc-8bc9-07eb7d0ab3a4" providerId="ADAL" clId="{BE503A25-7BF5-46D1-ACBB-CB53CA58F582}" dt="2023-09-29T12:35:18.759" v="1771" actId="20577"/>
-        <pc:sldMkLst>
-          <pc:docMk/>
-          <pc:sldMk cId="985928655" sldId="258"/>
-        </pc:sldMkLst>
-        <pc:spChg chg="mod">
-          <ac:chgData name="Eivind Jahr Kirkeby" userId="edd961ea-506c-4dfc-8bc9-07eb7d0ab3a4" providerId="ADAL" clId="{BE503A25-7BF5-46D1-ACBB-CB53CA58F582}" dt="2023-09-22T06:44:12.293" v="15" actId="20577"/>
-          <ac:spMkLst>
-            <pc:docMk/>
-            <pc:sldMk cId="985928655" sldId="258"/>
-            <ac:spMk id="3" creationId="{E10CD0F3-E2E1-E43D-8B18-758BB33909E2}"/>
-          </ac:spMkLst>
-        </pc:spChg>
-        <pc:spChg chg="mod">
-          <ac:chgData name="Eivind Jahr Kirkeby" userId="edd961ea-506c-4dfc-8bc9-07eb7d0ab3a4" providerId="ADAL" clId="{BE503A25-7BF5-46D1-ACBB-CB53CA58F582}" dt="2023-09-22T06:44:34.561" v="30" actId="21"/>
-          <ac:spMkLst>
-            <pc:docMk/>
-            <pc:sldMk cId="985928655" sldId="258"/>
-            <ac:spMk id="4" creationId="{4D8B24D7-9F09-CEBE-332F-E1C40B908774}"/>
-          </ac:spMkLst>
-        </pc:spChg>
-        <pc:spChg chg="mod">
-          <ac:chgData name="Eivind Jahr Kirkeby" userId="edd961ea-506c-4dfc-8bc9-07eb7d0ab3a4" providerId="ADAL" clId="{BE503A25-7BF5-46D1-ACBB-CB53CA58F582}" dt="2023-09-22T06:44:45.450" v="36" actId="20577"/>
-          <ac:spMkLst>
-            <pc:docMk/>
-            <pc:sldMk cId="985928655" sldId="258"/>
-            <ac:spMk id="5" creationId="{977AA237-ECA5-CA73-B98A-D5D387C116D7}"/>
-          </ac:spMkLst>
-        </pc:spChg>
-      </pc:sldChg>
-      <pc:sldChg chg="addSp delSp modSp new mod modClrScheme chgLayout modNotesTx">
-        <pc:chgData name="Eivind Jahr Kirkeby" userId="edd961ea-506c-4dfc-8bc9-07eb7d0ab3a4" providerId="ADAL" clId="{BE503A25-7BF5-46D1-ACBB-CB53CA58F582}" dt="2023-09-29T13:09:49.993" v="2349" actId="20577"/>
-        <pc:sldMkLst>
-          <pc:docMk/>
-          <pc:sldMk cId="3002929882" sldId="259"/>
-        </pc:sldMkLst>
-        <pc:spChg chg="add del mod ord">
-          <ac:chgData name="Eivind Jahr Kirkeby" userId="edd961ea-506c-4dfc-8bc9-07eb7d0ab3a4" providerId="ADAL" clId="{BE503A25-7BF5-46D1-ACBB-CB53CA58F582}" dt="2023-09-22T10:27:01.672" v="47" actId="700"/>
-          <ac:spMkLst>
-            <pc:docMk/>
-            <pc:sldMk cId="3002929882" sldId="259"/>
-            <ac:spMk id="2" creationId="{1DFE732D-30B8-403B-134A-F77A35A4676D}"/>
-          </ac:spMkLst>
-        </pc:spChg>
-        <pc:spChg chg="del mod ord">
-          <ac:chgData name="Eivind Jahr Kirkeby" userId="edd961ea-506c-4dfc-8bc9-07eb7d0ab3a4" providerId="ADAL" clId="{BE503A25-7BF5-46D1-ACBB-CB53CA58F582}" dt="2023-09-22T06:46:40.224" v="38" actId="700"/>
-          <ac:spMkLst>
-            <pc:docMk/>
-            <pc:sldMk cId="3002929882" sldId="259"/>
-            <ac:spMk id="2" creationId="{7C97DC19-06F9-4D13-012A-5538E5FF3957}"/>
-          </ac:spMkLst>
-        </pc:spChg>
-        <pc:spChg chg="add del mod ord">
-          <ac:chgData name="Eivind Jahr Kirkeby" userId="edd961ea-506c-4dfc-8bc9-07eb7d0ab3a4" providerId="ADAL" clId="{BE503A25-7BF5-46D1-ACBB-CB53CA58F582}" dt="2023-09-22T10:27:01.672" v="47" actId="700"/>
-          <ac:spMkLst>
-            <pc:docMk/>
-            <pc:sldMk cId="3002929882" sldId="259"/>
-            <ac:spMk id="3" creationId="{0851345A-0659-89B7-F2BA-1560016F6133}"/>
-          </ac:spMkLst>
-        </pc:spChg>
-        <pc:spChg chg="del mod ord">
-          <ac:chgData name="Eivind Jahr Kirkeby" userId="edd961ea-506c-4dfc-8bc9-07eb7d0ab3a4" providerId="ADAL" clId="{BE503A25-7BF5-46D1-ACBB-CB53CA58F582}" dt="2023-09-22T06:46:40.224" v="38" actId="700"/>
-          <ac:spMkLst>
-            <pc:docMk/>
-            <pc:sldMk cId="3002929882" sldId="259"/>
-            <ac:spMk id="3" creationId="{6FA91359-18BA-1C47-5468-343BA8CFDF45}"/>
-          </ac:spMkLst>
-        </pc:spChg>
-        <pc:spChg chg="del mod ord">
-          <ac:chgData name="Eivind Jahr Kirkeby" userId="edd961ea-506c-4dfc-8bc9-07eb7d0ab3a4" providerId="ADAL" clId="{BE503A25-7BF5-46D1-ACBB-CB53CA58F582}" dt="2023-09-22T06:46:40.224" v="38" actId="700"/>
-          <ac:spMkLst>
-            <pc:docMk/>
-            <pc:sldMk cId="3002929882" sldId="259"/>
-            <ac:spMk id="4" creationId="{36142816-7990-5574-AF20-3457FF5B5910}"/>
-          </ac:spMkLst>
-        </pc:spChg>
-        <pc:spChg chg="add del mod ord">
-          <ac:chgData name="Eivind Jahr Kirkeby" userId="edd961ea-506c-4dfc-8bc9-07eb7d0ab3a4" providerId="ADAL" clId="{BE503A25-7BF5-46D1-ACBB-CB53CA58F582}" dt="2023-09-22T10:27:01.672" v="47" actId="700"/>
-          <ac:spMkLst>
-            <pc:docMk/>
-            <pc:sldMk cId="3002929882" sldId="259"/>
-            <ac:spMk id="4" creationId="{B8BFAF24-2C1A-D3C9-90B9-4F8FEBF6870E}"/>
-          </ac:spMkLst>
-        </pc:spChg>
-        <pc:spChg chg="del">
-          <ac:chgData name="Eivind Jahr Kirkeby" userId="edd961ea-506c-4dfc-8bc9-07eb7d0ab3a4" providerId="ADAL" clId="{BE503A25-7BF5-46D1-ACBB-CB53CA58F582}" dt="2023-09-22T06:46:40.224" v="38" actId="700"/>
-          <ac:spMkLst>
-            <pc:docMk/>
-            <pc:sldMk cId="3002929882" sldId="259"/>
-            <ac:spMk id="5" creationId="{7A6513F4-E265-377F-9DF3-326C2ECB9800}"/>
-          </ac:spMkLst>
-        </pc:spChg>
-        <pc:spChg chg="add del mod ord">
-          <ac:chgData name="Eivind Jahr Kirkeby" userId="edd961ea-506c-4dfc-8bc9-07eb7d0ab3a4" providerId="ADAL" clId="{BE503A25-7BF5-46D1-ACBB-CB53CA58F582}" dt="2023-09-22T10:27:44.849" v="51" actId="700"/>
-          <ac:spMkLst>
-            <pc:docMk/>
-            <pc:sldMk cId="3002929882" sldId="259"/>
-            <ac:spMk id="5" creationId="{A7C2AC11-88BF-AD80-651A-3666C8F56D18}"/>
-          </ac:spMkLst>
-        </pc:spChg>
-        <pc:spChg chg="add del mod ord">
-          <ac:chgData name="Eivind Jahr Kirkeby" userId="edd961ea-506c-4dfc-8bc9-07eb7d0ab3a4" providerId="ADAL" clId="{BE503A25-7BF5-46D1-ACBB-CB53CA58F582}" dt="2023-09-22T10:37:10.448" v="98" actId="700"/>
-          <ac:spMkLst>
-            <pc:docMk/>
-            <pc:sldMk cId="3002929882" sldId="259"/>
-            <ac:spMk id="6" creationId="{AA3613F6-34E9-73DA-3BD2-AA6F322CF5F3}"/>
-          </ac:spMkLst>
-        </pc:spChg>
-        <pc:spChg chg="add del mod ord">
-          <ac:chgData name="Eivind Jahr Kirkeby" userId="edd961ea-506c-4dfc-8bc9-07eb7d0ab3a4" providerId="ADAL" clId="{BE503A25-7BF5-46D1-ACBB-CB53CA58F582}" dt="2023-09-22T10:27:44.849" v="51" actId="700"/>
-          <ac:spMkLst>
-            <pc:docMk/>
-            <pc:sldMk cId="3002929882" sldId="259"/>
-            <ac:spMk id="7" creationId="{273B15AE-2D56-E2D2-5CEE-94A5EA5E0D5E}"/>
-          </ac:spMkLst>
-        </pc:spChg>
-        <pc:spChg chg="add del mod ord">
-          <ac:chgData name="Eivind Jahr Kirkeby" userId="edd961ea-506c-4dfc-8bc9-07eb7d0ab3a4" providerId="ADAL" clId="{BE503A25-7BF5-46D1-ACBB-CB53CA58F582}" dt="2023-09-22T06:46:46.382" v="39"/>
-          <ac:spMkLst>
-            <pc:docMk/>
-            <pc:sldMk cId="3002929882" sldId="259"/>
-            <ac:spMk id="7" creationId="{7497A8B9-EDEC-7808-D713-86348463F73A}"/>
-          </ac:spMkLst>
-        </pc:spChg>
-        <pc:spChg chg="add del mod ord">
-          <ac:chgData name="Eivind Jahr Kirkeby" userId="edd961ea-506c-4dfc-8bc9-07eb7d0ab3a4" providerId="ADAL" clId="{BE503A25-7BF5-46D1-ACBB-CB53CA58F582}" dt="2023-09-22T10:28:16.767" v="62" actId="700"/>
-          <ac:spMkLst>
-            <pc:docMk/>
-            <pc:sldMk cId="3002929882" sldId="259"/>
-            <ac:spMk id="8" creationId="{77EDBF8E-D166-900E-F714-53E514471D02}"/>
-          </ac:spMkLst>
-        </pc:spChg>
-        <pc:spChg chg="add del mod ord">
-          <ac:chgData name="Eivind Jahr Kirkeby" userId="edd961ea-506c-4dfc-8bc9-07eb7d0ab3a4" providerId="ADAL" clId="{BE503A25-7BF5-46D1-ACBB-CB53CA58F582}" dt="2023-09-22T10:28:21.157" v="63" actId="700"/>
-          <ac:spMkLst>
-            <pc:docMk/>
-            <pc:sldMk cId="3002929882" sldId="259"/>
-            <ac:spMk id="10" creationId="{9641FE1E-5612-68E8-34F6-F864B67EC6EA}"/>
-          </ac:spMkLst>
-        </pc:spChg>
-        <pc:spChg chg="add del mod ord">
-          <ac:chgData name="Eivind Jahr Kirkeby" userId="edd961ea-506c-4dfc-8bc9-07eb7d0ab3a4" providerId="ADAL" clId="{BE503A25-7BF5-46D1-ACBB-CB53CA58F582}" dt="2023-09-22T10:29:00.167" v="68" actId="700"/>
-          <ac:spMkLst>
-            <pc:docMk/>
-            <pc:sldMk cId="3002929882" sldId="259"/>
-            <ac:spMk id="11" creationId="{AED85E83-3B79-CC28-8AA2-CBB95FAEFB0F}"/>
-          </ac:spMkLst>
-        </pc:spChg>
-        <pc:spChg chg="add del mod ord">
-          <ac:chgData name="Eivind Jahr Kirkeby" userId="edd961ea-506c-4dfc-8bc9-07eb7d0ab3a4" providerId="ADAL" clId="{BE503A25-7BF5-46D1-ACBB-CB53CA58F582}" dt="2023-09-22T10:37:07.682" v="97" actId="700"/>
-          <ac:spMkLst>
-            <pc:docMk/>
-            <pc:sldMk cId="3002929882" sldId="259"/>
-            <ac:spMk id="12" creationId="{8929D871-9C81-6A04-3F2F-6F452FB6B753}"/>
-          </ac:spMkLst>
-        </pc:spChg>
-        <pc:spChg chg="add mod ord">
-          <ac:chgData name="Eivind Jahr Kirkeby" userId="edd961ea-506c-4dfc-8bc9-07eb7d0ab3a4" providerId="ADAL" clId="{BE503A25-7BF5-46D1-ACBB-CB53CA58F582}" dt="2023-09-22T10:37:10.448" v="98" actId="700"/>
-          <ac:spMkLst>
-            <pc:docMk/>
-            <pc:sldMk cId="3002929882" sldId="259"/>
-            <ac:spMk id="13" creationId="{7E02E14E-7AF8-9E02-8C94-B865BABEE88D}"/>
-          </ac:spMkLst>
-        </pc:spChg>
-        <pc:spChg chg="add del mod ord">
-          <ac:chgData name="Eivind Jahr Kirkeby" userId="edd961ea-506c-4dfc-8bc9-07eb7d0ab3a4" providerId="ADAL" clId="{BE503A25-7BF5-46D1-ACBB-CB53CA58F582}" dt="2023-09-22T10:37:10.448" v="98" actId="700"/>
-          <ac:spMkLst>
-            <pc:docMk/>
-            <pc:sldMk cId="3002929882" sldId="259"/>
-            <ac:spMk id="14" creationId="{878041B4-0B00-7CF5-6961-4BD451631BED}"/>
-          </ac:spMkLst>
-        </pc:spChg>
-        <pc:spChg chg="add mod ord">
-          <ac:chgData name="Eivind Jahr Kirkeby" userId="edd961ea-506c-4dfc-8bc9-07eb7d0ab3a4" providerId="ADAL" clId="{BE503A25-7BF5-46D1-ACBB-CB53CA58F582}" dt="2023-09-29T13:09:49.993" v="2349" actId="20577"/>
-          <ac:spMkLst>
-            <pc:docMk/>
-            <pc:sldMk cId="3002929882" sldId="259"/>
-            <ac:spMk id="15" creationId="{EF1917BA-77AA-0C4B-3459-D6131533E987}"/>
-          </ac:spMkLst>
-        </pc:spChg>
-        <pc:picChg chg="add mod ord">
-          <ac:chgData name="Eivind Jahr Kirkeby" userId="edd961ea-506c-4dfc-8bc9-07eb7d0ab3a4" providerId="ADAL" clId="{BE503A25-7BF5-46D1-ACBB-CB53CA58F582}" dt="2023-09-22T10:37:10.448" v="98" actId="700"/>
-          <ac:picMkLst>
-            <pc:docMk/>
-            <pc:sldMk cId="3002929882" sldId="259"/>
-            <ac:picMk id="9" creationId="{AF1BAA66-8261-43D2-AAAA-A3890D56BE5D}"/>
-          </ac:picMkLst>
-        </pc:picChg>
-        <pc:picChg chg="add del mod">
-          <ac:chgData name="Eivind Jahr Kirkeby" userId="edd961ea-506c-4dfc-8bc9-07eb7d0ab3a4" providerId="ADAL" clId="{BE503A25-7BF5-46D1-ACBB-CB53CA58F582}" dt="2023-09-22T06:57:23.035" v="41" actId="478"/>
-          <ac:picMkLst>
-            <pc:docMk/>
-            <pc:sldMk cId="3002929882" sldId="259"/>
-            <ac:picMk id="10" creationId="{1570356C-A255-BB10-6467-872D955D5F11}"/>
-          </ac:picMkLst>
-        </pc:picChg>
-        <pc:picChg chg="add del mod">
-          <ac:chgData name="Eivind Jahr Kirkeby" userId="edd961ea-506c-4dfc-8bc9-07eb7d0ab3a4" providerId="ADAL" clId="{BE503A25-7BF5-46D1-ACBB-CB53CA58F582}" dt="2023-09-22T06:57:32.887" v="45" actId="478"/>
-          <ac:picMkLst>
-            <pc:docMk/>
-            <pc:sldMk cId="3002929882" sldId="259"/>
-            <ac:picMk id="12" creationId="{BF78CC59-ACFF-C66C-6FF2-F71FA9E8A843}"/>
-          </ac:picMkLst>
-        </pc:picChg>
-      </pc:sldChg>
-      <pc:sldChg chg="addSp delSp modSp new mod modClrScheme chgLayout modNotesTx">
-        <pc:chgData name="Eivind Jahr Kirkeby" userId="edd961ea-506c-4dfc-8bc9-07eb7d0ab3a4" providerId="ADAL" clId="{BE503A25-7BF5-46D1-ACBB-CB53CA58F582}" dt="2023-09-29T12:33:40.344" v="1704" actId="20577"/>
-        <pc:sldMkLst>
-          <pc:docMk/>
-          <pc:sldMk cId="1236673208" sldId="260"/>
-        </pc:sldMkLst>
-        <pc:spChg chg="del">
-          <ac:chgData name="Eivind Jahr Kirkeby" userId="edd961ea-506c-4dfc-8bc9-07eb7d0ab3a4" providerId="ADAL" clId="{BE503A25-7BF5-46D1-ACBB-CB53CA58F582}" dt="2023-09-22T10:27:23.378" v="49"/>
-          <ac:spMkLst>
-            <pc:docMk/>
-            <pc:sldMk cId="1236673208" sldId="260"/>
-            <ac:spMk id="2" creationId="{DBEC7EB4-EA0D-BDD8-A756-42A4CED31684}"/>
-          </ac:spMkLst>
-        </pc:spChg>
-        <pc:spChg chg="del mod ord">
-          <ac:chgData name="Eivind Jahr Kirkeby" userId="edd961ea-506c-4dfc-8bc9-07eb7d0ab3a4" providerId="ADAL" clId="{BE503A25-7BF5-46D1-ACBB-CB53CA58F582}" dt="2023-09-22T10:37:14.822" v="99" actId="700"/>
-          <ac:spMkLst>
-            <pc:docMk/>
-            <pc:sldMk cId="1236673208" sldId="260"/>
-            <ac:spMk id="3" creationId="{C40FFDE8-68FD-E23D-EFE2-ECB238E9136D}"/>
-          </ac:spMkLst>
-        </pc:spChg>
-        <pc:spChg chg="mod ord">
-          <ac:chgData name="Eivind Jahr Kirkeby" userId="edd961ea-506c-4dfc-8bc9-07eb7d0ab3a4" providerId="ADAL" clId="{BE503A25-7BF5-46D1-ACBB-CB53CA58F582}" dt="2023-09-22T10:37:14.822" v="99" actId="700"/>
-          <ac:spMkLst>
-            <pc:docMk/>
-            <pc:sldMk cId="1236673208" sldId="260"/>
-            <ac:spMk id="4" creationId="{6285E830-CD2B-D7A6-231D-68115E7EE60D}"/>
-          </ac:spMkLst>
-        </pc:spChg>
-        <pc:spChg chg="mod ord">
-          <ac:chgData name="Eivind Jahr Kirkeby" userId="edd961ea-506c-4dfc-8bc9-07eb7d0ab3a4" providerId="ADAL" clId="{BE503A25-7BF5-46D1-ACBB-CB53CA58F582}" dt="2023-09-22T10:37:14.822" v="99" actId="700"/>
-          <ac:spMkLst>
-            <pc:docMk/>
-            <pc:sldMk cId="1236673208" sldId="260"/>
-            <ac:spMk id="5" creationId="{0A00F8F4-7FCB-8F1C-066F-32F39A308D77}"/>
-          </ac:spMkLst>
-        </pc:spChg>
-        <pc:spChg chg="mod ord">
-          <ac:chgData name="Eivind Jahr Kirkeby" userId="edd961ea-506c-4dfc-8bc9-07eb7d0ab3a4" providerId="ADAL" clId="{BE503A25-7BF5-46D1-ACBB-CB53CA58F582}" dt="2023-09-22T10:37:14.822" v="99" actId="700"/>
-          <ac:spMkLst>
-            <pc:docMk/>
-            <pc:sldMk cId="1236673208" sldId="260"/>
-            <ac:spMk id="6" creationId="{9AACCAF6-678E-1CAA-DD49-37841252AB5B}"/>
-          </ac:spMkLst>
-        </pc:spChg>
-        <pc:spChg chg="add mod ord">
-          <ac:chgData name="Eivind Jahr Kirkeby" userId="edd961ea-506c-4dfc-8bc9-07eb7d0ab3a4" providerId="ADAL" clId="{BE503A25-7BF5-46D1-ACBB-CB53CA58F582}" dt="2023-09-22T10:37:52.930" v="106" actId="20577"/>
-          <ac:spMkLst>
-            <pc:docMk/>
-            <pc:sldMk cId="1236673208" sldId="260"/>
-            <ac:spMk id="8" creationId="{39C22184-3D75-760D-CCC6-6E165F534567}"/>
-          </ac:spMkLst>
-        </pc:spChg>
-        <pc:picChg chg="add mod ord">
-          <ac:chgData name="Eivind Jahr Kirkeby" userId="edd961ea-506c-4dfc-8bc9-07eb7d0ab3a4" providerId="ADAL" clId="{BE503A25-7BF5-46D1-ACBB-CB53CA58F582}" dt="2023-09-22T10:37:14.822" v="99" actId="700"/>
-          <ac:picMkLst>
-            <pc:docMk/>
-            <pc:sldMk cId="1236673208" sldId="260"/>
-            <ac:picMk id="7" creationId="{86D11B14-396B-AD84-6690-2D322F60FB9A}"/>
-          </ac:picMkLst>
-        </pc:picChg>
-      </pc:sldChg>
-      <pc:sldChg chg="addSp delSp modSp new mod modClrScheme chgLayout">
-        <pc:chgData name="Eivind Jahr Kirkeby" userId="edd961ea-506c-4dfc-8bc9-07eb7d0ab3a4" providerId="ADAL" clId="{BE503A25-7BF5-46D1-ACBB-CB53CA58F582}" dt="2023-09-22T10:49:50.499" v="336"/>
-        <pc:sldMkLst>
-          <pc:docMk/>
-          <pc:sldMk cId="2972038765" sldId="261"/>
-        </pc:sldMkLst>
-        <pc:spChg chg="del mod ord">
-          <ac:chgData name="Eivind Jahr Kirkeby" userId="edd961ea-506c-4dfc-8bc9-07eb7d0ab3a4" providerId="ADAL" clId="{BE503A25-7BF5-46D1-ACBB-CB53CA58F582}" dt="2023-09-22T10:37:33.070" v="100" actId="700"/>
-          <ac:spMkLst>
-            <pc:docMk/>
-            <pc:sldMk cId="2972038765" sldId="261"/>
-            <ac:spMk id="2" creationId="{65005CF6-4EC9-BADE-2E2F-B08309082A92}"/>
-          </ac:spMkLst>
-        </pc:spChg>
-        <pc:spChg chg="del mod ord">
-          <ac:chgData name="Eivind Jahr Kirkeby" userId="edd961ea-506c-4dfc-8bc9-07eb7d0ab3a4" providerId="ADAL" clId="{BE503A25-7BF5-46D1-ACBB-CB53CA58F582}" dt="2023-09-22T10:37:33.070" v="100" actId="700"/>
-          <ac:spMkLst>
-            <pc:docMk/>
-            <pc:sldMk cId="2972038765" sldId="261"/>
-            <ac:spMk id="3" creationId="{0D10276E-9656-0ADA-6A09-500D796C4320}"/>
-          </ac:spMkLst>
-        </pc:spChg>
-        <pc:spChg chg="del mod ord">
-          <ac:chgData name="Eivind Jahr Kirkeby" userId="edd961ea-506c-4dfc-8bc9-07eb7d0ab3a4" providerId="ADAL" clId="{BE503A25-7BF5-46D1-ACBB-CB53CA58F582}" dt="2023-09-22T10:37:33.070" v="100" actId="700"/>
-          <ac:spMkLst>
-            <pc:docMk/>
-            <pc:sldMk cId="2972038765" sldId="261"/>
-            <ac:spMk id="4" creationId="{74A02E9C-8B9A-FFBF-C803-B8D912D07CFB}"/>
-          </ac:spMkLst>
-        </pc:spChg>
-        <pc:spChg chg="mod ord">
-          <ac:chgData name="Eivind Jahr Kirkeby" userId="edd961ea-506c-4dfc-8bc9-07eb7d0ab3a4" providerId="ADAL" clId="{BE503A25-7BF5-46D1-ACBB-CB53CA58F582}" dt="2023-09-22T10:49:50.499" v="336"/>
-          <ac:spMkLst>
-            <pc:docMk/>
-            <pc:sldMk cId="2972038765" sldId="261"/>
-            <ac:spMk id="5" creationId="{D37DD467-261B-CE8D-F087-9C58BACE6177}"/>
-          </ac:spMkLst>
-        </pc:spChg>
-        <pc:spChg chg="mod ord">
-          <ac:chgData name="Eivind Jahr Kirkeby" userId="edd961ea-506c-4dfc-8bc9-07eb7d0ab3a4" providerId="ADAL" clId="{BE503A25-7BF5-46D1-ACBB-CB53CA58F582}" dt="2023-09-22T10:37:33.070" v="100" actId="700"/>
-          <ac:spMkLst>
-            <pc:docMk/>
-            <pc:sldMk cId="2972038765" sldId="261"/>
-            <ac:spMk id="6" creationId="{EBB87491-6BBC-E096-A40D-389B0843D222}"/>
-          </ac:spMkLst>
-        </pc:spChg>
-        <pc:spChg chg="add mod ord">
-          <ac:chgData name="Eivind Jahr Kirkeby" userId="edd961ea-506c-4dfc-8bc9-07eb7d0ab3a4" providerId="ADAL" clId="{BE503A25-7BF5-46D1-ACBB-CB53CA58F582}" dt="2023-09-22T10:38:32.821" v="163" actId="14100"/>
-          <ac:spMkLst>
-            <pc:docMk/>
-            <pc:sldMk cId="2972038765" sldId="261"/>
-            <ac:spMk id="7" creationId="{6E1CA743-A80C-524D-DDA0-AC4F45304ECC}"/>
-          </ac:spMkLst>
-        </pc:spChg>
-        <pc:spChg chg="add mod ord">
-          <ac:chgData name="Eivind Jahr Kirkeby" userId="edd961ea-506c-4dfc-8bc9-07eb7d0ab3a4" providerId="ADAL" clId="{BE503A25-7BF5-46D1-ACBB-CB53CA58F582}" dt="2023-09-22T10:39:46.915" v="258" actId="14100"/>
-          <ac:spMkLst>
-            <pc:docMk/>
-            <pc:sldMk cId="2972038765" sldId="261"/>
-            <ac:spMk id="8" creationId="{E0BCA51F-D62F-43FE-A9BE-4652051143DC}"/>
-          </ac:spMkLst>
-        </pc:spChg>
-        <pc:spChg chg="add mod ord">
-          <ac:chgData name="Eivind Jahr Kirkeby" userId="edd961ea-506c-4dfc-8bc9-07eb7d0ab3a4" providerId="ADAL" clId="{BE503A25-7BF5-46D1-ACBB-CB53CA58F582}" dt="2023-09-22T10:39:49.952" v="259" actId="14100"/>
-          <ac:spMkLst>
-            <pc:docMk/>
-            <pc:sldMk cId="2972038765" sldId="261"/>
-            <ac:spMk id="9" creationId="{3F7C26D6-486D-F9BB-D600-3F2B30CD608B}"/>
-          </ac:spMkLst>
-        </pc:spChg>
-        <pc:spChg chg="add mod ord">
-          <ac:chgData name="Eivind Jahr Kirkeby" userId="edd961ea-506c-4dfc-8bc9-07eb7d0ab3a4" providerId="ADAL" clId="{BE503A25-7BF5-46D1-ACBB-CB53CA58F582}" dt="2023-09-22T10:37:33.070" v="100" actId="700"/>
-          <ac:spMkLst>
-            <pc:docMk/>
-            <pc:sldMk cId="2972038765" sldId="261"/>
-            <ac:spMk id="10" creationId="{2E83B693-7142-3CC0-2EF9-45080F31F52A}"/>
-          </ac:spMkLst>
-        </pc:spChg>
-        <pc:spChg chg="add mod">
-          <ac:chgData name="Eivind Jahr Kirkeby" userId="edd961ea-506c-4dfc-8bc9-07eb7d0ab3a4" providerId="ADAL" clId="{BE503A25-7BF5-46D1-ACBB-CB53CA58F582}" dt="2023-09-22T10:40:00.930" v="261" actId="1076"/>
-          <ac:spMkLst>
-            <pc:docMk/>
-            <pc:sldMk cId="2972038765" sldId="261"/>
-            <ac:spMk id="11" creationId="{924F7953-A22B-FFD5-FF7E-8C1A0E3C5FF3}"/>
-          </ac:spMkLst>
-        </pc:spChg>
-        <pc:spChg chg="add mod">
-          <ac:chgData name="Eivind Jahr Kirkeby" userId="edd961ea-506c-4dfc-8bc9-07eb7d0ab3a4" providerId="ADAL" clId="{BE503A25-7BF5-46D1-ACBB-CB53CA58F582}" dt="2023-09-22T10:39:54.078" v="260" actId="1076"/>
-          <ac:spMkLst>
-            <pc:docMk/>
-            <pc:sldMk cId="2972038765" sldId="261"/>
-            <ac:spMk id="12" creationId="{7FED9CD1-D618-AD19-2BF9-C46F1D9F82AD}"/>
-          </ac:spMkLst>
-        </pc:spChg>
-      </pc:sldChg>
-      <pc:sldChg chg="addSp delSp modSp new mod modClrScheme chgLayout">
-        <pc:chgData name="Eivind Jahr Kirkeby" userId="edd961ea-506c-4dfc-8bc9-07eb7d0ab3a4" providerId="ADAL" clId="{BE503A25-7BF5-46D1-ACBB-CB53CA58F582}" dt="2023-09-22T10:50:15.774" v="340" actId="732"/>
-        <pc:sldMkLst>
-          <pc:docMk/>
-          <pc:sldMk cId="245216933" sldId="262"/>
-        </pc:sldMkLst>
-        <pc:spChg chg="del mod ord">
-          <ac:chgData name="Eivind Jahr Kirkeby" userId="edd961ea-506c-4dfc-8bc9-07eb7d0ab3a4" providerId="ADAL" clId="{BE503A25-7BF5-46D1-ACBB-CB53CA58F582}" dt="2023-09-22T10:41:01.349" v="263" actId="700"/>
-          <ac:spMkLst>
-            <pc:docMk/>
-            <pc:sldMk cId="245216933" sldId="262"/>
-            <ac:spMk id="2" creationId="{1EECF7E2-AAD0-2860-B842-3A240195EC69}"/>
-          </ac:spMkLst>
-        </pc:spChg>
-        <pc:spChg chg="del">
-          <ac:chgData name="Eivind Jahr Kirkeby" userId="edd961ea-506c-4dfc-8bc9-07eb7d0ab3a4" providerId="ADAL" clId="{BE503A25-7BF5-46D1-ACBB-CB53CA58F582}" dt="2023-09-22T10:41:01.349" v="263" actId="700"/>
-          <ac:spMkLst>
-            <pc:docMk/>
-            <pc:sldMk cId="245216933" sldId="262"/>
-            <ac:spMk id="3" creationId="{B0EC69FF-86CA-FF8D-CA21-6A44CDDDDEA0}"/>
-          </ac:spMkLst>
-        </pc:spChg>
-        <pc:spChg chg="del mod ord">
-          <ac:chgData name="Eivind Jahr Kirkeby" userId="edd961ea-506c-4dfc-8bc9-07eb7d0ab3a4" providerId="ADAL" clId="{BE503A25-7BF5-46D1-ACBB-CB53CA58F582}" dt="2023-09-22T10:41:01.349" v="263" actId="700"/>
-          <ac:spMkLst>
-            <pc:docMk/>
-            <pc:sldMk cId="245216933" sldId="262"/>
-            <ac:spMk id="4" creationId="{8FA75276-C1D7-64E3-7C8B-6B9BC82A76B2}"/>
-          </ac:spMkLst>
-        </pc:spChg>
-        <pc:spChg chg="del mod ord">
-          <ac:chgData name="Eivind Jahr Kirkeby" userId="edd961ea-506c-4dfc-8bc9-07eb7d0ab3a4" providerId="ADAL" clId="{BE503A25-7BF5-46D1-ACBB-CB53CA58F582}" dt="2023-09-22T10:41:01.349" v="263" actId="700"/>
-          <ac:spMkLst>
-            <pc:docMk/>
-            <pc:sldMk cId="245216933" sldId="262"/>
-            <ac:spMk id="5" creationId="{12D14237-EB44-3ABD-114E-FA96071616FA}"/>
-          </ac:spMkLst>
-        </pc:spChg>
-        <pc:spChg chg="mod ord">
-          <ac:chgData name="Eivind Jahr Kirkeby" userId="edd961ea-506c-4dfc-8bc9-07eb7d0ab3a4" providerId="ADAL" clId="{BE503A25-7BF5-46D1-ACBB-CB53CA58F582}" dt="2023-09-22T10:49:55.609" v="338"/>
-          <ac:spMkLst>
-            <pc:docMk/>
-            <pc:sldMk cId="245216933" sldId="262"/>
-            <ac:spMk id="6" creationId="{2F163E8C-733C-72F0-457A-309DFD07012F}"/>
-          </ac:spMkLst>
-        </pc:spChg>
-        <pc:spChg chg="mod ord">
-          <ac:chgData name="Eivind Jahr Kirkeby" userId="edd961ea-506c-4dfc-8bc9-07eb7d0ab3a4" providerId="ADAL" clId="{BE503A25-7BF5-46D1-ACBB-CB53CA58F582}" dt="2023-09-22T10:41:39.777" v="268" actId="700"/>
-          <ac:spMkLst>
-            <pc:docMk/>
-            <pc:sldMk cId="245216933" sldId="262"/>
-            <ac:spMk id="7" creationId="{89C69138-5392-4855-B942-61FF4F2BCB19}"/>
-          </ac:spMkLst>
-        </pc:spChg>
-        <pc:spChg chg="add del mod ord">
-          <ac:chgData name="Eivind Jahr Kirkeby" userId="edd961ea-506c-4dfc-8bc9-07eb7d0ab3a4" providerId="ADAL" clId="{BE503A25-7BF5-46D1-ACBB-CB53CA58F582}" dt="2023-09-22T10:41:13.571" v="266" actId="700"/>
-          <ac:spMkLst>
-            <pc:docMk/>
-            <pc:sldMk cId="245216933" sldId="262"/>
-            <ac:spMk id="8" creationId="{7BDAEFEA-719E-6DDD-9680-01258E9A9467}"/>
-          </ac:spMkLst>
-        </pc:spChg>
-        <pc:spChg chg="add del mod ord">
-          <ac:chgData name="Eivind Jahr Kirkeby" userId="edd961ea-506c-4dfc-8bc9-07eb7d0ab3a4" providerId="ADAL" clId="{BE503A25-7BF5-46D1-ACBB-CB53CA58F582}" dt="2023-09-22T10:41:13.571" v="266" actId="700"/>
-          <ac:spMkLst>
-            <pc:docMk/>
-            <pc:sldMk cId="245216933" sldId="262"/>
-            <ac:spMk id="9" creationId="{7FB6B704-60E2-186C-9895-2A6BD8444861}"/>
-          </ac:spMkLst>
-        </pc:spChg>
-        <pc:spChg chg="add del mod ord">
-          <ac:chgData name="Eivind Jahr Kirkeby" userId="edd961ea-506c-4dfc-8bc9-07eb7d0ab3a4" providerId="ADAL" clId="{BE503A25-7BF5-46D1-ACBB-CB53CA58F582}" dt="2023-09-22T10:41:13.571" v="266" actId="700"/>
-          <ac:spMkLst>
-            <pc:docMk/>
-            <pc:sldMk cId="245216933" sldId="262"/>
-            <ac:spMk id="10" creationId="{3CC09E4A-877B-725B-C5C8-47EF86C3368D}"/>
-          </ac:spMkLst>
-        </pc:spChg>
-        <pc:spChg chg="add del mod ord">
-          <ac:chgData name="Eivind Jahr Kirkeby" userId="edd961ea-506c-4dfc-8bc9-07eb7d0ab3a4" providerId="ADAL" clId="{BE503A25-7BF5-46D1-ACBB-CB53CA58F582}" dt="2023-09-22T10:41:30.072" v="267" actId="700"/>
-          <ac:spMkLst>
-            <pc:docMk/>
-            <pc:sldMk cId="245216933" sldId="262"/>
-            <ac:spMk id="16" creationId="{E791DBEE-0846-266F-5CBD-7BFB546877F0}"/>
-          </ac:spMkLst>
-        </pc:spChg>
-        <pc:spChg chg="add del mod ord">
-          <ac:chgData name="Eivind Jahr Kirkeby" userId="edd961ea-506c-4dfc-8bc9-07eb7d0ab3a4" providerId="ADAL" clId="{BE503A25-7BF5-46D1-ACBB-CB53CA58F582}" dt="2023-09-22T10:41:30.072" v="267" actId="700"/>
-          <ac:spMkLst>
-            <pc:docMk/>
-            <pc:sldMk cId="245216933" sldId="262"/>
-            <ac:spMk id="17" creationId="{7BE3D869-5263-20D8-04A6-302EF476AD6B}"/>
-          </ac:spMkLst>
-        </pc:spChg>
-        <pc:spChg chg="add del mod ord">
-          <ac:chgData name="Eivind Jahr Kirkeby" userId="edd961ea-506c-4dfc-8bc9-07eb7d0ab3a4" providerId="ADAL" clId="{BE503A25-7BF5-46D1-ACBB-CB53CA58F582}" dt="2023-09-22T10:41:30.072" v="267" actId="700"/>
-          <ac:spMkLst>
-            <pc:docMk/>
-            <pc:sldMk cId="245216933" sldId="262"/>
-            <ac:spMk id="18" creationId="{BDA02AEB-0862-708E-07F5-D6D90B4105FF}"/>
-          </ac:spMkLst>
-        </pc:spChg>
-        <pc:spChg chg="add del mod ord">
-          <ac:chgData name="Eivind Jahr Kirkeby" userId="edd961ea-506c-4dfc-8bc9-07eb7d0ab3a4" providerId="ADAL" clId="{BE503A25-7BF5-46D1-ACBB-CB53CA58F582}" dt="2023-09-22T10:41:30.072" v="267" actId="700"/>
-          <ac:spMkLst>
-            <pc:docMk/>
-            <pc:sldMk cId="245216933" sldId="262"/>
-            <ac:spMk id="19" creationId="{91D196FD-7C46-8CBB-052C-763A2A15D92D}"/>
-          </ac:spMkLst>
-        </pc:spChg>
-        <pc:spChg chg="add del mod ord">
-          <ac:chgData name="Eivind Jahr Kirkeby" userId="edd961ea-506c-4dfc-8bc9-07eb7d0ab3a4" providerId="ADAL" clId="{BE503A25-7BF5-46D1-ACBB-CB53CA58F582}" dt="2023-09-22T10:41:39.777" v="268" actId="700"/>
-          <ac:spMkLst>
-            <pc:docMk/>
-            <pc:sldMk cId="245216933" sldId="262"/>
-            <ac:spMk id="20" creationId="{B7CB08B4-7EF4-925C-6F3B-97C11ADDC789}"/>
-          </ac:spMkLst>
-        </pc:spChg>
-        <pc:spChg chg="add del mod ord">
-          <ac:chgData name="Eivind Jahr Kirkeby" userId="edd961ea-506c-4dfc-8bc9-07eb7d0ab3a4" providerId="ADAL" clId="{BE503A25-7BF5-46D1-ACBB-CB53CA58F582}" dt="2023-09-22T10:41:39.777" v="268" actId="700"/>
-          <ac:spMkLst>
-            <pc:docMk/>
-            <pc:sldMk cId="245216933" sldId="262"/>
-            <ac:spMk id="21" creationId="{587B4A5B-23CC-07FF-37DF-3D01B62999F9}"/>
-          </ac:spMkLst>
-        </pc:spChg>
-        <pc:spChg chg="add mod ord">
-          <ac:chgData name="Eivind Jahr Kirkeby" userId="edd961ea-506c-4dfc-8bc9-07eb7d0ab3a4" providerId="ADAL" clId="{BE503A25-7BF5-46D1-ACBB-CB53CA58F582}" dt="2023-09-22T10:42:09.510" v="278" actId="20577"/>
-          <ac:spMkLst>
-            <pc:docMk/>
-            <pc:sldMk cId="245216933" sldId="262"/>
-            <ac:spMk id="22" creationId="{7F75F664-2508-4EC2-7460-E06882640C5F}"/>
-          </ac:spMkLst>
-        </pc:spChg>
-        <pc:spChg chg="add mod ord">
-          <ac:chgData name="Eivind Jahr Kirkeby" userId="edd961ea-506c-4dfc-8bc9-07eb7d0ab3a4" providerId="ADAL" clId="{BE503A25-7BF5-46D1-ACBB-CB53CA58F582}" dt="2023-09-22T10:41:39.777" v="268" actId="700"/>
-          <ac:spMkLst>
-            <pc:docMk/>
-            <pc:sldMk cId="245216933" sldId="262"/>
-            <ac:spMk id="23" creationId="{40284F28-BBF3-0C1B-A051-30FDE55DC554}"/>
-          </ac:spMkLst>
-        </pc:spChg>
-        <pc:spChg chg="add mod ord">
-          <ac:chgData name="Eivind Jahr Kirkeby" userId="edd961ea-506c-4dfc-8bc9-07eb7d0ab3a4" providerId="ADAL" clId="{BE503A25-7BF5-46D1-ACBB-CB53CA58F582}" dt="2023-09-22T10:41:39.777" v="268" actId="700"/>
-          <ac:spMkLst>
-            <pc:docMk/>
-            <pc:sldMk cId="245216933" sldId="262"/>
-            <ac:spMk id="24" creationId="{15445131-C853-34FF-7702-004D3B40AA91}"/>
-          </ac:spMkLst>
-        </pc:spChg>
-        <pc:picChg chg="add mod">
-          <ac:chgData name="Eivind Jahr Kirkeby" userId="edd961ea-506c-4dfc-8bc9-07eb7d0ab3a4" providerId="ADAL" clId="{BE503A25-7BF5-46D1-ACBB-CB53CA58F582}" dt="2023-09-22T10:50:15.774" v="340" actId="732"/>
-          <ac:picMkLst>
-            <pc:docMk/>
-            <pc:sldMk cId="245216933" sldId="262"/>
-            <ac:picMk id="11" creationId="{5885ACA5-F6C2-FACE-EAB8-0621BCE4D3B9}"/>
-          </ac:picMkLst>
-        </pc:picChg>
-        <pc:picChg chg="add mod">
-          <ac:chgData name="Eivind Jahr Kirkeby" userId="edd961ea-506c-4dfc-8bc9-07eb7d0ab3a4" providerId="ADAL" clId="{BE503A25-7BF5-46D1-ACBB-CB53CA58F582}" dt="2023-09-22T10:41:46.706" v="269" actId="1076"/>
-          <ac:picMkLst>
-            <pc:docMk/>
-            <pc:sldMk cId="245216933" sldId="262"/>
-            <ac:picMk id="12" creationId="{4BEDCA5A-4F09-3FD1-EF2A-064A4D0904D9}"/>
-          </ac:picMkLst>
-        </pc:picChg>
-        <pc:picChg chg="add mod">
-          <ac:chgData name="Eivind Jahr Kirkeby" userId="edd961ea-506c-4dfc-8bc9-07eb7d0ab3a4" providerId="ADAL" clId="{BE503A25-7BF5-46D1-ACBB-CB53CA58F582}" dt="2023-09-22T10:41:46.706" v="269" actId="1076"/>
-          <ac:picMkLst>
-            <pc:docMk/>
-            <pc:sldMk cId="245216933" sldId="262"/>
-            <ac:picMk id="13" creationId="{DCB128FF-AB04-5D2C-D19E-3D346451C539}"/>
-          </ac:picMkLst>
-        </pc:picChg>
-        <pc:picChg chg="add mod">
-          <ac:chgData name="Eivind Jahr Kirkeby" userId="edd961ea-506c-4dfc-8bc9-07eb7d0ab3a4" providerId="ADAL" clId="{BE503A25-7BF5-46D1-ACBB-CB53CA58F582}" dt="2023-09-22T10:41:46.706" v="269" actId="1076"/>
-          <ac:picMkLst>
-            <pc:docMk/>
-            <pc:sldMk cId="245216933" sldId="262"/>
-            <ac:picMk id="14" creationId="{FD6FD442-CB5F-2164-2548-05033FEC655D}"/>
-          </ac:picMkLst>
-        </pc:picChg>
-        <pc:picChg chg="add mod">
-          <ac:chgData name="Eivind Jahr Kirkeby" userId="edd961ea-506c-4dfc-8bc9-07eb7d0ab3a4" providerId="ADAL" clId="{BE503A25-7BF5-46D1-ACBB-CB53CA58F582}" dt="2023-09-22T10:41:46.706" v="269" actId="1076"/>
-          <ac:picMkLst>
-            <pc:docMk/>
-            <pc:sldMk cId="245216933" sldId="262"/>
-            <ac:picMk id="15" creationId="{86CC2073-3FFA-AFA9-611B-F09A0E04BF57}"/>
-          </ac:picMkLst>
-        </pc:picChg>
-      </pc:sldChg>
-      <pc:sldChg chg="addSp delSp modSp new mod modClrScheme chgLayout modNotesTx">
-        <pc:chgData name="Eivind Jahr Kirkeby" userId="edd961ea-506c-4dfc-8bc9-07eb7d0ab3a4" providerId="ADAL" clId="{BE503A25-7BF5-46D1-ACBB-CB53CA58F582}" dt="2023-09-29T12:35:39.213" v="1778" actId="20577"/>
-        <pc:sldMkLst>
-          <pc:docMk/>
-          <pc:sldMk cId="3666830824" sldId="263"/>
-        </pc:sldMkLst>
-        <pc:spChg chg="del mod">
-          <ac:chgData name="Eivind Jahr Kirkeby" userId="edd961ea-506c-4dfc-8bc9-07eb7d0ab3a4" providerId="ADAL" clId="{BE503A25-7BF5-46D1-ACBB-CB53CA58F582}" dt="2023-09-22T10:47:58.655" v="299" actId="1032"/>
-          <ac:spMkLst>
-            <pc:docMk/>
-            <pc:sldMk cId="3666830824" sldId="263"/>
-            <ac:spMk id="2" creationId="{F3FC2128-7CBE-C51C-712F-396D450F05FC}"/>
-          </ac:spMkLst>
-        </pc:spChg>
-        <pc:spChg chg="del mod ord">
-          <ac:chgData name="Eivind Jahr Kirkeby" userId="edd961ea-506c-4dfc-8bc9-07eb7d0ab3a4" providerId="ADAL" clId="{BE503A25-7BF5-46D1-ACBB-CB53CA58F582}" dt="2023-09-22T10:48:32.281" v="304" actId="700"/>
-          <ac:spMkLst>
-            <pc:docMk/>
-            <pc:sldMk cId="3666830824" sldId="263"/>
-            <ac:spMk id="3" creationId="{28F09EF9-4438-986A-F026-98D956F637D8}"/>
-          </ac:spMkLst>
-        </pc:spChg>
-        <pc:spChg chg="del mod ord">
-          <ac:chgData name="Eivind Jahr Kirkeby" userId="edd961ea-506c-4dfc-8bc9-07eb7d0ab3a4" providerId="ADAL" clId="{BE503A25-7BF5-46D1-ACBB-CB53CA58F582}" dt="2023-09-22T10:48:32.281" v="304" actId="700"/>
-          <ac:spMkLst>
-            <pc:docMk/>
-            <pc:sldMk cId="3666830824" sldId="263"/>
-            <ac:spMk id="4" creationId="{541825BF-D86E-6155-7F81-BCC43BD12B4D}"/>
-          </ac:spMkLst>
-        </pc:spChg>
-        <pc:spChg chg="mod ord">
-          <ac:chgData name="Eivind Jahr Kirkeby" userId="edd961ea-506c-4dfc-8bc9-07eb7d0ab3a4" providerId="ADAL" clId="{BE503A25-7BF5-46D1-ACBB-CB53CA58F582}" dt="2023-09-22T10:49:53.337" v="337"/>
-          <ac:spMkLst>
-            <pc:docMk/>
-            <pc:sldMk cId="3666830824" sldId="263"/>
-            <ac:spMk id="5" creationId="{E238EFD2-A757-3626-9A32-10831DA3842F}"/>
-          </ac:spMkLst>
-        </pc:spChg>
-        <pc:spChg chg="mod ord">
-          <ac:chgData name="Eivind Jahr Kirkeby" userId="edd961ea-506c-4dfc-8bc9-07eb7d0ab3a4" providerId="ADAL" clId="{BE503A25-7BF5-46D1-ACBB-CB53CA58F582}" dt="2023-09-22T10:48:32.281" v="304" actId="700"/>
-          <ac:spMkLst>
-            <pc:docMk/>
-            <pc:sldMk cId="3666830824" sldId="263"/>
-            <ac:spMk id="6" creationId="{04D6E2D7-2746-03CF-CA95-FE69F284F6A4}"/>
-          </ac:spMkLst>
-        </pc:spChg>
-        <pc:spChg chg="add del">
-          <ac:chgData name="Eivind Jahr Kirkeby" userId="edd961ea-506c-4dfc-8bc9-07eb7d0ab3a4" providerId="ADAL" clId="{BE503A25-7BF5-46D1-ACBB-CB53CA58F582}" dt="2023-09-22T10:46:47.753" v="281" actId="22"/>
-          <ac:spMkLst>
-            <pc:docMk/>
-            <pc:sldMk cId="3666830824" sldId="263"/>
-            <ac:spMk id="8" creationId="{C2D6DBF3-98E5-A573-8BFD-4C5D8171FC4F}"/>
-          </ac:spMkLst>
-        </pc:spChg>
-        <pc:spChg chg="add mod ord">
-          <ac:chgData name="Eivind Jahr Kirkeby" userId="edd961ea-506c-4dfc-8bc9-07eb7d0ab3a4" providerId="ADAL" clId="{BE503A25-7BF5-46D1-ACBB-CB53CA58F582}" dt="2023-09-22T10:49:37.349" v="335" actId="20577"/>
-          <ac:spMkLst>
-            <pc:docMk/>
-            <pc:sldMk cId="3666830824" sldId="263"/>
-            <ac:spMk id="12" creationId="{2ECF7051-2557-5FA2-66EF-BECB796385C5}"/>
-          </ac:spMkLst>
-        </pc:spChg>
-        <pc:spChg chg="add mod ord">
-          <ac:chgData name="Eivind Jahr Kirkeby" userId="edd961ea-506c-4dfc-8bc9-07eb7d0ab3a4" providerId="ADAL" clId="{BE503A25-7BF5-46D1-ACBB-CB53CA58F582}" dt="2023-09-29T12:35:39.213" v="1778" actId="20577"/>
-          <ac:spMkLst>
-            <pc:docMk/>
-            <pc:sldMk cId="3666830824" sldId="263"/>
-            <ac:spMk id="13" creationId="{87A198A7-6B4B-0E8C-414D-ED119CFF2C03}"/>
-          </ac:spMkLst>
-        </pc:spChg>
-        <pc:graphicFrameChg chg="add del modGraphic">
-          <ac:chgData name="Eivind Jahr Kirkeby" userId="edd961ea-506c-4dfc-8bc9-07eb7d0ab3a4" providerId="ADAL" clId="{BE503A25-7BF5-46D1-ACBB-CB53CA58F582}" dt="2023-09-22T10:47:24.185" v="291" actId="1032"/>
-          <ac:graphicFrameMkLst>
-            <pc:docMk/>
-            <pc:sldMk cId="3666830824" sldId="263"/>
-            <ac:graphicFrameMk id="9" creationId="{65D29715-F1F0-65E0-2F84-D9CCB250B0A2}"/>
-          </ac:graphicFrameMkLst>
-        </pc:graphicFrameChg>
-        <pc:graphicFrameChg chg="add del modGraphic">
-          <ac:chgData name="Eivind Jahr Kirkeby" userId="edd961ea-506c-4dfc-8bc9-07eb7d0ab3a4" providerId="ADAL" clId="{BE503A25-7BF5-46D1-ACBB-CB53CA58F582}" dt="2023-09-22T10:47:52.037" v="296" actId="1032"/>
-          <ac:graphicFrameMkLst>
-            <pc:docMk/>
-            <pc:sldMk cId="3666830824" sldId="263"/>
-            <ac:graphicFrameMk id="10" creationId="{88172FCE-4E28-7087-1111-05997028E3D1}"/>
-          </ac:graphicFrameMkLst>
-        </pc:graphicFrameChg>
-        <pc:graphicFrameChg chg="add mod ord modGraphic">
-          <ac:chgData name="Eivind Jahr Kirkeby" userId="edd961ea-506c-4dfc-8bc9-07eb7d0ab3a4" providerId="ADAL" clId="{BE503A25-7BF5-46D1-ACBB-CB53CA58F582}" dt="2023-09-22T10:54:05.924" v="361" actId="207"/>
-          <ac:graphicFrameMkLst>
-            <pc:docMk/>
-            <pc:sldMk cId="3666830824" sldId="263"/>
-            <ac:graphicFrameMk id="11" creationId="{949EECBD-0C20-DB64-4A9C-611D9609B2B1}"/>
-          </ac:graphicFrameMkLst>
-        </pc:graphicFrameChg>
-      </pc:sldChg>
-      <pc:sldChg chg="addSp delSp modSp new mod modClrScheme chgLayout modNotesTx">
-        <pc:chgData name="Eivind Jahr Kirkeby" userId="edd961ea-506c-4dfc-8bc9-07eb7d0ab3a4" providerId="ADAL" clId="{BE503A25-7BF5-46D1-ACBB-CB53CA58F582}" dt="2023-09-22T10:58:41.429" v="585" actId="20577"/>
-        <pc:sldMkLst>
-          <pc:docMk/>
-          <pc:sldMk cId="3660443692" sldId="264"/>
-        </pc:sldMkLst>
-        <pc:spChg chg="del">
-          <ac:chgData name="Eivind Jahr Kirkeby" userId="edd961ea-506c-4dfc-8bc9-07eb7d0ab3a4" providerId="ADAL" clId="{BE503A25-7BF5-46D1-ACBB-CB53CA58F582}" dt="2023-09-22T10:52:59.530" v="356"/>
-          <ac:spMkLst>
-            <pc:docMk/>
-            <pc:sldMk cId="3660443692" sldId="264"/>
-            <ac:spMk id="2" creationId="{AAA82EFA-EE05-349D-1249-4C403AF6BF8E}"/>
-          </ac:spMkLst>
-        </pc:spChg>
-        <pc:spChg chg="add del mod">
-          <ac:chgData name="Eivind Jahr Kirkeby" userId="edd961ea-506c-4dfc-8bc9-07eb7d0ab3a4" providerId="ADAL" clId="{BE503A25-7BF5-46D1-ACBB-CB53CA58F582}" dt="2023-09-22T10:57:38.700" v="451"/>
-          <ac:spMkLst>
-            <pc:docMk/>
-            <pc:sldMk cId="3660443692" sldId="264"/>
-            <ac:spMk id="3" creationId="{63D35F6B-B5CC-D3B6-71D8-AEC3381E4404}"/>
-          </ac:spMkLst>
-        </pc:spChg>
-        <pc:spChg chg="mod">
-          <ac:chgData name="Eivind Jahr Kirkeby" userId="edd961ea-506c-4dfc-8bc9-07eb7d0ab3a4" providerId="ADAL" clId="{BE503A25-7BF5-46D1-ACBB-CB53CA58F582}" dt="2023-09-22T10:57:42.212" v="459" actId="20577"/>
-          <ac:spMkLst>
-            <pc:docMk/>
-            <pc:sldMk cId="3660443692" sldId="264"/>
-            <ac:spMk id="4" creationId="{E1BA50F5-AD68-7482-7480-D80A5B9FF7C5}"/>
-          </ac:spMkLst>
-        </pc:spChg>
-        <pc:spChg chg="mod">
-          <ac:chgData name="Eivind Jahr Kirkeby" userId="edd961ea-506c-4dfc-8bc9-07eb7d0ab3a4" providerId="ADAL" clId="{BE503A25-7BF5-46D1-ACBB-CB53CA58F582}" dt="2023-09-22T10:54:49.203" v="362"/>
-          <ac:spMkLst>
-            <pc:docMk/>
-            <pc:sldMk cId="3660443692" sldId="264"/>
-            <ac:spMk id="5" creationId="{84BF2F0C-60E2-29BE-DAD7-A46C02A5825C}"/>
-          </ac:spMkLst>
-        </pc:spChg>
-        <pc:spChg chg="mod">
-          <ac:chgData name="Eivind Jahr Kirkeby" userId="edd961ea-506c-4dfc-8bc9-07eb7d0ab3a4" providerId="ADAL" clId="{BE503A25-7BF5-46D1-ACBB-CB53CA58F582}" dt="2023-09-22T10:53:03.606" v="358" actId="26606"/>
-          <ac:spMkLst>
-            <pc:docMk/>
-            <pc:sldMk cId="3660443692" sldId="264"/>
-            <ac:spMk id="6" creationId="{1E6F65FE-0B19-95BC-AF94-3D0BB3774E45}"/>
-          </ac:spMkLst>
-        </pc:spChg>
-        <pc:spChg chg="add del mod">
-          <ac:chgData name="Eivind Jahr Kirkeby" userId="edd961ea-506c-4dfc-8bc9-07eb7d0ab3a4" providerId="ADAL" clId="{BE503A25-7BF5-46D1-ACBB-CB53CA58F582}" dt="2023-09-22T10:53:03.606" v="358" actId="26606"/>
-          <ac:spMkLst>
-            <pc:docMk/>
-            <pc:sldMk cId="3660443692" sldId="264"/>
-            <ac:spMk id="1031" creationId="{1581A03F-003B-46D3-C19D-5E9AF2F088A1}"/>
-          </ac:spMkLst>
-        </pc:spChg>
-        <pc:picChg chg="add mod ord">
-          <ac:chgData name="Eivind Jahr Kirkeby" userId="edd961ea-506c-4dfc-8bc9-07eb7d0ab3a4" providerId="ADAL" clId="{BE503A25-7BF5-46D1-ACBB-CB53CA58F582}" dt="2023-09-22T10:53:03.606" v="358" actId="26606"/>
-          <ac:picMkLst>
-            <pc:docMk/>
-            <pc:sldMk cId="3660443692" sldId="264"/>
-            <ac:picMk id="1026" creationId="{2BA69DC6-3616-25A1-CFB6-A14FC89D4BAD}"/>
-          </ac:picMkLst>
-        </pc:picChg>
-      </pc:sldChg>
-      <pc:sldChg chg="addSp delSp modSp new mod modClrScheme chgLayout">
-        <pc:chgData name="Eivind Jahr Kirkeby" userId="edd961ea-506c-4dfc-8bc9-07eb7d0ab3a4" providerId="ADAL" clId="{BE503A25-7BF5-46D1-ACBB-CB53CA58F582}" dt="2023-09-22T10:57:33.891" v="450"/>
-        <pc:sldMkLst>
-          <pc:docMk/>
-          <pc:sldMk cId="2021633908" sldId="265"/>
-        </pc:sldMkLst>
-        <pc:spChg chg="del mod ord">
-          <ac:chgData name="Eivind Jahr Kirkeby" userId="edd961ea-506c-4dfc-8bc9-07eb7d0ab3a4" providerId="ADAL" clId="{BE503A25-7BF5-46D1-ACBB-CB53CA58F582}" dt="2023-09-22T10:56:29.417" v="427" actId="700"/>
-          <ac:spMkLst>
-            <pc:docMk/>
-            <pc:sldMk cId="2021633908" sldId="265"/>
-            <ac:spMk id="2" creationId="{B3DC30FF-AFB6-775A-0434-DCC2EBD962CB}"/>
-          </ac:spMkLst>
-        </pc:spChg>
-        <pc:spChg chg="del">
-          <ac:chgData name="Eivind Jahr Kirkeby" userId="edd961ea-506c-4dfc-8bc9-07eb7d0ab3a4" providerId="ADAL" clId="{BE503A25-7BF5-46D1-ACBB-CB53CA58F582}" dt="2023-09-22T10:56:29.417" v="427" actId="700"/>
-          <ac:spMkLst>
-            <pc:docMk/>
-            <pc:sldMk cId="2021633908" sldId="265"/>
-            <ac:spMk id="3" creationId="{A8FA6884-FFF0-6003-64E2-75F06EBB6CE6}"/>
-          </ac:spMkLst>
-        </pc:spChg>
-        <pc:spChg chg="del mod ord">
-          <ac:chgData name="Eivind Jahr Kirkeby" userId="edd961ea-506c-4dfc-8bc9-07eb7d0ab3a4" providerId="ADAL" clId="{BE503A25-7BF5-46D1-ACBB-CB53CA58F582}" dt="2023-09-22T10:56:29.417" v="427" actId="700"/>
-          <ac:spMkLst>
-            <pc:docMk/>
-            <pc:sldMk cId="2021633908" sldId="265"/>
-            <ac:spMk id="4" creationId="{2A8F8F7D-FDEE-2E76-D401-9D96B8AEE2FF}"/>
-          </ac:spMkLst>
-        </pc:spChg>
-        <pc:spChg chg="mod ord">
-          <ac:chgData name="Eivind Jahr Kirkeby" userId="edd961ea-506c-4dfc-8bc9-07eb7d0ab3a4" providerId="ADAL" clId="{BE503A25-7BF5-46D1-ACBB-CB53CA58F582}" dt="2023-09-22T10:57:33.891" v="450"/>
-          <ac:spMkLst>
-            <pc:docMk/>
-            <pc:sldMk cId="2021633908" sldId="265"/>
-            <ac:spMk id="5" creationId="{E70148E6-837B-1C60-DB48-A59AC0026950}"/>
-          </ac:spMkLst>
-        </pc:spChg>
-        <pc:spChg chg="mod ord">
-          <ac:chgData name="Eivind Jahr Kirkeby" userId="edd961ea-506c-4dfc-8bc9-07eb7d0ab3a4" providerId="ADAL" clId="{BE503A25-7BF5-46D1-ACBB-CB53CA58F582}" dt="2023-09-22T10:56:29.417" v="427" actId="700"/>
-          <ac:spMkLst>
-            <pc:docMk/>
-            <pc:sldMk cId="2021633908" sldId="265"/>
-            <ac:spMk id="6" creationId="{637F9814-DCF4-1A0D-5CBA-548A2E687AED}"/>
-          </ac:spMkLst>
-        </pc:spChg>
-        <pc:spChg chg="add mod ord">
-          <ac:chgData name="Eivind Jahr Kirkeby" userId="edd961ea-506c-4dfc-8bc9-07eb7d0ab3a4" providerId="ADAL" clId="{BE503A25-7BF5-46D1-ACBB-CB53CA58F582}" dt="2023-09-22T10:56:49.825" v="438" actId="313"/>
-          <ac:spMkLst>
-            <pc:docMk/>
-            <pc:sldMk cId="2021633908" sldId="265"/>
-            <ac:spMk id="7" creationId="{2FAF2783-99E3-9FCA-8B21-88C63DB6A7D7}"/>
-          </ac:spMkLst>
-        </pc:spChg>
-        <pc:spChg chg="add mod ord">
-          <ac:chgData name="Eivind Jahr Kirkeby" userId="edd961ea-506c-4dfc-8bc9-07eb7d0ab3a4" providerId="ADAL" clId="{BE503A25-7BF5-46D1-ACBB-CB53CA58F582}" dt="2023-09-22T10:57:10.656" v="449" actId="14100"/>
-          <ac:spMkLst>
-            <pc:docMk/>
-            <pc:sldMk cId="2021633908" sldId="265"/>
-            <ac:spMk id="8" creationId="{A5CA5A42-FC0F-CFED-706F-A3228881719A}"/>
-          </ac:spMkLst>
-        </pc:spChg>
-      </pc:sldChg>
-      <pc:sldChg chg="addSp delSp modSp new mod chgLayout">
-        <pc:chgData name="Eivind Jahr Kirkeby" userId="edd961ea-506c-4dfc-8bc9-07eb7d0ab3a4" providerId="ADAL" clId="{BE503A25-7BF5-46D1-ACBB-CB53CA58F582}" dt="2023-09-29T11:39:27.927" v="751"/>
-        <pc:sldMkLst>
-          <pc:docMk/>
-          <pc:sldMk cId="3412566513" sldId="266"/>
-        </pc:sldMkLst>
-        <pc:spChg chg="add del mod">
-          <ac:chgData name="Eivind Jahr Kirkeby" userId="edd961ea-506c-4dfc-8bc9-07eb7d0ab3a4" providerId="ADAL" clId="{BE503A25-7BF5-46D1-ACBB-CB53CA58F582}" dt="2023-09-22T11:02:24.622" v="593" actId="6264"/>
-          <ac:spMkLst>
-            <pc:docMk/>
-            <pc:sldMk cId="3412566513" sldId="266"/>
-            <ac:spMk id="2" creationId="{A638E543-A4D1-1258-B9C2-AACC7ECDAD0B}"/>
-          </ac:spMkLst>
-        </pc:spChg>
-        <pc:spChg chg="add del">
-          <ac:chgData name="Eivind Jahr Kirkeby" userId="edd961ea-506c-4dfc-8bc9-07eb7d0ab3a4" providerId="ADAL" clId="{BE503A25-7BF5-46D1-ACBB-CB53CA58F582}" dt="2023-09-22T11:02:24.622" v="593" actId="6264"/>
-          <ac:spMkLst>
-            <pc:docMk/>
-            <pc:sldMk cId="3412566513" sldId="266"/>
-            <ac:spMk id="3" creationId="{B4F90C2B-5124-5C10-8869-8767E01BD6CA}"/>
-          </ac:spMkLst>
-        </pc:spChg>
-        <pc:spChg chg="add del">
-          <ac:chgData name="Eivind Jahr Kirkeby" userId="edd961ea-506c-4dfc-8bc9-07eb7d0ab3a4" providerId="ADAL" clId="{BE503A25-7BF5-46D1-ACBB-CB53CA58F582}" dt="2023-09-22T11:02:24.622" v="593" actId="6264"/>
-          <ac:spMkLst>
-            <pc:docMk/>
-            <pc:sldMk cId="3412566513" sldId="266"/>
-            <ac:spMk id="4" creationId="{A7FACAAC-46A5-2246-910E-FA96B6AC54AC}"/>
-          </ac:spMkLst>
-        </pc:spChg>
-        <pc:spChg chg="mod ord">
-          <ac:chgData name="Eivind Jahr Kirkeby" userId="edd961ea-506c-4dfc-8bc9-07eb7d0ab3a4" providerId="ADAL" clId="{BE503A25-7BF5-46D1-ACBB-CB53CA58F582}" dt="2023-09-29T11:39:27.927" v="751"/>
-          <ac:spMkLst>
-            <pc:docMk/>
-            <pc:sldMk cId="3412566513" sldId="266"/>
-            <ac:spMk id="5" creationId="{C5F6BAB5-B5A6-8CF6-D045-AFEED5A64D93}"/>
-          </ac:spMkLst>
-        </pc:spChg>
-        <pc:spChg chg="mod ord">
-          <ac:chgData name="Eivind Jahr Kirkeby" userId="edd961ea-506c-4dfc-8bc9-07eb7d0ab3a4" providerId="ADAL" clId="{BE503A25-7BF5-46D1-ACBB-CB53CA58F582}" dt="2023-09-22T11:02:24.622" v="593" actId="6264"/>
-          <ac:spMkLst>
-            <pc:docMk/>
-            <pc:sldMk cId="3412566513" sldId="266"/>
-            <ac:spMk id="6" creationId="{40079E0E-24FC-D607-E4F1-126CBD5B06DF}"/>
-          </ac:spMkLst>
-        </pc:spChg>
-        <pc:spChg chg="add del mod">
-          <ac:chgData name="Eivind Jahr Kirkeby" userId="edd961ea-506c-4dfc-8bc9-07eb7d0ab3a4" providerId="ADAL" clId="{BE503A25-7BF5-46D1-ACBB-CB53CA58F582}" dt="2023-09-22T11:02:21.686" v="592" actId="6264"/>
-          <ac:spMkLst>
-            <pc:docMk/>
-            <pc:sldMk cId="3412566513" sldId="266"/>
-            <ac:spMk id="7" creationId="{A2BC77E9-3163-77DF-FCAF-D35C8B164C3D}"/>
-          </ac:spMkLst>
-        </pc:spChg>
-        <pc:spChg chg="add del mod">
-          <ac:chgData name="Eivind Jahr Kirkeby" userId="edd961ea-506c-4dfc-8bc9-07eb7d0ab3a4" providerId="ADAL" clId="{BE503A25-7BF5-46D1-ACBB-CB53CA58F582}" dt="2023-09-22T11:02:21.686" v="592" actId="6264"/>
-          <ac:spMkLst>
-            <pc:docMk/>
-            <pc:sldMk cId="3412566513" sldId="266"/>
-            <ac:spMk id="8" creationId="{84B32030-FB45-4C79-D651-CC1CA90A664D}"/>
-          </ac:spMkLst>
-        </pc:spChg>
-        <pc:spChg chg="add del mod ord">
-          <ac:chgData name="Eivind Jahr Kirkeby" userId="edd961ea-506c-4dfc-8bc9-07eb7d0ab3a4" providerId="ADAL" clId="{BE503A25-7BF5-46D1-ACBB-CB53CA58F582}" dt="2023-09-22T11:02:21.686" v="592" actId="6264"/>
-          <ac:spMkLst>
-            <pc:docMk/>
-            <pc:sldMk cId="3412566513" sldId="266"/>
-            <ac:spMk id="9" creationId="{86B1DBBA-2DF5-6D32-6AE7-B177E1DAF8C7}"/>
-          </ac:spMkLst>
-        </pc:spChg>
-        <pc:spChg chg="add del mod ord">
-          <ac:chgData name="Eivind Jahr Kirkeby" userId="edd961ea-506c-4dfc-8bc9-07eb7d0ab3a4" providerId="ADAL" clId="{BE503A25-7BF5-46D1-ACBB-CB53CA58F582}" dt="2023-09-22T11:02:21.686" v="592" actId="6264"/>
-          <ac:spMkLst>
-            <pc:docMk/>
-            <pc:sldMk cId="3412566513" sldId="266"/>
-            <ac:spMk id="10" creationId="{A00CF341-4DD1-ED52-0DC5-75BA7C1018F9}"/>
-          </ac:spMkLst>
-        </pc:spChg>
-        <pc:spChg chg="add del mod ord">
-          <ac:chgData name="Eivind Jahr Kirkeby" userId="edd961ea-506c-4dfc-8bc9-07eb7d0ab3a4" providerId="ADAL" clId="{BE503A25-7BF5-46D1-ACBB-CB53CA58F582}" dt="2023-09-22T11:02:21.686" v="592" actId="6264"/>
-          <ac:spMkLst>
-            <pc:docMk/>
-            <pc:sldMk cId="3412566513" sldId="266"/>
-            <ac:spMk id="11" creationId="{2E4EAF1F-FDBA-3DA5-F9F5-B06261FDCF66}"/>
-          </ac:spMkLst>
-        </pc:spChg>
-        <pc:spChg chg="add del mod">
-          <ac:chgData name="Eivind Jahr Kirkeby" userId="edd961ea-506c-4dfc-8bc9-07eb7d0ab3a4" providerId="ADAL" clId="{BE503A25-7BF5-46D1-ACBB-CB53CA58F582}" dt="2023-09-22T11:02:24.622" v="593" actId="6264"/>
-          <ac:spMkLst>
-            <pc:docMk/>
-            <pc:sldMk cId="3412566513" sldId="266"/>
-            <ac:spMk id="12" creationId="{6205ACFF-934E-3490-3C4C-6B0D05CBF05B}"/>
-          </ac:spMkLst>
-        </pc:spChg>
-        <pc:spChg chg="add del mod">
-          <ac:chgData name="Eivind Jahr Kirkeby" userId="edd961ea-506c-4dfc-8bc9-07eb7d0ab3a4" providerId="ADAL" clId="{BE503A25-7BF5-46D1-ACBB-CB53CA58F582}" dt="2023-09-22T11:02:24.622" v="593" actId="6264"/>
-          <ac:spMkLst>
-            <pc:docMk/>
-            <pc:sldMk cId="3412566513" sldId="266"/>
-            <ac:spMk id="13" creationId="{D993A018-437D-5E55-B691-489F7FB39937}"/>
-          </ac:spMkLst>
-        </pc:spChg>
-        <pc:spChg chg="add mod ord">
-          <ac:chgData name="Eivind Jahr Kirkeby" userId="edd961ea-506c-4dfc-8bc9-07eb7d0ab3a4" providerId="ADAL" clId="{BE503A25-7BF5-46D1-ACBB-CB53CA58F582}" dt="2023-09-22T11:05:14.575" v="613" actId="20577"/>
-          <ac:spMkLst>
-            <pc:docMk/>
-            <pc:sldMk cId="3412566513" sldId="266"/>
-            <ac:spMk id="14" creationId="{387CE918-2DF0-6FCE-2BB2-BFD7C7391D85}"/>
-          </ac:spMkLst>
-        </pc:spChg>
-        <pc:spChg chg="add del mod ord">
-          <ac:chgData name="Eivind Jahr Kirkeby" userId="edd961ea-506c-4dfc-8bc9-07eb7d0ab3a4" providerId="ADAL" clId="{BE503A25-7BF5-46D1-ACBB-CB53CA58F582}" dt="2023-09-22T11:05:04.994" v="606" actId="22"/>
-          <ac:spMkLst>
-            <pc:docMk/>
-            <pc:sldMk cId="3412566513" sldId="266"/>
-            <ac:spMk id="15" creationId="{BFC10B15-2088-16AE-5834-A361A50CA469}"/>
-          </ac:spMkLst>
-        </pc:spChg>
-        <pc:spChg chg="add mod ord">
-          <ac:chgData name="Eivind Jahr Kirkeby" userId="edd961ea-506c-4dfc-8bc9-07eb7d0ab3a4" providerId="ADAL" clId="{BE503A25-7BF5-46D1-ACBB-CB53CA58F582}" dt="2023-09-22T11:05:20.684" v="615" actId="20577"/>
-          <ac:spMkLst>
-            <pc:docMk/>
-            <pc:sldMk cId="3412566513" sldId="266"/>
-            <ac:spMk id="16" creationId="{313F75E0-1BD2-3B4A-04B1-EF112190A33F}"/>
-          </ac:spMkLst>
-        </pc:spChg>
-        <pc:spChg chg="add del mod">
-          <ac:chgData name="Eivind Jahr Kirkeby" userId="edd961ea-506c-4dfc-8bc9-07eb7d0ab3a4" providerId="ADAL" clId="{BE503A25-7BF5-46D1-ACBB-CB53CA58F582}" dt="2023-09-22T11:04:24.455" v="601"/>
-          <ac:spMkLst>
-            <pc:docMk/>
-            <pc:sldMk cId="3412566513" sldId="266"/>
-            <ac:spMk id="17" creationId="{09EB9045-8C8B-DA70-FBB7-88DA5F8DC6CC}"/>
-          </ac:spMkLst>
-        </pc:spChg>
-        <pc:spChg chg="add del mod">
-          <ac:chgData name="Eivind Jahr Kirkeby" userId="edd961ea-506c-4dfc-8bc9-07eb7d0ab3a4" providerId="ADAL" clId="{BE503A25-7BF5-46D1-ACBB-CB53CA58F582}" dt="2023-09-22T11:04:25.841" v="603"/>
-          <ac:spMkLst>
-            <pc:docMk/>
-            <pc:sldMk cId="3412566513" sldId="266"/>
-            <ac:spMk id="18" creationId="{C1A49407-DFAE-9021-9ADB-EC16EFFE27AE}"/>
-          </ac:spMkLst>
-        </pc:spChg>
-        <pc:spChg chg="add del mod">
-          <ac:chgData name="Eivind Jahr Kirkeby" userId="edd961ea-506c-4dfc-8bc9-07eb7d0ab3a4" providerId="ADAL" clId="{BE503A25-7BF5-46D1-ACBB-CB53CA58F582}" dt="2023-09-22T11:04:42.474" v="605" actId="478"/>
-          <ac:spMkLst>
-            <pc:docMk/>
-            <pc:sldMk cId="3412566513" sldId="266"/>
-            <ac:spMk id="19" creationId="{15CAD175-8142-0E32-A886-17EBD7AE6264}"/>
-          </ac:spMkLst>
-        </pc:spChg>
-        <pc:picChg chg="add mod ord">
-          <ac:chgData name="Eivind Jahr Kirkeby" userId="edd961ea-506c-4dfc-8bc9-07eb7d0ab3a4" providerId="ADAL" clId="{BE503A25-7BF5-46D1-ACBB-CB53CA58F582}" dt="2023-09-22T11:05:04.994" v="606" actId="22"/>
-          <ac:picMkLst>
-            <pc:docMk/>
-            <pc:sldMk cId="3412566513" sldId="266"/>
-            <ac:picMk id="21" creationId="{13843F22-0A5A-FF81-CB29-0A84B4C6117B}"/>
-          </ac:picMkLst>
-        </pc:picChg>
-      </pc:sldChg>
-      <pc:sldChg chg="addSp delSp modSp new mod modClrScheme chgLayout modNotesTx">
-        <pc:chgData name="Eivind Jahr Kirkeby" userId="edd961ea-506c-4dfc-8bc9-07eb7d0ab3a4" providerId="ADAL" clId="{BE503A25-7BF5-46D1-ACBB-CB53CA58F582}" dt="2023-09-29T12:28:33.857" v="1314" actId="20577"/>
-        <pc:sldMkLst>
-          <pc:docMk/>
-          <pc:sldMk cId="3087527206" sldId="267"/>
-        </pc:sldMkLst>
-        <pc:spChg chg="del">
-          <ac:chgData name="Eivind Jahr Kirkeby" userId="edd961ea-506c-4dfc-8bc9-07eb7d0ab3a4" providerId="ADAL" clId="{BE503A25-7BF5-46D1-ACBB-CB53CA58F582}" dt="2023-09-29T11:25:50.621" v="617" actId="700"/>
-          <ac:spMkLst>
-            <pc:docMk/>
-            <pc:sldMk cId="3087527206" sldId="267"/>
-            <ac:spMk id="2" creationId="{E23136AE-29ED-0C7C-B929-FBD168DA0485}"/>
-          </ac:spMkLst>
-        </pc:spChg>
-        <pc:spChg chg="del mod ord">
-          <ac:chgData name="Eivind Jahr Kirkeby" userId="edd961ea-506c-4dfc-8bc9-07eb7d0ab3a4" providerId="ADAL" clId="{BE503A25-7BF5-46D1-ACBB-CB53CA58F582}" dt="2023-09-29T11:25:50.621" v="617" actId="700"/>
-          <ac:spMkLst>
-            <pc:docMk/>
-            <pc:sldMk cId="3087527206" sldId="267"/>
-            <ac:spMk id="3" creationId="{264C2326-9FAC-8200-5D86-9DA617A444C6}"/>
-          </ac:spMkLst>
-        </pc:spChg>
-        <pc:spChg chg="del mod ord">
-          <ac:chgData name="Eivind Jahr Kirkeby" userId="edd961ea-506c-4dfc-8bc9-07eb7d0ab3a4" providerId="ADAL" clId="{BE503A25-7BF5-46D1-ACBB-CB53CA58F582}" dt="2023-09-29T11:25:50.621" v="617" actId="700"/>
-          <ac:spMkLst>
-            <pc:docMk/>
-            <pc:sldMk cId="3087527206" sldId="267"/>
-            <ac:spMk id="4" creationId="{056C39E7-520E-AB3C-91FB-1C4D25D294A9}"/>
-          </ac:spMkLst>
-        </pc:spChg>
-        <pc:spChg chg="mod ord">
-          <ac:chgData name="Eivind Jahr Kirkeby" userId="edd961ea-506c-4dfc-8bc9-07eb7d0ab3a4" providerId="ADAL" clId="{BE503A25-7BF5-46D1-ACBB-CB53CA58F582}" dt="2023-09-29T11:41:10.977" v="760" actId="700"/>
-          <ac:spMkLst>
-            <pc:docMk/>
-            <pc:sldMk cId="3087527206" sldId="267"/>
-            <ac:spMk id="5" creationId="{7369EAD1-DC03-83BD-0E1E-97B90E1A03D3}"/>
-          </ac:spMkLst>
-        </pc:spChg>
-        <pc:spChg chg="mod ord">
-          <ac:chgData name="Eivind Jahr Kirkeby" userId="edd961ea-506c-4dfc-8bc9-07eb7d0ab3a4" providerId="ADAL" clId="{BE503A25-7BF5-46D1-ACBB-CB53CA58F582}" dt="2023-09-29T11:41:10.977" v="760" actId="700"/>
-          <ac:spMkLst>
-            <pc:docMk/>
-            <pc:sldMk cId="3087527206" sldId="267"/>
-            <ac:spMk id="6" creationId="{01D5A5B5-258F-5655-6947-611771B5846C}"/>
-          </ac:spMkLst>
-        </pc:spChg>
-        <pc:spChg chg="add mod ord">
-          <ac:chgData name="Eivind Jahr Kirkeby" userId="edd961ea-506c-4dfc-8bc9-07eb7d0ab3a4" providerId="ADAL" clId="{BE503A25-7BF5-46D1-ACBB-CB53CA58F582}" dt="2023-09-29T11:41:10.977" v="760" actId="700"/>
-          <ac:spMkLst>
-            <pc:docMk/>
-            <pc:sldMk cId="3087527206" sldId="267"/>
-            <ac:spMk id="7" creationId="{A333E45A-2DD3-8649-74C0-F0E3B9CA1149}"/>
-          </ac:spMkLst>
-        </pc:spChg>
-        <pc:spChg chg="add del mod ord">
-          <ac:chgData name="Eivind Jahr Kirkeby" userId="edd961ea-506c-4dfc-8bc9-07eb7d0ab3a4" providerId="ADAL" clId="{BE503A25-7BF5-46D1-ACBB-CB53CA58F582}" dt="2023-09-29T11:39:46.273" v="754" actId="700"/>
-          <ac:spMkLst>
-            <pc:docMk/>
-            <pc:sldMk cId="3087527206" sldId="267"/>
-            <ac:spMk id="8" creationId="{7A7C611C-D7D0-5A19-923D-8EAF02ADB085}"/>
-          </ac:spMkLst>
-        </pc:spChg>
-        <pc:spChg chg="add mod ord">
-          <ac:chgData name="Eivind Jahr Kirkeby" userId="edd961ea-506c-4dfc-8bc9-07eb7d0ab3a4" providerId="ADAL" clId="{BE503A25-7BF5-46D1-ACBB-CB53CA58F582}" dt="2023-09-29T11:41:10.977" v="760" actId="700"/>
-          <ac:spMkLst>
-            <pc:docMk/>
-            <pc:sldMk cId="3087527206" sldId="267"/>
-            <ac:spMk id="9" creationId="{DAB3E93A-1025-D8B0-EB8F-AB1FF48482A3}"/>
-          </ac:spMkLst>
-        </pc:spChg>
-        <pc:spChg chg="add del mod ord">
-          <ac:chgData name="Eivind Jahr Kirkeby" userId="edd961ea-506c-4dfc-8bc9-07eb7d0ab3a4" providerId="ADAL" clId="{BE503A25-7BF5-46D1-ACBB-CB53CA58F582}" dt="2023-09-29T11:41:10.977" v="760" actId="700"/>
-          <ac:spMkLst>
-            <pc:docMk/>
-            <pc:sldMk cId="3087527206" sldId="267"/>
-            <ac:spMk id="10" creationId="{6778555D-B2ED-B099-263D-A995976FD38A}"/>
-          </ac:spMkLst>
-        </pc:spChg>
-        <pc:picChg chg="add mod">
-          <ac:chgData name="Eivind Jahr Kirkeby" userId="edd961ea-506c-4dfc-8bc9-07eb7d0ab3a4" providerId="ADAL" clId="{BE503A25-7BF5-46D1-ACBB-CB53CA58F582}" dt="2023-09-29T11:50:33.075" v="817" actId="1076"/>
-          <ac:picMkLst>
-            <pc:docMk/>
-            <pc:sldMk cId="3087527206" sldId="267"/>
-            <ac:picMk id="11" creationId="{B64E54BF-6177-06C2-8835-20543103D93C}"/>
-          </ac:picMkLst>
-        </pc:picChg>
-        <pc:picChg chg="add mod">
-          <ac:chgData name="Eivind Jahr Kirkeby" userId="edd961ea-506c-4dfc-8bc9-07eb7d0ab3a4" providerId="ADAL" clId="{BE503A25-7BF5-46D1-ACBB-CB53CA58F582}" dt="2023-09-29T11:50:30.929" v="816" actId="1076"/>
-          <ac:picMkLst>
-            <pc:docMk/>
-            <pc:sldMk cId="3087527206" sldId="267"/>
-            <ac:picMk id="12" creationId="{469E5A51-6D91-1BB7-2340-B1E24889F808}"/>
-          </ac:picMkLst>
-        </pc:picChg>
-      </pc:sldChg>
-      <pc:sldChg chg="new del">
-        <pc:chgData name="Eivind Jahr Kirkeby" userId="edd961ea-506c-4dfc-8bc9-07eb7d0ab3a4" providerId="ADAL" clId="{BE503A25-7BF5-46D1-ACBB-CB53CA58F582}" dt="2023-09-29T11:41:16.745" v="761" actId="47"/>
-        <pc:sldMkLst>
-          <pc:docMk/>
-          <pc:sldMk cId="1647141508" sldId="268"/>
-        </pc:sldMkLst>
-      </pc:sldChg>
-      <pc:sldChg chg="addSp delSp modSp new mod modClrScheme chgLayout">
-        <pc:chgData name="Eivind Jahr Kirkeby" userId="edd961ea-506c-4dfc-8bc9-07eb7d0ab3a4" providerId="ADAL" clId="{BE503A25-7BF5-46D1-ACBB-CB53CA58F582}" dt="2023-09-29T11:49:56.869" v="784" actId="20577"/>
-        <pc:sldMkLst>
-          <pc:docMk/>
-          <pc:sldMk cId="3246537870" sldId="269"/>
-        </pc:sldMkLst>
-        <pc:spChg chg="del">
-          <ac:chgData name="Eivind Jahr Kirkeby" userId="edd961ea-506c-4dfc-8bc9-07eb7d0ab3a4" providerId="ADAL" clId="{BE503A25-7BF5-46D1-ACBB-CB53CA58F582}" dt="2023-09-29T11:38:31.544" v="747" actId="931"/>
-          <ac:spMkLst>
-            <pc:docMk/>
-            <pc:sldMk cId="3246537870" sldId="269"/>
-            <ac:spMk id="2" creationId="{F93BE658-8C94-8DD7-65C9-28FF75A2A6A6}"/>
-          </ac:spMkLst>
-        </pc:spChg>
-        <pc:spChg chg="mod ord">
-          <ac:chgData name="Eivind Jahr Kirkeby" userId="edd961ea-506c-4dfc-8bc9-07eb7d0ab3a4" providerId="ADAL" clId="{BE503A25-7BF5-46D1-ACBB-CB53CA58F582}" dt="2023-09-29T11:39:15.589" v="750" actId="700"/>
-          <ac:spMkLst>
-            <pc:docMk/>
-            <pc:sldMk cId="3246537870" sldId="269"/>
-            <ac:spMk id="3" creationId="{CCB6DF32-4819-03D2-B261-7EF95AAB85BC}"/>
-          </ac:spMkLst>
-        </pc:spChg>
-        <pc:spChg chg="mod ord">
-          <ac:chgData name="Eivind Jahr Kirkeby" userId="edd961ea-506c-4dfc-8bc9-07eb7d0ab3a4" providerId="ADAL" clId="{BE503A25-7BF5-46D1-ACBB-CB53CA58F582}" dt="2023-09-29T11:49:56.869" v="784" actId="20577"/>
-          <ac:spMkLst>
-            <pc:docMk/>
-            <pc:sldMk cId="3246537870" sldId="269"/>
-            <ac:spMk id="4" creationId="{AC81E0B8-3BBE-5932-DD1B-DB8AC6A373E5}"/>
-          </ac:spMkLst>
-        </pc:spChg>
-        <pc:spChg chg="mod ord">
-          <ac:chgData name="Eivind Jahr Kirkeby" userId="edd961ea-506c-4dfc-8bc9-07eb7d0ab3a4" providerId="ADAL" clId="{BE503A25-7BF5-46D1-ACBB-CB53CA58F582}" dt="2023-09-29T11:39:30.348" v="752"/>
-          <ac:spMkLst>
-            <pc:docMk/>
-            <pc:sldMk cId="3246537870" sldId="269"/>
-            <ac:spMk id="5" creationId="{75E6102C-2D2B-CA75-9F1F-1558D1E23385}"/>
-          </ac:spMkLst>
-        </pc:spChg>
-        <pc:spChg chg="mod ord">
-          <ac:chgData name="Eivind Jahr Kirkeby" userId="edd961ea-506c-4dfc-8bc9-07eb7d0ab3a4" providerId="ADAL" clId="{BE503A25-7BF5-46D1-ACBB-CB53CA58F582}" dt="2023-09-29T11:39:15.589" v="750" actId="700"/>
-          <ac:spMkLst>
-            <pc:docMk/>
-            <pc:sldMk cId="3246537870" sldId="269"/>
-            <ac:spMk id="6" creationId="{9F722536-E2B3-51E9-FC96-0AEFE98AB3AD}"/>
-          </ac:spMkLst>
-        </pc:spChg>
-        <pc:spChg chg="add del mod">
-          <ac:chgData name="Eivind Jahr Kirkeby" userId="edd961ea-506c-4dfc-8bc9-07eb7d0ab3a4" providerId="ADAL" clId="{BE503A25-7BF5-46D1-ACBB-CB53CA58F582}" dt="2023-09-29T11:39:10.820" v="749" actId="931"/>
-          <ac:spMkLst>
-            <pc:docMk/>
-            <pc:sldMk cId="3246537870" sldId="269"/>
-            <ac:spMk id="10" creationId="{0D5D27BE-E288-327D-28F0-265EEDA67E42}"/>
-          </ac:spMkLst>
-        </pc:spChg>
-        <pc:picChg chg="add del mod">
-          <ac:chgData name="Eivind Jahr Kirkeby" userId="edd961ea-506c-4dfc-8bc9-07eb7d0ab3a4" providerId="ADAL" clId="{BE503A25-7BF5-46D1-ACBB-CB53CA58F582}" dt="2023-09-29T11:38:38.389" v="748" actId="478"/>
-          <ac:picMkLst>
-            <pc:docMk/>
-            <pc:sldMk cId="3246537870" sldId="269"/>
-            <ac:picMk id="8" creationId="{274123F2-6BE0-5558-7923-53CDDF1DE562}"/>
-          </ac:picMkLst>
-        </pc:picChg>
-        <pc:picChg chg="add mod ord">
-          <ac:chgData name="Eivind Jahr Kirkeby" userId="edd961ea-506c-4dfc-8bc9-07eb7d0ab3a4" providerId="ADAL" clId="{BE503A25-7BF5-46D1-ACBB-CB53CA58F582}" dt="2023-09-29T11:39:15.589" v="750" actId="700"/>
-          <ac:picMkLst>
-            <pc:docMk/>
-            <pc:sldMk cId="3246537870" sldId="269"/>
-            <ac:picMk id="12" creationId="{C6731D08-BF05-B6B9-9306-950641D7413C}"/>
-          </ac:picMkLst>
-        </pc:picChg>
-      </pc:sldChg>
-      <pc:sldChg chg="modSp add del mod">
-        <pc:chgData name="Eivind Jahr Kirkeby" userId="edd961ea-506c-4dfc-8bc9-07eb7d0ab3a4" providerId="ADAL" clId="{BE503A25-7BF5-46D1-ACBB-CB53CA58F582}" dt="2023-09-29T11:50:36.242" v="818" actId="47"/>
-        <pc:sldMkLst>
-          <pc:docMk/>
-          <pc:sldMk cId="558030510" sldId="270"/>
-        </pc:sldMkLst>
-        <pc:spChg chg="mod">
-          <ac:chgData name="Eivind Jahr Kirkeby" userId="edd961ea-506c-4dfc-8bc9-07eb7d0ab3a4" providerId="ADAL" clId="{BE503A25-7BF5-46D1-ACBB-CB53CA58F582}" dt="2023-09-29T11:41:22.909" v="765" actId="20577"/>
-          <ac:spMkLst>
-            <pc:docMk/>
-            <pc:sldMk cId="558030510" sldId="270"/>
-            <ac:spMk id="7" creationId="{A333E45A-2DD3-8649-74C0-F0E3B9CA1149}"/>
-          </ac:spMkLst>
-        </pc:spChg>
-      </pc:sldChg>
-      <pc:sldChg chg="modSp add del mod">
-        <pc:chgData name="Eivind Jahr Kirkeby" userId="edd961ea-506c-4dfc-8bc9-07eb7d0ab3a4" providerId="ADAL" clId="{BE503A25-7BF5-46D1-ACBB-CB53CA58F582}" dt="2023-09-29T11:50:36.242" v="818" actId="47"/>
-        <pc:sldMkLst>
-          <pc:docMk/>
-          <pc:sldMk cId="3180595796" sldId="271"/>
-        </pc:sldMkLst>
-        <pc:spChg chg="mod">
-          <ac:chgData name="Eivind Jahr Kirkeby" userId="edd961ea-506c-4dfc-8bc9-07eb7d0ab3a4" providerId="ADAL" clId="{BE503A25-7BF5-46D1-ACBB-CB53CA58F582}" dt="2023-09-29T11:41:26.026" v="767" actId="20577"/>
-          <ac:spMkLst>
-            <pc:docMk/>
-            <pc:sldMk cId="3180595796" sldId="271"/>
-            <ac:spMk id="7" creationId="{A333E45A-2DD3-8649-74C0-F0E3B9CA1149}"/>
-          </ac:spMkLst>
-        </pc:spChg>
-      </pc:sldChg>
-      <pc:sldChg chg="new del">
-        <pc:chgData name="Eivind Jahr Kirkeby" userId="edd961ea-506c-4dfc-8bc9-07eb7d0ab3a4" providerId="ADAL" clId="{BE503A25-7BF5-46D1-ACBB-CB53CA58F582}" dt="2023-09-29T11:41:51.193" v="769" actId="47"/>
-        <pc:sldMkLst>
-          <pc:docMk/>
-          <pc:sldMk cId="368578065" sldId="272"/>
-        </pc:sldMkLst>
-      </pc:sldChg>
-      <pc:sldChg chg="addSp delSp modSp add mod">
-        <pc:chgData name="Eivind Jahr Kirkeby" userId="edd961ea-506c-4dfc-8bc9-07eb7d0ab3a4" providerId="ADAL" clId="{BE503A25-7BF5-46D1-ACBB-CB53CA58F582}" dt="2023-09-29T11:50:05.084" v="806" actId="20577"/>
-        <pc:sldMkLst>
-          <pc:docMk/>
-          <pc:sldMk cId="1548224941" sldId="272"/>
-        </pc:sldMkLst>
-        <pc:spChg chg="mod">
-          <ac:chgData name="Eivind Jahr Kirkeby" userId="edd961ea-506c-4dfc-8bc9-07eb7d0ab3a4" providerId="ADAL" clId="{BE503A25-7BF5-46D1-ACBB-CB53CA58F582}" dt="2023-09-29T11:50:05.084" v="806" actId="20577"/>
-          <ac:spMkLst>
-            <pc:docMk/>
-            <pc:sldMk cId="1548224941" sldId="272"/>
-            <ac:spMk id="4" creationId="{AC81E0B8-3BBE-5932-DD1B-DB8AC6A373E5}"/>
-          </ac:spMkLst>
-        </pc:spChg>
-        <pc:spChg chg="add del mod">
-          <ac:chgData name="Eivind Jahr Kirkeby" userId="edd961ea-506c-4dfc-8bc9-07eb7d0ab3a4" providerId="ADAL" clId="{BE503A25-7BF5-46D1-ACBB-CB53CA58F582}" dt="2023-09-29T11:49:41.345" v="772" actId="931"/>
-          <ac:spMkLst>
-            <pc:docMk/>
-            <pc:sldMk cId="1548224941" sldId="272"/>
-            <ac:spMk id="7" creationId="{DD97848D-4270-1994-6110-104738F9D63B}"/>
-          </ac:spMkLst>
-        </pc:spChg>
-        <pc:picChg chg="add mod">
-          <ac:chgData name="Eivind Jahr Kirkeby" userId="edd961ea-506c-4dfc-8bc9-07eb7d0ab3a4" providerId="ADAL" clId="{BE503A25-7BF5-46D1-ACBB-CB53CA58F582}" dt="2023-09-29T11:49:41.345" v="772" actId="931"/>
-          <ac:picMkLst>
-            <pc:docMk/>
-            <pc:sldMk cId="1548224941" sldId="272"/>
-            <ac:picMk id="9" creationId="{238E26EF-0D2C-B263-93ED-D91EC8E20D08}"/>
-          </ac:picMkLst>
-        </pc:picChg>
-        <pc:picChg chg="del">
-          <ac:chgData name="Eivind Jahr Kirkeby" userId="edd961ea-506c-4dfc-8bc9-07eb7d0ab3a4" providerId="ADAL" clId="{BE503A25-7BF5-46D1-ACBB-CB53CA58F582}" dt="2023-09-29T11:49:37.567" v="771" actId="478"/>
-          <ac:picMkLst>
-            <pc:docMk/>
-            <pc:sldMk cId="1548224941" sldId="272"/>
-            <ac:picMk id="12" creationId="{C6731D08-BF05-B6B9-9306-950641D7413C}"/>
-          </ac:picMkLst>
-        </pc:picChg>
-      </pc:sldChg>
-      <pc:sldChg chg="modSp add mod modNotesTx">
-        <pc:chgData name="Eivind Jahr Kirkeby" userId="edd961ea-506c-4dfc-8bc9-07eb7d0ab3a4" providerId="ADAL" clId="{BE503A25-7BF5-46D1-ACBB-CB53CA58F582}" dt="2023-09-29T12:29:43.826" v="1445" actId="5793"/>
-        <pc:sldMkLst>
-          <pc:docMk/>
-          <pc:sldMk cId="1129886293" sldId="273"/>
-        </pc:sldMkLst>
-        <pc:spChg chg="mod">
-          <ac:chgData name="Eivind Jahr Kirkeby" userId="edd961ea-506c-4dfc-8bc9-07eb7d0ab3a4" providerId="ADAL" clId="{BE503A25-7BF5-46D1-ACBB-CB53CA58F582}" dt="2023-09-29T12:19:39.952" v="821" actId="20577"/>
-          <ac:spMkLst>
-            <pc:docMk/>
-            <pc:sldMk cId="1129886293" sldId="273"/>
-            <ac:spMk id="7" creationId="{A333E45A-2DD3-8649-74C0-F0E3B9CA1149}"/>
-          </ac:spMkLst>
-        </pc:spChg>
-      </pc:sldChg>
-      <pc:sldChg chg="modSp add mod modNotesTx">
-        <pc:chgData name="Eivind Jahr Kirkeby" userId="edd961ea-506c-4dfc-8bc9-07eb7d0ab3a4" providerId="ADAL" clId="{BE503A25-7BF5-46D1-ACBB-CB53CA58F582}" dt="2023-09-29T12:29:55.567" v="1447" actId="15"/>
-        <pc:sldMkLst>
-          <pc:docMk/>
-          <pc:sldMk cId="2061088718" sldId="274"/>
-        </pc:sldMkLst>
-        <pc:spChg chg="mod">
-          <ac:chgData name="Eivind Jahr Kirkeby" userId="edd961ea-506c-4dfc-8bc9-07eb7d0ab3a4" providerId="ADAL" clId="{BE503A25-7BF5-46D1-ACBB-CB53CA58F582}" dt="2023-09-29T12:19:42.872" v="822" actId="20577"/>
-          <ac:spMkLst>
-            <pc:docMk/>
-            <pc:sldMk cId="2061088718" sldId="274"/>
-            <ac:spMk id="7" creationId="{A333E45A-2DD3-8649-74C0-F0E3B9CA1149}"/>
-          </ac:spMkLst>
-        </pc:spChg>
-      </pc:sldChg>
-      <pc:sldChg chg="addSp delSp modSp new mod modClrScheme chgLayout modNotesTx">
-        <pc:chgData name="Eivind Jahr Kirkeby" userId="edd961ea-506c-4dfc-8bc9-07eb7d0ab3a4" providerId="ADAL" clId="{BE503A25-7BF5-46D1-ACBB-CB53CA58F582}" dt="2023-09-29T13:09:18.779" v="2334"/>
-        <pc:sldMkLst>
-          <pc:docMk/>
-          <pc:sldMk cId="4249186643" sldId="275"/>
-        </pc:sldMkLst>
-        <pc:spChg chg="del mod ord">
-          <ac:chgData name="Eivind Jahr Kirkeby" userId="edd961ea-506c-4dfc-8bc9-07eb7d0ab3a4" providerId="ADAL" clId="{BE503A25-7BF5-46D1-ACBB-CB53CA58F582}" dt="2023-09-29T12:36:03.827" v="1780" actId="700"/>
-          <ac:spMkLst>
-            <pc:docMk/>
-            <pc:sldMk cId="4249186643" sldId="275"/>
-            <ac:spMk id="2" creationId="{C156C2C7-490E-88DB-1E06-89B278E19413}"/>
-          </ac:spMkLst>
-        </pc:spChg>
-        <pc:spChg chg="mod ord">
-          <ac:chgData name="Eivind Jahr Kirkeby" userId="edd961ea-506c-4dfc-8bc9-07eb7d0ab3a4" providerId="ADAL" clId="{BE503A25-7BF5-46D1-ACBB-CB53CA58F582}" dt="2023-09-29T13:09:18.779" v="2334"/>
-          <ac:spMkLst>
-            <pc:docMk/>
-            <pc:sldMk cId="4249186643" sldId="275"/>
-            <ac:spMk id="3" creationId="{93E49281-73B1-B3E6-E7E7-329C818CB9BA}"/>
-          </ac:spMkLst>
-        </pc:spChg>
-        <pc:spChg chg="mod ord">
-          <ac:chgData name="Eivind Jahr Kirkeby" userId="edd961ea-506c-4dfc-8bc9-07eb7d0ab3a4" providerId="ADAL" clId="{BE503A25-7BF5-46D1-ACBB-CB53CA58F582}" dt="2023-09-29T12:36:03.827" v="1780" actId="700"/>
-          <ac:spMkLst>
-            <pc:docMk/>
-            <pc:sldMk cId="4249186643" sldId="275"/>
-            <ac:spMk id="4" creationId="{AE0E2563-153F-512B-1484-BB5932D0FAAF}"/>
-          </ac:spMkLst>
-        </pc:spChg>
-        <pc:spChg chg="del mod ord">
-          <ac:chgData name="Eivind Jahr Kirkeby" userId="edd961ea-506c-4dfc-8bc9-07eb7d0ab3a4" providerId="ADAL" clId="{BE503A25-7BF5-46D1-ACBB-CB53CA58F582}" dt="2023-09-29T12:36:03.827" v="1780" actId="700"/>
-          <ac:spMkLst>
-            <pc:docMk/>
-            <pc:sldMk cId="4249186643" sldId="275"/>
-            <ac:spMk id="5" creationId="{55AFAF1F-9B8A-146E-D0EC-3B5FEAE6A15F}"/>
-          </ac:spMkLst>
-        </pc:spChg>
-        <pc:spChg chg="add mod ord">
-          <ac:chgData name="Eivind Jahr Kirkeby" userId="edd961ea-506c-4dfc-8bc9-07eb7d0ab3a4" providerId="ADAL" clId="{BE503A25-7BF5-46D1-ACBB-CB53CA58F582}" dt="2023-09-29T12:36:07.467" v="1793" actId="20577"/>
-          <ac:spMkLst>
-            <pc:docMk/>
-            <pc:sldMk cId="4249186643" sldId="275"/>
-            <ac:spMk id="6" creationId="{B6C961DE-3E94-06D6-7550-B6C191DE1152}"/>
-          </ac:spMkLst>
-        </pc:spChg>
-        <pc:spChg chg="add mod ord">
-          <ac:chgData name="Eivind Jahr Kirkeby" userId="edd961ea-506c-4dfc-8bc9-07eb7d0ab3a4" providerId="ADAL" clId="{BE503A25-7BF5-46D1-ACBB-CB53CA58F582}" dt="2023-09-29T12:39:28.479" v="1996" actId="20577"/>
-          <ac:spMkLst>
-            <pc:docMk/>
-            <pc:sldMk cId="4249186643" sldId="275"/>
-            <ac:spMk id="7" creationId="{B58C27D0-A4B9-69FE-6761-BF941B805C21}"/>
-          </ac:spMkLst>
-        </pc:spChg>
-        <pc:spChg chg="add mod ord">
-          <ac:chgData name="Eivind Jahr Kirkeby" userId="edd961ea-506c-4dfc-8bc9-07eb7d0ab3a4" providerId="ADAL" clId="{BE503A25-7BF5-46D1-ACBB-CB53CA58F582}" dt="2023-09-29T13:06:37.437" v="2010" actId="20577"/>
-          <ac:spMkLst>
-            <pc:docMk/>
-            <pc:sldMk cId="4249186643" sldId="275"/>
-            <ac:spMk id="8" creationId="{61CDA455-D4AA-42BF-29DF-4BA3577FF47C}"/>
-          </ac:spMkLst>
-        </pc:spChg>
-      </pc:sldChg>
-      <pc:sldChg chg="addSp delSp modSp new mod modClrScheme chgLayout">
-        <pc:chgData name="Eivind Jahr Kirkeby" userId="edd961ea-506c-4dfc-8bc9-07eb7d0ab3a4" providerId="ADAL" clId="{BE503A25-7BF5-46D1-ACBB-CB53CA58F582}" dt="2023-09-29T13:09:22.273" v="2335"/>
-        <pc:sldMkLst>
-          <pc:docMk/>
-          <pc:sldMk cId="4056130801" sldId="276"/>
-        </pc:sldMkLst>
-        <pc:spChg chg="del">
-          <ac:chgData name="Eivind Jahr Kirkeby" userId="edd961ea-506c-4dfc-8bc9-07eb7d0ab3a4" providerId="ADAL" clId="{BE503A25-7BF5-46D1-ACBB-CB53CA58F582}" dt="2023-09-29T13:08:34.969" v="2274" actId="700"/>
-          <ac:spMkLst>
-            <pc:docMk/>
-            <pc:sldMk cId="4056130801" sldId="276"/>
-            <ac:spMk id="2" creationId="{2CF403D3-0723-4AF7-7C4E-94C2B6CF32EF}"/>
-          </ac:spMkLst>
-        </pc:spChg>
-        <pc:spChg chg="del mod ord">
-          <ac:chgData name="Eivind Jahr Kirkeby" userId="edd961ea-506c-4dfc-8bc9-07eb7d0ab3a4" providerId="ADAL" clId="{BE503A25-7BF5-46D1-ACBB-CB53CA58F582}" dt="2023-09-29T13:08:34.969" v="2274" actId="700"/>
-          <ac:spMkLst>
-            <pc:docMk/>
-            <pc:sldMk cId="4056130801" sldId="276"/>
-            <ac:spMk id="3" creationId="{AE72011C-E2AB-4836-9C29-0829E35230F0}"/>
-          </ac:spMkLst>
-        </pc:spChg>
-        <pc:spChg chg="del mod ord">
-          <ac:chgData name="Eivind Jahr Kirkeby" userId="edd961ea-506c-4dfc-8bc9-07eb7d0ab3a4" providerId="ADAL" clId="{BE503A25-7BF5-46D1-ACBB-CB53CA58F582}" dt="2023-09-29T13:08:34.969" v="2274" actId="700"/>
-          <ac:spMkLst>
-            <pc:docMk/>
-            <pc:sldMk cId="4056130801" sldId="276"/>
-            <ac:spMk id="4" creationId="{2A6F72AE-FA1D-E81B-A2A4-1198F15C2C0E}"/>
-          </ac:spMkLst>
-        </pc:spChg>
-        <pc:spChg chg="mod ord">
-          <ac:chgData name="Eivind Jahr Kirkeby" userId="edd961ea-506c-4dfc-8bc9-07eb7d0ab3a4" providerId="ADAL" clId="{BE503A25-7BF5-46D1-ACBB-CB53CA58F582}" dt="2023-09-29T13:09:22.273" v="2335"/>
-          <ac:spMkLst>
-            <pc:docMk/>
-            <pc:sldMk cId="4056130801" sldId="276"/>
-            <ac:spMk id="5" creationId="{822E6FDC-FAB9-FACE-8B7E-D245677B20DF}"/>
-          </ac:spMkLst>
-        </pc:spChg>
-        <pc:spChg chg="mod ord">
-          <ac:chgData name="Eivind Jahr Kirkeby" userId="edd961ea-506c-4dfc-8bc9-07eb7d0ab3a4" providerId="ADAL" clId="{BE503A25-7BF5-46D1-ACBB-CB53CA58F582}" dt="2023-09-29T13:08:34.969" v="2274" actId="700"/>
-          <ac:spMkLst>
-            <pc:docMk/>
-            <pc:sldMk cId="4056130801" sldId="276"/>
-            <ac:spMk id="6" creationId="{C4CCDD1C-691B-3594-D7F2-C87AB5B284DC}"/>
-          </ac:spMkLst>
-        </pc:spChg>
-        <pc:spChg chg="add mod ord">
-          <ac:chgData name="Eivind Jahr Kirkeby" userId="edd961ea-506c-4dfc-8bc9-07eb7d0ab3a4" providerId="ADAL" clId="{BE503A25-7BF5-46D1-ACBB-CB53CA58F582}" dt="2023-09-29T13:09:06.355" v="2333" actId="20577"/>
-          <ac:spMkLst>
-            <pc:docMk/>
-            <pc:sldMk cId="4056130801" sldId="276"/>
-            <ac:spMk id="7" creationId="{7C6694EB-31D5-0121-E083-67D2034C1BA6}"/>
-          </ac:spMkLst>
-        </pc:spChg>
-        <pc:spChg chg="add mod ord">
-          <ac:chgData name="Eivind Jahr Kirkeby" userId="edd961ea-506c-4dfc-8bc9-07eb7d0ab3a4" providerId="ADAL" clId="{BE503A25-7BF5-46D1-ACBB-CB53CA58F582}" dt="2023-09-29T13:08:34.969" v="2274" actId="700"/>
-          <ac:spMkLst>
-            <pc:docMk/>
-            <pc:sldMk cId="4056130801" sldId="276"/>
-            <ac:spMk id="8" creationId="{4CD2AE71-DBCC-4071-DAA7-DF2B1CF6172C}"/>
-          </ac:spMkLst>
-        </pc:spChg>
-      </pc:sldChg>
-    </pc:docChg>
-  </pc:docChgLst>
-</pc:chgInfo>
 </file>
 
 <file path=ppt/notesMasters/notesMaster1.xml><?xml version="1.0" encoding="utf-8"?>
@@ -1579,7 +226,7 @@
           <a:p>
             <a:fld id="{458B3470-95F1-4BD9-AFB4-529F3BDC56EE}" type="datetimeFigureOut">
               <a:rPr lang="sv-SE" smtClean="0"/>
-              <a:t>2024-02-04</a:t>
+              <a:t>2024-02-24</a:t>
             </a:fld>
             <a:endParaRPr lang="sv-SE"/>
           </a:p>
@@ -2029,11 +676,17 @@
           <a:bodyPr/>
           <a:lstStyle/>
           <a:p>
-            <a:pPr marL="171450" indent="-171450">
-              <a:buFont typeface="Arial" panose="020B0604020202020204" pitchFamily="34" charset="0"/>
-              <a:buChar char="•"/>
-            </a:pPr>
-            <a:endParaRPr lang="en-US" dirty="0"/>
+            <a:r>
+              <a:rPr lang="en-US" b="0" i="0" dirty="0">
+                <a:solidFill>
+                  <a:srgbClr val="D1D5DB"/>
+                </a:solidFill>
+                <a:effectLst/>
+                <a:latin typeface="Söhne"/>
+              </a:rPr>
+              <a:t>The 1960s saw the emergence of the first navigational database systems. These systems, such as IBM's Information Management System (IMS) and Charles Bachman's Integrated Data Store (IDS), were hierarchical and network databases</a:t>
+            </a:r>
+            <a:endParaRPr lang="nb-NO" dirty="0"/>
           </a:p>
         </p:txBody>
       </p:sp>
@@ -2054,7 +707,7 @@
           <a:p>
             <a:fld id="{9778E0F8-0F4F-4133-AB17-43107DBECF7F}" type="slidenum">
               <a:rPr lang="sv-SE" smtClean="0"/>
-              <a:t>5</a:t>
+              <a:t>4</a:t>
             </a:fld>
             <a:endParaRPr lang="sv-SE"/>
           </a:p>
@@ -2063,7 +716,7 @@
     </p:spTree>
     <p:extLst>
       <p:ext uri="{BB962C8B-B14F-4D97-AF65-F5344CB8AC3E}">
-        <p14:creationId xmlns:p14="http://schemas.microsoft.com/office/powerpoint/2010/main" val="1222153504"/>
+        <p14:creationId xmlns:p14="http://schemas.microsoft.com/office/powerpoint/2010/main" val="3343233212"/>
       </p:ext>
     </p:extLst>
   </p:cSld>
@@ -2121,6 +774,35 @@
               <a:buFont typeface="Arial" panose="020B0604020202020204" pitchFamily="34" charset="0"/>
               <a:buChar char="•"/>
             </a:pPr>
+            <a:endParaRPr lang="en-US" b="0" i="0" dirty="0">
+              <a:solidFill>
+                <a:srgbClr val="D1D5DB"/>
+              </a:solidFill>
+              <a:effectLst/>
+              <a:latin typeface="Söhne"/>
+            </a:endParaRPr>
+          </a:p>
+          <a:p>
+            <a:pPr marL="171450" indent="-171450">
+              <a:buFont typeface="Arial" panose="020B0604020202020204" pitchFamily="34" charset="0"/>
+              <a:buChar char="•"/>
+            </a:pPr>
+            <a:r>
+              <a:rPr lang="en-US" b="0" i="0" dirty="0">
+                <a:solidFill>
+                  <a:srgbClr val="D1D5DB"/>
+                </a:solidFill>
+                <a:effectLst/>
+                <a:latin typeface="Söhne"/>
+              </a:rPr>
+              <a:t>Edgar F. Codd, an English computer scientist working at IBM, in a seminal 1970 paper titled "A Relational Model of Data for Large Shared Data Banks</a:t>
+            </a:r>
+          </a:p>
+          <a:p>
+            <a:pPr marL="171450" indent="-171450">
+              <a:buFont typeface="Arial" panose="020B0604020202020204" pitchFamily="34" charset="0"/>
+              <a:buChar char="•"/>
+            </a:pPr>
             <a:endParaRPr lang="en-US" dirty="0"/>
           </a:p>
         </p:txBody>
@@ -2142,7 +824,7 @@
           <a:p>
             <a:fld id="{9778E0F8-0F4F-4133-AB17-43107DBECF7F}" type="slidenum">
               <a:rPr lang="sv-SE" smtClean="0"/>
-              <a:t>6</a:t>
+              <a:t>5</a:t>
             </a:fld>
             <a:endParaRPr lang="sv-SE"/>
           </a:p>
@@ -2151,7 +833,7 @@
     </p:spTree>
     <p:extLst>
       <p:ext uri="{BB962C8B-B14F-4D97-AF65-F5344CB8AC3E}">
-        <p14:creationId xmlns:p14="http://schemas.microsoft.com/office/powerpoint/2010/main" val="1016398486"/>
+        <p14:creationId xmlns:p14="http://schemas.microsoft.com/office/powerpoint/2010/main" val="1222153504"/>
       </p:ext>
     </p:extLst>
   </p:cSld>
@@ -2209,7 +891,18 @@
               <a:buFont typeface="Arial" panose="020B0604020202020204" pitchFamily="34" charset="0"/>
               <a:buChar char="•"/>
             </a:pPr>
-            <a:endParaRPr lang="en-US" dirty="0"/>
+            <a:r>
+              <a:rPr lang="en-US" dirty="0"/>
+              <a:t>ORM – Object Rational Mapping: Entity Framework , Dapper, </a:t>
+            </a:r>
+            <a:r>
+              <a:rPr lang="en-US" dirty="0" err="1"/>
+              <a:t>Hsibernate</a:t>
+            </a:r>
+            <a:r>
+              <a:rPr lang="en-US" dirty="0"/>
+              <a:t>, Django</a:t>
+            </a:r>
           </a:p>
         </p:txBody>
       </p:sp>
@@ -2230,7 +923,7 @@
           <a:p>
             <a:fld id="{9778E0F8-0F4F-4133-AB17-43107DBECF7F}" type="slidenum">
               <a:rPr lang="sv-SE" smtClean="0"/>
-              <a:t>8</a:t>
+              <a:t>6</a:t>
             </a:fld>
             <a:endParaRPr lang="sv-SE"/>
           </a:p>
@@ -2239,7 +932,7 @@
     </p:spTree>
     <p:extLst>
       <p:ext uri="{BB962C8B-B14F-4D97-AF65-F5344CB8AC3E}">
-        <p14:creationId xmlns:p14="http://schemas.microsoft.com/office/powerpoint/2010/main" val="312092818"/>
+        <p14:creationId xmlns:p14="http://schemas.microsoft.com/office/powerpoint/2010/main" val="1016398486"/>
       </p:ext>
     </p:extLst>
   </p:cSld>
@@ -2250,6 +943,118 @@
 </file>
 
 <file path=ppt/notesSlides/notesSlide5.xml><?xml version="1.0" encoding="utf-8"?>
+<p:notes xmlns:a="http://schemas.openxmlformats.org/drawingml/2006/main" xmlns:r="http://schemas.openxmlformats.org/officeDocument/2006/relationships" xmlns:p="http://schemas.openxmlformats.org/presentationml/2006/main">
+  <p:cSld>
+    <p:spTree>
+      <p:nvGrpSpPr>
+        <p:cNvPr id="1" name="">
+          <a:extLst>
+            <a:ext uri="{FF2B5EF4-FFF2-40B4-BE49-F238E27FC236}">
+              <a16:creationId xmlns:a16="http://schemas.microsoft.com/office/drawing/2014/main" id="{EDE8EF78-3FBF-3F0E-1240-76B0B84DFD78}"/>
+            </a:ext>
+          </a:extLst>
+        </p:cNvPr>
+        <p:cNvGrpSpPr/>
+        <p:nvPr/>
+      </p:nvGrpSpPr>
+      <p:grpSpPr>
+        <a:xfrm>
+          <a:off x="0" y="0"/>
+          <a:ext cx="0" cy="0"/>
+          <a:chOff x="0" y="0"/>
+          <a:chExt cx="0" cy="0"/>
+        </a:xfrm>
+      </p:grpSpPr>
+      <p:sp>
+        <p:nvSpPr>
+          <p:cNvPr id="2" name="Slide Image Placeholder 1">
+            <a:extLst>
+              <a:ext uri="{FF2B5EF4-FFF2-40B4-BE49-F238E27FC236}">
+                <a16:creationId xmlns:a16="http://schemas.microsoft.com/office/drawing/2014/main" id="{9DFF5546-ED14-E73E-9035-7B0915CF075A}"/>
+              </a:ext>
+            </a:extLst>
+          </p:cNvPr>
+          <p:cNvSpPr>
+            <a:spLocks noGrp="1" noRot="1" noChangeAspect="1"/>
+          </p:cNvSpPr>
+          <p:nvPr>
+            <p:ph type="sldImg"/>
+          </p:nvPr>
+        </p:nvSpPr>
+        <p:spPr/>
+      </p:sp>
+      <p:sp>
+        <p:nvSpPr>
+          <p:cNvPr id="3" name="Notes Placeholder 2">
+            <a:extLst>
+              <a:ext uri="{FF2B5EF4-FFF2-40B4-BE49-F238E27FC236}">
+                <a16:creationId xmlns:a16="http://schemas.microsoft.com/office/drawing/2014/main" id="{5A042B53-F774-4768-B272-A6E8D9A1E898}"/>
+              </a:ext>
+            </a:extLst>
+          </p:cNvPr>
+          <p:cNvSpPr>
+            <a:spLocks noGrp="1"/>
+          </p:cNvSpPr>
+          <p:nvPr>
+            <p:ph type="body" idx="1"/>
+          </p:nvPr>
+        </p:nvSpPr>
+        <p:spPr/>
+        <p:txBody>
+          <a:bodyPr/>
+          <a:lstStyle/>
+          <a:p>
+            <a:pPr marL="171450" indent="-171450">
+              <a:buFont typeface="Arial" panose="020B0604020202020204" pitchFamily="34" charset="0"/>
+              <a:buChar char="•"/>
+            </a:pPr>
+            <a:endParaRPr lang="en-US" dirty="0"/>
+          </a:p>
+        </p:txBody>
+      </p:sp>
+      <p:sp>
+        <p:nvSpPr>
+          <p:cNvPr id="4" name="Slide Number Placeholder 3">
+            <a:extLst>
+              <a:ext uri="{FF2B5EF4-FFF2-40B4-BE49-F238E27FC236}">
+                <a16:creationId xmlns:a16="http://schemas.microsoft.com/office/drawing/2014/main" id="{950A4E45-5588-6428-DA6B-3C15B7A039B3}"/>
+              </a:ext>
+            </a:extLst>
+          </p:cNvPr>
+          <p:cNvSpPr>
+            <a:spLocks noGrp="1"/>
+          </p:cNvSpPr>
+          <p:nvPr>
+            <p:ph type="sldNum" sz="quarter" idx="5"/>
+          </p:nvPr>
+        </p:nvSpPr>
+        <p:spPr/>
+        <p:txBody>
+          <a:bodyPr/>
+          <a:lstStyle/>
+          <a:p>
+            <a:fld id="{9778E0F8-0F4F-4133-AB17-43107DBECF7F}" type="slidenum">
+              <a:rPr lang="sv-SE" smtClean="0"/>
+              <a:t>7</a:t>
+            </a:fld>
+            <a:endParaRPr lang="sv-SE"/>
+          </a:p>
+        </p:txBody>
+      </p:sp>
+    </p:spTree>
+    <p:extLst>
+      <p:ext uri="{BB962C8B-B14F-4D97-AF65-F5344CB8AC3E}">
+        <p14:creationId xmlns:p14="http://schemas.microsoft.com/office/powerpoint/2010/main" val="2240272358"/>
+      </p:ext>
+    </p:extLst>
+  </p:cSld>
+  <p:clrMapOvr>
+    <a:masterClrMapping/>
+  </p:clrMapOvr>
+</p:notes>
+</file>
+
+<file path=ppt/notesSlides/notesSlide6.xml><?xml version="1.0" encoding="utf-8"?>
 <p:notes xmlns:a="http://schemas.openxmlformats.org/drawingml/2006/main" xmlns:r="http://schemas.openxmlformats.org/officeDocument/2006/relationships" xmlns:p="http://schemas.openxmlformats.org/presentationml/2006/main">
   <p:cSld>
     <p:spTree>
@@ -2297,6 +1102,46 @@
               <a:buFont typeface="Arial" panose="020B0604020202020204" pitchFamily="34" charset="0"/>
               <a:buChar char="•"/>
             </a:pPr>
+            <a:r>
+              <a:rPr lang="en-US" dirty="0"/>
+              <a:t>You may have heard about sequence diagrams, flow chars and other diagrams</a:t>
+            </a:r>
+          </a:p>
+          <a:p>
+            <a:pPr marL="171450" indent="-171450">
+              <a:buFont typeface="Arial" panose="020B0604020202020204" pitchFamily="34" charset="0"/>
+              <a:buChar char="•"/>
+            </a:pPr>
+            <a:r>
+              <a:rPr lang="en-US" dirty="0"/>
+              <a:t>Any of you ever heard of/used ER-diagrams?</a:t>
+            </a:r>
+          </a:p>
+          <a:p>
+            <a:pPr marL="171450" indent="-171450">
+              <a:buFont typeface="Arial" panose="020B0604020202020204" pitchFamily="34" charset="0"/>
+              <a:buChar char="•"/>
+            </a:pPr>
+            <a:r>
+              <a:rPr lang="en-US" dirty="0"/>
+              <a:t>Is it really as simple as the example ER diagram shows?</a:t>
+            </a:r>
+          </a:p>
+          <a:p>
+            <a:pPr marL="628650" lvl="1" indent="-171450">
+              <a:buFont typeface="Arial" panose="020B0604020202020204" pitchFamily="34" charset="0"/>
+              <a:buChar char="•"/>
+            </a:pPr>
+            <a:r>
+              <a:rPr lang="en-US" dirty="0"/>
+              <a:t>Need to know all artist that have performed a certain song</a:t>
+            </a:r>
+          </a:p>
+          <a:p>
+            <a:pPr marL="171450" indent="-171450">
+              <a:buFont typeface="Arial" panose="020B0604020202020204" pitchFamily="34" charset="0"/>
+              <a:buChar char="•"/>
+            </a:pPr>
             <a:endParaRPr lang="en-US" dirty="0"/>
           </a:p>
         </p:txBody>
@@ -2327,7 +1172,150 @@
     </p:spTree>
     <p:extLst>
       <p:ext uri="{BB962C8B-B14F-4D97-AF65-F5344CB8AC3E}">
-        <p14:creationId xmlns:p14="http://schemas.microsoft.com/office/powerpoint/2010/main" val="4122106030"/>
+        <p14:creationId xmlns:p14="http://schemas.microsoft.com/office/powerpoint/2010/main" val="312092818"/>
+      </p:ext>
+    </p:extLst>
+  </p:cSld>
+  <p:clrMapOvr>
+    <a:masterClrMapping/>
+  </p:clrMapOvr>
+</p:notes>
+</file>
+
+<file path=ppt/notesSlides/notesSlide7.xml><?xml version="1.0" encoding="utf-8"?>
+<p:notes xmlns:a="http://schemas.openxmlformats.org/drawingml/2006/main" xmlns:r="http://schemas.openxmlformats.org/officeDocument/2006/relationships" xmlns:p="http://schemas.openxmlformats.org/presentationml/2006/main">
+  <p:cSld>
+    <p:spTree>
+      <p:nvGrpSpPr>
+        <p:cNvPr id="1" name="">
+          <a:extLst>
+            <a:ext uri="{FF2B5EF4-FFF2-40B4-BE49-F238E27FC236}">
+              <a16:creationId xmlns:a16="http://schemas.microsoft.com/office/drawing/2014/main" id="{0349558F-6BFA-9079-9336-58D8DC71E04A}"/>
+            </a:ext>
+          </a:extLst>
+        </p:cNvPr>
+        <p:cNvGrpSpPr/>
+        <p:nvPr/>
+      </p:nvGrpSpPr>
+      <p:grpSpPr>
+        <a:xfrm>
+          <a:off x="0" y="0"/>
+          <a:ext cx="0" cy="0"/>
+          <a:chOff x="0" y="0"/>
+          <a:chExt cx="0" cy="0"/>
+        </a:xfrm>
+      </p:grpSpPr>
+      <p:sp>
+        <p:nvSpPr>
+          <p:cNvPr id="2" name="Slide Image Placeholder 1">
+            <a:extLst>
+              <a:ext uri="{FF2B5EF4-FFF2-40B4-BE49-F238E27FC236}">
+                <a16:creationId xmlns:a16="http://schemas.microsoft.com/office/drawing/2014/main" id="{518C10AC-CF90-42ED-8C63-76401520CDF8}"/>
+              </a:ext>
+            </a:extLst>
+          </p:cNvPr>
+          <p:cNvSpPr>
+            <a:spLocks noGrp="1" noRot="1" noChangeAspect="1"/>
+          </p:cNvSpPr>
+          <p:nvPr>
+            <p:ph type="sldImg"/>
+          </p:nvPr>
+        </p:nvSpPr>
+        <p:spPr/>
+      </p:sp>
+      <p:sp>
+        <p:nvSpPr>
+          <p:cNvPr id="3" name="Notes Placeholder 2">
+            <a:extLst>
+              <a:ext uri="{FF2B5EF4-FFF2-40B4-BE49-F238E27FC236}">
+                <a16:creationId xmlns:a16="http://schemas.microsoft.com/office/drawing/2014/main" id="{49A310DC-33A9-B05B-B8FF-BDCB708C7864}"/>
+              </a:ext>
+            </a:extLst>
+          </p:cNvPr>
+          <p:cNvSpPr>
+            <a:spLocks noGrp="1"/>
+          </p:cNvSpPr>
+          <p:nvPr>
+            <p:ph type="body" idx="1"/>
+          </p:nvPr>
+        </p:nvSpPr>
+        <p:spPr/>
+        <p:txBody>
+          <a:bodyPr/>
+          <a:lstStyle/>
+          <a:p>
+            <a:pPr marL="171450" indent="-171450">
+              <a:buFont typeface="Arial" panose="020B0604020202020204" pitchFamily="34" charset="0"/>
+              <a:buChar char="•"/>
+            </a:pPr>
+            <a:r>
+              <a:rPr lang="en-US" dirty="0"/>
+              <a:t>But what if we want to know the different performances the same artist have done of the same song? </a:t>
+            </a:r>
+          </a:p>
+          <a:p>
+            <a:pPr marL="171450" indent="-171450">
+              <a:buFont typeface="Arial" panose="020B0604020202020204" pitchFamily="34" charset="0"/>
+              <a:buChar char="•"/>
+            </a:pPr>
+            <a:r>
+              <a:rPr lang="en-US" dirty="0"/>
+              <a:t>Maybe we are modelling a concert booking system? </a:t>
+            </a:r>
+          </a:p>
+          <a:p>
+            <a:pPr marL="171450" indent="-171450">
+              <a:buFont typeface="Arial" panose="020B0604020202020204" pitchFamily="34" charset="0"/>
+              <a:buChar char="•"/>
+            </a:pPr>
+            <a:r>
+              <a:rPr lang="en-US" dirty="0"/>
+              <a:t>How would that </a:t>
+            </a:r>
+            <a:r>
+              <a:rPr lang="en-US"/>
+              <a:t>ER diagram look </a:t>
+            </a:r>
+            <a:r>
+              <a:rPr lang="en-US" dirty="0"/>
+              <a:t>like?</a:t>
+            </a:r>
+          </a:p>
+        </p:txBody>
+      </p:sp>
+      <p:sp>
+        <p:nvSpPr>
+          <p:cNvPr id="4" name="Slide Number Placeholder 3">
+            <a:extLst>
+              <a:ext uri="{FF2B5EF4-FFF2-40B4-BE49-F238E27FC236}">
+                <a16:creationId xmlns:a16="http://schemas.microsoft.com/office/drawing/2014/main" id="{9EB4A39C-10F0-0E9E-9E2A-E61899AE3E32}"/>
+              </a:ext>
+            </a:extLst>
+          </p:cNvPr>
+          <p:cNvSpPr>
+            <a:spLocks noGrp="1"/>
+          </p:cNvSpPr>
+          <p:nvPr>
+            <p:ph type="sldNum" sz="quarter" idx="5"/>
+          </p:nvPr>
+        </p:nvSpPr>
+        <p:spPr/>
+        <p:txBody>
+          <a:bodyPr/>
+          <a:lstStyle/>
+          <a:p>
+            <a:fld id="{9778E0F8-0F4F-4133-AB17-43107DBECF7F}" type="slidenum">
+              <a:rPr lang="sv-SE" smtClean="0"/>
+              <a:t>10</a:t>
+            </a:fld>
+            <a:endParaRPr lang="sv-SE"/>
+          </a:p>
+        </p:txBody>
+      </p:sp>
+    </p:spTree>
+    <p:extLst>
+      <p:ext uri="{BB962C8B-B14F-4D97-AF65-F5344CB8AC3E}">
+        <p14:creationId xmlns:p14="http://schemas.microsoft.com/office/powerpoint/2010/main" val="3331211663"/>
       </p:ext>
     </p:extLst>
   </p:cSld>
@@ -17454,6 +16442,367 @@
   <p:cSld>
     <p:spTree>
       <p:nvGrpSpPr>
+        <p:cNvPr id="1" name="">
+          <a:extLst>
+            <a:ext uri="{FF2B5EF4-FFF2-40B4-BE49-F238E27FC236}">
+              <a16:creationId xmlns:a16="http://schemas.microsoft.com/office/drawing/2014/main" id="{ADC14921-0C92-C39C-961D-A39DD4D962AE}"/>
+            </a:ext>
+          </a:extLst>
+        </p:cNvPr>
+        <p:cNvGrpSpPr/>
+        <p:nvPr/>
+      </p:nvGrpSpPr>
+      <p:grpSpPr>
+        <a:xfrm>
+          <a:off x="0" y="0"/>
+          <a:ext cx="0" cy="0"/>
+          <a:chOff x="0" y="0"/>
+          <a:chExt cx="0" cy="0"/>
+        </a:xfrm>
+      </p:grpSpPr>
+      <p:sp>
+        <p:nvSpPr>
+          <p:cNvPr id="7" name="Content Placeholder 6">
+            <a:extLst>
+              <a:ext uri="{FF2B5EF4-FFF2-40B4-BE49-F238E27FC236}">
+                <a16:creationId xmlns:a16="http://schemas.microsoft.com/office/drawing/2014/main" id="{430F46FB-A939-E267-DCA6-4FF7F5B29D96}"/>
+              </a:ext>
+            </a:extLst>
+          </p:cNvPr>
+          <p:cNvSpPr>
+            <a:spLocks noGrp="1"/>
+          </p:cNvSpPr>
+          <p:nvPr>
+            <p:ph sz="half" idx="1"/>
+          </p:nvPr>
+        </p:nvSpPr>
+        <p:spPr>
+          <a:xfrm>
+            <a:off x="467998" y="2160000"/>
+            <a:ext cx="4866002" cy="3924000"/>
+          </a:xfrm>
+        </p:spPr>
+        <p:txBody>
+          <a:bodyPr>
+            <a:normAutofit fontScale="85000" lnSpcReduction="20000"/>
+          </a:bodyPr>
+          <a:lstStyle/>
+          <a:p>
+            <a:pPr marL="0" indent="0">
+              <a:buNone/>
+            </a:pPr>
+            <a:r>
+              <a:rPr lang="en-US" dirty="0"/>
+              <a:t>One song can be performed by different artists</a:t>
+            </a:r>
+          </a:p>
+          <a:p>
+            <a:pPr marL="0" indent="0">
+              <a:buNone/>
+            </a:pPr>
+            <a:r>
+              <a:rPr lang="en-US" dirty="0"/>
+              <a:t>We need a “link” table “song-performance”</a:t>
+            </a:r>
+          </a:p>
+          <a:p>
+            <a:pPr marL="0" indent="0">
+              <a:buNone/>
+            </a:pPr>
+            <a:endParaRPr lang="en-US" dirty="0"/>
+          </a:p>
+          <a:p>
+            <a:pPr marL="0" indent="0">
+              <a:buNone/>
+            </a:pPr>
+            <a:r>
+              <a:rPr lang="en-US" dirty="0"/>
+              <a:t>Keys:</a:t>
+            </a:r>
+          </a:p>
+          <a:p>
+            <a:pPr marL="0" indent="0">
+              <a:buNone/>
+            </a:pPr>
+            <a:r>
+              <a:rPr lang="en-US" dirty="0"/>
+              <a:t>Artist: </a:t>
+            </a:r>
+            <a:r>
+              <a:rPr lang="en-US" dirty="0" err="1"/>
+              <a:t>artist_id</a:t>
+            </a:r>
+            <a:r>
+              <a:rPr lang="en-US" dirty="0"/>
+              <a:t> (primary key)</a:t>
+            </a:r>
+          </a:p>
+          <a:p>
+            <a:pPr marL="0" indent="0">
+              <a:buNone/>
+            </a:pPr>
+            <a:r>
+              <a:rPr lang="en-US" dirty="0"/>
+              <a:t>Song: </a:t>
+            </a:r>
+            <a:r>
+              <a:rPr lang="en-US" dirty="0" err="1"/>
+              <a:t>song_id</a:t>
+            </a:r>
+            <a:r>
+              <a:rPr lang="en-US" dirty="0"/>
+              <a:t> (primary key)</a:t>
+            </a:r>
+          </a:p>
+          <a:p>
+            <a:pPr marL="0" indent="0">
+              <a:buNone/>
+            </a:pPr>
+            <a:r>
+              <a:rPr lang="en-US" dirty="0"/>
+              <a:t>Song-performance: </a:t>
+            </a:r>
+          </a:p>
+          <a:p>
+            <a:pPr marL="0" indent="0">
+              <a:buNone/>
+            </a:pPr>
+            <a:r>
+              <a:rPr lang="en-US" dirty="0"/>
+              <a:t>	</a:t>
+            </a:r>
+            <a:r>
+              <a:rPr lang="en-US" dirty="0" err="1"/>
+              <a:t>song_performancee_Id</a:t>
+            </a:r>
+            <a:r>
+              <a:rPr lang="en-US" dirty="0"/>
+              <a:t> (primary key)</a:t>
+            </a:r>
+          </a:p>
+          <a:p>
+            <a:pPr marL="0" indent="0">
+              <a:buNone/>
+            </a:pPr>
+            <a:r>
+              <a:rPr lang="en-US" dirty="0"/>
+              <a:t>	</a:t>
+            </a:r>
+            <a:r>
+              <a:rPr lang="en-US" dirty="0" err="1"/>
+              <a:t>artist_id</a:t>
+            </a:r>
+            <a:r>
+              <a:rPr lang="en-US" dirty="0"/>
+              <a:t> (foreign key)</a:t>
+            </a:r>
+          </a:p>
+          <a:p>
+            <a:pPr marL="0" indent="0">
+              <a:buNone/>
+            </a:pPr>
+            <a:r>
+              <a:rPr lang="en-US" dirty="0"/>
+              <a:t>	</a:t>
+            </a:r>
+            <a:r>
+              <a:rPr lang="en-US" dirty="0" err="1"/>
+              <a:t>song_id</a:t>
+            </a:r>
+            <a:r>
+              <a:rPr lang="en-US" dirty="0"/>
+              <a:t> (foreign key)</a:t>
+            </a:r>
+          </a:p>
+          <a:p>
+            <a:pPr marL="0" indent="0">
+              <a:buNone/>
+            </a:pPr>
+            <a:r>
+              <a:rPr lang="en-US" dirty="0"/>
+              <a:t>	</a:t>
+            </a:r>
+            <a:r>
+              <a:rPr lang="en-US" dirty="0" err="1"/>
+              <a:t>artist_id</a:t>
+            </a:r>
+            <a:r>
+              <a:rPr lang="en-US" dirty="0"/>
+              <a:t> + </a:t>
+            </a:r>
+            <a:r>
+              <a:rPr lang="en-US" dirty="0" err="1"/>
+              <a:t>song_id</a:t>
+            </a:r>
+            <a:r>
+              <a:rPr lang="en-US" dirty="0"/>
+              <a:t> (unique index)</a:t>
+            </a:r>
+          </a:p>
+        </p:txBody>
+      </p:sp>
+      <p:sp>
+        <p:nvSpPr>
+          <p:cNvPr id="8" name="Subtitle 7">
+            <a:extLst>
+              <a:ext uri="{FF2B5EF4-FFF2-40B4-BE49-F238E27FC236}">
+                <a16:creationId xmlns:a16="http://schemas.microsoft.com/office/drawing/2014/main" id="{129798E1-861F-7F29-69C3-10B253304A3B}"/>
+              </a:ext>
+            </a:extLst>
+          </p:cNvPr>
+          <p:cNvSpPr>
+            <a:spLocks noGrp="1"/>
+          </p:cNvSpPr>
+          <p:nvPr>
+            <p:ph type="subTitle" idx="16"/>
+          </p:nvPr>
+        </p:nvSpPr>
+        <p:spPr/>
+        <p:txBody>
+          <a:bodyPr/>
+          <a:lstStyle/>
+          <a:p>
+            <a:r>
+              <a:rPr lang="en-US" dirty="0"/>
+              <a:t>Environments</a:t>
+            </a:r>
+          </a:p>
+        </p:txBody>
+      </p:sp>
+      <p:sp>
+        <p:nvSpPr>
+          <p:cNvPr id="6" name="Title 5">
+            <a:extLst>
+              <a:ext uri="{FF2B5EF4-FFF2-40B4-BE49-F238E27FC236}">
+                <a16:creationId xmlns:a16="http://schemas.microsoft.com/office/drawing/2014/main" id="{2B57E308-5C71-17B3-9AF8-A3683443F71E}"/>
+              </a:ext>
+            </a:extLst>
+          </p:cNvPr>
+          <p:cNvSpPr>
+            <a:spLocks noGrp="1"/>
+          </p:cNvSpPr>
+          <p:nvPr>
+            <p:ph type="title"/>
+          </p:nvPr>
+        </p:nvSpPr>
+        <p:spPr/>
+        <p:txBody>
+          <a:bodyPr/>
+          <a:lstStyle/>
+          <a:p>
+            <a:r>
+              <a:rPr lang="en-US" dirty="0"/>
+              <a:t>Entity-Relationship (ER) diagrams</a:t>
+            </a:r>
+          </a:p>
+        </p:txBody>
+      </p:sp>
+      <p:sp>
+        <p:nvSpPr>
+          <p:cNvPr id="3" name="Footer Placeholder 2">
+            <a:extLst>
+              <a:ext uri="{FF2B5EF4-FFF2-40B4-BE49-F238E27FC236}">
+                <a16:creationId xmlns:a16="http://schemas.microsoft.com/office/drawing/2014/main" id="{F9D351B2-1DD4-B25B-8A7D-8A81BBC6D3F8}"/>
+              </a:ext>
+            </a:extLst>
+          </p:cNvPr>
+          <p:cNvSpPr>
+            <a:spLocks noGrp="1"/>
+          </p:cNvSpPr>
+          <p:nvPr>
+            <p:ph type="ftr" sz="quarter" idx="17"/>
+          </p:nvPr>
+        </p:nvSpPr>
+        <p:spPr/>
+        <p:txBody>
+          <a:bodyPr/>
+          <a:lstStyle/>
+          <a:p>
+            <a:r>
+              <a:rPr lang="sv-SE"/>
+              <a:t>Namn på presentationen</a:t>
+            </a:r>
+          </a:p>
+        </p:txBody>
+      </p:sp>
+      <p:sp>
+        <p:nvSpPr>
+          <p:cNvPr id="4" name="Slide Number Placeholder 3">
+            <a:extLst>
+              <a:ext uri="{FF2B5EF4-FFF2-40B4-BE49-F238E27FC236}">
+                <a16:creationId xmlns:a16="http://schemas.microsoft.com/office/drawing/2014/main" id="{B6A46875-5A7C-9189-0CA3-77F07D0AD3A9}"/>
+              </a:ext>
+            </a:extLst>
+          </p:cNvPr>
+          <p:cNvSpPr>
+            <a:spLocks noGrp="1"/>
+          </p:cNvSpPr>
+          <p:nvPr>
+            <p:ph type="sldNum" sz="quarter" idx="18"/>
+          </p:nvPr>
+        </p:nvSpPr>
+        <p:spPr/>
+        <p:txBody>
+          <a:bodyPr/>
+          <a:lstStyle/>
+          <a:p>
+            <a:fld id="{89578386-84DA-45F9-ABB1-FE09AA2697D8}" type="slidenum">
+              <a:rPr lang="sv-SE" smtClean="0"/>
+              <a:pPr/>
+              <a:t>10</a:t>
+            </a:fld>
+            <a:endParaRPr lang="sv-SE"/>
+          </a:p>
+        </p:txBody>
+      </p:sp>
+      <p:pic>
+        <p:nvPicPr>
+          <p:cNvPr id="5" name="Picture 4">
+            <a:extLst>
+              <a:ext uri="{FF2B5EF4-FFF2-40B4-BE49-F238E27FC236}">
+                <a16:creationId xmlns:a16="http://schemas.microsoft.com/office/drawing/2014/main" id="{894F7F41-4CFD-DAFD-FAED-B4B433ECEDE3}"/>
+              </a:ext>
+            </a:extLst>
+          </p:cNvPr>
+          <p:cNvPicPr>
+            <a:picLocks noChangeAspect="1"/>
+          </p:cNvPicPr>
+          <p:nvPr/>
+        </p:nvPicPr>
+        <p:blipFill>
+          <a:blip r:embed="rId3"/>
+          <a:stretch>
+            <a:fillRect/>
+          </a:stretch>
+        </p:blipFill>
+        <p:spPr>
+          <a:xfrm>
+            <a:off x="5562600" y="2018036"/>
+            <a:ext cx="5516998" cy="4577754"/>
+          </a:xfrm>
+          <a:prstGeom prst="rect">
+            <a:avLst/>
+          </a:prstGeom>
+        </p:spPr>
+      </p:pic>
+    </p:spTree>
+    <p:extLst>
+      <p:ext uri="{BB962C8B-B14F-4D97-AF65-F5344CB8AC3E}">
+        <p14:creationId xmlns:p14="http://schemas.microsoft.com/office/powerpoint/2010/main" val="2732020781"/>
+      </p:ext>
+    </p:extLst>
+  </p:cSld>
+  <p:clrMapOvr>
+    <a:masterClrMapping/>
+  </p:clrMapOvr>
+</p:sld>
+</file>
+
+<file path=ppt/slides/slide11.xml><?xml version="1.0" encoding="utf-8"?>
+<p:sld xmlns:a="http://schemas.openxmlformats.org/drawingml/2006/main" xmlns:r="http://schemas.openxmlformats.org/officeDocument/2006/relationships" xmlns:p="http://schemas.openxmlformats.org/presentationml/2006/main">
+  <p:cSld>
+    <p:spTree>
+      <p:nvGrpSpPr>
         <p:cNvPr id="1" name=""/>
         <p:cNvGrpSpPr/>
         <p:nvPr/>
@@ -17562,7 +16911,7 @@
             <a:fld id="{89578386-84DA-45F9-ABB1-FE09AA2697D8}" type="slidenum">
               <a:rPr lang="sv-SE" smtClean="0"/>
               <a:pPr/>
-              <a:t>10</a:t>
+              <a:t>11</a:t>
             </a:fld>
             <a:endParaRPr lang="sv-SE"/>
           </a:p>
@@ -17915,7 +17264,7 @@
           <a:p>
             <a:r>
               <a:rPr lang="en-US" dirty="0"/>
-              <a:t>Transaction SQL</a:t>
+              <a:t>Structured Query language (SQL)</a:t>
             </a:r>
           </a:p>
           <a:p>
@@ -18015,7 +17364,7 @@
           <a:p>
             <a:r>
               <a:rPr lang="en-US" dirty="0"/>
-              <a:t>Why do we need databases?</a:t>
+              <a:t>Intro: Why do we need databases?</a:t>
             </a:r>
           </a:p>
         </p:txBody>
@@ -18103,37 +17452,78 @@
             <p:ph sz="half" idx="1"/>
           </p:nvPr>
         </p:nvSpPr>
-        <p:spPr/>
+        <p:spPr>
+          <a:xfrm>
+            <a:off x="467998" y="2160000"/>
+            <a:ext cx="11343002" cy="3924000"/>
+          </a:xfrm>
+        </p:spPr>
         <p:txBody>
           <a:bodyPr/>
           <a:lstStyle/>
           <a:p>
-            <a:endParaRPr lang="nb-NO"/>
-          </a:p>
-        </p:txBody>
-      </p:sp>
-      <p:sp>
-        <p:nvSpPr>
-          <p:cNvPr id="13" name="Content Placeholder 12">
-            <a:extLst>
-              <a:ext uri="{FF2B5EF4-FFF2-40B4-BE49-F238E27FC236}">
-                <a16:creationId xmlns:a16="http://schemas.microsoft.com/office/drawing/2014/main" id="{B19CC780-79EE-8CB5-6AE6-449C964D5021}"/>
-              </a:ext>
-            </a:extLst>
-          </p:cNvPr>
-          <p:cNvSpPr>
-            <a:spLocks noGrp="1"/>
-          </p:cNvSpPr>
-          <p:nvPr>
-            <p:ph sz="half" idx="14"/>
-          </p:nvPr>
-        </p:nvSpPr>
-        <p:spPr/>
-        <p:txBody>
-          <a:bodyPr/>
-          <a:lstStyle/>
-          <a:p>
-            <a:endParaRPr lang="nb-NO"/>
+            <a:pPr marL="0" indent="0">
+              <a:buNone/>
+            </a:pPr>
+            <a:r>
+              <a:rPr lang="nb-NO" dirty="0"/>
+              <a:t>«</a:t>
+            </a:r>
+            <a:r>
+              <a:rPr lang="en-US" dirty="0">
+                <a:solidFill>
+                  <a:srgbClr val="D1D5DB"/>
+                </a:solidFill>
+                <a:latin typeface="Söhne"/>
+              </a:rPr>
+              <a:t>D</a:t>
+            </a:r>
+            <a:r>
+              <a:rPr lang="en-US" b="0" i="0" dirty="0">
+                <a:solidFill>
+                  <a:srgbClr val="D1D5DB"/>
+                </a:solidFill>
+                <a:effectLst/>
+                <a:latin typeface="Söhne"/>
+              </a:rPr>
+              <a:t>atabases are essential for organizing, managing, securing, and efficiently retrieving data, making them a fundamental component of nearly every software system and data-driven organization. They enable data-driven decision-making, support business processes, and ensure data is available, reliable, and secure”</a:t>
+            </a:r>
+          </a:p>
+          <a:p>
+            <a:pPr marL="0" indent="0">
+              <a:buNone/>
+            </a:pPr>
+            <a:endParaRPr lang="en-US" dirty="0">
+              <a:solidFill>
+                <a:srgbClr val="D1D5DB"/>
+              </a:solidFill>
+              <a:latin typeface="Söhne"/>
+            </a:endParaRPr>
+          </a:p>
+          <a:p>
+            <a:pPr marL="0" indent="0">
+              <a:buNone/>
+            </a:pPr>
+            <a:r>
+              <a:rPr lang="en-US" dirty="0">
+                <a:solidFill>
+                  <a:srgbClr val="D1D5DB"/>
+                </a:solidFill>
+                <a:latin typeface="Söhne"/>
+              </a:rPr>
+              <a:t>“D</a:t>
+            </a:r>
+            <a:r>
+              <a:rPr lang="en-US" b="0" i="0" dirty="0">
+                <a:solidFill>
+                  <a:srgbClr val="D1D5DB"/>
+                </a:solidFill>
+                <a:effectLst/>
+                <a:latin typeface="Söhne"/>
+              </a:rPr>
+              <a:t>atabases are fundamental to modern computing environments, supporting a wide range of applications from simple websites to complex analytical systems, ensuring that data is organized, secure, accessible, and useful.”</a:t>
+            </a:r>
+            <a:endParaRPr lang="nb-NO" dirty="0"/>
           </a:p>
         </p:txBody>
       </p:sp>
@@ -18218,7 +17608,7 @@
           <a:p>
             <a:r>
               <a:rPr lang="en-US" dirty="0"/>
-              <a:t>Types of databases</a:t>
+              <a:t>Intro: Types of databases</a:t>
             </a:r>
           </a:p>
         </p:txBody>
@@ -18306,12 +17696,490 @@
             <p:ph sz="half" idx="1"/>
           </p:nvPr>
         </p:nvSpPr>
-        <p:spPr/>
-        <p:txBody>
-          <a:bodyPr/>
+        <p:spPr>
+          <a:xfrm>
+            <a:off x="467998" y="2160000"/>
+            <a:ext cx="5551802" cy="3924000"/>
+          </a:xfrm>
+        </p:spPr>
+        <p:txBody>
+          <a:bodyPr>
+            <a:normAutofit/>
+          </a:bodyPr>
           <a:lstStyle/>
           <a:p>
-            <a:endParaRPr lang="nb-NO"/>
+            <a:pPr marL="0" indent="0">
+              <a:buNone/>
+            </a:pPr>
+            <a:r>
+              <a:rPr lang="nb-NO" dirty="0" err="1"/>
+              <a:t>Relation</a:t>
+            </a:r>
+            <a:r>
+              <a:rPr lang="nb-NO" dirty="0"/>
+              <a:t> databases (RDBMS)</a:t>
+            </a:r>
+          </a:p>
+          <a:p>
+            <a:r>
+              <a:rPr lang="nb-NO" dirty="0" err="1"/>
+              <a:t>Structured</a:t>
+            </a:r>
+            <a:r>
+              <a:rPr lang="nb-NO" dirty="0"/>
+              <a:t> data</a:t>
+            </a:r>
+          </a:p>
+          <a:p>
+            <a:r>
+              <a:rPr lang="nb-NO" dirty="0" err="1"/>
+              <a:t>Tables</a:t>
+            </a:r>
+            <a:r>
+              <a:rPr lang="nb-NO" dirty="0"/>
+              <a:t>, </a:t>
+            </a:r>
+            <a:r>
+              <a:rPr lang="nb-NO" dirty="0" err="1"/>
+              <a:t>rows</a:t>
+            </a:r>
+            <a:r>
+              <a:rPr lang="nb-NO" dirty="0"/>
+              <a:t>, </a:t>
+            </a:r>
+            <a:r>
+              <a:rPr lang="nb-NO" dirty="0" err="1"/>
+              <a:t>columns</a:t>
+            </a:r>
+            <a:endParaRPr lang="nb-NO" dirty="0"/>
+          </a:p>
+          <a:p>
+            <a:r>
+              <a:rPr lang="nb-NO" dirty="0"/>
+              <a:t>Relationships </a:t>
+            </a:r>
+            <a:r>
+              <a:rPr lang="nb-NO" dirty="0" err="1"/>
+              <a:t>between</a:t>
+            </a:r>
+            <a:r>
+              <a:rPr lang="nb-NO" dirty="0"/>
+              <a:t> </a:t>
+            </a:r>
+            <a:r>
+              <a:rPr lang="nb-NO" dirty="0" err="1"/>
+              <a:t>tables</a:t>
+            </a:r>
+            <a:endParaRPr lang="nb-NO" dirty="0"/>
+          </a:p>
+          <a:p>
+            <a:r>
+              <a:rPr lang="en-US" dirty="0"/>
+              <a:t>ACID (Atomicity, Consistency, Isolation, Durability) properties, which ensure that database transactions are reliable, consistent, and maintain data integrity</a:t>
+            </a:r>
+            <a:endParaRPr lang="nb-NO" dirty="0"/>
+          </a:p>
+          <a:p>
+            <a:r>
+              <a:rPr lang="nb-NO" dirty="0"/>
+              <a:t>Supports </a:t>
+            </a:r>
+            <a:r>
+              <a:rPr lang="nb-NO" dirty="0" err="1"/>
+              <a:t>Structured</a:t>
+            </a:r>
+            <a:r>
+              <a:rPr lang="nb-NO" dirty="0"/>
+              <a:t> Query Language (SQL)</a:t>
+            </a:r>
+          </a:p>
+        </p:txBody>
+      </p:sp>
+      <p:sp>
+        <p:nvSpPr>
+          <p:cNvPr id="2" name="Content Placeholder 2">
+            <a:extLst>
+              <a:ext uri="{FF2B5EF4-FFF2-40B4-BE49-F238E27FC236}">
+                <a16:creationId xmlns:a16="http://schemas.microsoft.com/office/drawing/2014/main" id="{E4F54C69-984E-26F7-BB49-0EF230439431}"/>
+              </a:ext>
+            </a:extLst>
+          </p:cNvPr>
+          <p:cNvSpPr txBox="1">
+            <a:spLocks/>
+          </p:cNvSpPr>
+          <p:nvPr/>
+        </p:nvSpPr>
+        <p:spPr>
+          <a:xfrm>
+            <a:off x="6432909" y="2057400"/>
+            <a:ext cx="5551802" cy="3924000"/>
+          </a:xfrm>
+          <a:prstGeom prst="rect">
+            <a:avLst/>
+          </a:prstGeom>
+        </p:spPr>
+        <p:txBody>
+          <a:bodyPr vert="horz" lIns="0" tIns="0" rIns="0" bIns="0" rtlCol="0">
+            <a:normAutofit/>
+          </a:bodyPr>
+          <a:lstStyle>
+            <a:lvl1pPr marL="177800" indent="-177800" algn="l" defTabSz="914400" rtl="0" eaLnBrk="1" latinLnBrk="0" hangingPunct="1">
+              <a:lnSpc>
+                <a:spcPct val="110000"/>
+              </a:lnSpc>
+              <a:spcBef>
+                <a:spcPts val="1200"/>
+              </a:spcBef>
+              <a:buFont typeface="Arial" panose="020B0604020202020204" pitchFamily="34" charset="0"/>
+              <a:buChar char="•"/>
+              <a:defRPr sz="1800" kern="1200">
+                <a:solidFill>
+                  <a:schemeClr val="bg1"/>
+                </a:solidFill>
+                <a:latin typeface="+mn-lt"/>
+                <a:ea typeface="+mn-ea"/>
+                <a:cs typeface="+mn-cs"/>
+              </a:defRPr>
+            </a:lvl1pPr>
+            <a:lvl2pPr marL="361950" indent="-184150" algn="l" defTabSz="914400" rtl="0" eaLnBrk="1" latinLnBrk="0" hangingPunct="1">
+              <a:lnSpc>
+                <a:spcPct val="110000"/>
+              </a:lnSpc>
+              <a:spcBef>
+                <a:spcPts val="300"/>
+              </a:spcBef>
+              <a:spcAft>
+                <a:spcPts val="300"/>
+              </a:spcAft>
+              <a:buFont typeface="Calibri" panose="020F0502020204030204" pitchFamily="34" charset="0"/>
+              <a:buChar char="‒"/>
+              <a:defRPr sz="1600" kern="1200">
+                <a:solidFill>
+                  <a:schemeClr val="bg1"/>
+                </a:solidFill>
+                <a:latin typeface="+mn-lt"/>
+                <a:ea typeface="+mn-ea"/>
+                <a:cs typeface="+mn-cs"/>
+              </a:defRPr>
+            </a:lvl2pPr>
+            <a:lvl3pPr marL="538163" indent="-176213" algn="l" defTabSz="914400" rtl="0" eaLnBrk="1" latinLnBrk="0" hangingPunct="1">
+              <a:lnSpc>
+                <a:spcPct val="110000"/>
+              </a:lnSpc>
+              <a:spcBef>
+                <a:spcPts val="300"/>
+              </a:spcBef>
+              <a:spcAft>
+                <a:spcPts val="300"/>
+              </a:spcAft>
+              <a:buFont typeface="Calibri" panose="020F0502020204030204" pitchFamily="34" charset="0"/>
+              <a:buChar char="‒"/>
+              <a:defRPr sz="1400" kern="1200">
+                <a:solidFill>
+                  <a:schemeClr val="bg1"/>
+                </a:solidFill>
+                <a:latin typeface="+mn-lt"/>
+                <a:ea typeface="+mn-ea"/>
+                <a:cs typeface="+mn-cs"/>
+              </a:defRPr>
+            </a:lvl3pPr>
+            <a:lvl4pPr marL="684000" indent="-144000" algn="l" defTabSz="914400" rtl="0" eaLnBrk="1" latinLnBrk="0" hangingPunct="1">
+              <a:lnSpc>
+                <a:spcPct val="110000"/>
+              </a:lnSpc>
+              <a:spcBef>
+                <a:spcPts val="300"/>
+              </a:spcBef>
+              <a:spcAft>
+                <a:spcPts val="300"/>
+              </a:spcAft>
+              <a:buFont typeface="Calibri" panose="020F0502020204030204" pitchFamily="34" charset="0"/>
+              <a:buChar char="‒"/>
+              <a:defRPr sz="1200" kern="1200">
+                <a:solidFill>
+                  <a:schemeClr val="bg1"/>
+                </a:solidFill>
+                <a:latin typeface="+mn-lt"/>
+                <a:ea typeface="+mn-ea"/>
+                <a:cs typeface="+mn-cs"/>
+              </a:defRPr>
+            </a:lvl4pPr>
+            <a:lvl5pPr marL="808038" indent="-126000" algn="l" defTabSz="914400" rtl="0" eaLnBrk="1" latinLnBrk="0" hangingPunct="1">
+              <a:lnSpc>
+                <a:spcPct val="110000"/>
+              </a:lnSpc>
+              <a:spcBef>
+                <a:spcPts val="300"/>
+              </a:spcBef>
+              <a:spcAft>
+                <a:spcPts val="300"/>
+              </a:spcAft>
+              <a:buFont typeface="Calibri" panose="020F0502020204030204" pitchFamily="34" charset="0"/>
+              <a:buChar char="‒"/>
+              <a:defRPr sz="1200" kern="1200">
+                <a:solidFill>
+                  <a:schemeClr val="bg1"/>
+                </a:solidFill>
+                <a:latin typeface="+mn-lt"/>
+                <a:ea typeface="+mn-ea"/>
+                <a:cs typeface="+mn-cs"/>
+              </a:defRPr>
+            </a:lvl5pPr>
+            <a:lvl6pPr marL="2514600" indent="-228600" algn="l" defTabSz="914400" rtl="0" eaLnBrk="1" latinLnBrk="0" hangingPunct="1">
+              <a:lnSpc>
+                <a:spcPct val="90000"/>
+              </a:lnSpc>
+              <a:spcBef>
+                <a:spcPts val="500"/>
+              </a:spcBef>
+              <a:buFont typeface="Arial" panose="020B0604020202020204" pitchFamily="34" charset="0"/>
+              <a:buChar char="•"/>
+              <a:defRPr sz="1800" kern="1200">
+                <a:solidFill>
+                  <a:schemeClr val="tx1"/>
+                </a:solidFill>
+                <a:latin typeface="+mn-lt"/>
+                <a:ea typeface="+mn-ea"/>
+                <a:cs typeface="+mn-cs"/>
+              </a:defRPr>
+            </a:lvl6pPr>
+            <a:lvl7pPr marL="2971800" indent="-228600" algn="l" defTabSz="914400" rtl="0" eaLnBrk="1" latinLnBrk="0" hangingPunct="1">
+              <a:lnSpc>
+                <a:spcPct val="90000"/>
+              </a:lnSpc>
+              <a:spcBef>
+                <a:spcPts val="500"/>
+              </a:spcBef>
+              <a:buFont typeface="Arial" panose="020B0604020202020204" pitchFamily="34" charset="0"/>
+              <a:buChar char="•"/>
+              <a:defRPr sz="1800" kern="1200">
+                <a:solidFill>
+                  <a:schemeClr val="tx1"/>
+                </a:solidFill>
+                <a:latin typeface="+mn-lt"/>
+                <a:ea typeface="+mn-ea"/>
+                <a:cs typeface="+mn-cs"/>
+              </a:defRPr>
+            </a:lvl7pPr>
+            <a:lvl8pPr marL="3429000" indent="-228600" algn="l" defTabSz="914400" rtl="0" eaLnBrk="1" latinLnBrk="0" hangingPunct="1">
+              <a:lnSpc>
+                <a:spcPct val="90000"/>
+              </a:lnSpc>
+              <a:spcBef>
+                <a:spcPts val="500"/>
+              </a:spcBef>
+              <a:buFont typeface="Arial" panose="020B0604020202020204" pitchFamily="34" charset="0"/>
+              <a:buChar char="•"/>
+              <a:defRPr sz="1800" kern="1200">
+                <a:solidFill>
+                  <a:schemeClr val="tx1"/>
+                </a:solidFill>
+                <a:latin typeface="+mn-lt"/>
+                <a:ea typeface="+mn-ea"/>
+                <a:cs typeface="+mn-cs"/>
+              </a:defRPr>
+            </a:lvl8pPr>
+            <a:lvl9pPr marL="3886200" indent="-228600" algn="l" defTabSz="914400" rtl="0" eaLnBrk="1" latinLnBrk="0" hangingPunct="1">
+              <a:lnSpc>
+                <a:spcPct val="90000"/>
+              </a:lnSpc>
+              <a:spcBef>
+                <a:spcPts val="500"/>
+              </a:spcBef>
+              <a:buFont typeface="Arial" panose="020B0604020202020204" pitchFamily="34" charset="0"/>
+              <a:buChar char="•"/>
+              <a:defRPr sz="1800" kern="1200">
+                <a:solidFill>
+                  <a:schemeClr val="tx1"/>
+                </a:solidFill>
+                <a:latin typeface="+mn-lt"/>
+                <a:ea typeface="+mn-ea"/>
+                <a:cs typeface="+mn-cs"/>
+              </a:defRPr>
+            </a:lvl9pPr>
+          </a:lstStyle>
+          <a:p>
+            <a:pPr marL="0" indent="0">
+              <a:buFont typeface="Arial" panose="020B0604020202020204" pitchFamily="34" charset="0"/>
+              <a:buNone/>
+            </a:pPr>
+            <a:r>
+              <a:rPr lang="nb-NO" dirty="0"/>
+              <a:t>Non-</a:t>
+            </a:r>
+            <a:r>
+              <a:rPr lang="nb-NO" dirty="0" err="1"/>
+              <a:t>relation</a:t>
+            </a:r>
+            <a:r>
+              <a:rPr lang="nb-NO" dirty="0"/>
+              <a:t> (</a:t>
+            </a:r>
+            <a:r>
+              <a:rPr lang="nb-NO" dirty="0" err="1"/>
+              <a:t>NoSQL</a:t>
+            </a:r>
+            <a:r>
+              <a:rPr lang="nb-NO" dirty="0"/>
+              <a:t>) databases</a:t>
+            </a:r>
+          </a:p>
+          <a:p>
+            <a:r>
+              <a:rPr lang="nb-NO" dirty="0" err="1"/>
+              <a:t>Unstructred</a:t>
+            </a:r>
+            <a:r>
+              <a:rPr lang="nb-NO" dirty="0"/>
+              <a:t>, </a:t>
+            </a:r>
+            <a:r>
+              <a:rPr lang="nb-NO" dirty="0" err="1"/>
+              <a:t>semi-structured</a:t>
+            </a:r>
+            <a:r>
+              <a:rPr lang="nb-NO" dirty="0"/>
+              <a:t> &amp; </a:t>
+            </a:r>
+            <a:r>
+              <a:rPr lang="nb-NO" dirty="0" err="1"/>
+              <a:t>structured</a:t>
+            </a:r>
+            <a:r>
+              <a:rPr lang="nb-NO" dirty="0"/>
+              <a:t> data</a:t>
+            </a:r>
+          </a:p>
+          <a:p>
+            <a:r>
+              <a:rPr lang="nb-NO" dirty="0" err="1"/>
+              <a:t>Document</a:t>
+            </a:r>
+            <a:r>
+              <a:rPr lang="nb-NO" dirty="0"/>
+              <a:t> stores (</a:t>
+            </a:r>
+            <a:r>
+              <a:rPr lang="nb-NO" dirty="0" err="1"/>
+              <a:t>json</a:t>
+            </a:r>
+            <a:r>
+              <a:rPr lang="nb-NO" dirty="0"/>
+              <a:t>/</a:t>
+            </a:r>
+            <a:r>
+              <a:rPr lang="nb-NO" dirty="0" err="1"/>
+              <a:t>bson</a:t>
+            </a:r>
+            <a:r>
+              <a:rPr lang="nb-NO" dirty="0"/>
+              <a:t>)</a:t>
+            </a:r>
+          </a:p>
+          <a:p>
+            <a:r>
+              <a:rPr lang="nb-NO" dirty="0"/>
+              <a:t>Key-</a:t>
+            </a:r>
+            <a:r>
+              <a:rPr lang="nb-NO" dirty="0" err="1"/>
+              <a:t>value</a:t>
+            </a:r>
+            <a:r>
+              <a:rPr lang="nb-NO" dirty="0"/>
+              <a:t> stores (key-</a:t>
+            </a:r>
+            <a:r>
+              <a:rPr lang="nb-NO" dirty="0" err="1"/>
+              <a:t>value</a:t>
+            </a:r>
+            <a:r>
+              <a:rPr lang="nb-NO" dirty="0"/>
+              <a:t> pairs)</a:t>
+            </a:r>
+          </a:p>
+          <a:p>
+            <a:r>
+              <a:rPr lang="nb-NO" dirty="0"/>
+              <a:t>Object stores (files and media)</a:t>
+            </a:r>
+          </a:p>
+          <a:p>
+            <a:r>
+              <a:rPr lang="nb-NO" dirty="0" err="1"/>
+              <a:t>Varying</a:t>
+            </a:r>
+            <a:r>
+              <a:rPr lang="nb-NO" dirty="0"/>
+              <a:t> </a:t>
+            </a:r>
+            <a:r>
+              <a:rPr lang="nb-NO" dirty="0" err="1"/>
+              <a:t>degree</a:t>
+            </a:r>
+            <a:r>
+              <a:rPr lang="nb-NO" dirty="0"/>
+              <a:t> </a:t>
+            </a:r>
+            <a:r>
+              <a:rPr lang="nb-NO" dirty="0" err="1"/>
+              <a:t>of</a:t>
+            </a:r>
+            <a:r>
+              <a:rPr lang="nb-NO" dirty="0"/>
+              <a:t> support for </a:t>
+            </a:r>
+            <a:r>
+              <a:rPr lang="nb-NO" dirty="0" err="1"/>
+              <a:t>transactions</a:t>
+            </a:r>
+            <a:endParaRPr lang="nb-NO" dirty="0"/>
+          </a:p>
+          <a:p>
+            <a:r>
+              <a:rPr lang="nb-NO" dirty="0"/>
+              <a:t>No standard </a:t>
+            </a:r>
+            <a:r>
+              <a:rPr lang="nb-NO" dirty="0" err="1"/>
+              <a:t>query</a:t>
+            </a:r>
+            <a:r>
+              <a:rPr lang="nb-NO" dirty="0"/>
+              <a:t> </a:t>
+            </a:r>
+            <a:r>
+              <a:rPr lang="nb-NO" dirty="0" err="1"/>
+              <a:t>language</a:t>
+            </a:r>
+            <a:r>
+              <a:rPr lang="nb-NO" dirty="0"/>
+              <a:t>, </a:t>
+            </a:r>
+            <a:r>
+              <a:rPr lang="nb-NO" dirty="0" err="1"/>
+              <a:t>often</a:t>
+            </a:r>
+            <a:r>
+              <a:rPr lang="nb-NO" dirty="0"/>
+              <a:t> APIs or SQL-like </a:t>
+            </a:r>
+            <a:r>
+              <a:rPr lang="nb-NO" dirty="0" err="1"/>
+              <a:t>query</a:t>
+            </a:r>
+            <a:r>
+              <a:rPr lang="nb-NO" dirty="0"/>
+              <a:t> </a:t>
+            </a:r>
+            <a:r>
+              <a:rPr lang="nb-NO" dirty="0" err="1"/>
+              <a:t>language</a:t>
+            </a:r>
+            <a:endParaRPr lang="nb-NO" dirty="0"/>
+          </a:p>
+          <a:p>
+            <a:endParaRPr lang="nb-NO" dirty="0"/>
           </a:p>
         </p:txBody>
       </p:sp>
@@ -18396,7 +18264,7 @@
           <a:p>
             <a:r>
               <a:rPr lang="en-US" dirty="0"/>
-              <a:t>Relation databases</a:t>
+              <a:t>Intro: Relation databases vs non-relation (NoSQL) databases</a:t>
             </a:r>
           </a:p>
         </p:txBody>
@@ -18484,12 +18352,522 @@
             <p:ph sz="half" idx="1"/>
           </p:nvPr>
         </p:nvSpPr>
-        <p:spPr/>
+        <p:spPr>
+          <a:xfrm>
+            <a:off x="467998" y="2141540"/>
+            <a:ext cx="5551802" cy="3924000"/>
+          </a:xfrm>
+        </p:spPr>
         <p:txBody>
           <a:bodyPr/>
           <a:lstStyle/>
           <a:p>
-            <a:endParaRPr lang="nb-NO"/>
+            <a:pPr marL="0" indent="0">
+              <a:buNone/>
+            </a:pPr>
+            <a:r>
+              <a:rPr lang="nb-NO" dirty="0" err="1"/>
+              <a:t>Choose</a:t>
+            </a:r>
+            <a:r>
+              <a:rPr lang="nb-NO" dirty="0"/>
+              <a:t> a </a:t>
+            </a:r>
+            <a:r>
+              <a:rPr lang="nb-NO" dirty="0" err="1"/>
+              <a:t>relation</a:t>
+            </a:r>
+            <a:r>
+              <a:rPr lang="nb-NO" dirty="0"/>
+              <a:t> database </a:t>
+            </a:r>
+            <a:r>
+              <a:rPr lang="nb-NO" dirty="0" err="1"/>
+              <a:t>when</a:t>
+            </a:r>
+            <a:r>
+              <a:rPr lang="nb-NO" dirty="0"/>
+              <a:t>:</a:t>
+            </a:r>
+          </a:p>
+          <a:p>
+            <a:r>
+              <a:rPr lang="nb-NO" dirty="0"/>
+              <a:t>Data </a:t>
+            </a:r>
+            <a:r>
+              <a:rPr lang="nb-NO" dirty="0" err="1"/>
+              <a:t>structure</a:t>
+            </a:r>
+            <a:r>
+              <a:rPr lang="nb-NO" dirty="0"/>
+              <a:t> is </a:t>
+            </a:r>
+            <a:r>
+              <a:rPr lang="nb-NO" dirty="0" err="1"/>
+              <a:t>well</a:t>
+            </a:r>
+            <a:r>
+              <a:rPr lang="nb-NO" dirty="0"/>
+              <a:t> </a:t>
+            </a:r>
+            <a:r>
+              <a:rPr lang="nb-NO" dirty="0" err="1"/>
+              <a:t>defined</a:t>
+            </a:r>
+            <a:endParaRPr lang="nb-NO" dirty="0"/>
+          </a:p>
+          <a:p>
+            <a:r>
+              <a:rPr lang="nb-NO" dirty="0"/>
+              <a:t>ACID is a </a:t>
+            </a:r>
+            <a:r>
+              <a:rPr lang="nb-NO" dirty="0" err="1"/>
+              <a:t>requirement</a:t>
+            </a:r>
+            <a:endParaRPr lang="nb-NO" dirty="0"/>
+          </a:p>
+          <a:p>
+            <a:r>
+              <a:rPr lang="nb-NO" dirty="0" err="1"/>
+              <a:t>Need</a:t>
+            </a:r>
+            <a:r>
+              <a:rPr lang="nb-NO" dirty="0"/>
+              <a:t> to run </a:t>
+            </a:r>
+            <a:r>
+              <a:rPr lang="nb-NO" dirty="0" err="1"/>
+              <a:t>complex</a:t>
+            </a:r>
+            <a:r>
+              <a:rPr lang="nb-NO" dirty="0"/>
+              <a:t> </a:t>
+            </a:r>
+            <a:r>
+              <a:rPr lang="nb-NO" dirty="0" err="1"/>
+              <a:t>queries</a:t>
+            </a:r>
+            <a:endParaRPr lang="nb-NO" dirty="0"/>
+          </a:p>
+          <a:p>
+            <a:r>
+              <a:rPr lang="nb-NO" dirty="0" err="1"/>
+              <a:t>Extra</a:t>
+            </a:r>
+            <a:r>
+              <a:rPr lang="nb-NO" dirty="0"/>
+              <a:t> </a:t>
+            </a:r>
+            <a:r>
+              <a:rPr lang="nb-NO" dirty="0" err="1"/>
+              <a:t>level</a:t>
+            </a:r>
+            <a:r>
+              <a:rPr lang="nb-NO" dirty="0"/>
+              <a:t> </a:t>
+            </a:r>
+            <a:r>
+              <a:rPr lang="nb-NO" dirty="0" err="1"/>
+              <a:t>of</a:t>
+            </a:r>
+            <a:r>
+              <a:rPr lang="nb-NO" dirty="0"/>
+              <a:t> </a:t>
+            </a:r>
+            <a:r>
+              <a:rPr lang="nb-NO" dirty="0" err="1"/>
+              <a:t>security</a:t>
+            </a:r>
+            <a:endParaRPr lang="nb-NO" dirty="0"/>
+          </a:p>
+          <a:p>
+            <a:r>
+              <a:rPr lang="nb-NO" dirty="0"/>
+              <a:t>Small to medium </a:t>
+            </a:r>
+            <a:r>
+              <a:rPr lang="nb-NO" dirty="0" err="1"/>
+              <a:t>sized</a:t>
+            </a:r>
+            <a:r>
+              <a:rPr lang="nb-NO" dirty="0"/>
+              <a:t> database</a:t>
+            </a:r>
+          </a:p>
+          <a:p>
+            <a:r>
+              <a:rPr lang="nb-NO" dirty="0"/>
+              <a:t>Legacy </a:t>
+            </a:r>
+            <a:r>
+              <a:rPr lang="nb-NO" dirty="0" err="1"/>
+              <a:t>stystems</a:t>
+            </a:r>
+            <a:endParaRPr lang="nb-NO" dirty="0"/>
+          </a:p>
+        </p:txBody>
+      </p:sp>
+      <p:sp>
+        <p:nvSpPr>
+          <p:cNvPr id="7" name="Content Placeholder 1">
+            <a:extLst>
+              <a:ext uri="{FF2B5EF4-FFF2-40B4-BE49-F238E27FC236}">
+                <a16:creationId xmlns:a16="http://schemas.microsoft.com/office/drawing/2014/main" id="{0A7F367D-DAFA-3DFA-8E53-7F02839FE3D6}"/>
+              </a:ext>
+            </a:extLst>
+          </p:cNvPr>
+          <p:cNvSpPr txBox="1">
+            <a:spLocks/>
+          </p:cNvSpPr>
+          <p:nvPr/>
+        </p:nvSpPr>
+        <p:spPr>
+          <a:xfrm>
+            <a:off x="6167947" y="2141540"/>
+            <a:ext cx="5551802" cy="3924000"/>
+          </a:xfrm>
+          <a:prstGeom prst="rect">
+            <a:avLst/>
+          </a:prstGeom>
+        </p:spPr>
+        <p:txBody>
+          <a:bodyPr vert="horz" lIns="0" tIns="0" rIns="0" bIns="0" rtlCol="0">
+            <a:normAutofit/>
+          </a:bodyPr>
+          <a:lstStyle>
+            <a:lvl1pPr marL="177800" indent="-177800" algn="l" defTabSz="914400" rtl="0" eaLnBrk="1" latinLnBrk="0" hangingPunct="1">
+              <a:lnSpc>
+                <a:spcPct val="110000"/>
+              </a:lnSpc>
+              <a:spcBef>
+                <a:spcPts val="1200"/>
+              </a:spcBef>
+              <a:buFont typeface="Arial" panose="020B0604020202020204" pitchFamily="34" charset="0"/>
+              <a:buChar char="•"/>
+              <a:defRPr sz="1800" kern="1200">
+                <a:solidFill>
+                  <a:schemeClr val="bg1"/>
+                </a:solidFill>
+                <a:latin typeface="+mn-lt"/>
+                <a:ea typeface="+mn-ea"/>
+                <a:cs typeface="+mn-cs"/>
+              </a:defRPr>
+            </a:lvl1pPr>
+            <a:lvl2pPr marL="361950" indent="-184150" algn="l" defTabSz="914400" rtl="0" eaLnBrk="1" latinLnBrk="0" hangingPunct="1">
+              <a:lnSpc>
+                <a:spcPct val="110000"/>
+              </a:lnSpc>
+              <a:spcBef>
+                <a:spcPts val="300"/>
+              </a:spcBef>
+              <a:spcAft>
+                <a:spcPts val="300"/>
+              </a:spcAft>
+              <a:buFont typeface="Calibri" panose="020F0502020204030204" pitchFamily="34" charset="0"/>
+              <a:buChar char="‒"/>
+              <a:defRPr sz="1600" kern="1200">
+                <a:solidFill>
+                  <a:schemeClr val="bg1"/>
+                </a:solidFill>
+                <a:latin typeface="+mn-lt"/>
+                <a:ea typeface="+mn-ea"/>
+                <a:cs typeface="+mn-cs"/>
+              </a:defRPr>
+            </a:lvl2pPr>
+            <a:lvl3pPr marL="538163" indent="-176213" algn="l" defTabSz="914400" rtl="0" eaLnBrk="1" latinLnBrk="0" hangingPunct="1">
+              <a:lnSpc>
+                <a:spcPct val="110000"/>
+              </a:lnSpc>
+              <a:spcBef>
+                <a:spcPts val="300"/>
+              </a:spcBef>
+              <a:spcAft>
+                <a:spcPts val="300"/>
+              </a:spcAft>
+              <a:buFont typeface="Calibri" panose="020F0502020204030204" pitchFamily="34" charset="0"/>
+              <a:buChar char="‒"/>
+              <a:defRPr sz="1400" kern="1200">
+                <a:solidFill>
+                  <a:schemeClr val="bg1"/>
+                </a:solidFill>
+                <a:latin typeface="+mn-lt"/>
+                <a:ea typeface="+mn-ea"/>
+                <a:cs typeface="+mn-cs"/>
+              </a:defRPr>
+            </a:lvl3pPr>
+            <a:lvl4pPr marL="684000" indent="-144000" algn="l" defTabSz="914400" rtl="0" eaLnBrk="1" latinLnBrk="0" hangingPunct="1">
+              <a:lnSpc>
+                <a:spcPct val="110000"/>
+              </a:lnSpc>
+              <a:spcBef>
+                <a:spcPts val="300"/>
+              </a:spcBef>
+              <a:spcAft>
+                <a:spcPts val="300"/>
+              </a:spcAft>
+              <a:buFont typeface="Calibri" panose="020F0502020204030204" pitchFamily="34" charset="0"/>
+              <a:buChar char="‒"/>
+              <a:defRPr sz="1200" kern="1200">
+                <a:solidFill>
+                  <a:schemeClr val="bg1"/>
+                </a:solidFill>
+                <a:latin typeface="+mn-lt"/>
+                <a:ea typeface="+mn-ea"/>
+                <a:cs typeface="+mn-cs"/>
+              </a:defRPr>
+            </a:lvl4pPr>
+            <a:lvl5pPr marL="808038" indent="-126000" algn="l" defTabSz="914400" rtl="0" eaLnBrk="1" latinLnBrk="0" hangingPunct="1">
+              <a:lnSpc>
+                <a:spcPct val="110000"/>
+              </a:lnSpc>
+              <a:spcBef>
+                <a:spcPts val="300"/>
+              </a:spcBef>
+              <a:spcAft>
+                <a:spcPts val="300"/>
+              </a:spcAft>
+              <a:buFont typeface="Calibri" panose="020F0502020204030204" pitchFamily="34" charset="0"/>
+              <a:buChar char="‒"/>
+              <a:defRPr sz="1200" kern="1200">
+                <a:solidFill>
+                  <a:schemeClr val="bg1"/>
+                </a:solidFill>
+                <a:latin typeface="+mn-lt"/>
+                <a:ea typeface="+mn-ea"/>
+                <a:cs typeface="+mn-cs"/>
+              </a:defRPr>
+            </a:lvl5pPr>
+            <a:lvl6pPr marL="2514600" indent="-228600" algn="l" defTabSz="914400" rtl="0" eaLnBrk="1" latinLnBrk="0" hangingPunct="1">
+              <a:lnSpc>
+                <a:spcPct val="90000"/>
+              </a:lnSpc>
+              <a:spcBef>
+                <a:spcPts val="500"/>
+              </a:spcBef>
+              <a:buFont typeface="Arial" panose="020B0604020202020204" pitchFamily="34" charset="0"/>
+              <a:buChar char="•"/>
+              <a:defRPr sz="1800" kern="1200">
+                <a:solidFill>
+                  <a:schemeClr val="tx1"/>
+                </a:solidFill>
+                <a:latin typeface="+mn-lt"/>
+                <a:ea typeface="+mn-ea"/>
+                <a:cs typeface="+mn-cs"/>
+              </a:defRPr>
+            </a:lvl6pPr>
+            <a:lvl7pPr marL="2971800" indent="-228600" algn="l" defTabSz="914400" rtl="0" eaLnBrk="1" latinLnBrk="0" hangingPunct="1">
+              <a:lnSpc>
+                <a:spcPct val="90000"/>
+              </a:lnSpc>
+              <a:spcBef>
+                <a:spcPts val="500"/>
+              </a:spcBef>
+              <a:buFont typeface="Arial" panose="020B0604020202020204" pitchFamily="34" charset="0"/>
+              <a:buChar char="•"/>
+              <a:defRPr sz="1800" kern="1200">
+                <a:solidFill>
+                  <a:schemeClr val="tx1"/>
+                </a:solidFill>
+                <a:latin typeface="+mn-lt"/>
+                <a:ea typeface="+mn-ea"/>
+                <a:cs typeface="+mn-cs"/>
+              </a:defRPr>
+            </a:lvl7pPr>
+            <a:lvl8pPr marL="3429000" indent="-228600" algn="l" defTabSz="914400" rtl="0" eaLnBrk="1" latinLnBrk="0" hangingPunct="1">
+              <a:lnSpc>
+                <a:spcPct val="90000"/>
+              </a:lnSpc>
+              <a:spcBef>
+                <a:spcPts val="500"/>
+              </a:spcBef>
+              <a:buFont typeface="Arial" panose="020B0604020202020204" pitchFamily="34" charset="0"/>
+              <a:buChar char="•"/>
+              <a:defRPr sz="1800" kern="1200">
+                <a:solidFill>
+                  <a:schemeClr val="tx1"/>
+                </a:solidFill>
+                <a:latin typeface="+mn-lt"/>
+                <a:ea typeface="+mn-ea"/>
+                <a:cs typeface="+mn-cs"/>
+              </a:defRPr>
+            </a:lvl8pPr>
+            <a:lvl9pPr marL="3886200" indent="-228600" algn="l" defTabSz="914400" rtl="0" eaLnBrk="1" latinLnBrk="0" hangingPunct="1">
+              <a:lnSpc>
+                <a:spcPct val="90000"/>
+              </a:lnSpc>
+              <a:spcBef>
+                <a:spcPts val="500"/>
+              </a:spcBef>
+              <a:buFont typeface="Arial" panose="020B0604020202020204" pitchFamily="34" charset="0"/>
+              <a:buChar char="•"/>
+              <a:defRPr sz="1800" kern="1200">
+                <a:solidFill>
+                  <a:schemeClr val="tx1"/>
+                </a:solidFill>
+                <a:latin typeface="+mn-lt"/>
+                <a:ea typeface="+mn-ea"/>
+                <a:cs typeface="+mn-cs"/>
+              </a:defRPr>
+            </a:lvl9pPr>
+          </a:lstStyle>
+          <a:p>
+            <a:pPr marL="0" indent="0">
+              <a:buNone/>
+            </a:pPr>
+            <a:r>
+              <a:rPr lang="nb-NO" dirty="0" err="1"/>
+              <a:t>Choose</a:t>
+            </a:r>
+            <a:r>
+              <a:rPr lang="nb-NO" dirty="0"/>
+              <a:t> a </a:t>
+            </a:r>
+            <a:r>
+              <a:rPr lang="nb-NO" dirty="0" err="1"/>
+              <a:t>NoSQL</a:t>
+            </a:r>
+            <a:r>
+              <a:rPr lang="nb-NO" dirty="0"/>
+              <a:t> database </a:t>
+            </a:r>
+            <a:r>
+              <a:rPr lang="nb-NO" dirty="0" err="1"/>
+              <a:t>when</a:t>
+            </a:r>
+            <a:r>
+              <a:rPr lang="nb-NO" dirty="0"/>
+              <a:t>:</a:t>
+            </a:r>
+          </a:p>
+          <a:p>
+            <a:r>
+              <a:rPr lang="nb-NO" dirty="0" err="1"/>
+              <a:t>Semi-structured</a:t>
+            </a:r>
+            <a:r>
+              <a:rPr lang="nb-NO" dirty="0"/>
+              <a:t> or </a:t>
+            </a:r>
+            <a:r>
+              <a:rPr lang="nb-NO" dirty="0" err="1"/>
+              <a:t>unstructured</a:t>
+            </a:r>
+            <a:r>
+              <a:rPr lang="nb-NO" dirty="0"/>
+              <a:t> data</a:t>
+            </a:r>
+          </a:p>
+          <a:p>
+            <a:r>
+              <a:rPr lang="nb-NO" dirty="0"/>
+              <a:t>Massive </a:t>
+            </a:r>
+            <a:r>
+              <a:rPr lang="nb-NO" dirty="0" err="1"/>
+              <a:t>amounts</a:t>
+            </a:r>
+            <a:r>
+              <a:rPr lang="nb-NO" dirty="0"/>
+              <a:t> </a:t>
+            </a:r>
+            <a:r>
+              <a:rPr lang="nb-NO" dirty="0" err="1"/>
+              <a:t>of</a:t>
+            </a:r>
+            <a:r>
+              <a:rPr lang="nb-NO" dirty="0"/>
+              <a:t> data</a:t>
+            </a:r>
+          </a:p>
+          <a:p>
+            <a:r>
+              <a:rPr lang="nb-NO" dirty="0"/>
+              <a:t>High </a:t>
+            </a:r>
+            <a:r>
+              <a:rPr lang="nb-NO" dirty="0" err="1"/>
+              <a:t>availability</a:t>
+            </a:r>
+            <a:r>
+              <a:rPr lang="nb-NO" dirty="0"/>
+              <a:t> &amp; </a:t>
+            </a:r>
+            <a:r>
+              <a:rPr lang="nb-NO" dirty="0" err="1"/>
+              <a:t>low</a:t>
+            </a:r>
+            <a:r>
+              <a:rPr lang="nb-NO" dirty="0"/>
+              <a:t> </a:t>
+            </a:r>
+            <a:r>
+              <a:rPr lang="nb-NO" dirty="0" err="1"/>
+              <a:t>latency</a:t>
+            </a:r>
+            <a:endParaRPr lang="nb-NO" dirty="0"/>
+          </a:p>
+          <a:p>
+            <a:r>
+              <a:rPr lang="nb-NO" dirty="0" err="1"/>
+              <a:t>Simplfy</a:t>
+            </a:r>
+            <a:r>
+              <a:rPr lang="nb-NO" dirty="0"/>
+              <a:t> </a:t>
+            </a:r>
+            <a:r>
+              <a:rPr lang="nb-NO" dirty="0" err="1"/>
+              <a:t>development</a:t>
+            </a:r>
+            <a:r>
+              <a:rPr lang="nb-NO" dirty="0"/>
+              <a:t> </a:t>
+            </a:r>
+            <a:r>
+              <a:rPr lang="nb-NO" dirty="0" err="1"/>
+              <a:t>complexity</a:t>
+            </a:r>
+            <a:r>
+              <a:rPr lang="nb-NO" dirty="0"/>
+              <a:t> (less </a:t>
+            </a:r>
+            <a:r>
+              <a:rPr lang="nb-NO" dirty="0" err="1"/>
+              <a:t>need</a:t>
+            </a:r>
+            <a:r>
+              <a:rPr lang="nb-NO" dirty="0"/>
+              <a:t> for ORM)</a:t>
+            </a:r>
+          </a:p>
+          <a:p>
+            <a:r>
+              <a:rPr lang="nb-NO" dirty="0"/>
+              <a:t>More </a:t>
+            </a:r>
+            <a:r>
+              <a:rPr lang="nb-NO" dirty="0" err="1"/>
+              <a:t>cost-effective</a:t>
+            </a:r>
+            <a:r>
+              <a:rPr lang="nb-NO" dirty="0"/>
+              <a:t> at </a:t>
+            </a:r>
+            <a:r>
+              <a:rPr lang="nb-NO" dirty="0" err="1"/>
+              <a:t>large</a:t>
+            </a:r>
+            <a:r>
+              <a:rPr lang="nb-NO" dirty="0"/>
+              <a:t> </a:t>
+            </a:r>
+            <a:r>
+              <a:rPr lang="nb-NO" dirty="0" err="1"/>
+              <a:t>scale</a:t>
+            </a:r>
+            <a:endParaRPr lang="nb-NO" dirty="0"/>
           </a:p>
         </p:txBody>
       </p:sp>
@@ -18511,7 +18889,13 @@
   <p:cSld>
     <p:spTree>
       <p:nvGrpSpPr>
-        <p:cNvPr id="1" name=""/>
+        <p:cNvPr id="1" name="">
+          <a:extLst>
+            <a:ext uri="{FF2B5EF4-FFF2-40B4-BE49-F238E27FC236}">
+              <a16:creationId xmlns:a16="http://schemas.microsoft.com/office/drawing/2014/main" id="{255D0844-8102-4300-E604-F2888A714B58}"/>
+            </a:ext>
+          </a:extLst>
+        </p:cNvPr>
         <p:cNvGrpSpPr/>
         <p:nvPr/>
       </p:nvGrpSpPr>
@@ -18525,10 +18909,78 @@
       </p:grpSpPr>
       <p:sp>
         <p:nvSpPr>
-          <p:cNvPr id="16" name="Subtitle 15">
-            <a:extLst>
-              <a:ext uri="{FF2B5EF4-FFF2-40B4-BE49-F238E27FC236}">
-                <a16:creationId xmlns:a16="http://schemas.microsoft.com/office/drawing/2014/main" id="{313F75E0-1BD2-3B4A-04B1-EF112190A33F}"/>
+          <p:cNvPr id="7" name="Content Placeholder 6">
+            <a:extLst>
+              <a:ext uri="{FF2B5EF4-FFF2-40B4-BE49-F238E27FC236}">
+                <a16:creationId xmlns:a16="http://schemas.microsoft.com/office/drawing/2014/main" id="{0CCAD414-0450-4DF1-BDBE-C89FD4E9B780}"/>
+              </a:ext>
+            </a:extLst>
+          </p:cNvPr>
+          <p:cNvSpPr>
+            <a:spLocks noGrp="1"/>
+          </p:cNvSpPr>
+          <p:nvPr>
+            <p:ph sz="half" idx="1"/>
+          </p:nvPr>
+        </p:nvSpPr>
+        <p:spPr>
+          <a:xfrm>
+            <a:off x="467998" y="2160000"/>
+            <a:ext cx="3113402" cy="3924000"/>
+          </a:xfrm>
+        </p:spPr>
+        <p:txBody>
+          <a:bodyPr>
+            <a:normAutofit/>
+          </a:bodyPr>
+          <a:lstStyle/>
+          <a:p>
+            <a:pPr marL="0" indent="0">
+              <a:buNone/>
+            </a:pPr>
+            <a:r>
+              <a:rPr lang="en-US" dirty="0"/>
+              <a:t>Relation databases</a:t>
+            </a:r>
+          </a:p>
+          <a:p>
+            <a:r>
+              <a:rPr lang="en-US" dirty="0"/>
+              <a:t>Microsoft SQL Server</a:t>
+            </a:r>
+          </a:p>
+          <a:p>
+            <a:r>
+              <a:rPr lang="en-US" dirty="0"/>
+              <a:t>Oracle Databases</a:t>
+            </a:r>
+          </a:p>
+          <a:p>
+            <a:r>
+              <a:rPr lang="en-US" dirty="0"/>
+              <a:t>SQLite</a:t>
+            </a:r>
+          </a:p>
+          <a:p>
+            <a:r>
+              <a:rPr lang="en-US" dirty="0"/>
+              <a:t>MySQL</a:t>
+            </a:r>
+          </a:p>
+          <a:p>
+            <a:r>
+              <a:rPr lang="en-US" dirty="0"/>
+              <a:t>PostgreSQL</a:t>
+            </a:r>
+          </a:p>
+        </p:txBody>
+      </p:sp>
+      <p:sp>
+        <p:nvSpPr>
+          <p:cNvPr id="8" name="Subtitle 7">
+            <a:extLst>
+              <a:ext uri="{FF2B5EF4-FFF2-40B4-BE49-F238E27FC236}">
+                <a16:creationId xmlns:a16="http://schemas.microsoft.com/office/drawing/2014/main" id="{50383C6E-EA00-E0E9-A896-2B0557554BA5}"/>
               </a:ext>
             </a:extLst>
           </p:cNvPr>
@@ -18546,17 +18998,17 @@
           <a:p>
             <a:r>
               <a:rPr lang="en-US" dirty="0"/>
-              <a:t>GitHub Actions</a:t>
-            </a:r>
-          </a:p>
-        </p:txBody>
-      </p:sp>
-      <p:sp>
-        <p:nvSpPr>
-          <p:cNvPr id="14" name="Title 13">
-            <a:extLst>
-              <a:ext uri="{FF2B5EF4-FFF2-40B4-BE49-F238E27FC236}">
-                <a16:creationId xmlns:a16="http://schemas.microsoft.com/office/drawing/2014/main" id="{387CE918-2DF0-6FCE-2BB2-BFD7C7391D85}"/>
+              <a:t>Pull requests</a:t>
+            </a:r>
+          </a:p>
+        </p:txBody>
+      </p:sp>
+      <p:sp>
+        <p:nvSpPr>
+          <p:cNvPr id="6" name="Title 5">
+            <a:extLst>
+              <a:ext uri="{FF2B5EF4-FFF2-40B4-BE49-F238E27FC236}">
+                <a16:creationId xmlns:a16="http://schemas.microsoft.com/office/drawing/2014/main" id="{7F67AFA2-3999-C1BB-85F4-A3965E340636}"/>
               </a:ext>
             </a:extLst>
           </p:cNvPr>
@@ -18574,17 +19026,17 @@
           <a:p>
             <a:r>
               <a:rPr lang="en-US" dirty="0"/>
-              <a:t>Data modelling</a:t>
-            </a:r>
-          </a:p>
-        </p:txBody>
-      </p:sp>
-      <p:sp>
-        <p:nvSpPr>
-          <p:cNvPr id="5" name="Footer Placeholder 4">
-            <a:extLst>
-              <a:ext uri="{FF2B5EF4-FFF2-40B4-BE49-F238E27FC236}">
-                <a16:creationId xmlns:a16="http://schemas.microsoft.com/office/drawing/2014/main" id="{C5F6BAB5-B5A6-8CF6-D045-AFEED5A64D93}"/>
+              <a:t>Intro: Most used databases</a:t>
+            </a:r>
+          </a:p>
+        </p:txBody>
+      </p:sp>
+      <p:sp>
+        <p:nvSpPr>
+          <p:cNvPr id="3" name="Footer Placeholder 2">
+            <a:extLst>
+              <a:ext uri="{FF2B5EF4-FFF2-40B4-BE49-F238E27FC236}">
+                <a16:creationId xmlns:a16="http://schemas.microsoft.com/office/drawing/2014/main" id="{45AE7F95-C2C0-9C04-F7ED-E7652A4DB3D0}"/>
               </a:ext>
             </a:extLst>
           </p:cNvPr>
@@ -18595,12 +19047,7 @@
             <p:ph type="ftr" sz="quarter" idx="17"/>
           </p:nvPr>
         </p:nvSpPr>
-        <p:spPr>
-          <a:xfrm>
-            <a:off x="473371" y="6575008"/>
-            <a:ext cx="3600000" cy="144000"/>
-          </a:xfrm>
-        </p:spPr>
+        <p:spPr/>
         <p:txBody>
           <a:bodyPr/>
           <a:lstStyle/>
@@ -18623,10 +19070,10 @@
       </p:sp>
       <p:sp>
         <p:nvSpPr>
-          <p:cNvPr id="6" name="Slide Number Placeholder 5">
-            <a:extLst>
-              <a:ext uri="{FF2B5EF4-FFF2-40B4-BE49-F238E27FC236}">
-                <a16:creationId xmlns:a16="http://schemas.microsoft.com/office/drawing/2014/main" id="{40079E0E-24FC-D607-E4F1-126CBD5B06DF}"/>
+          <p:cNvPr id="4" name="Slide Number Placeholder 3">
+            <a:extLst>
+              <a:ext uri="{FF2B5EF4-FFF2-40B4-BE49-F238E27FC236}">
+                <a16:creationId xmlns:a16="http://schemas.microsoft.com/office/drawing/2014/main" id="{2208E98A-4FFE-9000-D02E-CA6F8018FC85}"/>
               </a:ext>
             </a:extLst>
           </p:cNvPr>
@@ -18637,12 +19084,7 @@
             <p:ph type="sldNum" sz="quarter" idx="18"/>
           </p:nvPr>
         </p:nvSpPr>
-        <p:spPr>
-          <a:xfrm>
-            <a:off x="5736000" y="6575008"/>
-            <a:ext cx="720000" cy="144000"/>
-          </a:xfrm>
-        </p:spPr>
+        <p:spPr/>
         <p:txBody>
           <a:bodyPr/>
           <a:lstStyle/>
@@ -18658,33 +19100,241 @@
       </p:sp>
       <p:sp>
         <p:nvSpPr>
-          <p:cNvPr id="3" name="Content Placeholder 2">
-            <a:extLst>
-              <a:ext uri="{FF2B5EF4-FFF2-40B4-BE49-F238E27FC236}">
-                <a16:creationId xmlns:a16="http://schemas.microsoft.com/office/drawing/2014/main" id="{1C649143-1258-2971-9A5D-6D44AE335C98}"/>
-              </a:ext>
-            </a:extLst>
-          </p:cNvPr>
-          <p:cNvSpPr>
-            <a:spLocks noGrp="1"/>
-          </p:cNvSpPr>
-          <p:nvPr>
-            <p:ph sz="half" idx="1"/>
-          </p:nvPr>
-        </p:nvSpPr>
-        <p:spPr/>
-        <p:txBody>
-          <a:bodyPr/>
-          <a:lstStyle/>
-          <a:p>
-            <a:endParaRPr lang="nb-NO"/>
+          <p:cNvPr id="2" name="Content Placeholder 6">
+            <a:extLst>
+              <a:ext uri="{FF2B5EF4-FFF2-40B4-BE49-F238E27FC236}">
+                <a16:creationId xmlns:a16="http://schemas.microsoft.com/office/drawing/2014/main" id="{623026A4-2AFA-080E-8C08-AAC9D052461E}"/>
+              </a:ext>
+            </a:extLst>
+          </p:cNvPr>
+          <p:cNvSpPr txBox="1">
+            <a:spLocks/>
+          </p:cNvSpPr>
+          <p:nvPr/>
+        </p:nvSpPr>
+        <p:spPr>
+          <a:xfrm>
+            <a:off x="4597400" y="2160000"/>
+            <a:ext cx="3113402" cy="3924000"/>
+          </a:xfrm>
+          <a:prstGeom prst="rect">
+            <a:avLst/>
+          </a:prstGeom>
+        </p:spPr>
+        <p:txBody>
+          <a:bodyPr vert="horz" lIns="0" tIns="0" rIns="0" bIns="0" rtlCol="0">
+            <a:normAutofit/>
+          </a:bodyPr>
+          <a:lstStyle>
+            <a:lvl1pPr marL="177800" indent="-177800" algn="l" defTabSz="914400" rtl="0" eaLnBrk="1" latinLnBrk="0" hangingPunct="1">
+              <a:lnSpc>
+                <a:spcPct val="110000"/>
+              </a:lnSpc>
+              <a:spcBef>
+                <a:spcPts val="1200"/>
+              </a:spcBef>
+              <a:buFont typeface="Arial" panose="020B0604020202020204" pitchFamily="34" charset="0"/>
+              <a:buChar char="•"/>
+              <a:defRPr sz="1800" kern="1200">
+                <a:solidFill>
+                  <a:schemeClr val="bg1"/>
+                </a:solidFill>
+                <a:latin typeface="+mn-lt"/>
+                <a:ea typeface="+mn-ea"/>
+                <a:cs typeface="+mn-cs"/>
+              </a:defRPr>
+            </a:lvl1pPr>
+            <a:lvl2pPr marL="361950" indent="-184150" algn="l" defTabSz="914400" rtl="0" eaLnBrk="1" latinLnBrk="0" hangingPunct="1">
+              <a:lnSpc>
+                <a:spcPct val="110000"/>
+              </a:lnSpc>
+              <a:spcBef>
+                <a:spcPts val="300"/>
+              </a:spcBef>
+              <a:spcAft>
+                <a:spcPts val="300"/>
+              </a:spcAft>
+              <a:buFont typeface="Calibri" panose="020F0502020204030204" pitchFamily="34" charset="0"/>
+              <a:buChar char="‒"/>
+              <a:defRPr sz="1600" kern="1200">
+                <a:solidFill>
+                  <a:schemeClr val="bg1"/>
+                </a:solidFill>
+                <a:latin typeface="+mn-lt"/>
+                <a:ea typeface="+mn-ea"/>
+                <a:cs typeface="+mn-cs"/>
+              </a:defRPr>
+            </a:lvl2pPr>
+            <a:lvl3pPr marL="538163" indent="-176213" algn="l" defTabSz="914400" rtl="0" eaLnBrk="1" latinLnBrk="0" hangingPunct="1">
+              <a:lnSpc>
+                <a:spcPct val="110000"/>
+              </a:lnSpc>
+              <a:spcBef>
+                <a:spcPts val="300"/>
+              </a:spcBef>
+              <a:spcAft>
+                <a:spcPts val="300"/>
+              </a:spcAft>
+              <a:buFont typeface="Calibri" panose="020F0502020204030204" pitchFamily="34" charset="0"/>
+              <a:buChar char="‒"/>
+              <a:defRPr sz="1400" kern="1200">
+                <a:solidFill>
+                  <a:schemeClr val="bg1"/>
+                </a:solidFill>
+                <a:latin typeface="+mn-lt"/>
+                <a:ea typeface="+mn-ea"/>
+                <a:cs typeface="+mn-cs"/>
+              </a:defRPr>
+            </a:lvl3pPr>
+            <a:lvl4pPr marL="684000" indent="-144000" algn="l" defTabSz="914400" rtl="0" eaLnBrk="1" latinLnBrk="0" hangingPunct="1">
+              <a:lnSpc>
+                <a:spcPct val="110000"/>
+              </a:lnSpc>
+              <a:spcBef>
+                <a:spcPts val="300"/>
+              </a:spcBef>
+              <a:spcAft>
+                <a:spcPts val="300"/>
+              </a:spcAft>
+              <a:buFont typeface="Calibri" panose="020F0502020204030204" pitchFamily="34" charset="0"/>
+              <a:buChar char="‒"/>
+              <a:defRPr sz="1200" kern="1200">
+                <a:solidFill>
+                  <a:schemeClr val="bg1"/>
+                </a:solidFill>
+                <a:latin typeface="+mn-lt"/>
+                <a:ea typeface="+mn-ea"/>
+                <a:cs typeface="+mn-cs"/>
+              </a:defRPr>
+            </a:lvl4pPr>
+            <a:lvl5pPr marL="808038" indent="-126000" algn="l" defTabSz="914400" rtl="0" eaLnBrk="1" latinLnBrk="0" hangingPunct="1">
+              <a:lnSpc>
+                <a:spcPct val="110000"/>
+              </a:lnSpc>
+              <a:spcBef>
+                <a:spcPts val="300"/>
+              </a:spcBef>
+              <a:spcAft>
+                <a:spcPts val="300"/>
+              </a:spcAft>
+              <a:buFont typeface="Calibri" panose="020F0502020204030204" pitchFamily="34" charset="0"/>
+              <a:buChar char="‒"/>
+              <a:defRPr sz="1200" kern="1200">
+                <a:solidFill>
+                  <a:schemeClr val="bg1"/>
+                </a:solidFill>
+                <a:latin typeface="+mn-lt"/>
+                <a:ea typeface="+mn-ea"/>
+                <a:cs typeface="+mn-cs"/>
+              </a:defRPr>
+            </a:lvl5pPr>
+            <a:lvl6pPr marL="2514600" indent="-228600" algn="l" defTabSz="914400" rtl="0" eaLnBrk="1" latinLnBrk="0" hangingPunct="1">
+              <a:lnSpc>
+                <a:spcPct val="90000"/>
+              </a:lnSpc>
+              <a:spcBef>
+                <a:spcPts val="500"/>
+              </a:spcBef>
+              <a:buFont typeface="Arial" panose="020B0604020202020204" pitchFamily="34" charset="0"/>
+              <a:buChar char="•"/>
+              <a:defRPr sz="1800" kern="1200">
+                <a:solidFill>
+                  <a:schemeClr val="tx1"/>
+                </a:solidFill>
+                <a:latin typeface="+mn-lt"/>
+                <a:ea typeface="+mn-ea"/>
+                <a:cs typeface="+mn-cs"/>
+              </a:defRPr>
+            </a:lvl6pPr>
+            <a:lvl7pPr marL="2971800" indent="-228600" algn="l" defTabSz="914400" rtl="0" eaLnBrk="1" latinLnBrk="0" hangingPunct="1">
+              <a:lnSpc>
+                <a:spcPct val="90000"/>
+              </a:lnSpc>
+              <a:spcBef>
+                <a:spcPts val="500"/>
+              </a:spcBef>
+              <a:buFont typeface="Arial" panose="020B0604020202020204" pitchFamily="34" charset="0"/>
+              <a:buChar char="•"/>
+              <a:defRPr sz="1800" kern="1200">
+                <a:solidFill>
+                  <a:schemeClr val="tx1"/>
+                </a:solidFill>
+                <a:latin typeface="+mn-lt"/>
+                <a:ea typeface="+mn-ea"/>
+                <a:cs typeface="+mn-cs"/>
+              </a:defRPr>
+            </a:lvl7pPr>
+            <a:lvl8pPr marL="3429000" indent="-228600" algn="l" defTabSz="914400" rtl="0" eaLnBrk="1" latinLnBrk="0" hangingPunct="1">
+              <a:lnSpc>
+                <a:spcPct val="90000"/>
+              </a:lnSpc>
+              <a:spcBef>
+                <a:spcPts val="500"/>
+              </a:spcBef>
+              <a:buFont typeface="Arial" panose="020B0604020202020204" pitchFamily="34" charset="0"/>
+              <a:buChar char="•"/>
+              <a:defRPr sz="1800" kern="1200">
+                <a:solidFill>
+                  <a:schemeClr val="tx1"/>
+                </a:solidFill>
+                <a:latin typeface="+mn-lt"/>
+                <a:ea typeface="+mn-ea"/>
+                <a:cs typeface="+mn-cs"/>
+              </a:defRPr>
+            </a:lvl8pPr>
+            <a:lvl9pPr marL="3886200" indent="-228600" algn="l" defTabSz="914400" rtl="0" eaLnBrk="1" latinLnBrk="0" hangingPunct="1">
+              <a:lnSpc>
+                <a:spcPct val="90000"/>
+              </a:lnSpc>
+              <a:spcBef>
+                <a:spcPts val="500"/>
+              </a:spcBef>
+              <a:buFont typeface="Arial" panose="020B0604020202020204" pitchFamily="34" charset="0"/>
+              <a:buChar char="•"/>
+              <a:defRPr sz="1800" kern="1200">
+                <a:solidFill>
+                  <a:schemeClr val="tx1"/>
+                </a:solidFill>
+                <a:latin typeface="+mn-lt"/>
+                <a:ea typeface="+mn-ea"/>
+                <a:cs typeface="+mn-cs"/>
+              </a:defRPr>
+            </a:lvl9pPr>
+          </a:lstStyle>
+          <a:p>
+            <a:pPr marL="0" indent="0">
+              <a:buFont typeface="Arial" panose="020B0604020202020204" pitchFamily="34" charset="0"/>
+              <a:buNone/>
+            </a:pPr>
+            <a:r>
+              <a:rPr lang="en-US" dirty="0"/>
+              <a:t>No-SQL databases</a:t>
+            </a:r>
+          </a:p>
+          <a:p>
+            <a:r>
+              <a:rPr lang="en-US" dirty="0"/>
+              <a:t>MongoDB (Document database)</a:t>
+            </a:r>
+          </a:p>
+          <a:p>
+            <a:r>
+              <a:rPr lang="en-US" dirty="0"/>
+              <a:t>Amazon DynamoDB</a:t>
+            </a:r>
+          </a:p>
+          <a:p>
+            <a:r>
+              <a:rPr lang="en-US" dirty="0"/>
+              <a:t>Redis (Key-value store)</a:t>
+            </a:r>
           </a:p>
         </p:txBody>
       </p:sp>
     </p:spTree>
     <p:extLst>
       <p:ext uri="{BB962C8B-B14F-4D97-AF65-F5344CB8AC3E}">
-        <p14:creationId xmlns:p14="http://schemas.microsoft.com/office/powerpoint/2010/main" val="3412566513"/>
+        <p14:creationId xmlns:p14="http://schemas.microsoft.com/office/powerpoint/2010/main" val="3863378380"/>
       </p:ext>
     </p:extLst>
   </p:cSld>
@@ -18713,18 +19363,18 @@
       </p:grpSpPr>
       <p:sp>
         <p:nvSpPr>
-          <p:cNvPr id="7" name="Content Placeholder 6">
-            <a:extLst>
-              <a:ext uri="{FF2B5EF4-FFF2-40B4-BE49-F238E27FC236}">
-                <a16:creationId xmlns:a16="http://schemas.microsoft.com/office/drawing/2014/main" id="{F429022B-212F-6BD8-4737-55433E2215A8}"/>
-              </a:ext>
-            </a:extLst>
-          </p:cNvPr>
-          <p:cNvSpPr>
-            <a:spLocks noGrp="1"/>
-          </p:cNvSpPr>
-          <p:nvPr>
-            <p:ph sz="half" idx="1"/>
+          <p:cNvPr id="16" name="Subtitle 15">
+            <a:extLst>
+              <a:ext uri="{FF2B5EF4-FFF2-40B4-BE49-F238E27FC236}">
+                <a16:creationId xmlns:a16="http://schemas.microsoft.com/office/drawing/2014/main" id="{313F75E0-1BD2-3B4A-04B1-EF112190A33F}"/>
+              </a:ext>
+            </a:extLst>
+          </p:cNvPr>
+          <p:cNvSpPr>
+            <a:spLocks noGrp="1"/>
+          </p:cNvSpPr>
+          <p:nvPr>
+            <p:ph type="subTitle" idx="16"/>
           </p:nvPr>
         </p:nvSpPr>
         <p:spPr/>
@@ -18732,24 +19382,27 @@
           <a:bodyPr/>
           <a:lstStyle/>
           <a:p>
-            <a:endParaRPr lang="en-US" dirty="0"/>
-          </a:p>
-        </p:txBody>
-      </p:sp>
-      <p:sp>
-        <p:nvSpPr>
-          <p:cNvPr id="8" name="Subtitle 7">
-            <a:extLst>
-              <a:ext uri="{FF2B5EF4-FFF2-40B4-BE49-F238E27FC236}">
-                <a16:creationId xmlns:a16="http://schemas.microsoft.com/office/drawing/2014/main" id="{915F35EB-091F-24F0-7EFB-32551D3F9C8A}"/>
-              </a:ext>
-            </a:extLst>
-          </p:cNvPr>
-          <p:cNvSpPr>
-            <a:spLocks noGrp="1"/>
-          </p:cNvSpPr>
-          <p:nvPr>
-            <p:ph type="subTitle" idx="16"/>
+            <a:r>
+              <a:rPr lang="en-US" dirty="0"/>
+              <a:t>GitHub Actions</a:t>
+            </a:r>
+          </a:p>
+        </p:txBody>
+      </p:sp>
+      <p:sp>
+        <p:nvSpPr>
+          <p:cNvPr id="14" name="Title 13">
+            <a:extLst>
+              <a:ext uri="{FF2B5EF4-FFF2-40B4-BE49-F238E27FC236}">
+                <a16:creationId xmlns:a16="http://schemas.microsoft.com/office/drawing/2014/main" id="{387CE918-2DF0-6FCE-2BB2-BFD7C7391D85}"/>
+              </a:ext>
+            </a:extLst>
+          </p:cNvPr>
+          <p:cNvSpPr>
+            <a:spLocks noGrp="1"/>
+          </p:cNvSpPr>
+          <p:nvPr>
+            <p:ph type="title"/>
           </p:nvPr>
         </p:nvSpPr>
         <p:spPr/>
@@ -18759,73 +19412,59 @@
           <a:p>
             <a:r>
               <a:rPr lang="en-US" dirty="0"/>
-              <a:t>Environments</a:t>
-            </a:r>
-          </a:p>
-        </p:txBody>
-      </p:sp>
-      <p:sp>
-        <p:nvSpPr>
-          <p:cNvPr id="6" name="Title 5">
-            <a:extLst>
-              <a:ext uri="{FF2B5EF4-FFF2-40B4-BE49-F238E27FC236}">
-                <a16:creationId xmlns:a16="http://schemas.microsoft.com/office/drawing/2014/main" id="{4664F50F-50AA-4ADB-6B10-7B193C4E3758}"/>
-              </a:ext>
-            </a:extLst>
-          </p:cNvPr>
-          <p:cNvSpPr>
-            <a:spLocks noGrp="1"/>
-          </p:cNvSpPr>
-          <p:nvPr>
-            <p:ph type="title"/>
-          </p:nvPr>
-        </p:nvSpPr>
-        <p:spPr/>
+              <a:t>Data modelling</a:t>
+            </a:r>
+          </a:p>
+        </p:txBody>
+      </p:sp>
+      <p:sp>
+        <p:nvSpPr>
+          <p:cNvPr id="5" name="Footer Placeholder 4">
+            <a:extLst>
+              <a:ext uri="{FF2B5EF4-FFF2-40B4-BE49-F238E27FC236}">
+                <a16:creationId xmlns:a16="http://schemas.microsoft.com/office/drawing/2014/main" id="{C5F6BAB5-B5A6-8CF6-D045-AFEED5A64D93}"/>
+              </a:ext>
+            </a:extLst>
+          </p:cNvPr>
+          <p:cNvSpPr>
+            <a:spLocks noGrp="1"/>
+          </p:cNvSpPr>
+          <p:nvPr>
+            <p:ph type="ftr" sz="quarter" idx="17"/>
+          </p:nvPr>
+        </p:nvSpPr>
+        <p:spPr>
+          <a:xfrm>
+            <a:off x="473371" y="6575008"/>
+            <a:ext cx="3600000" cy="144000"/>
+          </a:xfrm>
+        </p:spPr>
         <p:txBody>
           <a:bodyPr/>
           <a:lstStyle/>
           <a:p>
             <a:r>
-              <a:rPr lang="en-US" dirty="0"/>
-              <a:t>Entity-Relation (ER) diagrams</a:t>
-            </a:r>
-          </a:p>
-        </p:txBody>
-      </p:sp>
-      <p:sp>
-        <p:nvSpPr>
-          <p:cNvPr id="3" name="Footer Placeholder 2">
-            <a:extLst>
-              <a:ext uri="{FF2B5EF4-FFF2-40B4-BE49-F238E27FC236}">
-                <a16:creationId xmlns:a16="http://schemas.microsoft.com/office/drawing/2014/main" id="{47DC10AA-F51C-C468-EF45-6435DCBFEBEC}"/>
-              </a:ext>
-            </a:extLst>
-          </p:cNvPr>
-          <p:cNvSpPr>
-            <a:spLocks noGrp="1"/>
-          </p:cNvSpPr>
-          <p:nvPr>
-            <p:ph type="ftr" sz="quarter" idx="17"/>
-          </p:nvPr>
-        </p:nvSpPr>
-        <p:spPr/>
-        <p:txBody>
-          <a:bodyPr/>
-          <a:lstStyle/>
-          <a:p>
-            <a:r>
-              <a:rPr lang="sv-SE"/>
-              <a:t>Namn på presentationen</a:t>
-            </a:r>
-          </a:p>
-        </p:txBody>
-      </p:sp>
-      <p:sp>
-        <p:nvSpPr>
-          <p:cNvPr id="4" name="Slide Number Placeholder 3">
-            <a:extLst>
-              <a:ext uri="{FF2B5EF4-FFF2-40B4-BE49-F238E27FC236}">
-                <a16:creationId xmlns:a16="http://schemas.microsoft.com/office/drawing/2014/main" id="{F3A84457-DA2E-DB3F-048D-98B6104A9441}"/>
+              <a:rPr lang="sv-SE" dirty="0" err="1"/>
+              <a:t>Build</a:t>
+            </a:r>
+            <a:r>
+              <a:rPr lang="sv-SE" dirty="0"/>
+              <a:t> and </a:t>
+            </a:r>
+            <a:r>
+              <a:rPr lang="sv-SE" dirty="0" err="1"/>
+              <a:t>deploy</a:t>
+            </a:r>
+            <a:endParaRPr lang="sv-SE" dirty="0"/>
+          </a:p>
+        </p:txBody>
+      </p:sp>
+      <p:sp>
+        <p:nvSpPr>
+          <p:cNvPr id="6" name="Slide Number Placeholder 5">
+            <a:extLst>
+              <a:ext uri="{FF2B5EF4-FFF2-40B4-BE49-F238E27FC236}">
+                <a16:creationId xmlns:a16="http://schemas.microsoft.com/office/drawing/2014/main" id="{40079E0E-24FC-D607-E4F1-126CBD5B06DF}"/>
               </a:ext>
             </a:extLst>
           </p:cNvPr>
@@ -18836,7 +19475,12 @@
             <p:ph type="sldNum" sz="quarter" idx="18"/>
           </p:nvPr>
         </p:nvSpPr>
-        <p:spPr/>
+        <p:spPr>
+          <a:xfrm>
+            <a:off x="5736000" y="6575008"/>
+            <a:ext cx="720000" cy="144000"/>
+          </a:xfrm>
+        </p:spPr>
         <p:txBody>
           <a:bodyPr/>
           <a:lstStyle/>
@@ -18850,10 +19494,204 @@
           </a:p>
         </p:txBody>
       </p:sp>
+      <p:sp>
+        <p:nvSpPr>
+          <p:cNvPr id="3" name="Content Placeholder 2">
+            <a:extLst>
+              <a:ext uri="{FF2B5EF4-FFF2-40B4-BE49-F238E27FC236}">
+                <a16:creationId xmlns:a16="http://schemas.microsoft.com/office/drawing/2014/main" id="{1C649143-1258-2971-9A5D-6D44AE335C98}"/>
+              </a:ext>
+            </a:extLst>
+          </p:cNvPr>
+          <p:cNvSpPr>
+            <a:spLocks noGrp="1"/>
+          </p:cNvSpPr>
+          <p:nvPr>
+            <p:ph sz="half" idx="1"/>
+          </p:nvPr>
+        </p:nvSpPr>
+        <p:spPr/>
+        <p:txBody>
+          <a:bodyPr>
+            <a:normAutofit/>
+          </a:bodyPr>
+          <a:lstStyle/>
+          <a:p>
+            <a:pPr marL="0" indent="0">
+              <a:buNone/>
+            </a:pPr>
+            <a:r>
+              <a:rPr lang="en-US" dirty="0">
+                <a:solidFill>
+                  <a:srgbClr val="D1D5DB"/>
+                </a:solidFill>
+                <a:latin typeface="Söhne"/>
+              </a:rPr>
+              <a:t>S</a:t>
+            </a:r>
+            <a:r>
+              <a:rPr lang="en-US" b="0" i="0" dirty="0">
+                <a:solidFill>
+                  <a:srgbClr val="D1D5DB"/>
+                </a:solidFill>
+                <a:effectLst/>
+                <a:latin typeface="Söhne"/>
+              </a:rPr>
+              <a:t>everal key principles should be followed to ensure the database is structured efficiently, scalable, and capable of supporting the applications that will interact with it:</a:t>
+            </a:r>
+          </a:p>
+          <a:p>
+            <a:r>
+              <a:rPr lang="en-US" b="0" i="0" dirty="0">
+                <a:solidFill>
+                  <a:srgbClr val="D1D5DB"/>
+                </a:solidFill>
+                <a:effectLst/>
+                <a:latin typeface="Söhne"/>
+              </a:rPr>
+              <a:t>Normalization – Minimize redundancy and dependency (1NF, 2NF, 3NF)</a:t>
+            </a:r>
+          </a:p>
+          <a:p>
+            <a:r>
+              <a:rPr lang="en-US" dirty="0">
+                <a:solidFill>
+                  <a:srgbClr val="D1D5DB"/>
+                </a:solidFill>
+                <a:latin typeface="Söhne"/>
+              </a:rPr>
+              <a:t>Data integrity</a:t>
+            </a:r>
+          </a:p>
+          <a:p>
+            <a:pPr lvl="1"/>
+            <a:r>
+              <a:rPr lang="en-US" dirty="0">
+                <a:solidFill>
+                  <a:srgbClr val="D1D5DB"/>
+                </a:solidFill>
+                <a:latin typeface="Söhne"/>
+              </a:rPr>
+              <a:t>Entity (primary key, uniquely identifies a row)</a:t>
+            </a:r>
+          </a:p>
+          <a:p>
+            <a:pPr lvl="1"/>
+            <a:r>
+              <a:rPr lang="en-US" dirty="0">
+                <a:solidFill>
+                  <a:srgbClr val="D1D5DB"/>
+                </a:solidFill>
+                <a:latin typeface="Söhne"/>
+              </a:rPr>
+              <a:t>Reference (foreign key ensures that referenced rows exists)</a:t>
+            </a:r>
+          </a:p>
+          <a:p>
+            <a:pPr lvl="1"/>
+            <a:r>
+              <a:rPr lang="en-US" dirty="0">
+                <a:solidFill>
+                  <a:srgbClr val="D1D5DB"/>
+                </a:solidFill>
+                <a:latin typeface="Söhne"/>
+              </a:rPr>
+              <a:t>Domain (the columns have correct data type, format and valid values)</a:t>
+            </a:r>
+          </a:p>
+          <a:p>
+            <a:r>
+              <a:rPr lang="en-US" b="0" i="0" dirty="0">
+                <a:solidFill>
+                  <a:srgbClr val="D1D5DB"/>
+                </a:solidFill>
+                <a:effectLst/>
+                <a:latin typeface="Söhne"/>
+              </a:rPr>
+              <a:t>Keys - </a:t>
+            </a:r>
+            <a:r>
+              <a:rPr lang="en-US" dirty="0">
+                <a:solidFill>
+                  <a:srgbClr val="D1D5DB"/>
+                </a:solidFill>
+                <a:latin typeface="Söhne"/>
+              </a:rPr>
+              <a:t>Primary , f</a:t>
+            </a:r>
+            <a:r>
+              <a:rPr lang="en-US" b="0" i="0" dirty="0">
+                <a:solidFill>
+                  <a:srgbClr val="D1D5DB"/>
+                </a:solidFill>
+                <a:effectLst/>
+                <a:latin typeface="Söhne"/>
+              </a:rPr>
+              <a:t>oreign, unique, </a:t>
+            </a:r>
+            <a:r>
+              <a:rPr lang="nb-NO" b="0" i="0" dirty="0">
+                <a:solidFill>
+                  <a:srgbClr val="D1D5DB"/>
+                </a:solidFill>
+                <a:effectLst/>
+                <a:latin typeface="Söhne"/>
+              </a:rPr>
+              <a:t>(</a:t>
+            </a:r>
+            <a:r>
+              <a:rPr lang="en-US" b="0" i="0" dirty="0">
+                <a:solidFill>
+                  <a:srgbClr val="D1D5DB"/>
+                </a:solidFill>
+                <a:effectLst/>
+                <a:latin typeface="Söhne"/>
+              </a:rPr>
+              <a:t>composite)</a:t>
+            </a:r>
+          </a:p>
+          <a:p>
+            <a:r>
+              <a:rPr lang="en-US" b="0" i="0" dirty="0">
+                <a:solidFill>
+                  <a:srgbClr val="D1D5DB"/>
+                </a:solidFill>
+                <a:effectLst/>
+                <a:latin typeface="Söhne"/>
+              </a:rPr>
+              <a:t>Performance – indexes</a:t>
+            </a:r>
+          </a:p>
+          <a:p>
+            <a:r>
+              <a:rPr lang="en-US" dirty="0">
+                <a:solidFill>
+                  <a:srgbClr val="D1D5DB"/>
+                </a:solidFill>
+                <a:latin typeface="Söhne"/>
+              </a:rPr>
+              <a:t>Entity-Relationship (ER) diagrams </a:t>
+            </a:r>
+            <a:endParaRPr lang="en-US" b="0" i="0" dirty="0">
+              <a:solidFill>
+                <a:srgbClr val="D1D5DB"/>
+              </a:solidFill>
+              <a:effectLst/>
+              <a:latin typeface="Söhne"/>
+            </a:endParaRPr>
+          </a:p>
+          <a:p>
+            <a:pPr marL="0" indent="0">
+              <a:buNone/>
+            </a:pPr>
+            <a:endParaRPr lang="nb-NO" dirty="0"/>
+          </a:p>
+        </p:txBody>
+      </p:sp>
     </p:spTree>
     <p:extLst>
       <p:ext uri="{BB962C8B-B14F-4D97-AF65-F5344CB8AC3E}">
-        <p14:creationId xmlns:p14="http://schemas.microsoft.com/office/powerpoint/2010/main" val="4182190946"/>
+        <p14:creationId xmlns:p14="http://schemas.microsoft.com/office/powerpoint/2010/main" val="3412566513"/>
       </p:ext>
     </p:extLst>
   </p:cSld>
@@ -18885,7 +19723,7 @@
           <p:cNvPr id="7" name="Content Placeholder 6">
             <a:extLst>
               <a:ext uri="{FF2B5EF4-FFF2-40B4-BE49-F238E27FC236}">
-                <a16:creationId xmlns:a16="http://schemas.microsoft.com/office/drawing/2014/main" id="{B58C27D0-A4B9-69FE-6761-BF941B805C21}"/>
+                <a16:creationId xmlns:a16="http://schemas.microsoft.com/office/drawing/2014/main" id="{F429022B-212F-6BD8-4737-55433E2215A8}"/>
               </a:ext>
             </a:extLst>
           </p:cNvPr>
@@ -18896,11 +19734,85 @@
             <p:ph sz="half" idx="1"/>
           </p:nvPr>
         </p:nvSpPr>
-        <p:spPr/>
+        <p:spPr>
+          <a:xfrm>
+            <a:off x="467998" y="2160000"/>
+            <a:ext cx="6466202" cy="3924000"/>
+          </a:xfrm>
+        </p:spPr>
         <p:txBody>
           <a:bodyPr/>
           <a:lstStyle/>
           <a:p>
+            <a:pPr marL="0" indent="0">
+              <a:buNone/>
+            </a:pPr>
+            <a:r>
+              <a:rPr lang="en-US" dirty="0"/>
+              <a:t>“ER diagrams are </a:t>
+            </a:r>
+            <a:r>
+              <a:rPr lang="en-US" b="0" i="0" dirty="0">
+                <a:solidFill>
+                  <a:srgbClr val="D1D5DB"/>
+                </a:solidFill>
+                <a:effectLst/>
+                <a:latin typeface="Söhne"/>
+              </a:rPr>
+              <a:t>used in database design and systems analysis because they provide a graphical way to model data structures and their relationships in a clear and systematic manner”</a:t>
+            </a:r>
+          </a:p>
+          <a:p>
+            <a:r>
+              <a:rPr lang="en-US" b="0" i="0" dirty="0">
+                <a:solidFill>
+                  <a:srgbClr val="D1D5DB"/>
+                </a:solidFill>
+                <a:effectLst/>
+                <a:latin typeface="Söhne"/>
+              </a:rPr>
+              <a:t>Database design</a:t>
+            </a:r>
+          </a:p>
+          <a:p>
+            <a:r>
+              <a:rPr lang="en-US" b="0" i="0" dirty="0">
+                <a:solidFill>
+                  <a:srgbClr val="D1D5DB"/>
+                </a:solidFill>
+                <a:effectLst/>
+                <a:latin typeface="Söhne"/>
+              </a:rPr>
+              <a:t>Visual Representation</a:t>
+            </a:r>
+          </a:p>
+          <a:p>
+            <a:r>
+              <a:rPr lang="en-US" dirty="0">
+                <a:solidFill>
+                  <a:srgbClr val="D1D5DB"/>
+                </a:solidFill>
+                <a:latin typeface="Söhne"/>
+              </a:rPr>
+              <a:t>Communication tool</a:t>
+            </a:r>
+          </a:p>
+          <a:p>
+            <a:r>
+              <a:rPr lang="en-US" b="0" i="0" dirty="0">
+                <a:solidFill>
+                  <a:srgbClr val="D1D5DB"/>
+                </a:solidFill>
+                <a:effectLst/>
+                <a:latin typeface="Söhne"/>
+              </a:rPr>
+              <a:t>Documentation</a:t>
+            </a:r>
+          </a:p>
+          <a:p>
+            <a:pPr marL="0" indent="0">
+              <a:buNone/>
+            </a:pPr>
             <a:endParaRPr lang="en-US" dirty="0"/>
           </a:p>
         </p:txBody>
@@ -18910,7 +19822,7 @@
           <p:cNvPr id="8" name="Subtitle 7">
             <a:extLst>
               <a:ext uri="{FF2B5EF4-FFF2-40B4-BE49-F238E27FC236}">
-                <a16:creationId xmlns:a16="http://schemas.microsoft.com/office/drawing/2014/main" id="{61CDA455-D4AA-42BF-29DF-4BA3577FF47C}"/>
+                <a16:creationId xmlns:a16="http://schemas.microsoft.com/office/drawing/2014/main" id="{915F35EB-091F-24F0-7EFB-32551D3F9C8A}"/>
               </a:ext>
             </a:extLst>
           </p:cNvPr>
@@ -18928,7 +19840,7 @@
           <a:p>
             <a:r>
               <a:rPr lang="en-US" dirty="0"/>
-              <a:t>Pull requests</a:t>
+              <a:t>Environments</a:t>
             </a:r>
           </a:p>
         </p:txBody>
@@ -18938,7 +19850,7 @@
           <p:cNvPr id="6" name="Title 5">
             <a:extLst>
               <a:ext uri="{FF2B5EF4-FFF2-40B4-BE49-F238E27FC236}">
-                <a16:creationId xmlns:a16="http://schemas.microsoft.com/office/drawing/2014/main" id="{B6C961DE-3E94-06D6-7550-B6C191DE1152}"/>
+                <a16:creationId xmlns:a16="http://schemas.microsoft.com/office/drawing/2014/main" id="{4664F50F-50AA-4ADB-6B10-7B193C4E3758}"/>
               </a:ext>
             </a:extLst>
           </p:cNvPr>
@@ -18956,7 +19868,7 @@
           <a:p>
             <a:r>
               <a:rPr lang="en-US" dirty="0"/>
-              <a:t>Major database providers</a:t>
+              <a:t>Entity-Relationship (ER) diagrams</a:t>
             </a:r>
           </a:p>
         </p:txBody>
@@ -18966,7 +19878,7 @@
           <p:cNvPr id="3" name="Footer Placeholder 2">
             <a:extLst>
               <a:ext uri="{FF2B5EF4-FFF2-40B4-BE49-F238E27FC236}">
-                <a16:creationId xmlns:a16="http://schemas.microsoft.com/office/drawing/2014/main" id="{93E49281-73B1-B3E6-E7E7-329C818CB9BA}"/>
+                <a16:creationId xmlns:a16="http://schemas.microsoft.com/office/drawing/2014/main" id="{47DC10AA-F51C-C468-EF45-6435DCBFEBEC}"/>
               </a:ext>
             </a:extLst>
           </p:cNvPr>
@@ -18983,18 +19895,9 @@
           <a:lstStyle/>
           <a:p>
             <a:r>
-              <a:rPr lang="sv-SE" dirty="0" err="1"/>
-              <a:t>Build</a:t>
-            </a:r>
-            <a:r>
-              <a:rPr lang="sv-SE" dirty="0"/>
-              <a:t> and </a:t>
-            </a:r>
-            <a:r>
-              <a:rPr lang="sv-SE" dirty="0" err="1"/>
-              <a:t>deploy</a:t>
-            </a:r>
-            <a:endParaRPr lang="sv-SE" dirty="0"/>
+              <a:rPr lang="sv-SE"/>
+              <a:t>Namn på presentationen</a:t>
+            </a:r>
           </a:p>
         </p:txBody>
       </p:sp>
@@ -19003,7 +19906,7 @@
           <p:cNvPr id="4" name="Slide Number Placeholder 3">
             <a:extLst>
               <a:ext uri="{FF2B5EF4-FFF2-40B4-BE49-F238E27FC236}">
-                <a16:creationId xmlns:a16="http://schemas.microsoft.com/office/drawing/2014/main" id="{AE0E2563-153F-512B-1484-BB5932D0FAAF}"/>
+                <a16:creationId xmlns:a16="http://schemas.microsoft.com/office/drawing/2014/main" id="{F3A84457-DA2E-DB3F-048D-98B6104A9441}"/>
               </a:ext>
             </a:extLst>
           </p:cNvPr>
@@ -19028,10 +19931,40 @@
           </a:p>
         </p:txBody>
       </p:sp>
+      <p:pic>
+        <p:nvPicPr>
+          <p:cNvPr id="12" name="Picture 11">
+            <a:extLst>
+              <a:ext uri="{FF2B5EF4-FFF2-40B4-BE49-F238E27FC236}">
+                <a16:creationId xmlns:a16="http://schemas.microsoft.com/office/drawing/2014/main" id="{A5E4F0B3-7F4C-BAB0-FB4D-178919BD67D7}"/>
+              </a:ext>
+            </a:extLst>
+          </p:cNvPr>
+          <p:cNvPicPr>
+            <a:picLocks noChangeAspect="1"/>
+          </p:cNvPicPr>
+          <p:nvPr/>
+        </p:nvPicPr>
+        <p:blipFill>
+          <a:blip r:embed="rId3"/>
+          <a:stretch>
+            <a:fillRect/>
+          </a:stretch>
+        </p:blipFill>
+        <p:spPr>
+          <a:xfrm>
+            <a:off x="7696200" y="1554654"/>
+            <a:ext cx="2229161" cy="5134692"/>
+          </a:xfrm>
+          <a:prstGeom prst="rect">
+            <a:avLst/>
+          </a:prstGeom>
+        </p:spPr>
+      </p:pic>
     </p:spTree>
     <p:extLst>
       <p:ext uri="{BB962C8B-B14F-4D97-AF65-F5344CB8AC3E}">
-        <p14:creationId xmlns:p14="http://schemas.microsoft.com/office/powerpoint/2010/main" val="4249186643"/>
+        <p14:creationId xmlns:p14="http://schemas.microsoft.com/office/powerpoint/2010/main" val="4182190946"/>
       </p:ext>
     </p:extLst>
   </p:cSld>
@@ -19623,12 +20556,7 @@
 
 <file path=customXml/item1.xml><?xml version="1.0" encoding="utf-8"?>
 <p:properties xmlns:p="http://schemas.microsoft.com/office/2006/metadata/properties" xmlns:xsi="http://www.w3.org/2001/XMLSchema-instance" xmlns:pc="http://schemas.microsoft.com/office/infopath/2007/PartnerControls">
-  <documentManagement>
-    <TaxCatchAll xmlns="bffe39aa-d507-463c-bcbf-aa8534762466" xsi:nil="true"/>
-    <lcf76f155ced4ddcb4097134ff3c332f xmlns="3271377c-1ead-4ce7-988f-a57cc4b626d4">
-      <Terms xmlns="http://schemas.microsoft.com/office/infopath/2007/PartnerControls"/>
-    </lcf76f155ced4ddcb4097134ff3c332f>
-  </documentManagement>
+  <documentManagement/>
 </p:properties>
 </file>
 
@@ -19642,29 +20570,17 @@
 </file>
 
 <file path=customXml/item3.xml><?xml version="1.0" encoding="utf-8"?>
-<ct:contentTypeSchema xmlns:ct="http://schemas.microsoft.com/office/2006/metadata/contentType" xmlns:ma="http://schemas.microsoft.com/office/2006/metadata/properties/metaAttributes" ct:_="" ma:_="" ma:contentTypeName="Document" ma:contentTypeID="0x010100D67801E138CB8349A8EFB781B70A66CF" ma:contentTypeVersion="14" ma:contentTypeDescription="Create a new document." ma:contentTypeScope="" ma:versionID="c93afcc059a797d24affe2670f083bce">
-  <xsd:schema xmlns:xsd="http://www.w3.org/2001/XMLSchema" xmlns:xs="http://www.w3.org/2001/XMLSchema" xmlns:p="http://schemas.microsoft.com/office/2006/metadata/properties" xmlns:ns2="3271377c-1ead-4ce7-988f-a57cc4b626d4" xmlns:ns3="bffe39aa-d507-463c-bcbf-aa8534762466" targetNamespace="http://schemas.microsoft.com/office/2006/metadata/properties" ma:root="true" ma:fieldsID="d4a8fac2847666cc42731b1adc3d96b8" ns2:_="" ns3:_="">
-    <xsd:import namespace="3271377c-1ead-4ce7-988f-a57cc4b626d4"/>
-    <xsd:import namespace="bffe39aa-d507-463c-bcbf-aa8534762466"/>
+<ct:contentTypeSchema xmlns:ct="http://schemas.microsoft.com/office/2006/metadata/contentType" xmlns:ma="http://schemas.microsoft.com/office/2006/metadata/properties/metaAttributes" ct:_="" ma:_="" ma:contentTypeName="Document" ma:contentTypeID="0x01010049F085E5E1B7D548ABC325BF1A369CDB" ma:contentTypeVersion="2" ma:contentTypeDescription="Create a new document." ma:contentTypeScope="" ma:versionID="61ec714a383a2fbb200c0a27d45c316c">
+  <xsd:schema xmlns:xsd="http://www.w3.org/2001/XMLSchema" xmlns:xs="http://www.w3.org/2001/XMLSchema" xmlns:p="http://schemas.microsoft.com/office/2006/metadata/properties" xmlns:ns3="821e4eb3-3624-4683-a4ef-eeee83e1e316" targetNamespace="http://schemas.microsoft.com/office/2006/metadata/properties" ma:root="true" ma:fieldsID="0c616c72a65216af860a624ddd1431a3" ns3:_="">
+    <xsd:import namespace="821e4eb3-3624-4683-a4ef-eeee83e1e316"/>
     <xsd:element name="properties">
       <xsd:complexType>
         <xsd:sequence>
           <xsd:element name="documentManagement">
             <xsd:complexType>
               <xsd:all>
-                <xsd:element ref="ns2:MediaServiceMetadata" minOccurs="0"/>
-                <xsd:element ref="ns2:MediaServiceFastMetadata" minOccurs="0"/>
-                <xsd:element ref="ns2:lcf76f155ced4ddcb4097134ff3c332f" minOccurs="0"/>
-                <xsd:element ref="ns3:TaxCatchAll" minOccurs="0"/>
-                <xsd:element ref="ns2:MediaServiceOCR" minOccurs="0"/>
-                <xsd:element ref="ns2:MediaServiceGenerationTime" minOccurs="0"/>
-                <xsd:element ref="ns2:MediaServiceEventHashCode" minOccurs="0"/>
-                <xsd:element ref="ns2:MediaLengthInSeconds" minOccurs="0"/>
-                <xsd:element ref="ns2:MediaServiceDateTaken" minOccurs="0"/>
-                <xsd:element ref="ns2:MediaServiceLocation" minOccurs="0"/>
-                <xsd:element ref="ns2:MediaServiceSearchProperties" minOccurs="0"/>
-                <xsd:element ref="ns3:SharedWithUsers" minOccurs="0"/>
-                <xsd:element ref="ns3:SharedWithDetails" minOccurs="0"/>
+                <xsd:element ref="ns3:MediaServiceMetadata" minOccurs="0"/>
+                <xsd:element ref="ns3:MediaServiceFastMetadata" minOccurs="0"/>
               </xsd:all>
             </xsd:complexType>
           </xsd:element>
@@ -19672,7 +20588,7 @@
       </xsd:complexType>
     </xsd:element>
   </xsd:schema>
-  <xsd:schema xmlns:xsd="http://www.w3.org/2001/XMLSchema" xmlns:xs="http://www.w3.org/2001/XMLSchema" xmlns:dms="http://schemas.microsoft.com/office/2006/documentManagement/types" xmlns:pc="http://schemas.microsoft.com/office/infopath/2007/PartnerControls" targetNamespace="3271377c-1ead-4ce7-988f-a57cc4b626d4" elementFormDefault="qualified">
+  <xsd:schema xmlns:xsd="http://www.w3.org/2001/XMLSchema" xmlns:xs="http://www.w3.org/2001/XMLSchema" xmlns:dms="http://schemas.microsoft.com/office/2006/documentManagement/types" xmlns:pc="http://schemas.microsoft.com/office/infopath/2007/PartnerControls" targetNamespace="821e4eb3-3624-4683-a4ef-eeee83e1e316" elementFormDefault="qualified">
     <xsd:import namespace="http://schemas.microsoft.com/office/2006/documentManagement/types"/>
     <xsd:import namespace="http://schemas.microsoft.com/office/infopath/2007/PartnerControls"/>
     <xsd:element name="MediaServiceMetadata" ma:index="8" nillable="true" ma:displayName="MediaServiceMetadata" ma:hidden="true" ma:internalName="MediaServiceMetadata" ma:readOnly="true">
@@ -19683,91 +20599,6 @@
     <xsd:element name="MediaServiceFastMetadata" ma:index="9" nillable="true" ma:displayName="MediaServiceFastMetadata" ma:hidden="true" ma:internalName="MediaServiceFastMetadata" ma:readOnly="true">
       <xsd:simpleType>
         <xsd:restriction base="dms:Note"/>
-      </xsd:simpleType>
-    </xsd:element>
-    <xsd:element name="lcf76f155ced4ddcb4097134ff3c332f" ma:index="11" nillable="true" ma:taxonomy="true" ma:internalName="lcf76f155ced4ddcb4097134ff3c332f" ma:taxonomyFieldName="MediaServiceImageTags" ma:displayName="Image Tags" ma:readOnly="false" ma:fieldId="{5cf76f15-5ced-4ddc-b409-7134ff3c332f}" ma:taxonomyMulti="true" ma:sspId="e53cbe0c-7f92-4caa-8d7a-6a36bccc9a91" ma:termSetId="09814cd3-568e-fe90-9814-8d621ff8fb84" ma:anchorId="fba54fb3-c3e1-fe81-a776-ca4b69148c4d" ma:open="true" ma:isKeyword="false">
-      <xsd:complexType>
-        <xsd:sequence>
-          <xsd:element ref="pc:Terms" minOccurs="0" maxOccurs="1"/>
-        </xsd:sequence>
-      </xsd:complexType>
-    </xsd:element>
-    <xsd:element name="MediaServiceOCR" ma:index="13" nillable="true" ma:displayName="Extracted Text" ma:internalName="MediaServiceOCR" ma:readOnly="true">
-      <xsd:simpleType>
-        <xsd:restriction base="dms:Note">
-          <xsd:maxLength value="255"/>
-        </xsd:restriction>
-      </xsd:simpleType>
-    </xsd:element>
-    <xsd:element name="MediaServiceGenerationTime" ma:index="14" nillable="true" ma:displayName="MediaServiceGenerationTime" ma:hidden="true" ma:internalName="MediaServiceGenerationTime" ma:readOnly="true">
-      <xsd:simpleType>
-        <xsd:restriction base="dms:Text"/>
-      </xsd:simpleType>
-    </xsd:element>
-    <xsd:element name="MediaServiceEventHashCode" ma:index="15" nillable="true" ma:displayName="MediaServiceEventHashCode" ma:hidden="true" ma:internalName="MediaServiceEventHashCode" ma:readOnly="true">
-      <xsd:simpleType>
-        <xsd:restriction base="dms:Text"/>
-      </xsd:simpleType>
-    </xsd:element>
-    <xsd:element name="MediaLengthInSeconds" ma:index="16" nillable="true" ma:displayName="MediaLengthInSeconds" ma:hidden="true" ma:internalName="MediaLengthInSeconds" ma:readOnly="true">
-      <xsd:simpleType>
-        <xsd:restriction base="dms:Unknown"/>
-      </xsd:simpleType>
-    </xsd:element>
-    <xsd:element name="MediaServiceDateTaken" ma:index="17" nillable="true" ma:displayName="MediaServiceDateTaken" ma:hidden="true" ma:indexed="true" ma:internalName="MediaServiceDateTaken" ma:readOnly="true">
-      <xsd:simpleType>
-        <xsd:restriction base="dms:Text"/>
-      </xsd:simpleType>
-    </xsd:element>
-    <xsd:element name="MediaServiceLocation" ma:index="18" nillable="true" ma:displayName="Location" ma:indexed="true" ma:internalName="MediaServiceLocation" ma:readOnly="true">
-      <xsd:simpleType>
-        <xsd:restriction base="dms:Text"/>
-      </xsd:simpleType>
-    </xsd:element>
-    <xsd:element name="MediaServiceSearchProperties" ma:index="19" nillable="true" ma:displayName="MediaServiceSearchProperties" ma:hidden="true" ma:internalName="MediaServiceSearchProperties" ma:readOnly="true">
-      <xsd:simpleType>
-        <xsd:restriction base="dms:Note"/>
-      </xsd:simpleType>
-    </xsd:element>
-  </xsd:schema>
-  <xsd:schema xmlns:xsd="http://www.w3.org/2001/XMLSchema" xmlns:xs="http://www.w3.org/2001/XMLSchema" xmlns:dms="http://schemas.microsoft.com/office/2006/documentManagement/types" xmlns:pc="http://schemas.microsoft.com/office/infopath/2007/PartnerControls" targetNamespace="bffe39aa-d507-463c-bcbf-aa8534762466" elementFormDefault="qualified">
-    <xsd:import namespace="http://schemas.microsoft.com/office/2006/documentManagement/types"/>
-    <xsd:import namespace="http://schemas.microsoft.com/office/infopath/2007/PartnerControls"/>
-    <xsd:element name="TaxCatchAll" ma:index="12" nillable="true" ma:displayName="Taxonomy Catch All Column" ma:hidden="true" ma:list="{2cb0f71d-688b-49ac-90de-a646406f91bd}" ma:internalName="TaxCatchAll" ma:showField="CatchAllData" ma:web="bffe39aa-d507-463c-bcbf-aa8534762466">
-      <xsd:complexType>
-        <xsd:complexContent>
-          <xsd:extension base="dms:MultiChoiceLookup">
-            <xsd:sequence>
-              <xsd:element name="Value" type="dms:Lookup" maxOccurs="unbounded" minOccurs="0" nillable="true"/>
-            </xsd:sequence>
-          </xsd:extension>
-        </xsd:complexContent>
-      </xsd:complexType>
-    </xsd:element>
-    <xsd:element name="SharedWithUsers" ma:index="20" nillable="true" ma:displayName="Shared With" ma:internalName="SharedWithUsers" ma:readOnly="true">
-      <xsd:complexType>
-        <xsd:complexContent>
-          <xsd:extension base="dms:UserMulti">
-            <xsd:sequence>
-              <xsd:element name="UserInfo" minOccurs="0" maxOccurs="unbounded">
-                <xsd:complexType>
-                  <xsd:sequence>
-                    <xsd:element name="DisplayName" type="xsd:string" minOccurs="0"/>
-                    <xsd:element name="AccountId" type="dms:UserId" minOccurs="0" nillable="true"/>
-                    <xsd:element name="AccountType" type="xsd:string" minOccurs="0"/>
-                  </xsd:sequence>
-                </xsd:complexType>
-              </xsd:element>
-            </xsd:sequence>
-          </xsd:extension>
-        </xsd:complexContent>
-      </xsd:complexType>
-    </xsd:element>
-    <xsd:element name="SharedWithDetails" ma:index="21" nillable="true" ma:displayName="Shared With Details" ma:internalName="SharedWithDetails" ma:readOnly="true">
-      <xsd:simpleType>
-        <xsd:restriction base="dms:Note">
-          <xsd:maxLength value="255"/>
-        </xsd:restriction>
       </xsd:simpleType>
     </xsd:element>
   </xsd:schema>
@@ -19873,10 +20704,15 @@
 <file path=customXml/itemProps1.xml><?xml version="1.0" encoding="utf-8"?>
 <ds:datastoreItem xmlns:ds="http://schemas.openxmlformats.org/officeDocument/2006/customXml" ds:itemID="{5C56C71D-643B-4E04-9A6A-F76847701330}">
   <ds:schemaRefs>
+    <ds:schemaRef ds:uri="http://schemas.microsoft.com/office/2006/documentManagement/types"/>
+    <ds:schemaRef ds:uri="http://purl.org/dc/dcmitype/"/>
+    <ds:schemaRef ds:uri="http://purl.org/dc/elements/1.1/"/>
+    <ds:schemaRef ds:uri="821e4eb3-3624-4683-a4ef-eeee83e1e316"/>
+    <ds:schemaRef ds:uri="http://schemas.microsoft.com/office/infopath/2007/PartnerControls"/>
+    <ds:schemaRef ds:uri="http://schemas.openxmlformats.org/package/2006/metadata/core-properties"/>
     <ds:schemaRef ds:uri="http://schemas.microsoft.com/office/2006/metadata/properties"/>
-    <ds:schemaRef ds:uri="http://schemas.microsoft.com/office/infopath/2007/PartnerControls"/>
-    <ds:schemaRef ds:uri="bffe39aa-d507-463c-bcbf-aa8534762466"/>
-    <ds:schemaRef ds:uri="3271377c-1ead-4ce7-988f-a57cc4b626d4"/>
+    <ds:schemaRef ds:uri="http://www.w3.org/XML/1998/namespace"/>
+    <ds:schemaRef ds:uri="http://purl.org/dc/terms/"/>
   </ds:schemaRefs>
 </ds:datastoreItem>
 </file>
@@ -19890,14 +20726,13 @@
 </file>
 
 <file path=customXml/itemProps3.xml><?xml version="1.0" encoding="utf-8"?>
-<ds:datastoreItem xmlns:ds="http://schemas.openxmlformats.org/officeDocument/2006/customXml" ds:itemID="{BB732F31-4FDA-44FD-9542-761DD7A1BFC1}">
+<ds:datastoreItem xmlns:ds="http://schemas.openxmlformats.org/officeDocument/2006/customXml" ds:itemID="{A4EFBDD3-AE94-4D98-8803-7397C5B7C1CB}">
   <ds:schemaRefs>
     <ds:schemaRef ds:uri="http://schemas.microsoft.com/office/2006/metadata/contentType"/>
     <ds:schemaRef ds:uri="http://schemas.microsoft.com/office/2006/metadata/properties/metaAttributes"/>
     <ds:schemaRef ds:uri="http://www.w3.org/2001/XMLSchema"/>
     <ds:schemaRef ds:uri="http://schemas.microsoft.com/office/2006/metadata/properties"/>
-    <ds:schemaRef ds:uri="3271377c-1ead-4ce7-988f-a57cc4b626d4"/>
-    <ds:schemaRef ds:uri="bffe39aa-d507-463c-bcbf-aa8534762466"/>
+    <ds:schemaRef ds:uri="821e4eb3-3624-4683-a4ef-eeee83e1e316"/>
     <ds:schemaRef ds:uri="http://schemas.microsoft.com/office/2006/documentManagement/types"/>
     <ds:schemaRef ds:uri="http://schemas.microsoft.com/office/infopath/2007/PartnerControls"/>
     <ds:schemaRef ds:uri="http://schemas.openxmlformats.org/package/2006/metadata/core-properties"/>

</xml_diff>

<commit_message>
Added link to database normalization markdown from PPT
</commit_message>
<xml_diff>
--- a/Presentation material/Databases APP.pptx
+++ b/Presentation material/Databases APP.pptx
@@ -19549,8 +19549,42 @@
                 <a:effectLst/>
                 <a:latin typeface="Söhne"/>
               </a:rPr>
-              <a:t>Normalization – Minimize redundancy and dependency (1NF, 2NF, 3NF)</a:t>
-            </a:r>
+              <a:t>Normalization – Minimize redundancy and dependency (1NF, 2NF, 3NF) -</a:t>
+            </a:r>
+            <a:r>
+              <a:rPr lang="en-US" b="0" i="0" dirty="0">
+                <a:solidFill>
+                  <a:srgbClr val="0070C0"/>
+                </a:solidFill>
+                <a:effectLst/>
+                <a:latin typeface="Söhne"/>
+              </a:rPr>
+              <a:t> </a:t>
+            </a:r>
+            <a:r>
+              <a:rPr lang="en-US" b="0" i="0" dirty="0">
+                <a:solidFill>
+                  <a:srgbClr val="0070C0"/>
+                </a:solidFill>
+                <a:effectLst/>
+                <a:latin typeface="Söhne"/>
+                <a:hlinkClick r:id="rId2">
+                  <a:extLst>
+                    <a:ext uri="{A12FA001-AC4F-418D-AE19-62706E023703}">
+                      <ahyp:hlinkClr xmlns:ahyp="http://schemas.microsoft.com/office/drawing/2018/hyperlinkcolor" val="tx"/>
+                    </a:ext>
+                  </a:extLst>
+                </a:hlinkClick>
+              </a:rPr>
+              <a:t>Theory</a:t>
+            </a:r>
+            <a:endParaRPr lang="en-US" b="0" i="0" dirty="0">
+              <a:solidFill>
+                <a:srgbClr val="0070C0"/>
+              </a:solidFill>
+              <a:effectLst/>
+              <a:latin typeface="Söhne"/>
+            </a:endParaRPr>
           </a:p>
           <a:p>
             <a:r>
@@ -20555,18 +20589,18 @@
 </file>
 
 <file path=customXml/item1.xml><?xml version="1.0" encoding="utf-8"?>
-<p:properties xmlns:p="http://schemas.microsoft.com/office/2006/metadata/properties" xmlns:xsi="http://www.w3.org/2001/XMLSchema-instance" xmlns:pc="http://schemas.microsoft.com/office/infopath/2007/PartnerControls">
-  <documentManagement/>
-</p:properties>
-</file>
-
-<file path=customXml/item2.xml><?xml version="1.0" encoding="utf-8"?>
 <?mso-contentType ?>
 <FormTemplates xmlns="http://schemas.microsoft.com/sharepoint/v3/contenttype/forms">
   <Display>DocumentLibraryForm</Display>
   <Edit>DocumentLibraryForm</Edit>
   <New>DocumentLibraryForm</New>
 </FormTemplates>
+</file>
+
+<file path=customXml/item2.xml><?xml version="1.0" encoding="utf-8"?>
+<p:properties xmlns:p="http://schemas.microsoft.com/office/2006/metadata/properties" xmlns:xsi="http://www.w3.org/2001/XMLSchema-instance" xmlns:pc="http://schemas.microsoft.com/office/infopath/2007/PartnerControls">
+  <documentManagement/>
+</p:properties>
 </file>
 
 <file path=customXml/item3.xml><?xml version="1.0" encoding="utf-8"?>
@@ -20702,6 +20736,14 @@
 </file>
 
 <file path=customXml/itemProps1.xml><?xml version="1.0" encoding="utf-8"?>
+<ds:datastoreItem xmlns:ds="http://schemas.openxmlformats.org/officeDocument/2006/customXml" ds:itemID="{DE89EAE4-F0DF-4056-A4B5-87C04EEE6F62}">
+  <ds:schemaRefs>
+    <ds:schemaRef ds:uri="http://schemas.microsoft.com/sharepoint/v3/contenttype/forms"/>
+  </ds:schemaRefs>
+</ds:datastoreItem>
+</file>
+
+<file path=customXml/itemProps2.xml><?xml version="1.0" encoding="utf-8"?>
 <ds:datastoreItem xmlns:ds="http://schemas.openxmlformats.org/officeDocument/2006/customXml" ds:itemID="{5C56C71D-643B-4E04-9A6A-F76847701330}">
   <ds:schemaRefs>
     <ds:schemaRef ds:uri="http://schemas.microsoft.com/office/2006/documentManagement/types"/>
@@ -20713,14 +20755,6 @@
     <ds:schemaRef ds:uri="http://schemas.microsoft.com/office/2006/metadata/properties"/>
     <ds:schemaRef ds:uri="http://www.w3.org/XML/1998/namespace"/>
     <ds:schemaRef ds:uri="http://purl.org/dc/terms/"/>
-  </ds:schemaRefs>
-</ds:datastoreItem>
-</file>
-
-<file path=customXml/itemProps2.xml><?xml version="1.0" encoding="utf-8"?>
-<ds:datastoreItem xmlns:ds="http://schemas.openxmlformats.org/officeDocument/2006/customXml" ds:itemID="{DE89EAE4-F0DF-4056-A4B5-87C04EEE6F62}">
-  <ds:schemaRefs>
-    <ds:schemaRef ds:uri="http://schemas.microsoft.com/sharepoint/v3/contenttype/forms"/>
   </ds:schemaRefs>
 </ds:datastoreItem>
 </file>

</xml_diff>

<commit_message>
Added a couple of PPT slides related to indexes
</commit_message>
<xml_diff>
--- a/Presentation material/Databases APP.pptx
+++ b/Presentation material/Databases APP.pptx
@@ -5,7 +5,7 @@
     <p:sldMasterId id="2147483648" r:id="rId4"/>
   </p:sldMasterIdLst>
   <p:notesMasterIdLst>
-    <p:notesMasterId r:id="rId24"/>
+    <p:notesMasterId r:id="rId26"/>
   </p:notesMasterIdLst>
   <p:sldIdLst>
     <p:sldId id="256" r:id="rId5"/>
@@ -24,9 +24,11 @@
     <p:sldId id="283" r:id="rId18"/>
     <p:sldId id="284" r:id="rId19"/>
     <p:sldId id="285" r:id="rId20"/>
-    <p:sldId id="286" r:id="rId21"/>
-    <p:sldId id="287" r:id="rId22"/>
-    <p:sldId id="276" r:id="rId23"/>
+    <p:sldId id="289" r:id="rId21"/>
+    <p:sldId id="288" r:id="rId22"/>
+    <p:sldId id="286" r:id="rId23"/>
+    <p:sldId id="287" r:id="rId24"/>
+    <p:sldId id="276" r:id="rId25"/>
   </p:sldIdLst>
   <p:sldSz cx="12192000" cy="6858000"/>
   <p:notesSz cx="6858000" cy="9144000"/>
@@ -234,7 +236,7 @@
           <a:p>
             <a:fld id="{458B3470-95F1-4BD9-AFB4-529F3BDC56EE}" type="datetimeFigureOut">
               <a:rPr lang="sv-SE" smtClean="0"/>
-              <a:t>2024-02-25</a:t>
+              <a:t>2024-02-27</a:t>
             </a:fld>
             <a:endParaRPr lang="sv-SE"/>
           </a:p>
@@ -1081,6 +1083,231 @@
         <p:cNvPr id="1" name="">
           <a:extLst>
             <a:ext uri="{FF2B5EF4-FFF2-40B4-BE49-F238E27FC236}">
+              <a16:creationId xmlns:a16="http://schemas.microsoft.com/office/drawing/2014/main" id="{13D7B540-06C8-2200-3EE6-C0DD9C2DE55A}"/>
+            </a:ext>
+          </a:extLst>
+        </p:cNvPr>
+        <p:cNvGrpSpPr/>
+        <p:nvPr/>
+      </p:nvGrpSpPr>
+      <p:grpSpPr>
+        <a:xfrm>
+          <a:off x="0" y="0"/>
+          <a:ext cx="0" cy="0"/>
+          <a:chOff x="0" y="0"/>
+          <a:chExt cx="0" cy="0"/>
+        </a:xfrm>
+      </p:grpSpPr>
+      <p:sp>
+        <p:nvSpPr>
+          <p:cNvPr id="2" name="Slide Image Placeholder 1">
+            <a:extLst>
+              <a:ext uri="{FF2B5EF4-FFF2-40B4-BE49-F238E27FC236}">
+                <a16:creationId xmlns:a16="http://schemas.microsoft.com/office/drawing/2014/main" id="{B03CF4CE-13AF-7B50-A5BE-529CE750C809}"/>
+              </a:ext>
+            </a:extLst>
+          </p:cNvPr>
+          <p:cNvSpPr>
+            <a:spLocks noGrp="1" noRot="1" noChangeAspect="1"/>
+          </p:cNvSpPr>
+          <p:nvPr>
+            <p:ph type="sldImg"/>
+          </p:nvPr>
+        </p:nvSpPr>
+        <p:spPr/>
+      </p:sp>
+      <p:sp>
+        <p:nvSpPr>
+          <p:cNvPr id="3" name="Notes Placeholder 2">
+            <a:extLst>
+              <a:ext uri="{FF2B5EF4-FFF2-40B4-BE49-F238E27FC236}">
+                <a16:creationId xmlns:a16="http://schemas.microsoft.com/office/drawing/2014/main" id="{DD6A6CCF-508F-535B-667C-9C042ABCD669}"/>
+              </a:ext>
+            </a:extLst>
+          </p:cNvPr>
+          <p:cNvSpPr>
+            <a:spLocks noGrp="1"/>
+          </p:cNvSpPr>
+          <p:nvPr>
+            <p:ph type="body" idx="1"/>
+          </p:nvPr>
+        </p:nvSpPr>
+        <p:spPr/>
+        <p:txBody>
+          <a:bodyPr/>
+          <a:lstStyle/>
+          <a:p>
+            <a:endParaRPr lang="en-US" noProof="0" dirty="0"/>
+          </a:p>
+        </p:txBody>
+      </p:sp>
+      <p:sp>
+        <p:nvSpPr>
+          <p:cNvPr id="4" name="Slide Number Placeholder 3">
+            <a:extLst>
+              <a:ext uri="{FF2B5EF4-FFF2-40B4-BE49-F238E27FC236}">
+                <a16:creationId xmlns:a16="http://schemas.microsoft.com/office/drawing/2014/main" id="{4C6EA341-F404-FB13-2C26-658018394AF1}"/>
+              </a:ext>
+            </a:extLst>
+          </p:cNvPr>
+          <p:cNvSpPr>
+            <a:spLocks noGrp="1"/>
+          </p:cNvSpPr>
+          <p:nvPr>
+            <p:ph type="sldNum" sz="quarter" idx="5"/>
+          </p:nvPr>
+        </p:nvSpPr>
+        <p:spPr/>
+        <p:txBody>
+          <a:bodyPr/>
+          <a:lstStyle/>
+          <a:p>
+            <a:fld id="{9778E0F8-0F4F-4133-AB17-43107DBECF7F}" type="slidenum">
+              <a:rPr lang="sv-SE" smtClean="0"/>
+              <a:t>17</a:t>
+            </a:fld>
+            <a:endParaRPr lang="sv-SE"/>
+          </a:p>
+        </p:txBody>
+      </p:sp>
+    </p:spTree>
+    <p:extLst>
+      <p:ext uri="{BB962C8B-B14F-4D97-AF65-F5344CB8AC3E}">
+        <p14:creationId xmlns:p14="http://schemas.microsoft.com/office/powerpoint/2010/main" val="4166509454"/>
+      </p:ext>
+    </p:extLst>
+  </p:cSld>
+  <p:clrMapOvr>
+    <a:masterClrMapping/>
+  </p:clrMapOvr>
+</p:notes>
+</file>
+
+<file path=ppt/notesSlides/notesSlide15.xml><?xml version="1.0" encoding="utf-8"?>
+<p:notes xmlns:a="http://schemas.openxmlformats.org/drawingml/2006/main" xmlns:r="http://schemas.openxmlformats.org/officeDocument/2006/relationships" xmlns:p="http://schemas.openxmlformats.org/presentationml/2006/main">
+  <p:cSld>
+    <p:spTree>
+      <p:nvGrpSpPr>
+        <p:cNvPr id="1" name="">
+          <a:extLst>
+            <a:ext uri="{FF2B5EF4-FFF2-40B4-BE49-F238E27FC236}">
+              <a16:creationId xmlns:a16="http://schemas.microsoft.com/office/drawing/2014/main" id="{6843661F-8089-ECD0-D811-63EA99264D0C}"/>
+            </a:ext>
+          </a:extLst>
+        </p:cNvPr>
+        <p:cNvGrpSpPr/>
+        <p:nvPr/>
+      </p:nvGrpSpPr>
+      <p:grpSpPr>
+        <a:xfrm>
+          <a:off x="0" y="0"/>
+          <a:ext cx="0" cy="0"/>
+          <a:chOff x="0" y="0"/>
+          <a:chExt cx="0" cy="0"/>
+        </a:xfrm>
+      </p:grpSpPr>
+      <p:sp>
+        <p:nvSpPr>
+          <p:cNvPr id="2" name="Slide Image Placeholder 1">
+            <a:extLst>
+              <a:ext uri="{FF2B5EF4-FFF2-40B4-BE49-F238E27FC236}">
+                <a16:creationId xmlns:a16="http://schemas.microsoft.com/office/drawing/2014/main" id="{63D122D6-8EB5-3ED8-680A-FA7CDE8975F8}"/>
+              </a:ext>
+            </a:extLst>
+          </p:cNvPr>
+          <p:cNvSpPr>
+            <a:spLocks noGrp="1" noRot="1" noChangeAspect="1"/>
+          </p:cNvSpPr>
+          <p:nvPr>
+            <p:ph type="sldImg"/>
+          </p:nvPr>
+        </p:nvSpPr>
+        <p:spPr/>
+      </p:sp>
+      <p:sp>
+        <p:nvSpPr>
+          <p:cNvPr id="3" name="Notes Placeholder 2">
+            <a:extLst>
+              <a:ext uri="{FF2B5EF4-FFF2-40B4-BE49-F238E27FC236}">
+                <a16:creationId xmlns:a16="http://schemas.microsoft.com/office/drawing/2014/main" id="{16CDBD0E-EFD3-A068-C952-123EF6A76C06}"/>
+              </a:ext>
+            </a:extLst>
+          </p:cNvPr>
+          <p:cNvSpPr>
+            <a:spLocks noGrp="1"/>
+          </p:cNvSpPr>
+          <p:nvPr>
+            <p:ph type="body" idx="1"/>
+          </p:nvPr>
+        </p:nvSpPr>
+        <p:spPr/>
+        <p:txBody>
+          <a:bodyPr/>
+          <a:lstStyle/>
+          <a:p>
+            <a:r>
+              <a:rPr lang="en-US" noProof="0" dirty="0"/>
+              <a:t>Estimated plan: Uses statistics stored in the database to do a best guess of how the query would be executed</a:t>
+            </a:r>
+          </a:p>
+          <a:p>
+            <a:r>
+              <a:rPr lang="en-US" noProof="0" dirty="0"/>
+              <a:t>Actual plan: Shows how the query was actually executed</a:t>
+            </a:r>
+          </a:p>
+        </p:txBody>
+      </p:sp>
+      <p:sp>
+        <p:nvSpPr>
+          <p:cNvPr id="4" name="Slide Number Placeholder 3">
+            <a:extLst>
+              <a:ext uri="{FF2B5EF4-FFF2-40B4-BE49-F238E27FC236}">
+                <a16:creationId xmlns:a16="http://schemas.microsoft.com/office/drawing/2014/main" id="{41CB47C0-DCFD-7EBF-E95D-2227AB2E1DCF}"/>
+              </a:ext>
+            </a:extLst>
+          </p:cNvPr>
+          <p:cNvSpPr>
+            <a:spLocks noGrp="1"/>
+          </p:cNvSpPr>
+          <p:nvPr>
+            <p:ph type="sldNum" sz="quarter" idx="5"/>
+          </p:nvPr>
+        </p:nvSpPr>
+        <p:spPr/>
+        <p:txBody>
+          <a:bodyPr/>
+          <a:lstStyle/>
+          <a:p>
+            <a:fld id="{9778E0F8-0F4F-4133-AB17-43107DBECF7F}" type="slidenum">
+              <a:rPr lang="sv-SE" smtClean="0"/>
+              <a:t>18</a:t>
+            </a:fld>
+            <a:endParaRPr lang="sv-SE"/>
+          </a:p>
+        </p:txBody>
+      </p:sp>
+    </p:spTree>
+    <p:extLst>
+      <p:ext uri="{BB962C8B-B14F-4D97-AF65-F5344CB8AC3E}">
+        <p14:creationId xmlns:p14="http://schemas.microsoft.com/office/powerpoint/2010/main" val="2251632996"/>
+      </p:ext>
+    </p:extLst>
+  </p:cSld>
+  <p:clrMapOvr>
+    <a:masterClrMapping/>
+  </p:clrMapOvr>
+</p:notes>
+</file>
+
+<file path=ppt/notesSlides/notesSlide16.xml><?xml version="1.0" encoding="utf-8"?>
+<p:notes xmlns:a="http://schemas.openxmlformats.org/drawingml/2006/main" xmlns:r="http://schemas.openxmlformats.org/officeDocument/2006/relationships" xmlns:p="http://schemas.openxmlformats.org/presentationml/2006/main">
+  <p:cSld>
+    <p:spTree>
+      <p:nvGrpSpPr>
+        <p:cNvPr id="1" name="">
+          <a:extLst>
+            <a:ext uri="{FF2B5EF4-FFF2-40B4-BE49-F238E27FC236}">
               <a16:creationId xmlns:a16="http://schemas.microsoft.com/office/drawing/2014/main" id="{7EBAC258-F666-F339-99C1-0EB04C905135}"/>
             </a:ext>
           </a:extLst>
@@ -1162,7 +1389,7 @@
           <a:p>
             <a:fld id="{9778E0F8-0F4F-4133-AB17-43107DBECF7F}" type="slidenum">
               <a:rPr lang="sv-SE" smtClean="0"/>
-              <a:t>17</a:t>
+              <a:t>19</a:t>
             </a:fld>
             <a:endParaRPr lang="sv-SE"/>
           </a:p>
@@ -1181,7 +1408,7 @@
 </p:notes>
 </file>
 
-<file path=ppt/notesSlides/notesSlide15.xml><?xml version="1.0" encoding="utf-8"?>
+<file path=ppt/notesSlides/notesSlide17.xml><?xml version="1.0" encoding="utf-8"?>
 <p:notes xmlns:a="http://schemas.openxmlformats.org/drawingml/2006/main" xmlns:r="http://schemas.openxmlformats.org/officeDocument/2006/relationships" xmlns:p="http://schemas.openxmlformats.org/presentationml/2006/main">
   <p:cSld>
     <p:spTree>
@@ -1270,7 +1497,7 @@
           <a:p>
             <a:fld id="{9778E0F8-0F4F-4133-AB17-43107DBECF7F}" type="slidenum">
               <a:rPr lang="sv-SE" smtClean="0"/>
-              <a:t>18</a:t>
+              <a:t>20</a:t>
             </a:fld>
             <a:endParaRPr lang="sv-SE"/>
           </a:p>
@@ -19549,7 +19776,7 @@
         <p:cNvPr id="1" name="">
           <a:extLst>
             <a:ext uri="{FF2B5EF4-FFF2-40B4-BE49-F238E27FC236}">
-              <a16:creationId xmlns:a16="http://schemas.microsoft.com/office/drawing/2014/main" id="{0AB9AD8A-131E-38A6-E503-73F55C263491}"/>
+              <a16:creationId xmlns:a16="http://schemas.microsoft.com/office/drawing/2014/main" id="{671CEF5A-96DA-35DF-6796-0D6D21A18A63}"/>
             </a:ext>
           </a:extLst>
         </p:cNvPr>
@@ -19569,7 +19796,7 @@
           <p:cNvPr id="16" name="Subtitle 15">
             <a:extLst>
               <a:ext uri="{FF2B5EF4-FFF2-40B4-BE49-F238E27FC236}">
-                <a16:creationId xmlns:a16="http://schemas.microsoft.com/office/drawing/2014/main" id="{04BD68CF-D646-F720-3EF8-302F26F5D604}"/>
+                <a16:creationId xmlns:a16="http://schemas.microsoft.com/office/drawing/2014/main" id="{F939373A-4B61-6DA1-7D90-5D15FFCED0B1}"/>
               </a:ext>
             </a:extLst>
           </p:cNvPr>
@@ -19597,7 +19824,7 @@
           <p:cNvPr id="14" name="Title 13">
             <a:extLst>
               <a:ext uri="{FF2B5EF4-FFF2-40B4-BE49-F238E27FC236}">
-                <a16:creationId xmlns:a16="http://schemas.microsoft.com/office/drawing/2014/main" id="{4E31435B-4D1E-CE0C-5128-1EF0B4564284}"/>
+                <a16:creationId xmlns:a16="http://schemas.microsoft.com/office/drawing/2014/main" id="{79BE4830-93A1-5802-0A50-D5115CCC5F43}"/>
               </a:ext>
             </a:extLst>
           </p:cNvPr>
@@ -19608,14 +19835,19 @@
             <p:ph type="title"/>
           </p:nvPr>
         </p:nvSpPr>
-        <p:spPr/>
+        <p:spPr>
+          <a:xfrm>
+            <a:off x="468000" y="684000"/>
+            <a:ext cx="8980800" cy="1080000"/>
+          </a:xfrm>
+        </p:spPr>
         <p:txBody>
           <a:bodyPr/>
           <a:lstStyle/>
           <a:p>
             <a:r>
               <a:rPr lang="en-US" dirty="0"/>
-              <a:t>Security – SQL Injection</a:t>
+              <a:t>Performance – Index scan vs Index seek</a:t>
             </a:r>
           </a:p>
         </p:txBody>
@@ -19625,7 +19857,7 @@
           <p:cNvPr id="5" name="Footer Placeholder 4">
             <a:extLst>
               <a:ext uri="{FF2B5EF4-FFF2-40B4-BE49-F238E27FC236}">
-                <a16:creationId xmlns:a16="http://schemas.microsoft.com/office/drawing/2014/main" id="{2B9D26A8-A027-6EAC-034C-445449A1EA57}"/>
+                <a16:creationId xmlns:a16="http://schemas.microsoft.com/office/drawing/2014/main" id="{80E525F3-0C42-2FD6-CE59-B9613A6FF213}"/>
               </a:ext>
             </a:extLst>
           </p:cNvPr>
@@ -19658,7 +19890,7 @@
           <p:cNvPr id="6" name="Slide Number Placeholder 5">
             <a:extLst>
               <a:ext uri="{FF2B5EF4-FFF2-40B4-BE49-F238E27FC236}">
-                <a16:creationId xmlns:a16="http://schemas.microsoft.com/office/drawing/2014/main" id="{16703104-EAD3-336F-EDEF-2F001F67F50A}"/>
+                <a16:creationId xmlns:a16="http://schemas.microsoft.com/office/drawing/2014/main" id="{251326D8-5208-B76D-656A-3460B1E74ED2}"/>
               </a:ext>
             </a:extLst>
           </p:cNvPr>
@@ -19693,7 +19925,7 @@
           <p:cNvPr id="3" name="Content Placeholder 2">
             <a:extLst>
               <a:ext uri="{FF2B5EF4-FFF2-40B4-BE49-F238E27FC236}">
-                <a16:creationId xmlns:a16="http://schemas.microsoft.com/office/drawing/2014/main" id="{C51DC355-C693-6B22-A7FA-A646126084C2}"/>
+                <a16:creationId xmlns:a16="http://schemas.microsoft.com/office/drawing/2014/main" id="{8F9D58E7-0B2E-79EB-EAEE-45607C15C0AB}"/>
               </a:ext>
             </a:extLst>
           </p:cNvPr>
@@ -19707,37 +19939,23 @@
         <p:spPr/>
         <p:txBody>
           <a:bodyPr>
-            <a:normAutofit fontScale="92500" lnSpcReduction="20000"/>
+            <a:normAutofit fontScale="92500"/>
           </a:bodyPr>
           <a:lstStyle/>
           <a:p>
             <a:pPr marL="177800" lvl="1" indent="0">
               <a:buNone/>
             </a:pPr>
+            <a:endParaRPr lang="en-US" dirty="0"/>
+          </a:p>
+          <a:p>
+            <a:pPr marL="177800" lvl="1" indent="0">
+              <a:buNone/>
+            </a:pPr>
             <a:r>
               <a:rPr lang="en-US" dirty="0"/>
-              <a:t>From Owasp: </a:t>
-            </a:r>
-            <a:r>
-              <a:rPr lang="en-US" dirty="0">
-                <a:solidFill>
-                  <a:srgbClr val="0070C0"/>
-                </a:solidFill>
-                <a:hlinkClick r:id="rId3">
-                  <a:extLst>
-                    <a:ext uri="{A12FA001-AC4F-418D-AE19-62706E023703}">
-                      <ahyp:hlinkClr xmlns:ahyp="http://schemas.microsoft.com/office/drawing/2018/hyperlinkcolor" val="tx"/>
-                    </a:ext>
-                  </a:extLst>
-                </a:hlinkClick>
-              </a:rPr>
-              <a:t>https://owasp.org/www-community/attacks/SQL_Injection</a:t>
-            </a:r>
-            <a:endParaRPr lang="en-US" dirty="0">
-              <a:solidFill>
-                <a:srgbClr val="0070C0"/>
-              </a:solidFill>
-            </a:endParaRPr>
+              <a:t>Scan</a:t>
+            </a:r>
           </a:p>
           <a:p>
             <a:pPr marL="177800" lvl="1" indent="0">
@@ -19745,7 +19963,25 @@
             </a:pPr>
             <a:r>
               <a:rPr lang="en-US" dirty="0"/>
-              <a:t>“A SQL injection attack consists of insertion or “injection” of a SQL query via the input data from the client to the application. A successful SQL injection exploit can read sensitive data from the database, modify database data (Insert/Update/Delete), execute administration operations on the database (such as shutdown the DBMS), recover the content of a given file present on the DBMS file system and in some cases issue commands to the operating system. SQL injection attacks are a type of injection attack, in which SQL commands are injected into data-plane input in order to affect the execution of predefined SQL commands.”</a:t>
+              <a:t>- Searches the entire index to find all the rows than meet the search condition (the WHERE clause, but  also the SELECT clause)</a:t>
+            </a:r>
+          </a:p>
+          <a:p>
+            <a:pPr marL="177800" lvl="1" indent="0">
+              <a:buNone/>
+            </a:pPr>
+            <a:r>
+              <a:rPr lang="en-US" dirty="0"/>
+              <a:t>- Consumes more CPU and I/O resources</a:t>
+            </a:r>
+          </a:p>
+          <a:p>
+            <a:pPr marL="177800" lvl="1" indent="0">
+              <a:buNone/>
+            </a:pPr>
+            <a:r>
+              <a:rPr lang="en-US" dirty="0"/>
+              <a:t>+ More acceptable or preferred for small tables or  in cases where most of the rows must be examined</a:t>
             </a:r>
           </a:p>
           <a:p>
@@ -19760,7 +19996,7 @@
             </a:pPr>
             <a:r>
               <a:rPr lang="en-US" dirty="0"/>
-              <a:t>Example:</a:t>
+              <a:t>Seek </a:t>
             </a:r>
           </a:p>
           <a:p>
@@ -19769,7 +20005,7 @@
             </a:pPr>
             <a:r>
               <a:rPr lang="en-US" dirty="0"/>
-              <a:t>Code concatenates parameter from API with rest of statement:</a:t>
+              <a:t>+ Uses the index to find the rows that meet the search condition</a:t>
             </a:r>
           </a:p>
           <a:p>
@@ -19778,7 +20014,7 @@
             </a:pPr>
             <a:r>
               <a:rPr lang="en-US" dirty="0"/>
-              <a:t>string sqlStatement = “SELECT * FROM [DBO].[Artist] WHERE [LastName] = ‘” + lastName + “’”;</a:t>
+              <a:t>+ Consumes less CPU and I/O resource</a:t>
             </a:r>
           </a:p>
           <a:p>
@@ -19787,34 +20023,30 @@
             </a:pPr>
             <a:r>
               <a:rPr lang="en-US" dirty="0"/>
-              <a:t>But what if the parameter “lastName”  contains the following?</a:t>
+              <a:t>- Remember that indexes comes with a cost for write operation like INSERT, DELETE &amp; UPDATE</a:t>
             </a:r>
           </a:p>
           <a:p>
             <a:pPr marL="177800" lvl="1" indent="0">
               <a:buNone/>
             </a:pPr>
+            <a:endParaRPr lang="en-US" dirty="0">
+              <a:sym typeface="Wingdings" panose="05000000000000000000" pitchFamily="2" charset="2"/>
+            </a:endParaRPr>
+          </a:p>
+          <a:p>
+            <a:pPr marL="177800" lvl="1" indent="0">
+              <a:buNone/>
+            </a:pPr>
+            <a:r>
+              <a:rPr lang="en-US" dirty="0">
+                <a:sym typeface="Wingdings" panose="05000000000000000000" pitchFamily="2" charset="2"/>
+              </a:rPr>
+              <a:t> </a:t>
+            </a:r>
             <a:r>
               <a:rPr lang="en-US" dirty="0"/>
-              <a:t>“hacker';SELECT * FROM sys.Tables’;SELECT ‘”</a:t>
-            </a:r>
-          </a:p>
-          <a:p>
-            <a:pPr marL="177800" lvl="1" indent="0">
-              <a:buNone/>
-            </a:pPr>
-            <a:r>
-              <a:rPr lang="en-US" dirty="0"/>
-              <a:t>Result in the valid query:</a:t>
-            </a:r>
-          </a:p>
-          <a:p>
-            <a:pPr marL="177800" lvl="1" indent="0">
-              <a:buNone/>
-            </a:pPr>
-            <a:r>
-              <a:rPr lang="en-US" dirty="0"/>
-              <a:t>“SELECT * FROM [DBO].[Artist] WHERE [LastName] = 'hacker';SELECT * FROM sys.Tables;SELECT ‘’”</a:t>
+              <a:t>In general, we want to achieve index seek over index scan</a:t>
             </a:r>
           </a:p>
         </p:txBody>
@@ -19822,7 +20054,7 @@
     </p:spTree>
     <p:extLst>
       <p:ext uri="{BB962C8B-B14F-4D97-AF65-F5344CB8AC3E}">
-        <p14:creationId xmlns:p14="http://schemas.microsoft.com/office/powerpoint/2010/main" val="2690010389"/>
+        <p14:creationId xmlns:p14="http://schemas.microsoft.com/office/powerpoint/2010/main" val="2869057177"/>
       </p:ext>
     </p:extLst>
   </p:cSld>
@@ -19840,7 +20072,7 @@
         <p:cNvPr id="1" name="">
           <a:extLst>
             <a:ext uri="{FF2B5EF4-FFF2-40B4-BE49-F238E27FC236}">
-              <a16:creationId xmlns:a16="http://schemas.microsoft.com/office/drawing/2014/main" id="{929A8DC9-C321-4FF5-6BA0-AE4E3A774C69}"/>
+              <a16:creationId xmlns:a16="http://schemas.microsoft.com/office/drawing/2014/main" id="{3B37C196-72ED-0FA6-3241-0BF732871184}"/>
             </a:ext>
           </a:extLst>
         </p:cNvPr>
@@ -19860,7 +20092,7 @@
           <p:cNvPr id="16" name="Subtitle 15">
             <a:extLst>
               <a:ext uri="{FF2B5EF4-FFF2-40B4-BE49-F238E27FC236}">
-                <a16:creationId xmlns:a16="http://schemas.microsoft.com/office/drawing/2014/main" id="{8AC607C0-1B7F-7AA7-C6F2-016FD6C12831}"/>
+                <a16:creationId xmlns:a16="http://schemas.microsoft.com/office/drawing/2014/main" id="{997CA551-48CA-A11A-0022-93323B094E15}"/>
               </a:ext>
             </a:extLst>
           </p:cNvPr>
@@ -19888,7 +20120,7 @@
           <p:cNvPr id="14" name="Title 13">
             <a:extLst>
               <a:ext uri="{FF2B5EF4-FFF2-40B4-BE49-F238E27FC236}">
-                <a16:creationId xmlns:a16="http://schemas.microsoft.com/office/drawing/2014/main" id="{70F05060-4C66-21A1-DCA2-9A3F83DB6456}"/>
+                <a16:creationId xmlns:a16="http://schemas.microsoft.com/office/drawing/2014/main" id="{7EF15063-5633-3C13-A3F6-FBC317A9F6EE}"/>
               </a:ext>
             </a:extLst>
           </p:cNvPr>
@@ -19906,7 +20138,7 @@
           <a:p>
             <a:r>
               <a:rPr lang="en-US" dirty="0"/>
-              <a:t>Security – SQL Injection</a:t>
+              <a:t>Azure Data Studio – Actual Plan</a:t>
             </a:r>
           </a:p>
         </p:txBody>
@@ -19916,7 +20148,7 @@
           <p:cNvPr id="5" name="Footer Placeholder 4">
             <a:extLst>
               <a:ext uri="{FF2B5EF4-FFF2-40B4-BE49-F238E27FC236}">
-                <a16:creationId xmlns:a16="http://schemas.microsoft.com/office/drawing/2014/main" id="{B766C258-4D2B-F09E-F48A-11ED2704B28B}"/>
+                <a16:creationId xmlns:a16="http://schemas.microsoft.com/office/drawing/2014/main" id="{3FA0C44E-3712-FA79-9083-441B34B2DBA1}"/>
               </a:ext>
             </a:extLst>
           </p:cNvPr>
@@ -19949,7 +20181,7 @@
           <p:cNvPr id="6" name="Slide Number Placeholder 5">
             <a:extLst>
               <a:ext uri="{FF2B5EF4-FFF2-40B4-BE49-F238E27FC236}">
-                <a16:creationId xmlns:a16="http://schemas.microsoft.com/office/drawing/2014/main" id="{A223B8A3-BBDE-E824-8B18-E4838B4DE98F}"/>
+                <a16:creationId xmlns:a16="http://schemas.microsoft.com/office/drawing/2014/main" id="{6901E55B-AB1F-E562-0E12-36BDD7CA2DD6}"/>
               </a:ext>
             </a:extLst>
           </p:cNvPr>
@@ -19984,7 +20216,7 @@
           <p:cNvPr id="3" name="Content Placeholder 2">
             <a:extLst>
               <a:ext uri="{FF2B5EF4-FFF2-40B4-BE49-F238E27FC236}">
-                <a16:creationId xmlns:a16="http://schemas.microsoft.com/office/drawing/2014/main" id="{48CBBFF6-0649-1195-DF8C-639E74246489}"/>
+                <a16:creationId xmlns:a16="http://schemas.microsoft.com/office/drawing/2014/main" id="{232301A5-E4FE-5C4A-84B9-FB5EA4A547A5}"/>
               </a:ext>
             </a:extLst>
           </p:cNvPr>
@@ -20007,306 +20239,397 @@
             </a:pPr>
             <a:r>
               <a:rPr lang="en-US" dirty="0"/>
-              <a:t>How to avoid:</a:t>
+              <a:t>Can be used to analyze queries and find if the query or database tables are optimal</a:t>
             </a:r>
           </a:p>
           <a:p>
             <a:pPr marL="177800" lvl="1" indent="0">
               <a:buNone/>
             </a:pPr>
-            <a:r>
-              <a:rPr lang="en-US" dirty="0"/>
-              <a:t>Use frameworks for executing queries</a:t>
-            </a:r>
-          </a:p>
-          <a:p>
-            <a:pPr marL="177800" lvl="1" indent="0">
+            <a:endParaRPr lang="en-US" dirty="0"/>
+          </a:p>
+        </p:txBody>
+      </p:sp>
+      <p:pic>
+        <p:nvPicPr>
+          <p:cNvPr id="4" name="Picture 3">
+            <a:extLst>
+              <a:ext uri="{FF2B5EF4-FFF2-40B4-BE49-F238E27FC236}">
+                <a16:creationId xmlns:a16="http://schemas.microsoft.com/office/drawing/2014/main" id="{42726C03-D83F-F86B-5C34-5D85116E6806}"/>
+              </a:ext>
+            </a:extLst>
+          </p:cNvPr>
+          <p:cNvPicPr>
+            <a:picLocks noChangeAspect="1"/>
+          </p:cNvPicPr>
+          <p:nvPr/>
+        </p:nvPicPr>
+        <p:blipFill>
+          <a:blip r:embed="rId3"/>
+          <a:stretch>
+            <a:fillRect/>
+          </a:stretch>
+        </p:blipFill>
+        <p:spPr>
+          <a:xfrm>
+            <a:off x="696600" y="2438400"/>
+            <a:ext cx="6923400" cy="2120555"/>
+          </a:xfrm>
+          <a:prstGeom prst="rect">
+            <a:avLst/>
+          </a:prstGeom>
+        </p:spPr>
+      </p:pic>
+      <p:sp>
+        <p:nvSpPr>
+          <p:cNvPr id="7" name="Rectangle 6">
+            <a:extLst>
+              <a:ext uri="{FF2B5EF4-FFF2-40B4-BE49-F238E27FC236}">
+                <a16:creationId xmlns:a16="http://schemas.microsoft.com/office/drawing/2014/main" id="{27762259-2B2A-5008-CD38-7B31FBB33EC8}"/>
+              </a:ext>
+            </a:extLst>
+          </p:cNvPr>
+          <p:cNvSpPr/>
+          <p:nvPr/>
+        </p:nvSpPr>
+        <p:spPr>
+          <a:xfrm>
+            <a:off x="6290860" y="2481927"/>
+            <a:ext cx="1329140" cy="185073"/>
+          </a:xfrm>
+          <a:prstGeom prst="rect">
+            <a:avLst/>
+          </a:prstGeom>
+          <a:noFill/>
+          <a:ln w="28575">
+            <a:solidFill>
+              <a:srgbClr val="FF0000"/>
+            </a:solidFill>
+          </a:ln>
+        </p:spPr>
+        <p:style>
+          <a:lnRef idx="2">
+            <a:schemeClr val="accent1">
+              <a:shade val="50000"/>
+            </a:schemeClr>
+          </a:lnRef>
+          <a:fillRef idx="1">
+            <a:schemeClr val="accent1"/>
+          </a:fillRef>
+          <a:effectRef idx="0">
+            <a:schemeClr val="accent1"/>
+          </a:effectRef>
+          <a:fontRef idx="minor">
+            <a:schemeClr val="lt1"/>
+          </a:fontRef>
+        </p:style>
+        <p:txBody>
+          <a:bodyPr rtlCol="0" anchor="ctr"/>
+          <a:lstStyle/>
+          <a:p>
+            <a:pPr algn="ctr"/>
+            <a:endParaRPr lang="nb-NO">
+              <a:solidFill>
+                <a:schemeClr val="bg1"/>
+              </a:solidFill>
+            </a:endParaRPr>
+          </a:p>
+        </p:txBody>
+      </p:sp>
+      <p:sp>
+        <p:nvSpPr>
+          <p:cNvPr id="8" name="Rectangle 7">
+            <a:extLst>
+              <a:ext uri="{FF2B5EF4-FFF2-40B4-BE49-F238E27FC236}">
+                <a16:creationId xmlns:a16="http://schemas.microsoft.com/office/drawing/2014/main" id="{67DFFA4A-C6C8-589C-E3D9-2A878A5BA959}"/>
+              </a:ext>
+            </a:extLst>
+          </p:cNvPr>
+          <p:cNvSpPr/>
+          <p:nvPr/>
+        </p:nvSpPr>
+        <p:spPr>
+          <a:xfrm>
+            <a:off x="2057400" y="3124200"/>
+            <a:ext cx="772370" cy="185070"/>
+          </a:xfrm>
+          <a:prstGeom prst="rect">
+            <a:avLst/>
+          </a:prstGeom>
+          <a:noFill/>
+          <a:ln w="28575">
+            <a:solidFill>
+              <a:srgbClr val="FF0000"/>
+            </a:solidFill>
+          </a:ln>
+        </p:spPr>
+        <p:style>
+          <a:lnRef idx="2">
+            <a:schemeClr val="accent1">
+              <a:shade val="50000"/>
+            </a:schemeClr>
+          </a:lnRef>
+          <a:fillRef idx="1">
+            <a:schemeClr val="accent1"/>
+          </a:fillRef>
+          <a:effectRef idx="0">
+            <a:schemeClr val="accent1"/>
+          </a:effectRef>
+          <a:fontRef idx="minor">
+            <a:schemeClr val="lt1"/>
+          </a:fontRef>
+        </p:style>
+        <p:txBody>
+          <a:bodyPr rtlCol="0" anchor="ctr"/>
+          <a:lstStyle/>
+          <a:p>
+            <a:pPr algn="ctr"/>
+            <a:endParaRPr lang="nb-NO">
+              <a:solidFill>
+                <a:schemeClr val="bg1"/>
+              </a:solidFill>
+            </a:endParaRPr>
+          </a:p>
+        </p:txBody>
+      </p:sp>
+      <p:sp>
+        <p:nvSpPr>
+          <p:cNvPr id="9" name="TextBox 8">
+            <a:extLst>
+              <a:ext uri="{FF2B5EF4-FFF2-40B4-BE49-F238E27FC236}">
+                <a16:creationId xmlns:a16="http://schemas.microsoft.com/office/drawing/2014/main" id="{A255F690-2486-0861-3386-0234C632FCA6}"/>
+              </a:ext>
+            </a:extLst>
+          </p:cNvPr>
+          <p:cNvSpPr txBox="1"/>
+          <p:nvPr/>
+        </p:nvSpPr>
+        <p:spPr>
+          <a:xfrm>
+            <a:off x="4267200" y="3962400"/>
+            <a:ext cx="462801" cy="422405"/>
+          </a:xfrm>
+          <a:prstGeom prst="rect">
+            <a:avLst/>
+          </a:prstGeom>
+          <a:noFill/>
+        </p:spPr>
+        <p:txBody>
+          <a:bodyPr wrap="none" lIns="72000" tIns="72000" rIns="72000" bIns="72000" rtlCol="0">
+            <a:spAutoFit/>
+          </a:bodyPr>
+          <a:lstStyle/>
+          <a:p>
+            <a:pPr marL="0" indent="0" algn="l">
+              <a:spcBef>
+                <a:spcPts val="600"/>
+              </a:spcBef>
+              <a:buFont typeface="Arial" panose="020B0604020202020204" pitchFamily="34" charset="0"/>
               <a:buNone/>
             </a:pPr>
             <a:r>
-              <a:rPr lang="en-US" dirty="0"/>
-              <a:t>Example in C# using the “SqlCommand” class with a parameterized query and adding parameters to the SqlCommand before executing the query:</a:t>
-            </a:r>
-          </a:p>
-          <a:p>
-            <a:pPr marL="177800" lvl="1" indent="0">
+              <a:rPr lang="nb-NO" sz="1800" dirty="0">
+                <a:solidFill>
+                  <a:schemeClr val="tx1"/>
+                </a:solidFill>
+              </a:rPr>
+              <a:t>😢</a:t>
+            </a:r>
+          </a:p>
+        </p:txBody>
+      </p:sp>
+      <p:pic>
+        <p:nvPicPr>
+          <p:cNvPr id="13" name="Picture 12">
+            <a:extLst>
+              <a:ext uri="{FF2B5EF4-FFF2-40B4-BE49-F238E27FC236}">
+                <a16:creationId xmlns:a16="http://schemas.microsoft.com/office/drawing/2014/main" id="{220F3A38-C63D-C939-5E46-27F3C27E5FBC}"/>
+              </a:ext>
+            </a:extLst>
+          </p:cNvPr>
+          <p:cNvPicPr>
+            <a:picLocks noChangeAspect="1"/>
+          </p:cNvPicPr>
+          <p:nvPr/>
+        </p:nvPicPr>
+        <p:blipFill>
+          <a:blip r:embed="rId4"/>
+          <a:stretch>
+            <a:fillRect/>
+          </a:stretch>
+        </p:blipFill>
+        <p:spPr>
+          <a:xfrm>
+            <a:off x="696600" y="4558955"/>
+            <a:ext cx="4882105" cy="1428180"/>
+          </a:xfrm>
+          <a:prstGeom prst="rect">
+            <a:avLst/>
+          </a:prstGeom>
+        </p:spPr>
+      </p:pic>
+      <p:sp>
+        <p:nvSpPr>
+          <p:cNvPr id="15" name="TextBox 14">
+            <a:extLst>
+              <a:ext uri="{FF2B5EF4-FFF2-40B4-BE49-F238E27FC236}">
+                <a16:creationId xmlns:a16="http://schemas.microsoft.com/office/drawing/2014/main" id="{C25C8336-94BB-432C-F37F-A25C22B5942F}"/>
+              </a:ext>
+            </a:extLst>
+          </p:cNvPr>
+          <p:cNvSpPr txBox="1"/>
+          <p:nvPr/>
+        </p:nvSpPr>
+        <p:spPr>
+          <a:xfrm>
+            <a:off x="4267200" y="5181600"/>
+            <a:ext cx="462801" cy="422405"/>
+          </a:xfrm>
+          <a:prstGeom prst="rect">
+            <a:avLst/>
+          </a:prstGeom>
+          <a:noFill/>
+        </p:spPr>
+        <p:txBody>
+          <a:bodyPr wrap="none" lIns="72000" tIns="72000" rIns="72000" bIns="72000" rtlCol="0">
+            <a:spAutoFit/>
+          </a:bodyPr>
+          <a:lstStyle/>
+          <a:p>
+            <a:pPr marL="0" indent="0" algn="l">
+              <a:spcBef>
+                <a:spcPts val="600"/>
+              </a:spcBef>
+              <a:buFont typeface="Arial" panose="020B0604020202020204" pitchFamily="34" charset="0"/>
               <a:buNone/>
             </a:pPr>
             <a:r>
-              <a:rPr lang="nb-NO" b="0" i="0" dirty="0">
-                <a:effectLst/>
-                <a:latin typeface="Courier New" panose="02070309020205020404" pitchFamily="49" charset="0"/>
+              <a:rPr lang="nb-NO" sz="1800" dirty="0">
+                <a:solidFill>
+                  <a:schemeClr val="tx1"/>
+                </a:solidFill>
               </a:rPr>
-              <a:t>var sqlCommand </a:t>
-            </a:r>
-            <a:r>
-              <a:rPr lang="nb-NO" b="0" i="0" dirty="0">
-                <a:solidFill>
-                  <a:srgbClr val="F92672"/>
-                </a:solidFill>
-                <a:effectLst/>
-                <a:latin typeface="Courier New" panose="02070309020205020404" pitchFamily="49" charset="0"/>
-              </a:rPr>
-              <a:t>=</a:t>
-            </a:r>
-            <a:r>
-              <a:rPr lang="nb-NO" b="0" i="0" dirty="0">
-                <a:effectLst/>
-                <a:latin typeface="Courier New" panose="02070309020205020404" pitchFamily="49" charset="0"/>
-              </a:rPr>
-              <a:t> </a:t>
-            </a:r>
-            <a:r>
-              <a:rPr lang="nb-NO" b="0" i="0" dirty="0">
-                <a:solidFill>
-                  <a:srgbClr val="66D9EF"/>
-                </a:solidFill>
-                <a:effectLst/>
-                <a:latin typeface="Courier New" panose="02070309020205020404" pitchFamily="49" charset="0"/>
-              </a:rPr>
-              <a:t>new</a:t>
-            </a:r>
-            <a:r>
-              <a:rPr lang="nb-NO" b="0" i="0" dirty="0">
-                <a:effectLst/>
-                <a:latin typeface="Courier New" panose="02070309020205020404" pitchFamily="49" charset="0"/>
-              </a:rPr>
-              <a:t> SqlCommand(); </a:t>
-            </a:r>
-          </a:p>
-          <a:p>
-            <a:pPr marL="177800" lvl="1" indent="0">
-              <a:buNone/>
-            </a:pPr>
-            <a:r>
-              <a:rPr lang="nb-NO" b="0" i="0" dirty="0">
-                <a:effectLst/>
-                <a:latin typeface="Courier New" panose="02070309020205020404" pitchFamily="49" charset="0"/>
-              </a:rPr>
-              <a:t>var </a:t>
-            </a:r>
-            <a:r>
-              <a:rPr lang="nb-NO" b="0" i="0" dirty="0">
-                <a:solidFill>
-                  <a:srgbClr val="66D9EF"/>
-                </a:solidFill>
-                <a:effectLst/>
-                <a:latin typeface="Courier New" panose="02070309020205020404" pitchFamily="49" charset="0"/>
-              </a:rPr>
-              <a:t>sql</a:t>
-            </a:r>
-            <a:r>
-              <a:rPr lang="nb-NO" b="0" i="0" dirty="0">
-                <a:effectLst/>
-                <a:latin typeface="Courier New" panose="02070309020205020404" pitchFamily="49" charset="0"/>
-              </a:rPr>
-              <a:t> </a:t>
-            </a:r>
-            <a:r>
-              <a:rPr lang="nb-NO" b="0" i="0" dirty="0">
-                <a:solidFill>
-                  <a:srgbClr val="F92672"/>
-                </a:solidFill>
-                <a:effectLst/>
-                <a:latin typeface="Courier New" panose="02070309020205020404" pitchFamily="49" charset="0"/>
-              </a:rPr>
-              <a:t>=</a:t>
-            </a:r>
-            <a:r>
-              <a:rPr lang="nb-NO" b="0" i="0" dirty="0">
-                <a:effectLst/>
-                <a:latin typeface="Courier New" panose="02070309020205020404" pitchFamily="49" charset="0"/>
-              </a:rPr>
-              <a:t> </a:t>
-            </a:r>
-            <a:r>
-              <a:rPr lang="nb-NO" b="0" i="0" dirty="0">
-                <a:solidFill>
-                  <a:srgbClr val="E6DB74"/>
-                </a:solidFill>
-                <a:effectLst/>
-                <a:latin typeface="Courier New" panose="02070309020205020404" pitchFamily="49" charset="0"/>
-              </a:rPr>
-              <a:t>"</a:t>
-            </a:r>
-            <a:r>
-              <a:rPr lang="nb-NO" b="0" i="0" dirty="0">
-                <a:solidFill>
-                  <a:srgbClr val="B45EA4"/>
-                </a:solidFill>
-                <a:effectLst/>
-                <a:latin typeface="Courier New" panose="02070309020205020404" pitchFamily="49" charset="0"/>
-              </a:rPr>
-              <a:t>SELECT</a:t>
-            </a:r>
-            <a:r>
-              <a:rPr lang="nb-NO" b="0" i="0" dirty="0">
-                <a:solidFill>
-                  <a:srgbClr val="E6DB74"/>
-                </a:solidFill>
-                <a:effectLst/>
-                <a:latin typeface="Courier New" panose="02070309020205020404" pitchFamily="49" charset="0"/>
-              </a:rPr>
-              <a:t> * </a:t>
-            </a:r>
-            <a:r>
-              <a:rPr lang="nb-NO" b="0" i="0" dirty="0">
-                <a:solidFill>
-                  <a:srgbClr val="B45EA4"/>
-                </a:solidFill>
-                <a:effectLst/>
-                <a:latin typeface="Courier New" panose="02070309020205020404" pitchFamily="49" charset="0"/>
-              </a:rPr>
-              <a:t>FROM</a:t>
-            </a:r>
-            <a:r>
-              <a:rPr lang="nb-NO" b="0" i="0" dirty="0">
-                <a:solidFill>
-                  <a:srgbClr val="E6DB74"/>
-                </a:solidFill>
-                <a:effectLst/>
-                <a:latin typeface="Courier New" panose="02070309020205020404" pitchFamily="49" charset="0"/>
-              </a:rPr>
-              <a:t> TBL_USER_MASTER </a:t>
-            </a:r>
-            <a:r>
-              <a:rPr lang="nb-NO" b="0" i="0" dirty="0">
-                <a:solidFill>
-                  <a:srgbClr val="B45EA4"/>
-                </a:solidFill>
-                <a:effectLst/>
-                <a:latin typeface="Courier New" panose="02070309020205020404" pitchFamily="49" charset="0"/>
-              </a:rPr>
-              <a:t>WHERE</a:t>
-            </a:r>
-            <a:r>
-              <a:rPr lang="nb-NO" b="0" i="0" dirty="0">
-                <a:solidFill>
-                  <a:srgbClr val="E6DB74"/>
-                </a:solidFill>
-                <a:effectLst/>
-                <a:latin typeface="Courier New" panose="02070309020205020404" pitchFamily="49" charset="0"/>
-              </a:rPr>
-              <a:t> USER_NAME = @parameter</a:t>
-            </a:r>
-            <a:r>
-              <a:rPr lang="nb-NO" b="0" i="0" dirty="0">
-                <a:solidFill>
-                  <a:srgbClr val="4FB4D7"/>
-                </a:solidFill>
-                <a:effectLst/>
-                <a:latin typeface="Courier New" panose="02070309020205020404" pitchFamily="49" charset="0"/>
-              </a:rPr>
-              <a:t>"; sqlCommand.CommandText = sql; </a:t>
-            </a:r>
-          </a:p>
-          <a:p>
-            <a:pPr marL="177800" lvl="1" indent="0">
-              <a:buNone/>
-            </a:pPr>
-            <a:r>
-              <a:rPr lang="nb-NO" b="0" i="0" dirty="0">
-                <a:solidFill>
-                  <a:srgbClr val="4FB4D7"/>
-                </a:solidFill>
-                <a:effectLst/>
-                <a:latin typeface="Courier New" panose="02070309020205020404" pitchFamily="49" charset="0"/>
-              </a:rPr>
-              <a:t>// Add the Parameter </a:t>
-            </a:r>
-          </a:p>
-          <a:p>
-            <a:pPr marL="177800" lvl="1" indent="0">
-              <a:buNone/>
-            </a:pPr>
-            <a:r>
-              <a:rPr lang="nb-NO" b="0" i="0" dirty="0">
-                <a:solidFill>
-                  <a:srgbClr val="4FB4D7"/>
-                </a:solidFill>
-                <a:effectLst/>
-                <a:latin typeface="Courier New" panose="02070309020205020404" pitchFamily="49" charset="0"/>
-              </a:rPr>
-              <a:t>sqlCommand.Parameters.AddWithValue("</a:t>
-            </a:r>
-            <a:r>
-              <a:rPr lang="nb-NO" b="0" i="0" dirty="0">
-                <a:solidFill>
-                  <a:srgbClr val="E6DB74"/>
-                </a:solidFill>
-                <a:effectLst/>
-                <a:latin typeface="Courier New" panose="02070309020205020404" pitchFamily="49" charset="0"/>
-              </a:rPr>
-              <a:t>parameter</a:t>
-            </a:r>
-            <a:r>
-              <a:rPr lang="nb-NO" b="0" i="0" dirty="0">
-                <a:solidFill>
-                  <a:srgbClr val="4FB4D7"/>
-                </a:solidFill>
-                <a:effectLst/>
-                <a:latin typeface="Courier New" panose="02070309020205020404" pitchFamily="49" charset="0"/>
-              </a:rPr>
-              <a:t>", "</a:t>
-            </a:r>
-            <a:r>
-              <a:rPr lang="nb-NO" b="0" i="0" dirty="0">
-                <a:solidFill>
-                  <a:srgbClr val="E6DB74"/>
-                </a:solidFill>
-                <a:effectLst/>
-                <a:latin typeface="Courier New" panose="02070309020205020404" pitchFamily="49" charset="0"/>
-              </a:rPr>
-              <a:t>sebastian</a:t>
-            </a:r>
-            <a:r>
-              <a:rPr lang="nb-NO" b="0" i="0" dirty="0">
-                <a:solidFill>
-                  <a:srgbClr val="4FB4D7"/>
-                </a:solidFill>
-                <a:effectLst/>
-                <a:latin typeface="Courier New" panose="02070309020205020404" pitchFamily="49" charset="0"/>
-              </a:rPr>
-              <a:t>"); </a:t>
-            </a:r>
-          </a:p>
-          <a:p>
-            <a:pPr marL="177800" lvl="1" indent="0">
-              <a:buNone/>
-            </a:pPr>
-            <a:r>
-              <a:rPr lang="nb-NO" b="0" i="0" dirty="0">
-                <a:solidFill>
-                  <a:srgbClr val="4FB4D7"/>
-                </a:solidFill>
-                <a:effectLst/>
-                <a:latin typeface="Courier New" panose="02070309020205020404" pitchFamily="49" charset="0"/>
-              </a:rPr>
-              <a:t>// Execute the query and do something with it </a:t>
-            </a:r>
-          </a:p>
-          <a:p>
-            <a:pPr marL="177800" lvl="1" indent="0">
-              <a:buNone/>
-            </a:pPr>
-            <a:r>
-              <a:rPr lang="nb-NO" b="0" i="0" dirty="0">
-                <a:solidFill>
-                  <a:srgbClr val="4FB4D7"/>
-                </a:solidFill>
-                <a:effectLst/>
-                <a:latin typeface="Courier New" panose="02070309020205020404" pitchFamily="49" charset="0"/>
-              </a:rPr>
-              <a:t>var reader = sqlCommand.ExecuteReader();</a:t>
-            </a:r>
-            <a:endParaRPr lang="en-US" dirty="0"/>
+              <a:t>😍</a:t>
+            </a:r>
+          </a:p>
+        </p:txBody>
+      </p:sp>
+      <p:sp>
+        <p:nvSpPr>
+          <p:cNvPr id="17" name="Rectangle 16">
+            <a:extLst>
+              <a:ext uri="{FF2B5EF4-FFF2-40B4-BE49-F238E27FC236}">
+                <a16:creationId xmlns:a16="http://schemas.microsoft.com/office/drawing/2014/main" id="{CA3786E2-D580-2A6A-237B-B8595A5B3093}"/>
+              </a:ext>
+            </a:extLst>
+          </p:cNvPr>
+          <p:cNvSpPr/>
+          <p:nvPr/>
+        </p:nvSpPr>
+        <p:spPr>
+          <a:xfrm>
+            <a:off x="2133600" y="4267200"/>
+            <a:ext cx="2203664" cy="270962"/>
+          </a:xfrm>
+          <a:prstGeom prst="rect">
+            <a:avLst/>
+          </a:prstGeom>
+          <a:noFill/>
+          <a:ln w="28575">
+            <a:solidFill>
+              <a:srgbClr val="FF0000"/>
+            </a:solidFill>
+          </a:ln>
+        </p:spPr>
+        <p:style>
+          <a:lnRef idx="2">
+            <a:schemeClr val="accent1">
+              <a:shade val="50000"/>
+            </a:schemeClr>
+          </a:lnRef>
+          <a:fillRef idx="1">
+            <a:schemeClr val="accent1"/>
+          </a:fillRef>
+          <a:effectRef idx="0">
+            <a:schemeClr val="accent1"/>
+          </a:effectRef>
+          <a:fontRef idx="minor">
+            <a:schemeClr val="lt1"/>
+          </a:fontRef>
+        </p:style>
+        <p:txBody>
+          <a:bodyPr rtlCol="0" anchor="ctr"/>
+          <a:lstStyle/>
+          <a:p>
+            <a:pPr algn="ctr"/>
+            <a:endParaRPr lang="nb-NO">
+              <a:solidFill>
+                <a:schemeClr val="bg1"/>
+              </a:solidFill>
+            </a:endParaRPr>
+          </a:p>
+        </p:txBody>
+      </p:sp>
+      <p:sp>
+        <p:nvSpPr>
+          <p:cNvPr id="18" name="Rectangle 17">
+            <a:extLst>
+              <a:ext uri="{FF2B5EF4-FFF2-40B4-BE49-F238E27FC236}">
+                <a16:creationId xmlns:a16="http://schemas.microsoft.com/office/drawing/2014/main" id="{0EEA94A8-589C-B54E-8AFA-546F4548D5FD}"/>
+              </a:ext>
+            </a:extLst>
+          </p:cNvPr>
+          <p:cNvSpPr/>
+          <p:nvPr/>
+        </p:nvSpPr>
+        <p:spPr>
+          <a:xfrm>
+            <a:off x="2362200" y="5630639"/>
+            <a:ext cx="2003331" cy="327864"/>
+          </a:xfrm>
+          <a:prstGeom prst="rect">
+            <a:avLst/>
+          </a:prstGeom>
+          <a:noFill/>
+          <a:ln w="28575">
+            <a:solidFill>
+              <a:srgbClr val="FF0000"/>
+            </a:solidFill>
+          </a:ln>
+        </p:spPr>
+        <p:style>
+          <a:lnRef idx="2">
+            <a:schemeClr val="accent1">
+              <a:shade val="50000"/>
+            </a:schemeClr>
+          </a:lnRef>
+          <a:fillRef idx="1">
+            <a:schemeClr val="accent1"/>
+          </a:fillRef>
+          <a:effectRef idx="0">
+            <a:schemeClr val="accent1"/>
+          </a:effectRef>
+          <a:fontRef idx="minor">
+            <a:schemeClr val="lt1"/>
+          </a:fontRef>
+        </p:style>
+        <p:txBody>
+          <a:bodyPr rtlCol="0" anchor="ctr"/>
+          <a:lstStyle/>
+          <a:p>
+            <a:pPr algn="ctr"/>
+            <a:endParaRPr lang="nb-NO">
+              <a:solidFill>
+                <a:schemeClr val="bg1"/>
+              </a:solidFill>
+            </a:endParaRPr>
           </a:p>
         </p:txBody>
       </p:sp>
     </p:spTree>
     <p:extLst>
       <p:ext uri="{BB962C8B-B14F-4D97-AF65-F5344CB8AC3E}">
-        <p14:creationId xmlns:p14="http://schemas.microsoft.com/office/powerpoint/2010/main" val="3552202885"/>
+        <p14:creationId xmlns:p14="http://schemas.microsoft.com/office/powerpoint/2010/main" val="588271550"/>
       </p:ext>
     </p:extLst>
   </p:cSld>
@@ -20321,7 +20644,13 @@
   <p:cSld>
     <p:spTree>
       <p:nvGrpSpPr>
-        <p:cNvPr id="1" name=""/>
+        <p:cNvPr id="1" name="">
+          <a:extLst>
+            <a:ext uri="{FF2B5EF4-FFF2-40B4-BE49-F238E27FC236}">
+              <a16:creationId xmlns:a16="http://schemas.microsoft.com/office/drawing/2014/main" id="{0AB9AD8A-131E-38A6-E503-73F55C263491}"/>
+            </a:ext>
+          </a:extLst>
+        </p:cNvPr>
         <p:cNvGrpSpPr/>
         <p:nvPr/>
       </p:nvGrpSpPr>
@@ -20335,18 +20664,18 @@
       </p:grpSpPr>
       <p:sp>
         <p:nvSpPr>
-          <p:cNvPr id="7" name="Title 6">
-            <a:extLst>
-              <a:ext uri="{FF2B5EF4-FFF2-40B4-BE49-F238E27FC236}">
-                <a16:creationId xmlns:a16="http://schemas.microsoft.com/office/drawing/2014/main" id="{7C6694EB-31D5-0121-E083-67D2034C1BA6}"/>
-              </a:ext>
-            </a:extLst>
-          </p:cNvPr>
-          <p:cNvSpPr>
-            <a:spLocks noGrp="1"/>
-          </p:cNvSpPr>
-          <p:nvPr>
-            <p:ph type="title"/>
+          <p:cNvPr id="16" name="Subtitle 15">
+            <a:extLst>
+              <a:ext uri="{FF2B5EF4-FFF2-40B4-BE49-F238E27FC236}">
+                <a16:creationId xmlns:a16="http://schemas.microsoft.com/office/drawing/2014/main" id="{04BD68CF-D646-F720-3EF8-302F26F5D604}"/>
+              </a:ext>
+            </a:extLst>
+          </p:cNvPr>
+          <p:cNvSpPr>
+            <a:spLocks noGrp="1"/>
+          </p:cNvSpPr>
+          <p:nvPr>
+            <p:ph type="subTitle" idx="16"/>
           </p:nvPr>
         </p:nvSpPr>
         <p:spPr/>
@@ -20356,32 +20685,25 @@
           <a:p>
             <a:r>
               <a:rPr lang="en-US" dirty="0"/>
-              <a:t>We are done</a:t>
-            </a:r>
-            <a:br>
-              <a:rPr lang="en-US" dirty="0"/>
-            </a:br>
-            <a:r>
-              <a:rPr lang="en-US" dirty="0"/>
-              <a:t>Keep on learning!</a:t>
-            </a:r>
-          </a:p>
-        </p:txBody>
-      </p:sp>
-      <p:sp>
-        <p:nvSpPr>
-          <p:cNvPr id="5" name="Footer Placeholder 4">
-            <a:extLst>
-              <a:ext uri="{FF2B5EF4-FFF2-40B4-BE49-F238E27FC236}">
-                <a16:creationId xmlns:a16="http://schemas.microsoft.com/office/drawing/2014/main" id="{822E6FDC-FAB9-FACE-8B7E-D245677B20DF}"/>
-              </a:ext>
-            </a:extLst>
-          </p:cNvPr>
-          <p:cNvSpPr>
-            <a:spLocks noGrp="1"/>
-          </p:cNvSpPr>
-          <p:nvPr>
-            <p:ph type="ftr" sz="quarter" idx="10"/>
+              <a:t>GitHub Actions</a:t>
+            </a:r>
+          </a:p>
+        </p:txBody>
+      </p:sp>
+      <p:sp>
+        <p:nvSpPr>
+          <p:cNvPr id="14" name="Title 13">
+            <a:extLst>
+              <a:ext uri="{FF2B5EF4-FFF2-40B4-BE49-F238E27FC236}">
+                <a16:creationId xmlns:a16="http://schemas.microsoft.com/office/drawing/2014/main" id="{4E31435B-4D1E-CE0C-5128-1EF0B4564284}"/>
+              </a:ext>
+            </a:extLst>
+          </p:cNvPr>
+          <p:cNvSpPr>
+            <a:spLocks noGrp="1"/>
+          </p:cNvSpPr>
+          <p:nvPr>
+            <p:ph type="title"/>
           </p:nvPr>
         </p:nvSpPr>
         <p:spPr/>
@@ -20391,71 +20713,214 @@
           <a:p>
             <a:r>
               <a:rPr lang="en-US" dirty="0"/>
-              <a:t>Storage &amp; Databases</a:t>
-            </a:r>
-            <a:endParaRPr lang="sv-SE" dirty="0"/>
-          </a:p>
-        </p:txBody>
-      </p:sp>
-      <p:sp>
-        <p:nvSpPr>
-          <p:cNvPr id="6" name="Slide Number Placeholder 5">
-            <a:extLst>
-              <a:ext uri="{FF2B5EF4-FFF2-40B4-BE49-F238E27FC236}">
-                <a16:creationId xmlns:a16="http://schemas.microsoft.com/office/drawing/2014/main" id="{C4CCDD1C-691B-3594-D7F2-C87AB5B284DC}"/>
-              </a:ext>
-            </a:extLst>
-          </p:cNvPr>
-          <p:cNvSpPr>
-            <a:spLocks noGrp="1"/>
-          </p:cNvSpPr>
-          <p:nvPr>
-            <p:ph type="sldNum" sz="quarter" idx="11"/>
-          </p:nvPr>
-        </p:nvSpPr>
-        <p:spPr/>
+              <a:t>Security – SQL Injection</a:t>
+            </a:r>
+          </a:p>
+        </p:txBody>
+      </p:sp>
+      <p:sp>
+        <p:nvSpPr>
+          <p:cNvPr id="5" name="Footer Placeholder 4">
+            <a:extLst>
+              <a:ext uri="{FF2B5EF4-FFF2-40B4-BE49-F238E27FC236}">
+                <a16:creationId xmlns:a16="http://schemas.microsoft.com/office/drawing/2014/main" id="{2B9D26A8-A027-6EAC-034C-445449A1EA57}"/>
+              </a:ext>
+            </a:extLst>
+          </p:cNvPr>
+          <p:cNvSpPr>
+            <a:spLocks noGrp="1"/>
+          </p:cNvSpPr>
+          <p:nvPr>
+            <p:ph type="ftr" sz="quarter" idx="17"/>
+          </p:nvPr>
+        </p:nvSpPr>
+        <p:spPr>
+          <a:xfrm>
+            <a:off x="473371" y="6575008"/>
+            <a:ext cx="3600000" cy="144000"/>
+          </a:xfrm>
+        </p:spPr>
         <p:txBody>
           <a:bodyPr/>
           <a:lstStyle/>
           <a:p>
+            <a:r>
+              <a:rPr lang="en-US" dirty="0"/>
+              <a:t>Storage &amp; Databases</a:t>
+            </a:r>
+          </a:p>
+        </p:txBody>
+      </p:sp>
+      <p:sp>
+        <p:nvSpPr>
+          <p:cNvPr id="6" name="Slide Number Placeholder 5">
+            <a:extLst>
+              <a:ext uri="{FF2B5EF4-FFF2-40B4-BE49-F238E27FC236}">
+                <a16:creationId xmlns:a16="http://schemas.microsoft.com/office/drawing/2014/main" id="{16703104-EAD3-336F-EDEF-2F001F67F50A}"/>
+              </a:ext>
+            </a:extLst>
+          </p:cNvPr>
+          <p:cNvSpPr>
+            <a:spLocks noGrp="1"/>
+          </p:cNvSpPr>
+          <p:nvPr>
+            <p:ph type="sldNum" sz="quarter" idx="18"/>
+          </p:nvPr>
+        </p:nvSpPr>
+        <p:spPr>
+          <a:xfrm>
+            <a:off x="5736000" y="6575008"/>
+            <a:ext cx="720000" cy="144000"/>
+          </a:xfrm>
+        </p:spPr>
+        <p:txBody>
+          <a:bodyPr/>
+          <a:lstStyle/>
+          <a:p>
             <a:fld id="{89578386-84DA-45F9-ABB1-FE09AA2697D8}" type="slidenum">
-              <a:rPr lang="sv-SE" smtClean="0"/>
+              <a:rPr lang="en-US" smtClean="0"/>
               <a:pPr/>
               <a:t>19</a:t>
             </a:fld>
-            <a:endParaRPr lang="sv-SE"/>
-          </a:p>
-        </p:txBody>
-      </p:sp>
-      <p:sp>
-        <p:nvSpPr>
-          <p:cNvPr id="8" name="Subtitle 7">
-            <a:extLst>
-              <a:ext uri="{FF2B5EF4-FFF2-40B4-BE49-F238E27FC236}">
-                <a16:creationId xmlns:a16="http://schemas.microsoft.com/office/drawing/2014/main" id="{4CD2AE71-DBCC-4071-DAA7-DF2B1CF6172C}"/>
-              </a:ext>
-            </a:extLst>
-          </p:cNvPr>
-          <p:cNvSpPr>
-            <a:spLocks noGrp="1"/>
-          </p:cNvSpPr>
-          <p:nvPr>
-            <p:ph type="subTitle" idx="16"/>
+            <a:endParaRPr lang="en-US" dirty="0"/>
+          </a:p>
+        </p:txBody>
+      </p:sp>
+      <p:sp>
+        <p:nvSpPr>
+          <p:cNvPr id="3" name="Content Placeholder 2">
+            <a:extLst>
+              <a:ext uri="{FF2B5EF4-FFF2-40B4-BE49-F238E27FC236}">
+                <a16:creationId xmlns:a16="http://schemas.microsoft.com/office/drawing/2014/main" id="{C51DC355-C693-6B22-A7FA-A646126084C2}"/>
+              </a:ext>
+            </a:extLst>
+          </p:cNvPr>
+          <p:cNvSpPr>
+            <a:spLocks noGrp="1"/>
+          </p:cNvSpPr>
+          <p:nvPr>
+            <p:ph sz="half" idx="1"/>
           </p:nvPr>
         </p:nvSpPr>
         <p:spPr/>
         <p:txBody>
-          <a:bodyPr/>
+          <a:bodyPr>
+            <a:normAutofit fontScale="92500" lnSpcReduction="20000"/>
+          </a:bodyPr>
           <a:lstStyle/>
           <a:p>
+            <a:pPr marL="177800" lvl="1" indent="0">
+              <a:buNone/>
+            </a:pPr>
+            <a:r>
+              <a:rPr lang="en-US" dirty="0"/>
+              <a:t>From Owasp: </a:t>
+            </a:r>
+            <a:r>
+              <a:rPr lang="en-US" dirty="0">
+                <a:solidFill>
+                  <a:srgbClr val="0070C0"/>
+                </a:solidFill>
+                <a:hlinkClick r:id="rId3">
+                  <a:extLst>
+                    <a:ext uri="{A12FA001-AC4F-418D-AE19-62706E023703}">
+                      <ahyp:hlinkClr xmlns:ahyp="http://schemas.microsoft.com/office/drawing/2018/hyperlinkcolor" val="tx"/>
+                    </a:ext>
+                  </a:extLst>
+                </a:hlinkClick>
+              </a:rPr>
+              <a:t>https://owasp.org/www-community/attacks/SQL_Injection</a:t>
+            </a:r>
+            <a:endParaRPr lang="en-US" dirty="0">
+              <a:solidFill>
+                <a:srgbClr val="0070C0"/>
+              </a:solidFill>
+            </a:endParaRPr>
+          </a:p>
+          <a:p>
+            <a:pPr marL="177800" lvl="1" indent="0">
+              <a:buNone/>
+            </a:pPr>
+            <a:r>
+              <a:rPr lang="en-US" dirty="0"/>
+              <a:t>“A SQL injection attack consists of insertion or “injection” of a SQL query via the input data from the client to the application. A successful SQL injection exploit can read sensitive data from the database, modify database data (Insert/Update/Delete), execute administration operations on the database (such as shutdown the DBMS), recover the content of a given file present on the DBMS file system and in some cases issue commands to the operating system. SQL injection attacks are a type of injection attack, in which SQL commands are injected into data-plane input in order to affect the execution of predefined SQL commands.”</a:t>
+            </a:r>
+          </a:p>
+          <a:p>
+            <a:pPr marL="177800" lvl="1" indent="0">
+              <a:buNone/>
+            </a:pPr>
             <a:endParaRPr lang="en-US" dirty="0"/>
+          </a:p>
+          <a:p>
+            <a:pPr marL="177800" lvl="1" indent="0">
+              <a:buNone/>
+            </a:pPr>
+            <a:r>
+              <a:rPr lang="en-US" dirty="0"/>
+              <a:t>Example:</a:t>
+            </a:r>
+          </a:p>
+          <a:p>
+            <a:pPr marL="177800" lvl="1" indent="0">
+              <a:buNone/>
+            </a:pPr>
+            <a:r>
+              <a:rPr lang="en-US" dirty="0"/>
+              <a:t>Code concatenates parameter from API with rest of statement:</a:t>
+            </a:r>
+          </a:p>
+          <a:p>
+            <a:pPr marL="177800" lvl="1" indent="0">
+              <a:buNone/>
+            </a:pPr>
+            <a:r>
+              <a:rPr lang="en-US" dirty="0"/>
+              <a:t>string sqlStatement = “SELECT * FROM [DBO].[Artist] WHERE [LastName] = ‘” + lastName + “’”;</a:t>
+            </a:r>
+          </a:p>
+          <a:p>
+            <a:pPr marL="177800" lvl="1" indent="0">
+              <a:buNone/>
+            </a:pPr>
+            <a:r>
+              <a:rPr lang="en-US" dirty="0"/>
+              <a:t>But what if the parameter “lastName”  contains the following?</a:t>
+            </a:r>
+          </a:p>
+          <a:p>
+            <a:pPr marL="177800" lvl="1" indent="0">
+              <a:buNone/>
+            </a:pPr>
+            <a:r>
+              <a:rPr lang="en-US" dirty="0"/>
+              <a:t>“hacker';SELECT * FROM sys.Tables’;SELECT ‘”</a:t>
+            </a:r>
+          </a:p>
+          <a:p>
+            <a:pPr marL="177800" lvl="1" indent="0">
+              <a:buNone/>
+            </a:pPr>
+            <a:r>
+              <a:rPr lang="en-US" dirty="0"/>
+              <a:t>Result in the valid query:</a:t>
+            </a:r>
+          </a:p>
+          <a:p>
+            <a:pPr marL="177800" lvl="1" indent="0">
+              <a:buNone/>
+            </a:pPr>
+            <a:r>
+              <a:rPr lang="en-US" dirty="0"/>
+              <a:t>“SELECT * FROM [DBO].[Artist] WHERE [LastName] = 'hacker';SELECT * FROM sys.Tables;SELECT ‘’”</a:t>
+            </a:r>
           </a:p>
         </p:txBody>
       </p:sp>
     </p:spTree>
     <p:extLst>
       <p:ext uri="{BB962C8B-B14F-4D97-AF65-F5344CB8AC3E}">
-        <p14:creationId xmlns:p14="http://schemas.microsoft.com/office/powerpoint/2010/main" val="4056130801"/>
+        <p14:creationId xmlns:p14="http://schemas.microsoft.com/office/powerpoint/2010/main" val="2690010389"/>
       </p:ext>
     </p:extLst>
   </p:cSld>
@@ -20601,6 +21066,639 @@
 </p:sld>
 </file>
 
+<file path=ppt/slides/slide20.xml><?xml version="1.0" encoding="utf-8"?>
+<p:sld xmlns:a="http://schemas.openxmlformats.org/drawingml/2006/main" xmlns:r="http://schemas.openxmlformats.org/officeDocument/2006/relationships" xmlns:p="http://schemas.openxmlformats.org/presentationml/2006/main">
+  <p:cSld>
+    <p:spTree>
+      <p:nvGrpSpPr>
+        <p:cNvPr id="1" name="">
+          <a:extLst>
+            <a:ext uri="{FF2B5EF4-FFF2-40B4-BE49-F238E27FC236}">
+              <a16:creationId xmlns:a16="http://schemas.microsoft.com/office/drawing/2014/main" id="{929A8DC9-C321-4FF5-6BA0-AE4E3A774C69}"/>
+            </a:ext>
+          </a:extLst>
+        </p:cNvPr>
+        <p:cNvGrpSpPr/>
+        <p:nvPr/>
+      </p:nvGrpSpPr>
+      <p:grpSpPr>
+        <a:xfrm>
+          <a:off x="0" y="0"/>
+          <a:ext cx="0" cy="0"/>
+          <a:chOff x="0" y="0"/>
+          <a:chExt cx="0" cy="0"/>
+        </a:xfrm>
+      </p:grpSpPr>
+      <p:sp>
+        <p:nvSpPr>
+          <p:cNvPr id="16" name="Subtitle 15">
+            <a:extLst>
+              <a:ext uri="{FF2B5EF4-FFF2-40B4-BE49-F238E27FC236}">
+                <a16:creationId xmlns:a16="http://schemas.microsoft.com/office/drawing/2014/main" id="{8AC607C0-1B7F-7AA7-C6F2-016FD6C12831}"/>
+              </a:ext>
+            </a:extLst>
+          </p:cNvPr>
+          <p:cNvSpPr>
+            <a:spLocks noGrp="1"/>
+          </p:cNvSpPr>
+          <p:nvPr>
+            <p:ph type="subTitle" idx="16"/>
+          </p:nvPr>
+        </p:nvSpPr>
+        <p:spPr/>
+        <p:txBody>
+          <a:bodyPr/>
+          <a:lstStyle/>
+          <a:p>
+            <a:r>
+              <a:rPr lang="en-US" dirty="0"/>
+              <a:t>GitHub Actions</a:t>
+            </a:r>
+          </a:p>
+        </p:txBody>
+      </p:sp>
+      <p:sp>
+        <p:nvSpPr>
+          <p:cNvPr id="14" name="Title 13">
+            <a:extLst>
+              <a:ext uri="{FF2B5EF4-FFF2-40B4-BE49-F238E27FC236}">
+                <a16:creationId xmlns:a16="http://schemas.microsoft.com/office/drawing/2014/main" id="{70F05060-4C66-21A1-DCA2-9A3F83DB6456}"/>
+              </a:ext>
+            </a:extLst>
+          </p:cNvPr>
+          <p:cNvSpPr>
+            <a:spLocks noGrp="1"/>
+          </p:cNvSpPr>
+          <p:nvPr>
+            <p:ph type="title"/>
+          </p:nvPr>
+        </p:nvSpPr>
+        <p:spPr/>
+        <p:txBody>
+          <a:bodyPr/>
+          <a:lstStyle/>
+          <a:p>
+            <a:r>
+              <a:rPr lang="en-US" dirty="0"/>
+              <a:t>Security – SQL Injection</a:t>
+            </a:r>
+          </a:p>
+        </p:txBody>
+      </p:sp>
+      <p:sp>
+        <p:nvSpPr>
+          <p:cNvPr id="5" name="Footer Placeholder 4">
+            <a:extLst>
+              <a:ext uri="{FF2B5EF4-FFF2-40B4-BE49-F238E27FC236}">
+                <a16:creationId xmlns:a16="http://schemas.microsoft.com/office/drawing/2014/main" id="{B766C258-4D2B-F09E-F48A-11ED2704B28B}"/>
+              </a:ext>
+            </a:extLst>
+          </p:cNvPr>
+          <p:cNvSpPr>
+            <a:spLocks noGrp="1"/>
+          </p:cNvSpPr>
+          <p:nvPr>
+            <p:ph type="ftr" sz="quarter" idx="17"/>
+          </p:nvPr>
+        </p:nvSpPr>
+        <p:spPr>
+          <a:xfrm>
+            <a:off x="473371" y="6575008"/>
+            <a:ext cx="3600000" cy="144000"/>
+          </a:xfrm>
+        </p:spPr>
+        <p:txBody>
+          <a:bodyPr/>
+          <a:lstStyle/>
+          <a:p>
+            <a:r>
+              <a:rPr lang="en-US" dirty="0"/>
+              <a:t>Storage &amp; Databases</a:t>
+            </a:r>
+          </a:p>
+        </p:txBody>
+      </p:sp>
+      <p:sp>
+        <p:nvSpPr>
+          <p:cNvPr id="6" name="Slide Number Placeholder 5">
+            <a:extLst>
+              <a:ext uri="{FF2B5EF4-FFF2-40B4-BE49-F238E27FC236}">
+                <a16:creationId xmlns:a16="http://schemas.microsoft.com/office/drawing/2014/main" id="{A223B8A3-BBDE-E824-8B18-E4838B4DE98F}"/>
+              </a:ext>
+            </a:extLst>
+          </p:cNvPr>
+          <p:cNvSpPr>
+            <a:spLocks noGrp="1"/>
+          </p:cNvSpPr>
+          <p:nvPr>
+            <p:ph type="sldNum" sz="quarter" idx="18"/>
+          </p:nvPr>
+        </p:nvSpPr>
+        <p:spPr>
+          <a:xfrm>
+            <a:off x="5736000" y="6575008"/>
+            <a:ext cx="720000" cy="144000"/>
+          </a:xfrm>
+        </p:spPr>
+        <p:txBody>
+          <a:bodyPr/>
+          <a:lstStyle/>
+          <a:p>
+            <a:fld id="{89578386-84DA-45F9-ABB1-FE09AA2697D8}" type="slidenum">
+              <a:rPr lang="en-US" smtClean="0"/>
+              <a:pPr/>
+              <a:t>20</a:t>
+            </a:fld>
+            <a:endParaRPr lang="en-US" dirty="0"/>
+          </a:p>
+        </p:txBody>
+      </p:sp>
+      <p:sp>
+        <p:nvSpPr>
+          <p:cNvPr id="3" name="Content Placeholder 2">
+            <a:extLst>
+              <a:ext uri="{FF2B5EF4-FFF2-40B4-BE49-F238E27FC236}">
+                <a16:creationId xmlns:a16="http://schemas.microsoft.com/office/drawing/2014/main" id="{48CBBFF6-0649-1195-DF8C-639E74246489}"/>
+              </a:ext>
+            </a:extLst>
+          </p:cNvPr>
+          <p:cNvSpPr>
+            <a:spLocks noGrp="1"/>
+          </p:cNvSpPr>
+          <p:nvPr>
+            <p:ph sz="half" idx="1"/>
+          </p:nvPr>
+        </p:nvSpPr>
+        <p:spPr/>
+        <p:txBody>
+          <a:bodyPr>
+            <a:normAutofit/>
+          </a:bodyPr>
+          <a:lstStyle/>
+          <a:p>
+            <a:pPr marL="177800" lvl="1" indent="0">
+              <a:buNone/>
+            </a:pPr>
+            <a:r>
+              <a:rPr lang="en-US" dirty="0"/>
+              <a:t>How to avoid:</a:t>
+            </a:r>
+          </a:p>
+          <a:p>
+            <a:pPr marL="177800" lvl="1" indent="0">
+              <a:buNone/>
+            </a:pPr>
+            <a:r>
+              <a:rPr lang="en-US" dirty="0"/>
+              <a:t>Use frameworks for executing queries</a:t>
+            </a:r>
+          </a:p>
+          <a:p>
+            <a:pPr marL="177800" lvl="1" indent="0">
+              <a:buNone/>
+            </a:pPr>
+            <a:r>
+              <a:rPr lang="en-US" dirty="0"/>
+              <a:t>Example in C# using the “SqlCommand” class with a parameterized query and adding parameters to the SqlCommand before executing the query:</a:t>
+            </a:r>
+          </a:p>
+          <a:p>
+            <a:pPr marL="177800" lvl="1" indent="0">
+              <a:buNone/>
+            </a:pPr>
+            <a:r>
+              <a:rPr lang="nb-NO" b="0" i="0" dirty="0">
+                <a:effectLst/>
+                <a:latin typeface="Courier New" panose="02070309020205020404" pitchFamily="49" charset="0"/>
+              </a:rPr>
+              <a:t>var sqlCommand </a:t>
+            </a:r>
+            <a:r>
+              <a:rPr lang="nb-NO" b="0" i="0" dirty="0">
+                <a:solidFill>
+                  <a:srgbClr val="F92672"/>
+                </a:solidFill>
+                <a:effectLst/>
+                <a:latin typeface="Courier New" panose="02070309020205020404" pitchFamily="49" charset="0"/>
+              </a:rPr>
+              <a:t>=</a:t>
+            </a:r>
+            <a:r>
+              <a:rPr lang="nb-NO" b="0" i="0" dirty="0">
+                <a:effectLst/>
+                <a:latin typeface="Courier New" panose="02070309020205020404" pitchFamily="49" charset="0"/>
+              </a:rPr>
+              <a:t> </a:t>
+            </a:r>
+            <a:r>
+              <a:rPr lang="nb-NO" b="0" i="0" dirty="0">
+                <a:solidFill>
+                  <a:srgbClr val="66D9EF"/>
+                </a:solidFill>
+                <a:effectLst/>
+                <a:latin typeface="Courier New" panose="02070309020205020404" pitchFamily="49" charset="0"/>
+              </a:rPr>
+              <a:t>new</a:t>
+            </a:r>
+            <a:r>
+              <a:rPr lang="nb-NO" b="0" i="0" dirty="0">
+                <a:effectLst/>
+                <a:latin typeface="Courier New" panose="02070309020205020404" pitchFamily="49" charset="0"/>
+              </a:rPr>
+              <a:t> SqlCommand(); </a:t>
+            </a:r>
+          </a:p>
+          <a:p>
+            <a:pPr marL="177800" lvl="1" indent="0">
+              <a:buNone/>
+            </a:pPr>
+            <a:r>
+              <a:rPr lang="nb-NO" b="0" i="0" dirty="0">
+                <a:effectLst/>
+                <a:latin typeface="Courier New" panose="02070309020205020404" pitchFamily="49" charset="0"/>
+              </a:rPr>
+              <a:t>var </a:t>
+            </a:r>
+            <a:r>
+              <a:rPr lang="nb-NO" b="0" i="0" dirty="0">
+                <a:solidFill>
+                  <a:srgbClr val="66D9EF"/>
+                </a:solidFill>
+                <a:effectLst/>
+                <a:latin typeface="Courier New" panose="02070309020205020404" pitchFamily="49" charset="0"/>
+              </a:rPr>
+              <a:t>sql</a:t>
+            </a:r>
+            <a:r>
+              <a:rPr lang="nb-NO" b="0" i="0" dirty="0">
+                <a:effectLst/>
+                <a:latin typeface="Courier New" panose="02070309020205020404" pitchFamily="49" charset="0"/>
+              </a:rPr>
+              <a:t> </a:t>
+            </a:r>
+            <a:r>
+              <a:rPr lang="nb-NO" b="0" i="0" dirty="0">
+                <a:solidFill>
+                  <a:srgbClr val="F92672"/>
+                </a:solidFill>
+                <a:effectLst/>
+                <a:latin typeface="Courier New" panose="02070309020205020404" pitchFamily="49" charset="0"/>
+              </a:rPr>
+              <a:t>=</a:t>
+            </a:r>
+            <a:r>
+              <a:rPr lang="nb-NO" b="0" i="0" dirty="0">
+                <a:effectLst/>
+                <a:latin typeface="Courier New" panose="02070309020205020404" pitchFamily="49" charset="0"/>
+              </a:rPr>
+              <a:t> </a:t>
+            </a:r>
+            <a:r>
+              <a:rPr lang="nb-NO" b="0" i="0" dirty="0">
+                <a:solidFill>
+                  <a:srgbClr val="E6DB74"/>
+                </a:solidFill>
+                <a:effectLst/>
+                <a:latin typeface="Courier New" panose="02070309020205020404" pitchFamily="49" charset="0"/>
+              </a:rPr>
+              <a:t>"</a:t>
+            </a:r>
+            <a:r>
+              <a:rPr lang="nb-NO" b="0" i="0" dirty="0">
+                <a:solidFill>
+                  <a:srgbClr val="B45EA4"/>
+                </a:solidFill>
+                <a:effectLst/>
+                <a:latin typeface="Courier New" panose="02070309020205020404" pitchFamily="49" charset="0"/>
+              </a:rPr>
+              <a:t>SELECT</a:t>
+            </a:r>
+            <a:r>
+              <a:rPr lang="nb-NO" b="0" i="0" dirty="0">
+                <a:solidFill>
+                  <a:srgbClr val="E6DB74"/>
+                </a:solidFill>
+                <a:effectLst/>
+                <a:latin typeface="Courier New" panose="02070309020205020404" pitchFamily="49" charset="0"/>
+              </a:rPr>
+              <a:t> * </a:t>
+            </a:r>
+            <a:r>
+              <a:rPr lang="nb-NO" b="0" i="0" dirty="0">
+                <a:solidFill>
+                  <a:srgbClr val="B45EA4"/>
+                </a:solidFill>
+                <a:effectLst/>
+                <a:latin typeface="Courier New" panose="02070309020205020404" pitchFamily="49" charset="0"/>
+              </a:rPr>
+              <a:t>FROM</a:t>
+            </a:r>
+            <a:r>
+              <a:rPr lang="nb-NO" b="0" i="0" dirty="0">
+                <a:solidFill>
+                  <a:srgbClr val="E6DB74"/>
+                </a:solidFill>
+                <a:effectLst/>
+                <a:latin typeface="Courier New" panose="02070309020205020404" pitchFamily="49" charset="0"/>
+              </a:rPr>
+              <a:t> TBL_USER_MASTER </a:t>
+            </a:r>
+            <a:r>
+              <a:rPr lang="nb-NO" b="0" i="0" dirty="0">
+                <a:solidFill>
+                  <a:srgbClr val="B45EA4"/>
+                </a:solidFill>
+                <a:effectLst/>
+                <a:latin typeface="Courier New" panose="02070309020205020404" pitchFamily="49" charset="0"/>
+              </a:rPr>
+              <a:t>WHERE</a:t>
+            </a:r>
+            <a:r>
+              <a:rPr lang="nb-NO" b="0" i="0" dirty="0">
+                <a:solidFill>
+                  <a:srgbClr val="E6DB74"/>
+                </a:solidFill>
+                <a:effectLst/>
+                <a:latin typeface="Courier New" panose="02070309020205020404" pitchFamily="49" charset="0"/>
+              </a:rPr>
+              <a:t> USER_NAME = @parameter</a:t>
+            </a:r>
+            <a:r>
+              <a:rPr lang="nb-NO" b="0" i="0" dirty="0">
+                <a:solidFill>
+                  <a:srgbClr val="4FB4D7"/>
+                </a:solidFill>
+                <a:effectLst/>
+                <a:latin typeface="Courier New" panose="02070309020205020404" pitchFamily="49" charset="0"/>
+              </a:rPr>
+              <a:t>"; sqlCommand.CommandText = sql; </a:t>
+            </a:r>
+          </a:p>
+          <a:p>
+            <a:pPr marL="177800" lvl="1" indent="0">
+              <a:buNone/>
+            </a:pPr>
+            <a:r>
+              <a:rPr lang="nb-NO" b="0" i="0" dirty="0">
+                <a:solidFill>
+                  <a:srgbClr val="4FB4D7"/>
+                </a:solidFill>
+                <a:effectLst/>
+                <a:latin typeface="Courier New" panose="02070309020205020404" pitchFamily="49" charset="0"/>
+              </a:rPr>
+              <a:t>// Add the Parameter </a:t>
+            </a:r>
+          </a:p>
+          <a:p>
+            <a:pPr marL="177800" lvl="1" indent="0">
+              <a:buNone/>
+            </a:pPr>
+            <a:r>
+              <a:rPr lang="nb-NO" b="0" i="0" dirty="0">
+                <a:solidFill>
+                  <a:srgbClr val="4FB4D7"/>
+                </a:solidFill>
+                <a:effectLst/>
+                <a:latin typeface="Courier New" panose="02070309020205020404" pitchFamily="49" charset="0"/>
+              </a:rPr>
+              <a:t>sqlCommand.Parameters.AddWithValue("</a:t>
+            </a:r>
+            <a:r>
+              <a:rPr lang="nb-NO" b="0" i="0" dirty="0">
+                <a:solidFill>
+                  <a:srgbClr val="E6DB74"/>
+                </a:solidFill>
+                <a:effectLst/>
+                <a:latin typeface="Courier New" panose="02070309020205020404" pitchFamily="49" charset="0"/>
+              </a:rPr>
+              <a:t>parameter</a:t>
+            </a:r>
+            <a:r>
+              <a:rPr lang="nb-NO" b="0" i="0" dirty="0">
+                <a:solidFill>
+                  <a:srgbClr val="4FB4D7"/>
+                </a:solidFill>
+                <a:effectLst/>
+                <a:latin typeface="Courier New" panose="02070309020205020404" pitchFamily="49" charset="0"/>
+              </a:rPr>
+              <a:t>", "</a:t>
+            </a:r>
+            <a:r>
+              <a:rPr lang="nb-NO" b="0" i="0" dirty="0">
+                <a:solidFill>
+                  <a:srgbClr val="E6DB74"/>
+                </a:solidFill>
+                <a:effectLst/>
+                <a:latin typeface="Courier New" panose="02070309020205020404" pitchFamily="49" charset="0"/>
+              </a:rPr>
+              <a:t>sebastian</a:t>
+            </a:r>
+            <a:r>
+              <a:rPr lang="nb-NO" b="0" i="0" dirty="0">
+                <a:solidFill>
+                  <a:srgbClr val="4FB4D7"/>
+                </a:solidFill>
+                <a:effectLst/>
+                <a:latin typeface="Courier New" panose="02070309020205020404" pitchFamily="49" charset="0"/>
+              </a:rPr>
+              <a:t>"); </a:t>
+            </a:r>
+          </a:p>
+          <a:p>
+            <a:pPr marL="177800" lvl="1" indent="0">
+              <a:buNone/>
+            </a:pPr>
+            <a:r>
+              <a:rPr lang="nb-NO" b="0" i="0" dirty="0">
+                <a:solidFill>
+                  <a:srgbClr val="4FB4D7"/>
+                </a:solidFill>
+                <a:effectLst/>
+                <a:latin typeface="Courier New" panose="02070309020205020404" pitchFamily="49" charset="0"/>
+              </a:rPr>
+              <a:t>// Execute the query and do something with it </a:t>
+            </a:r>
+          </a:p>
+          <a:p>
+            <a:pPr marL="177800" lvl="1" indent="0">
+              <a:buNone/>
+            </a:pPr>
+            <a:r>
+              <a:rPr lang="nb-NO" b="0" i="0" dirty="0">
+                <a:solidFill>
+                  <a:srgbClr val="4FB4D7"/>
+                </a:solidFill>
+                <a:effectLst/>
+                <a:latin typeface="Courier New" panose="02070309020205020404" pitchFamily="49" charset="0"/>
+              </a:rPr>
+              <a:t>var reader = sqlCommand.ExecuteReader();</a:t>
+            </a:r>
+            <a:endParaRPr lang="en-US" dirty="0"/>
+          </a:p>
+        </p:txBody>
+      </p:sp>
+    </p:spTree>
+    <p:extLst>
+      <p:ext uri="{BB962C8B-B14F-4D97-AF65-F5344CB8AC3E}">
+        <p14:creationId xmlns:p14="http://schemas.microsoft.com/office/powerpoint/2010/main" val="3552202885"/>
+      </p:ext>
+    </p:extLst>
+  </p:cSld>
+  <p:clrMapOvr>
+    <a:masterClrMapping/>
+  </p:clrMapOvr>
+</p:sld>
+</file>
+
+<file path=ppt/slides/slide21.xml><?xml version="1.0" encoding="utf-8"?>
+<p:sld xmlns:a="http://schemas.openxmlformats.org/drawingml/2006/main" xmlns:r="http://schemas.openxmlformats.org/officeDocument/2006/relationships" xmlns:p="http://schemas.openxmlformats.org/presentationml/2006/main">
+  <p:cSld>
+    <p:spTree>
+      <p:nvGrpSpPr>
+        <p:cNvPr id="1" name=""/>
+        <p:cNvGrpSpPr/>
+        <p:nvPr/>
+      </p:nvGrpSpPr>
+      <p:grpSpPr>
+        <a:xfrm>
+          <a:off x="0" y="0"/>
+          <a:ext cx="0" cy="0"/>
+          <a:chOff x="0" y="0"/>
+          <a:chExt cx="0" cy="0"/>
+        </a:xfrm>
+      </p:grpSpPr>
+      <p:sp>
+        <p:nvSpPr>
+          <p:cNvPr id="7" name="Title 6">
+            <a:extLst>
+              <a:ext uri="{FF2B5EF4-FFF2-40B4-BE49-F238E27FC236}">
+                <a16:creationId xmlns:a16="http://schemas.microsoft.com/office/drawing/2014/main" id="{7C6694EB-31D5-0121-E083-67D2034C1BA6}"/>
+              </a:ext>
+            </a:extLst>
+          </p:cNvPr>
+          <p:cNvSpPr>
+            <a:spLocks noGrp="1"/>
+          </p:cNvSpPr>
+          <p:nvPr>
+            <p:ph type="title"/>
+          </p:nvPr>
+        </p:nvSpPr>
+        <p:spPr/>
+        <p:txBody>
+          <a:bodyPr/>
+          <a:lstStyle/>
+          <a:p>
+            <a:r>
+              <a:rPr lang="en-US" dirty="0"/>
+              <a:t>We are done</a:t>
+            </a:r>
+            <a:br>
+              <a:rPr lang="en-US" dirty="0"/>
+            </a:br>
+            <a:r>
+              <a:rPr lang="en-US" dirty="0"/>
+              <a:t>Keep on learning!</a:t>
+            </a:r>
+          </a:p>
+        </p:txBody>
+      </p:sp>
+      <p:sp>
+        <p:nvSpPr>
+          <p:cNvPr id="5" name="Footer Placeholder 4">
+            <a:extLst>
+              <a:ext uri="{FF2B5EF4-FFF2-40B4-BE49-F238E27FC236}">
+                <a16:creationId xmlns:a16="http://schemas.microsoft.com/office/drawing/2014/main" id="{822E6FDC-FAB9-FACE-8B7E-D245677B20DF}"/>
+              </a:ext>
+            </a:extLst>
+          </p:cNvPr>
+          <p:cNvSpPr>
+            <a:spLocks noGrp="1"/>
+          </p:cNvSpPr>
+          <p:nvPr>
+            <p:ph type="ftr" sz="quarter" idx="10"/>
+          </p:nvPr>
+        </p:nvSpPr>
+        <p:spPr/>
+        <p:txBody>
+          <a:bodyPr/>
+          <a:lstStyle/>
+          <a:p>
+            <a:r>
+              <a:rPr lang="en-US" dirty="0"/>
+              <a:t>Storage &amp; Databases</a:t>
+            </a:r>
+            <a:endParaRPr lang="sv-SE" dirty="0"/>
+          </a:p>
+        </p:txBody>
+      </p:sp>
+      <p:sp>
+        <p:nvSpPr>
+          <p:cNvPr id="6" name="Slide Number Placeholder 5">
+            <a:extLst>
+              <a:ext uri="{FF2B5EF4-FFF2-40B4-BE49-F238E27FC236}">
+                <a16:creationId xmlns:a16="http://schemas.microsoft.com/office/drawing/2014/main" id="{C4CCDD1C-691B-3594-D7F2-C87AB5B284DC}"/>
+              </a:ext>
+            </a:extLst>
+          </p:cNvPr>
+          <p:cNvSpPr>
+            <a:spLocks noGrp="1"/>
+          </p:cNvSpPr>
+          <p:nvPr>
+            <p:ph type="sldNum" sz="quarter" idx="11"/>
+          </p:nvPr>
+        </p:nvSpPr>
+        <p:spPr/>
+        <p:txBody>
+          <a:bodyPr/>
+          <a:lstStyle/>
+          <a:p>
+            <a:fld id="{89578386-84DA-45F9-ABB1-FE09AA2697D8}" type="slidenum">
+              <a:rPr lang="sv-SE" smtClean="0"/>
+              <a:pPr/>
+              <a:t>21</a:t>
+            </a:fld>
+            <a:endParaRPr lang="sv-SE"/>
+          </a:p>
+        </p:txBody>
+      </p:sp>
+      <p:sp>
+        <p:nvSpPr>
+          <p:cNvPr id="8" name="Subtitle 7">
+            <a:extLst>
+              <a:ext uri="{FF2B5EF4-FFF2-40B4-BE49-F238E27FC236}">
+                <a16:creationId xmlns:a16="http://schemas.microsoft.com/office/drawing/2014/main" id="{4CD2AE71-DBCC-4071-DAA7-DF2B1CF6172C}"/>
+              </a:ext>
+            </a:extLst>
+          </p:cNvPr>
+          <p:cNvSpPr>
+            <a:spLocks noGrp="1"/>
+          </p:cNvSpPr>
+          <p:nvPr>
+            <p:ph type="subTitle" idx="16"/>
+          </p:nvPr>
+        </p:nvSpPr>
+        <p:spPr/>
+        <p:txBody>
+          <a:bodyPr/>
+          <a:lstStyle/>
+          <a:p>
+            <a:endParaRPr lang="en-US" dirty="0"/>
+          </a:p>
+        </p:txBody>
+      </p:sp>
+    </p:spTree>
+    <p:extLst>
+      <p:ext uri="{BB962C8B-B14F-4D97-AF65-F5344CB8AC3E}">
+        <p14:creationId xmlns:p14="http://schemas.microsoft.com/office/powerpoint/2010/main" val="4056130801"/>
+      </p:ext>
+    </p:extLst>
+  </p:cSld>
+  <p:clrMapOvr>
+    <a:masterClrMapping/>
+  </p:clrMapOvr>
+</p:sld>
+</file>
+
 <file path=ppt/slides/slide3.xml><?xml version="1.0" encoding="utf-8"?>
 <p:sld xmlns:a="http://schemas.openxmlformats.org/drawingml/2006/main" xmlns:r="http://schemas.openxmlformats.org/officeDocument/2006/relationships" xmlns:p="http://schemas.openxmlformats.org/presentationml/2006/main">
   <p:cSld>
@@ -20781,6 +21879,12 @@
             <a:r>
               <a:rPr lang="en-US" dirty="0"/>
               <a:t>Performance</a:t>
+            </a:r>
+          </a:p>
+          <a:p>
+            <a:r>
+              <a:rPr lang="en-US" dirty="0"/>
+              <a:t>SQL Injection</a:t>
             </a:r>
           </a:p>
           <a:p>
@@ -23658,18 +24762,18 @@
 </file>
 
 <file path=customXml/item1.xml><?xml version="1.0" encoding="utf-8"?>
+<p:properties xmlns:p="http://schemas.microsoft.com/office/2006/metadata/properties" xmlns:xsi="http://www.w3.org/2001/XMLSchema-instance" xmlns:pc="http://schemas.microsoft.com/office/infopath/2007/PartnerControls">
+  <documentManagement/>
+</p:properties>
+</file>
+
+<file path=customXml/item2.xml><?xml version="1.0" encoding="utf-8"?>
 <?mso-contentType ?>
 <FormTemplates xmlns="http://schemas.microsoft.com/sharepoint/v3/contenttype/forms">
   <Display>DocumentLibraryForm</Display>
   <Edit>DocumentLibraryForm</Edit>
   <New>DocumentLibraryForm</New>
 </FormTemplates>
-</file>
-
-<file path=customXml/item2.xml><?xml version="1.0" encoding="utf-8"?>
-<p:properties xmlns:p="http://schemas.microsoft.com/office/2006/metadata/properties" xmlns:xsi="http://www.w3.org/2001/XMLSchema-instance" xmlns:pc="http://schemas.microsoft.com/office/infopath/2007/PartnerControls">
-  <documentManagement/>
-</p:properties>
 </file>
 
 <file path=customXml/item3.xml><?xml version="1.0" encoding="utf-8"?>
@@ -23805,14 +24909,6 @@
 </file>
 
 <file path=customXml/itemProps1.xml><?xml version="1.0" encoding="utf-8"?>
-<ds:datastoreItem xmlns:ds="http://schemas.openxmlformats.org/officeDocument/2006/customXml" ds:itemID="{DE89EAE4-F0DF-4056-A4B5-87C04EEE6F62}">
-  <ds:schemaRefs>
-    <ds:schemaRef ds:uri="http://schemas.microsoft.com/sharepoint/v3/contenttype/forms"/>
-  </ds:schemaRefs>
-</ds:datastoreItem>
-</file>
-
-<file path=customXml/itemProps2.xml><?xml version="1.0" encoding="utf-8"?>
 <ds:datastoreItem xmlns:ds="http://schemas.openxmlformats.org/officeDocument/2006/customXml" ds:itemID="{5C56C71D-643B-4E04-9A6A-F76847701330}">
   <ds:schemaRefs>
     <ds:schemaRef ds:uri="http://schemas.microsoft.com/office/2006/documentManagement/types"/>
@@ -23824,6 +24920,14 @@
     <ds:schemaRef ds:uri="http://schemas.microsoft.com/office/2006/metadata/properties"/>
     <ds:schemaRef ds:uri="http://www.w3.org/XML/1998/namespace"/>
     <ds:schemaRef ds:uri="http://purl.org/dc/terms/"/>
+  </ds:schemaRefs>
+</ds:datastoreItem>
+</file>
+
+<file path=customXml/itemProps2.xml><?xml version="1.0" encoding="utf-8"?>
+<ds:datastoreItem xmlns:ds="http://schemas.openxmlformats.org/officeDocument/2006/customXml" ds:itemID="{DE89EAE4-F0DF-4056-A4B5-87C04EEE6F62}">
+  <ds:schemaRefs>
+    <ds:schemaRef ds:uri="http://schemas.microsoft.com/sharepoint/v3/contenttype/forms"/>
   </ds:schemaRefs>
 </ds:datastoreItem>
 </file>

</xml_diff>

<commit_message>
Minor adjustments to the presentation - more comments, ++
</commit_message>
<xml_diff>
--- a/Presentation material/Databases APP.pptx
+++ b/Presentation material/Databases APP.pptx
@@ -236,7 +236,7 @@
           <a:p>
             <a:fld id="{458B3470-95F1-4BD9-AFB4-529F3BDC56EE}" type="datetimeFigureOut">
               <a:rPr lang="sv-SE" smtClean="0"/>
-              <a:t>2024-02-27</a:t>
+              <a:t>2024-03-12</a:t>
             </a:fld>
             <a:endParaRPr lang="sv-SE"/>
           </a:p>
@@ -547,54 +547,7 @@
           <a:bodyPr/>
           <a:lstStyle/>
           <a:p>
-            <a:pPr marL="171450" indent="-171450">
-              <a:buFont typeface="Arial" panose="020B0604020202020204" pitchFamily="34" charset="0"/>
-              <a:buChar char="•"/>
-            </a:pPr>
-            <a:r>
-              <a:rPr lang="en-US" dirty="0"/>
-              <a:t>Ask some questions</a:t>
-            </a:r>
-          </a:p>
-          <a:p>
-            <a:pPr marL="628650" lvl="1" indent="-171450">
-              <a:buFont typeface="Arial" panose="020B0604020202020204" pitchFamily="34" charset="0"/>
-              <a:buChar char="•"/>
-            </a:pPr>
-            <a:r>
-              <a:rPr lang="en-US" dirty="0"/>
-              <a:t>How many have used a database?</a:t>
-            </a:r>
-          </a:p>
-          <a:p>
-            <a:pPr marL="628650" marR="0" lvl="1" indent="-171450" algn="l" defTabSz="914400" rtl="0" eaLnBrk="1" fontAlgn="auto" latinLnBrk="0" hangingPunct="1">
-              <a:lnSpc>
-                <a:spcPct val="100000"/>
-              </a:lnSpc>
-              <a:spcBef>
-                <a:spcPts val="0"/>
-              </a:spcBef>
-              <a:spcAft>
-                <a:spcPts val="0"/>
-              </a:spcAft>
-              <a:buClrTx/>
-              <a:buSzTx/>
-              <a:buFont typeface="Arial" panose="020B0604020202020204" pitchFamily="34" charset="0"/>
-              <a:buChar char="•"/>
-              <a:tabLst/>
-              <a:defRPr/>
-            </a:pPr>
-            <a:r>
-              <a:rPr lang="en-US" dirty="0"/>
-              <a:t>How many have used SQL Server?</a:t>
-            </a:r>
-          </a:p>
-          <a:p>
-            <a:pPr marL="628650" lvl="1" indent="-171450">
-              <a:buFont typeface="Arial" panose="020B0604020202020204" pitchFamily="34" charset="0"/>
-              <a:buChar char="•"/>
-            </a:pPr>
-            <a:endParaRPr lang="en-US" dirty="0"/>
+            <a:endParaRPr lang="en-GB" dirty="0"/>
           </a:p>
         </p:txBody>
       </p:sp>
@@ -615,7 +568,7 @@
           <a:p>
             <a:fld id="{9778E0F8-0F4F-4133-AB17-43107DBECF7F}" type="slidenum">
               <a:rPr lang="sv-SE" smtClean="0"/>
-              <a:t>2</a:t>
+              <a:t>1</a:t>
             </a:fld>
             <a:endParaRPr lang="sv-SE"/>
           </a:p>
@@ -624,7 +577,7 @@
     </p:spTree>
     <p:extLst>
       <p:ext uri="{BB962C8B-B14F-4D97-AF65-F5344CB8AC3E}">
-        <p14:creationId xmlns:p14="http://schemas.microsoft.com/office/powerpoint/2010/main" val="1236098698"/>
+        <p14:creationId xmlns:p14="http://schemas.microsoft.com/office/powerpoint/2010/main" val="2687865362"/>
       </p:ext>
     </p:extLst>
   </p:cSld>
@@ -635,6 +588,239 @@
 </file>
 
 <file path=ppt/notesSlides/notesSlide10.xml><?xml version="1.0" encoding="utf-8"?>
+<p:notes xmlns:a="http://schemas.openxmlformats.org/drawingml/2006/main" xmlns:r="http://schemas.openxmlformats.org/officeDocument/2006/relationships" xmlns:p="http://schemas.openxmlformats.org/presentationml/2006/main">
+  <p:cSld>
+    <p:spTree>
+      <p:nvGrpSpPr>
+        <p:cNvPr id="1" name="">
+          <a:extLst>
+            <a:ext uri="{FF2B5EF4-FFF2-40B4-BE49-F238E27FC236}">
+              <a16:creationId xmlns:a16="http://schemas.microsoft.com/office/drawing/2014/main" id="{2444EE03-38BE-7FC5-4047-91291CE3C8B1}"/>
+            </a:ext>
+          </a:extLst>
+        </p:cNvPr>
+        <p:cNvGrpSpPr/>
+        <p:nvPr/>
+      </p:nvGrpSpPr>
+      <p:grpSpPr>
+        <a:xfrm>
+          <a:off x="0" y="0"/>
+          <a:ext cx="0" cy="0"/>
+          <a:chOff x="0" y="0"/>
+          <a:chExt cx="0" cy="0"/>
+        </a:xfrm>
+      </p:grpSpPr>
+      <p:sp>
+        <p:nvSpPr>
+          <p:cNvPr id="2" name="Slide Image Placeholder 1">
+            <a:extLst>
+              <a:ext uri="{FF2B5EF4-FFF2-40B4-BE49-F238E27FC236}">
+                <a16:creationId xmlns:a16="http://schemas.microsoft.com/office/drawing/2014/main" id="{EBB95642-7CEF-770F-AC23-7B99EBCE1FB7}"/>
+              </a:ext>
+            </a:extLst>
+          </p:cNvPr>
+          <p:cNvSpPr>
+            <a:spLocks noGrp="1" noRot="1" noChangeAspect="1"/>
+          </p:cNvSpPr>
+          <p:nvPr>
+            <p:ph type="sldImg"/>
+          </p:nvPr>
+        </p:nvSpPr>
+        <p:spPr/>
+      </p:sp>
+      <p:sp>
+        <p:nvSpPr>
+          <p:cNvPr id="3" name="Notes Placeholder 2">
+            <a:extLst>
+              <a:ext uri="{FF2B5EF4-FFF2-40B4-BE49-F238E27FC236}">
+                <a16:creationId xmlns:a16="http://schemas.microsoft.com/office/drawing/2014/main" id="{04300F0A-A151-F87E-6F42-D8113F4EEF66}"/>
+              </a:ext>
+            </a:extLst>
+          </p:cNvPr>
+          <p:cNvSpPr>
+            <a:spLocks noGrp="1"/>
+          </p:cNvSpPr>
+          <p:nvPr>
+            <p:ph type="body" idx="1"/>
+          </p:nvPr>
+        </p:nvSpPr>
+        <p:spPr/>
+        <p:txBody>
+          <a:bodyPr/>
+          <a:lstStyle/>
+          <a:p>
+            <a:r>
+              <a:rPr lang="en-US" noProof="0" dirty="0"/>
+              <a:t>- NB! Indexes makes read/select performance, but degrades write performance (insert, update, delete)</a:t>
+            </a:r>
+          </a:p>
+          <a:p>
+            <a:r>
+              <a:rPr lang="en-US" noProof="0" dirty="0"/>
+              <a:t>- Schemas is often used to divide a database into sub parts/domains but also for security reasons</a:t>
+            </a:r>
+          </a:p>
+        </p:txBody>
+      </p:sp>
+      <p:sp>
+        <p:nvSpPr>
+          <p:cNvPr id="4" name="Slide Number Placeholder 3">
+            <a:extLst>
+              <a:ext uri="{FF2B5EF4-FFF2-40B4-BE49-F238E27FC236}">
+                <a16:creationId xmlns:a16="http://schemas.microsoft.com/office/drawing/2014/main" id="{8F081D67-0760-F1BB-819C-019928E4B608}"/>
+              </a:ext>
+            </a:extLst>
+          </p:cNvPr>
+          <p:cNvSpPr>
+            <a:spLocks noGrp="1"/>
+          </p:cNvSpPr>
+          <p:nvPr>
+            <p:ph type="sldNum" sz="quarter" idx="5"/>
+          </p:nvPr>
+        </p:nvSpPr>
+        <p:spPr/>
+        <p:txBody>
+          <a:bodyPr/>
+          <a:lstStyle/>
+          <a:p>
+            <a:fld id="{9778E0F8-0F4F-4133-AB17-43107DBECF7F}" type="slidenum">
+              <a:rPr lang="sv-SE" smtClean="0"/>
+              <a:t>11</a:t>
+            </a:fld>
+            <a:endParaRPr lang="sv-SE"/>
+          </a:p>
+        </p:txBody>
+      </p:sp>
+    </p:spTree>
+    <p:extLst>
+      <p:ext uri="{BB962C8B-B14F-4D97-AF65-F5344CB8AC3E}">
+        <p14:creationId xmlns:p14="http://schemas.microsoft.com/office/powerpoint/2010/main" val="1945119649"/>
+      </p:ext>
+    </p:extLst>
+  </p:cSld>
+  <p:clrMapOvr>
+    <a:masterClrMapping/>
+  </p:clrMapOvr>
+</p:notes>
+</file>
+
+<file path=ppt/notesSlides/notesSlide11.xml><?xml version="1.0" encoding="utf-8"?>
+<p:notes xmlns:a="http://schemas.openxmlformats.org/drawingml/2006/main" xmlns:r="http://schemas.openxmlformats.org/officeDocument/2006/relationships" xmlns:p="http://schemas.openxmlformats.org/presentationml/2006/main">
+  <p:cSld>
+    <p:spTree>
+      <p:nvGrpSpPr>
+        <p:cNvPr id="1" name=""/>
+        <p:cNvGrpSpPr/>
+        <p:nvPr/>
+      </p:nvGrpSpPr>
+      <p:grpSpPr>
+        <a:xfrm>
+          <a:off x="0" y="0"/>
+          <a:ext cx="0" cy="0"/>
+          <a:chOff x="0" y="0"/>
+          <a:chExt cx="0" cy="0"/>
+        </a:xfrm>
+      </p:grpSpPr>
+      <p:sp>
+        <p:nvSpPr>
+          <p:cNvPr id="2" name="Slide Image Placeholder 1"/>
+          <p:cNvSpPr>
+            <a:spLocks noGrp="1" noRot="1" noChangeAspect="1"/>
+          </p:cNvSpPr>
+          <p:nvPr>
+            <p:ph type="sldImg"/>
+          </p:nvPr>
+        </p:nvSpPr>
+        <p:spPr/>
+      </p:sp>
+      <p:sp>
+        <p:nvSpPr>
+          <p:cNvPr id="3" name="Notes Placeholder 2"/>
+          <p:cNvSpPr>
+            <a:spLocks noGrp="1"/>
+          </p:cNvSpPr>
+          <p:nvPr>
+            <p:ph type="body" idx="1"/>
+          </p:nvPr>
+        </p:nvSpPr>
+        <p:spPr/>
+        <p:txBody>
+          <a:bodyPr/>
+          <a:lstStyle/>
+          <a:p>
+            <a:r>
+              <a:rPr lang="en-US" noProof="0" dirty="0"/>
+              <a:t>Standardized:</a:t>
+            </a:r>
+          </a:p>
+          <a:p>
+            <a:r>
+              <a:rPr lang="en-US" noProof="0" dirty="0"/>
+              <a:t>- </a:t>
+            </a:r>
+            <a:r>
+              <a:rPr lang="en-US" b="0" i="0" noProof="0" dirty="0">
+                <a:solidFill>
+                  <a:srgbClr val="000000"/>
+                </a:solidFill>
+                <a:effectLst/>
+                <a:latin typeface="Verdana" panose="020B0604030504040204" pitchFamily="34" charset="0"/>
+              </a:rPr>
+              <a:t>American National Standards Institute (ANSI) in 1986</a:t>
+            </a:r>
+          </a:p>
+          <a:p>
+            <a:r>
+              <a:rPr lang="en-US" b="0" i="0" noProof="0" dirty="0">
+                <a:solidFill>
+                  <a:srgbClr val="000000"/>
+                </a:solidFill>
+                <a:effectLst/>
+                <a:latin typeface="Verdana" panose="020B0604030504040204" pitchFamily="34" charset="0"/>
+              </a:rPr>
+              <a:t>- International Organization for Standardization (ISO) in 1987</a:t>
+            </a:r>
+            <a:endParaRPr lang="en-US" noProof="0" dirty="0"/>
+          </a:p>
+        </p:txBody>
+      </p:sp>
+      <p:sp>
+        <p:nvSpPr>
+          <p:cNvPr id="4" name="Slide Number Placeholder 3"/>
+          <p:cNvSpPr>
+            <a:spLocks noGrp="1"/>
+          </p:cNvSpPr>
+          <p:nvPr>
+            <p:ph type="sldNum" sz="quarter" idx="5"/>
+          </p:nvPr>
+        </p:nvSpPr>
+        <p:spPr/>
+        <p:txBody>
+          <a:bodyPr/>
+          <a:lstStyle/>
+          <a:p>
+            <a:fld id="{9778E0F8-0F4F-4133-AB17-43107DBECF7F}" type="slidenum">
+              <a:rPr lang="sv-SE" smtClean="0"/>
+              <a:t>12</a:t>
+            </a:fld>
+            <a:endParaRPr lang="sv-SE"/>
+          </a:p>
+        </p:txBody>
+      </p:sp>
+    </p:spTree>
+    <p:extLst>
+      <p:ext uri="{BB962C8B-B14F-4D97-AF65-F5344CB8AC3E}">
+        <p14:creationId xmlns:p14="http://schemas.microsoft.com/office/powerpoint/2010/main" val="803176620"/>
+      </p:ext>
+    </p:extLst>
+  </p:cSld>
+  <p:clrMapOvr>
+    <a:masterClrMapping/>
+  </p:clrMapOvr>
+</p:notes>
+</file>
+
+<file path=ppt/notesSlides/notesSlide12.xml><?xml version="1.0" encoding="utf-8"?>
 <p:notes xmlns:a="http://schemas.openxmlformats.org/drawingml/2006/main" xmlns:r="http://schemas.openxmlformats.org/officeDocument/2006/relationships" xmlns:p="http://schemas.openxmlformats.org/presentationml/2006/main">
   <p:cSld>
     <p:spTree>
@@ -751,7 +937,7 @@
 </p:notes>
 </file>
 
-<file path=ppt/notesSlides/notesSlide11.xml><?xml version="1.0" encoding="utf-8"?>
+<file path=ppt/notesSlides/notesSlide13.xml><?xml version="1.0" encoding="utf-8"?>
 <p:notes xmlns:a="http://schemas.openxmlformats.org/drawingml/2006/main" xmlns:r="http://schemas.openxmlformats.org/officeDocument/2006/relationships" xmlns:p="http://schemas.openxmlformats.org/presentationml/2006/main">
   <p:cSld>
     <p:spTree>
@@ -859,7 +1045,7 @@
 </p:notes>
 </file>
 
-<file path=ppt/notesSlides/notesSlide12.xml><?xml version="1.0" encoding="utf-8"?>
+<file path=ppt/notesSlides/notesSlide14.xml><?xml version="1.0" encoding="utf-8"?>
 <p:notes xmlns:a="http://schemas.openxmlformats.org/drawingml/2006/main" xmlns:r="http://schemas.openxmlformats.org/officeDocument/2006/relationships" xmlns:p="http://schemas.openxmlformats.org/presentationml/2006/main">
   <p:cSld>
     <p:spTree>
@@ -967,7 +1153,7 @@
 </p:notes>
 </file>
 
-<file path=ppt/notesSlides/notesSlide13.xml><?xml version="1.0" encoding="utf-8"?>
+<file path=ppt/notesSlides/notesSlide15.xml><?xml version="1.0" encoding="utf-8"?>
 <p:notes xmlns:a="http://schemas.openxmlformats.org/drawingml/2006/main" xmlns:r="http://schemas.openxmlformats.org/officeDocument/2006/relationships" xmlns:p="http://schemas.openxmlformats.org/presentationml/2006/main">
   <p:cSld>
     <p:spTree>
@@ -1075,7 +1261,7 @@
 </p:notes>
 </file>
 
-<file path=ppt/notesSlides/notesSlide14.xml><?xml version="1.0" encoding="utf-8"?>
+<file path=ppt/notesSlides/notesSlide16.xml><?xml version="1.0" encoding="utf-8"?>
 <p:notes xmlns:a="http://schemas.openxmlformats.org/drawingml/2006/main" xmlns:r="http://schemas.openxmlformats.org/officeDocument/2006/relationships" xmlns:p="http://schemas.openxmlformats.org/presentationml/2006/main">
   <p:cSld>
     <p:spTree>
@@ -1183,7 +1369,7 @@
 </p:notes>
 </file>
 
-<file path=ppt/notesSlides/notesSlide15.xml><?xml version="1.0" encoding="utf-8"?>
+<file path=ppt/notesSlides/notesSlide17.xml><?xml version="1.0" encoding="utf-8"?>
 <p:notes xmlns:a="http://schemas.openxmlformats.org/drawingml/2006/main" xmlns:r="http://schemas.openxmlformats.org/officeDocument/2006/relationships" xmlns:p="http://schemas.openxmlformats.org/presentationml/2006/main">
   <p:cSld>
     <p:spTree>
@@ -1300,7 +1486,7 @@
 </p:notes>
 </file>
 
-<file path=ppt/notesSlides/notesSlide16.xml><?xml version="1.0" encoding="utf-8"?>
+<file path=ppt/notesSlides/notesSlide18.xml><?xml version="1.0" encoding="utf-8"?>
 <p:notes xmlns:a="http://schemas.openxmlformats.org/drawingml/2006/main" xmlns:r="http://schemas.openxmlformats.org/officeDocument/2006/relationships" xmlns:p="http://schemas.openxmlformats.org/presentationml/2006/main">
   <p:cSld>
     <p:spTree>
@@ -1408,7 +1594,7 @@
 </p:notes>
 </file>
 
-<file path=ppt/notesSlides/notesSlide17.xml><?xml version="1.0" encoding="utf-8"?>
+<file path=ppt/notesSlides/notesSlide19.xml><?xml version="1.0" encoding="utf-8"?>
 <p:notes xmlns:a="http://schemas.openxmlformats.org/drawingml/2006/main" xmlns:r="http://schemas.openxmlformats.org/officeDocument/2006/relationships" xmlns:p="http://schemas.openxmlformats.org/presentationml/2006/main">
   <p:cSld>
     <p:spTree>
@@ -1560,17 +1746,57 @@
           <a:bodyPr/>
           <a:lstStyle/>
           <a:p>
-            <a:r>
-              <a:rPr lang="en-US" b="0" i="0" dirty="0">
-                <a:solidFill>
-                  <a:srgbClr val="D1D5DB"/>
-                </a:solidFill>
-                <a:effectLst/>
-                <a:latin typeface="Söhne"/>
-              </a:rPr>
-              <a:t>The 1960s saw the emergence of the first navigational database systems. These systems, such as IBM's Information Management System (IMS) and Charles Bachman's Integrated Data Store (IDS), were hierarchical and network databases</a:t>
-            </a:r>
-            <a:endParaRPr lang="nb-NO" dirty="0"/>
+            <a:pPr marL="171450" indent="-171450">
+              <a:buFont typeface="Arial" panose="020B0604020202020204" pitchFamily="34" charset="0"/>
+              <a:buChar char="•"/>
+            </a:pPr>
+            <a:r>
+              <a:rPr lang="en-US" dirty="0"/>
+              <a:t>Ask some questions:</a:t>
+            </a:r>
+          </a:p>
+          <a:p>
+            <a:pPr marL="628650" lvl="1" indent="-171450">
+              <a:buFont typeface="Arial" panose="020B0604020202020204" pitchFamily="34" charset="0"/>
+              <a:buChar char="•"/>
+            </a:pPr>
+            <a:r>
+              <a:rPr lang="en-US" dirty="0"/>
+              <a:t>How many have used a database?</a:t>
+            </a:r>
+          </a:p>
+          <a:p>
+            <a:pPr marL="628650" lvl="1" indent="-171450">
+              <a:buFont typeface="Arial" panose="020B0604020202020204" pitchFamily="34" charset="0"/>
+              <a:buChar char="•"/>
+            </a:pPr>
+            <a:r>
+              <a:rPr lang="en-US" dirty="0"/>
+              <a:t>Have any of you done some database modeling and/or implemented a database?</a:t>
+            </a:r>
+          </a:p>
+          <a:p>
+            <a:pPr marL="628650" marR="0" lvl="1" indent="-171450" algn="l" defTabSz="914400" rtl="0" eaLnBrk="1" fontAlgn="auto" latinLnBrk="0" hangingPunct="1">
+              <a:lnSpc>
+                <a:spcPct val="100000"/>
+              </a:lnSpc>
+              <a:spcBef>
+                <a:spcPts val="0"/>
+              </a:spcBef>
+              <a:spcAft>
+                <a:spcPts val="0"/>
+              </a:spcAft>
+              <a:buClrTx/>
+              <a:buSzTx/>
+              <a:buFont typeface="Arial" panose="020B0604020202020204" pitchFamily="34" charset="0"/>
+              <a:buChar char="•"/>
+              <a:tabLst/>
+              <a:defRPr/>
+            </a:pPr>
+            <a:r>
+              <a:rPr lang="en-US" dirty="0"/>
+              <a:t>How many have used Microsoft SQL Server or Redis Cache?</a:t>
+            </a:r>
           </a:p>
         </p:txBody>
       </p:sp>
@@ -1591,7 +1817,7 @@
           <a:p>
             <a:fld id="{9778E0F8-0F4F-4133-AB17-43107DBECF7F}" type="slidenum">
               <a:rPr lang="sv-SE" smtClean="0"/>
-              <a:t>4</a:t>
+              <a:t>2</a:t>
             </a:fld>
             <a:endParaRPr lang="sv-SE"/>
           </a:p>
@@ -1600,7 +1826,7 @@
     </p:spTree>
     <p:extLst>
       <p:ext uri="{BB962C8B-B14F-4D97-AF65-F5344CB8AC3E}">
-        <p14:creationId xmlns:p14="http://schemas.microsoft.com/office/powerpoint/2010/main" val="3343233212"/>
+        <p14:creationId xmlns:p14="http://schemas.microsoft.com/office/powerpoint/2010/main" val="1236098698"/>
       </p:ext>
     </p:extLst>
   </p:cSld>
@@ -1654,23 +1880,6 @@
           <a:bodyPr/>
           <a:lstStyle/>
           <a:p>
-            <a:pPr marL="171450" indent="-171450">
-              <a:buFont typeface="Arial" panose="020B0604020202020204" pitchFamily="34" charset="0"/>
-              <a:buChar char="•"/>
-            </a:pPr>
-            <a:endParaRPr lang="en-US" b="0" i="0" dirty="0">
-              <a:solidFill>
-                <a:srgbClr val="D1D5DB"/>
-              </a:solidFill>
-              <a:effectLst/>
-              <a:latin typeface="Söhne"/>
-            </a:endParaRPr>
-          </a:p>
-          <a:p>
-            <a:pPr marL="171450" indent="-171450">
-              <a:buFont typeface="Arial" panose="020B0604020202020204" pitchFamily="34" charset="0"/>
-              <a:buChar char="•"/>
-            </a:pPr>
             <a:r>
               <a:rPr lang="en-US" b="0" i="0" dirty="0">
                 <a:solidFill>
@@ -1679,15 +1888,9 @@
                 <a:effectLst/>
                 <a:latin typeface="Söhne"/>
               </a:rPr>
-              <a:t>Edgar F. Codd, an English computer scientist working at IBM, in a seminal 1970 paper titled "A Relational Model of Data for Large Shared Data Banks</a:t>
-            </a:r>
-          </a:p>
-          <a:p>
-            <a:pPr marL="171450" indent="-171450">
-              <a:buFont typeface="Arial" panose="020B0604020202020204" pitchFamily="34" charset="0"/>
-              <a:buChar char="•"/>
-            </a:pPr>
-            <a:endParaRPr lang="en-US" dirty="0"/>
+              <a:t>The 1960s saw the emergence of the first navigational database systems. These systems, such as IBM's Information Management System (IMS) and Charles Bachman's Integrated Data Store (IDS), were hierarchical and network databases</a:t>
+            </a:r>
+            <a:endParaRPr lang="nb-NO" dirty="0"/>
           </a:p>
         </p:txBody>
       </p:sp>
@@ -1708,7 +1911,7 @@
           <a:p>
             <a:fld id="{9778E0F8-0F4F-4133-AB17-43107DBECF7F}" type="slidenum">
               <a:rPr lang="sv-SE" smtClean="0"/>
-              <a:t>5</a:t>
+              <a:t>4</a:t>
             </a:fld>
             <a:endParaRPr lang="sv-SE"/>
           </a:p>
@@ -1717,7 +1920,7 @@
     </p:spTree>
     <p:extLst>
       <p:ext uri="{BB962C8B-B14F-4D97-AF65-F5344CB8AC3E}">
-        <p14:creationId xmlns:p14="http://schemas.microsoft.com/office/powerpoint/2010/main" val="1222153504"/>
+        <p14:creationId xmlns:p14="http://schemas.microsoft.com/office/powerpoint/2010/main" val="3343233212"/>
       </p:ext>
     </p:extLst>
   </p:cSld>
@@ -1775,6 +1978,139 @@
               <a:buFont typeface="Arial" panose="020B0604020202020204" pitchFamily="34" charset="0"/>
               <a:buChar char="•"/>
             </a:pPr>
+            <a:endParaRPr lang="en-US" b="0" i="0" dirty="0">
+              <a:solidFill>
+                <a:srgbClr val="D1D5DB"/>
+              </a:solidFill>
+              <a:effectLst/>
+              <a:latin typeface="Söhne"/>
+            </a:endParaRPr>
+          </a:p>
+          <a:p>
+            <a:pPr marL="171450" indent="-171450">
+              <a:buFont typeface="Arial" panose="020B0604020202020204" pitchFamily="34" charset="0"/>
+              <a:buChar char="•"/>
+            </a:pPr>
+            <a:r>
+              <a:rPr lang="en-US" b="0" i="0" dirty="0">
+                <a:solidFill>
+                  <a:srgbClr val="D1D5DB"/>
+                </a:solidFill>
+                <a:effectLst/>
+                <a:latin typeface="Söhne"/>
+              </a:rPr>
+              <a:t>RDMS – Rational Database Management System</a:t>
+            </a:r>
+          </a:p>
+          <a:p>
+            <a:pPr marL="171450" indent="-171450">
+              <a:buFont typeface="Arial" panose="020B0604020202020204" pitchFamily="34" charset="0"/>
+              <a:buChar char="•"/>
+            </a:pPr>
+            <a:r>
+              <a:rPr lang="en-US" b="0" i="0" dirty="0">
+                <a:solidFill>
+                  <a:srgbClr val="D1D5DB"/>
+                </a:solidFill>
+                <a:effectLst/>
+                <a:latin typeface="Söhne"/>
+              </a:rPr>
+              <a:t>Edgar F. Codd, an English computer scientist working at IBM, in a seminal 1970 paper titled "A Relational Model of Data for Large Shared Data Banks”</a:t>
+            </a:r>
+          </a:p>
+          <a:p>
+            <a:pPr marL="171450" indent="-171450">
+              <a:buFont typeface="Arial" panose="020B0604020202020204" pitchFamily="34" charset="0"/>
+              <a:buChar char="•"/>
+            </a:pPr>
+            <a:endParaRPr lang="en-US" dirty="0"/>
+          </a:p>
+        </p:txBody>
+      </p:sp>
+      <p:sp>
+        <p:nvSpPr>
+          <p:cNvPr id="4" name="Slide Number Placeholder 3"/>
+          <p:cNvSpPr>
+            <a:spLocks noGrp="1"/>
+          </p:cNvSpPr>
+          <p:nvPr>
+            <p:ph type="sldNum" sz="quarter" idx="5"/>
+          </p:nvPr>
+        </p:nvSpPr>
+        <p:spPr/>
+        <p:txBody>
+          <a:bodyPr/>
+          <a:lstStyle/>
+          <a:p>
+            <a:fld id="{9778E0F8-0F4F-4133-AB17-43107DBECF7F}" type="slidenum">
+              <a:rPr lang="sv-SE" smtClean="0"/>
+              <a:t>5</a:t>
+            </a:fld>
+            <a:endParaRPr lang="sv-SE"/>
+          </a:p>
+        </p:txBody>
+      </p:sp>
+    </p:spTree>
+    <p:extLst>
+      <p:ext uri="{BB962C8B-B14F-4D97-AF65-F5344CB8AC3E}">
+        <p14:creationId xmlns:p14="http://schemas.microsoft.com/office/powerpoint/2010/main" val="1222153504"/>
+      </p:ext>
+    </p:extLst>
+  </p:cSld>
+  <p:clrMapOvr>
+    <a:masterClrMapping/>
+  </p:clrMapOvr>
+</p:notes>
+</file>
+
+<file path=ppt/notesSlides/notesSlide5.xml><?xml version="1.0" encoding="utf-8"?>
+<p:notes xmlns:a="http://schemas.openxmlformats.org/drawingml/2006/main" xmlns:r="http://schemas.openxmlformats.org/officeDocument/2006/relationships" xmlns:p="http://schemas.openxmlformats.org/presentationml/2006/main">
+  <p:cSld>
+    <p:spTree>
+      <p:nvGrpSpPr>
+        <p:cNvPr id="1" name=""/>
+        <p:cNvGrpSpPr/>
+        <p:nvPr/>
+      </p:nvGrpSpPr>
+      <p:grpSpPr>
+        <a:xfrm>
+          <a:off x="0" y="0"/>
+          <a:ext cx="0" cy="0"/>
+          <a:chOff x="0" y="0"/>
+          <a:chExt cx="0" cy="0"/>
+        </a:xfrm>
+      </p:grpSpPr>
+      <p:sp>
+        <p:nvSpPr>
+          <p:cNvPr id="2" name="Slide Image Placeholder 1"/>
+          <p:cNvSpPr>
+            <a:spLocks noGrp="1" noRot="1" noChangeAspect="1"/>
+          </p:cNvSpPr>
+          <p:nvPr>
+            <p:ph type="sldImg"/>
+          </p:nvPr>
+        </p:nvSpPr>
+        <p:spPr/>
+      </p:sp>
+      <p:sp>
+        <p:nvSpPr>
+          <p:cNvPr id="3" name="Notes Placeholder 2"/>
+          <p:cNvSpPr>
+            <a:spLocks noGrp="1"/>
+          </p:cNvSpPr>
+          <p:nvPr>
+            <p:ph type="body" idx="1"/>
+          </p:nvPr>
+        </p:nvSpPr>
+        <p:spPr/>
+        <p:txBody>
+          <a:bodyPr/>
+          <a:lstStyle/>
+          <a:p>
+            <a:pPr marL="171450" indent="-171450">
+              <a:buFont typeface="Arial" panose="020B0604020202020204" pitchFamily="34" charset="0"/>
+              <a:buChar char="•"/>
+            </a:pPr>
             <a:r>
               <a:rPr lang="en-US" dirty="0"/>
               <a:t>ORM – Object Rational Mapping: Entity Framework , Dapper, Hibernate, Django</a:t>
@@ -1818,7 +2154,7 @@
 </p:notes>
 </file>
 
-<file path=ppt/notesSlides/notesSlide5.xml><?xml version="1.0" encoding="utf-8"?>
+<file path=ppt/notesSlides/notesSlide6.xml><?xml version="1.0" encoding="utf-8"?>
 <p:notes xmlns:a="http://schemas.openxmlformats.org/drawingml/2006/main" xmlns:r="http://schemas.openxmlformats.org/officeDocument/2006/relationships" xmlns:p="http://schemas.openxmlformats.org/presentationml/2006/main">
   <p:cSld>
     <p:spTree>
@@ -1884,7 +2220,10 @@
               <a:buFont typeface="Arial" panose="020B0604020202020204" pitchFamily="34" charset="0"/>
               <a:buChar char="•"/>
             </a:pPr>
-            <a:endParaRPr lang="en-US" dirty="0"/>
+            <a:r>
+              <a:rPr lang="en-US" dirty="0"/>
+              <a:t>Who have used any of these databases?</a:t>
+            </a:r>
           </a:p>
         </p:txBody>
       </p:sp>
@@ -1930,7 +2269,7 @@
 </p:notes>
 </file>
 
-<file path=ppt/notesSlides/notesSlide6.xml><?xml version="1.0" encoding="utf-8"?>
+<file path=ppt/notesSlides/notesSlide7.xml><?xml version="1.0" encoding="utf-8"?>
 <p:notes xmlns:a="http://schemas.openxmlformats.org/drawingml/2006/main" xmlns:r="http://schemas.openxmlformats.org/officeDocument/2006/relationships" xmlns:p="http://schemas.openxmlformats.org/presentationml/2006/main">
   <p:cSld>
     <p:spTree>
@@ -1974,6 +2313,113 @@
           <a:bodyPr/>
           <a:lstStyle/>
           <a:p>
+            <a:r>
+              <a:rPr lang="en-GB" dirty="0"/>
+              <a:t>- Codd in Boyce-Codd is the same Edgar F. Codd that wrote the </a:t>
+            </a:r>
+            <a:r>
+              <a:rPr lang="en-US" b="0" i="0" dirty="0">
+                <a:solidFill>
+                  <a:srgbClr val="D1D5DB"/>
+                </a:solidFill>
+                <a:effectLst/>
+                <a:latin typeface="Söhne"/>
+              </a:rPr>
+              <a:t>1970 paper titled "A Relational Model of Data for Large Shared Data </a:t>
+            </a:r>
+            <a:r>
+              <a:rPr lang="en-US" b="0" i="0">
+                <a:solidFill>
+                  <a:srgbClr val="D1D5DB"/>
+                </a:solidFill>
+                <a:effectLst/>
+                <a:latin typeface="Söhne"/>
+              </a:rPr>
+              <a:t>Banks”</a:t>
+            </a:r>
+          </a:p>
+        </p:txBody>
+      </p:sp>
+      <p:sp>
+        <p:nvSpPr>
+          <p:cNvPr id="4" name="Slide Number Placeholder 3"/>
+          <p:cNvSpPr>
+            <a:spLocks noGrp="1"/>
+          </p:cNvSpPr>
+          <p:nvPr>
+            <p:ph type="sldNum" sz="quarter" idx="5"/>
+          </p:nvPr>
+        </p:nvSpPr>
+        <p:spPr/>
+        <p:txBody>
+          <a:bodyPr/>
+          <a:lstStyle/>
+          <a:p>
+            <a:fld id="{9778E0F8-0F4F-4133-AB17-43107DBECF7F}" type="slidenum">
+              <a:rPr lang="sv-SE" smtClean="0"/>
+              <a:t>8</a:t>
+            </a:fld>
+            <a:endParaRPr lang="sv-SE"/>
+          </a:p>
+        </p:txBody>
+      </p:sp>
+    </p:spTree>
+    <p:extLst>
+      <p:ext uri="{BB962C8B-B14F-4D97-AF65-F5344CB8AC3E}">
+        <p14:creationId xmlns:p14="http://schemas.microsoft.com/office/powerpoint/2010/main" val="3983800570"/>
+      </p:ext>
+    </p:extLst>
+  </p:cSld>
+  <p:clrMapOvr>
+    <a:masterClrMapping/>
+  </p:clrMapOvr>
+</p:notes>
+</file>
+
+<file path=ppt/notesSlides/notesSlide8.xml><?xml version="1.0" encoding="utf-8"?>
+<p:notes xmlns:a="http://schemas.openxmlformats.org/drawingml/2006/main" xmlns:r="http://schemas.openxmlformats.org/officeDocument/2006/relationships" xmlns:p="http://schemas.openxmlformats.org/presentationml/2006/main">
+  <p:cSld>
+    <p:spTree>
+      <p:nvGrpSpPr>
+        <p:cNvPr id="1" name=""/>
+        <p:cNvGrpSpPr/>
+        <p:nvPr/>
+      </p:nvGrpSpPr>
+      <p:grpSpPr>
+        <a:xfrm>
+          <a:off x="0" y="0"/>
+          <a:ext cx="0" cy="0"/>
+          <a:chOff x="0" y="0"/>
+          <a:chExt cx="0" cy="0"/>
+        </a:xfrm>
+      </p:grpSpPr>
+      <p:sp>
+        <p:nvSpPr>
+          <p:cNvPr id="2" name="Slide Image Placeholder 1"/>
+          <p:cNvSpPr>
+            <a:spLocks noGrp="1" noRot="1" noChangeAspect="1"/>
+          </p:cNvSpPr>
+          <p:nvPr>
+            <p:ph type="sldImg"/>
+          </p:nvPr>
+        </p:nvSpPr>
+        <p:spPr/>
+      </p:sp>
+      <p:sp>
+        <p:nvSpPr>
+          <p:cNvPr id="3" name="Notes Placeholder 2"/>
+          <p:cNvSpPr>
+            <a:spLocks noGrp="1"/>
+          </p:cNvSpPr>
+          <p:nvPr>
+            <p:ph type="body" idx="1"/>
+          </p:nvPr>
+        </p:nvSpPr>
+        <p:spPr/>
+        <p:txBody>
+          <a:bodyPr/>
+          <a:lstStyle/>
+          <a:p>
             <a:pPr marL="171450" indent="-171450">
               <a:buFont typeface="Arial" panose="020B0604020202020204" pitchFamily="34" charset="0"/>
               <a:buChar char="•"/>
@@ -2058,7 +2504,7 @@
 </p:notes>
 </file>
 
-<file path=ppt/notesSlides/notesSlide7.xml><?xml version="1.0" encoding="utf-8"?>
+<file path=ppt/notesSlides/notesSlide9.xml><?xml version="1.0" encoding="utf-8"?>
 <p:notes xmlns:a="http://schemas.openxmlformats.org/drawingml/2006/main" xmlns:r="http://schemas.openxmlformats.org/officeDocument/2006/relationships" xmlns:p="http://schemas.openxmlformats.org/presentationml/2006/main">
   <p:cSld>
     <p:spTree>
@@ -2194,239 +2640,6 @@
     <p:extLst>
       <p:ext uri="{BB962C8B-B14F-4D97-AF65-F5344CB8AC3E}">
         <p14:creationId xmlns:p14="http://schemas.microsoft.com/office/powerpoint/2010/main" val="3331211663"/>
-      </p:ext>
-    </p:extLst>
-  </p:cSld>
-  <p:clrMapOvr>
-    <a:masterClrMapping/>
-  </p:clrMapOvr>
-</p:notes>
-</file>
-
-<file path=ppt/notesSlides/notesSlide8.xml><?xml version="1.0" encoding="utf-8"?>
-<p:notes xmlns:a="http://schemas.openxmlformats.org/drawingml/2006/main" xmlns:r="http://schemas.openxmlformats.org/officeDocument/2006/relationships" xmlns:p="http://schemas.openxmlformats.org/presentationml/2006/main">
-  <p:cSld>
-    <p:spTree>
-      <p:nvGrpSpPr>
-        <p:cNvPr id="1" name="">
-          <a:extLst>
-            <a:ext uri="{FF2B5EF4-FFF2-40B4-BE49-F238E27FC236}">
-              <a16:creationId xmlns:a16="http://schemas.microsoft.com/office/drawing/2014/main" id="{2444EE03-38BE-7FC5-4047-91291CE3C8B1}"/>
-            </a:ext>
-          </a:extLst>
-        </p:cNvPr>
-        <p:cNvGrpSpPr/>
-        <p:nvPr/>
-      </p:nvGrpSpPr>
-      <p:grpSpPr>
-        <a:xfrm>
-          <a:off x="0" y="0"/>
-          <a:ext cx="0" cy="0"/>
-          <a:chOff x="0" y="0"/>
-          <a:chExt cx="0" cy="0"/>
-        </a:xfrm>
-      </p:grpSpPr>
-      <p:sp>
-        <p:nvSpPr>
-          <p:cNvPr id="2" name="Slide Image Placeholder 1">
-            <a:extLst>
-              <a:ext uri="{FF2B5EF4-FFF2-40B4-BE49-F238E27FC236}">
-                <a16:creationId xmlns:a16="http://schemas.microsoft.com/office/drawing/2014/main" id="{EBB95642-7CEF-770F-AC23-7B99EBCE1FB7}"/>
-              </a:ext>
-            </a:extLst>
-          </p:cNvPr>
-          <p:cNvSpPr>
-            <a:spLocks noGrp="1" noRot="1" noChangeAspect="1"/>
-          </p:cNvSpPr>
-          <p:nvPr>
-            <p:ph type="sldImg"/>
-          </p:nvPr>
-        </p:nvSpPr>
-        <p:spPr/>
-      </p:sp>
-      <p:sp>
-        <p:nvSpPr>
-          <p:cNvPr id="3" name="Notes Placeholder 2">
-            <a:extLst>
-              <a:ext uri="{FF2B5EF4-FFF2-40B4-BE49-F238E27FC236}">
-                <a16:creationId xmlns:a16="http://schemas.microsoft.com/office/drawing/2014/main" id="{04300F0A-A151-F87E-6F42-D8113F4EEF66}"/>
-              </a:ext>
-            </a:extLst>
-          </p:cNvPr>
-          <p:cNvSpPr>
-            <a:spLocks noGrp="1"/>
-          </p:cNvSpPr>
-          <p:nvPr>
-            <p:ph type="body" idx="1"/>
-          </p:nvPr>
-        </p:nvSpPr>
-        <p:spPr/>
-        <p:txBody>
-          <a:bodyPr/>
-          <a:lstStyle/>
-          <a:p>
-            <a:r>
-              <a:rPr lang="en-US" noProof="0" dirty="0"/>
-              <a:t>- NB! Indexes makes read/select performance, but degrades write performance (insert, update, delete)</a:t>
-            </a:r>
-          </a:p>
-          <a:p>
-            <a:r>
-              <a:rPr lang="en-US" noProof="0" dirty="0"/>
-              <a:t>- Schemas is often used to divide a database into sub parts/domains but also for security reasons</a:t>
-            </a:r>
-          </a:p>
-        </p:txBody>
-      </p:sp>
-      <p:sp>
-        <p:nvSpPr>
-          <p:cNvPr id="4" name="Slide Number Placeholder 3">
-            <a:extLst>
-              <a:ext uri="{FF2B5EF4-FFF2-40B4-BE49-F238E27FC236}">
-                <a16:creationId xmlns:a16="http://schemas.microsoft.com/office/drawing/2014/main" id="{8F081D67-0760-F1BB-819C-019928E4B608}"/>
-              </a:ext>
-            </a:extLst>
-          </p:cNvPr>
-          <p:cNvSpPr>
-            <a:spLocks noGrp="1"/>
-          </p:cNvSpPr>
-          <p:nvPr>
-            <p:ph type="sldNum" sz="quarter" idx="5"/>
-          </p:nvPr>
-        </p:nvSpPr>
-        <p:spPr/>
-        <p:txBody>
-          <a:bodyPr/>
-          <a:lstStyle/>
-          <a:p>
-            <a:fld id="{9778E0F8-0F4F-4133-AB17-43107DBECF7F}" type="slidenum">
-              <a:rPr lang="sv-SE" smtClean="0"/>
-              <a:t>11</a:t>
-            </a:fld>
-            <a:endParaRPr lang="sv-SE"/>
-          </a:p>
-        </p:txBody>
-      </p:sp>
-    </p:spTree>
-    <p:extLst>
-      <p:ext uri="{BB962C8B-B14F-4D97-AF65-F5344CB8AC3E}">
-        <p14:creationId xmlns:p14="http://schemas.microsoft.com/office/powerpoint/2010/main" val="1945119649"/>
-      </p:ext>
-    </p:extLst>
-  </p:cSld>
-  <p:clrMapOvr>
-    <a:masterClrMapping/>
-  </p:clrMapOvr>
-</p:notes>
-</file>
-
-<file path=ppt/notesSlides/notesSlide9.xml><?xml version="1.0" encoding="utf-8"?>
-<p:notes xmlns:a="http://schemas.openxmlformats.org/drawingml/2006/main" xmlns:r="http://schemas.openxmlformats.org/officeDocument/2006/relationships" xmlns:p="http://schemas.openxmlformats.org/presentationml/2006/main">
-  <p:cSld>
-    <p:spTree>
-      <p:nvGrpSpPr>
-        <p:cNvPr id="1" name=""/>
-        <p:cNvGrpSpPr/>
-        <p:nvPr/>
-      </p:nvGrpSpPr>
-      <p:grpSpPr>
-        <a:xfrm>
-          <a:off x="0" y="0"/>
-          <a:ext cx="0" cy="0"/>
-          <a:chOff x="0" y="0"/>
-          <a:chExt cx="0" cy="0"/>
-        </a:xfrm>
-      </p:grpSpPr>
-      <p:sp>
-        <p:nvSpPr>
-          <p:cNvPr id="2" name="Slide Image Placeholder 1"/>
-          <p:cNvSpPr>
-            <a:spLocks noGrp="1" noRot="1" noChangeAspect="1"/>
-          </p:cNvSpPr>
-          <p:nvPr>
-            <p:ph type="sldImg"/>
-          </p:nvPr>
-        </p:nvSpPr>
-        <p:spPr/>
-      </p:sp>
-      <p:sp>
-        <p:nvSpPr>
-          <p:cNvPr id="3" name="Notes Placeholder 2"/>
-          <p:cNvSpPr>
-            <a:spLocks noGrp="1"/>
-          </p:cNvSpPr>
-          <p:nvPr>
-            <p:ph type="body" idx="1"/>
-          </p:nvPr>
-        </p:nvSpPr>
-        <p:spPr/>
-        <p:txBody>
-          <a:bodyPr/>
-          <a:lstStyle/>
-          <a:p>
-            <a:r>
-              <a:rPr lang="en-US" noProof="0" dirty="0"/>
-              <a:t>Standardized:</a:t>
-            </a:r>
-          </a:p>
-          <a:p>
-            <a:r>
-              <a:rPr lang="en-US" noProof="0" dirty="0"/>
-              <a:t>- </a:t>
-            </a:r>
-            <a:r>
-              <a:rPr lang="en-US" b="0" i="0" noProof="0" dirty="0">
-                <a:solidFill>
-                  <a:srgbClr val="000000"/>
-                </a:solidFill>
-                <a:effectLst/>
-                <a:latin typeface="Verdana" panose="020B0604030504040204" pitchFamily="34" charset="0"/>
-              </a:rPr>
-              <a:t>American National Standards Institute (ANSI) in 1986</a:t>
-            </a:r>
-          </a:p>
-          <a:p>
-            <a:r>
-              <a:rPr lang="en-US" b="0" i="0" noProof="0" dirty="0">
-                <a:solidFill>
-                  <a:srgbClr val="000000"/>
-                </a:solidFill>
-                <a:effectLst/>
-                <a:latin typeface="Verdana" panose="020B0604030504040204" pitchFamily="34" charset="0"/>
-              </a:rPr>
-              <a:t>- International Organization for Standardization (ISO) in 1987</a:t>
-            </a:r>
-            <a:endParaRPr lang="en-US" noProof="0" dirty="0"/>
-          </a:p>
-        </p:txBody>
-      </p:sp>
-      <p:sp>
-        <p:nvSpPr>
-          <p:cNvPr id="4" name="Slide Number Placeholder 3"/>
-          <p:cNvSpPr>
-            <a:spLocks noGrp="1"/>
-          </p:cNvSpPr>
-          <p:nvPr>
-            <p:ph type="sldNum" sz="quarter" idx="5"/>
-          </p:nvPr>
-        </p:nvSpPr>
-        <p:spPr/>
-        <p:txBody>
-          <a:bodyPr/>
-          <a:lstStyle/>
-          <a:p>
-            <a:fld id="{9778E0F8-0F4F-4133-AB17-43107DBECF7F}" type="slidenum">
-              <a:rPr lang="sv-SE" smtClean="0"/>
-              <a:t>12</a:t>
-            </a:fld>
-            <a:endParaRPr lang="sv-SE"/>
-          </a:p>
-        </p:txBody>
-      </p:sp>
-    </p:spTree>
-    <p:extLst>
-      <p:ext uri="{BB962C8B-B14F-4D97-AF65-F5344CB8AC3E}">
-        <p14:creationId xmlns:p14="http://schemas.microsoft.com/office/powerpoint/2010/main" val="803176620"/>
       </p:ext>
     </p:extLst>
   </p:cSld>
@@ -23295,7 +23508,7 @@
         <p:spPr>
           <a:xfrm>
             <a:off x="4597400" y="2160000"/>
-            <a:ext cx="3113402" cy="3924000"/>
+            <a:ext cx="4165600" cy="3924000"/>
           </a:xfrm>
           <a:prstGeom prst="rect">
             <a:avLst/>
@@ -23500,13 +23713,19 @@
           <a:p>
             <a:r>
               <a:rPr lang="en-US" dirty="0"/>
-              <a:t>Amazon DynamoDB</a:t>
+              <a:t>Amazon DynamoDB (Key value store)</a:t>
             </a:r>
           </a:p>
           <a:p>
             <a:r>
               <a:rPr lang="en-US" dirty="0"/>
               <a:t>Redis (Key-value store)</a:t>
+            </a:r>
+          </a:p>
+          <a:p>
+            <a:r>
+              <a:rPr lang="en-US" dirty="0"/>
+              <a:t>Azure Object Storage (Object store)</a:t>
             </a:r>
           </a:p>
         </p:txBody>
@@ -23721,7 +23940,7 @@
                 <a:effectLst/>
                 <a:latin typeface="Söhne"/>
               </a:rPr>
-              <a:t>Normalization – Minimize redundancy and dependency (1NF, 2NF, 3NF) -</a:t>
+              <a:t>Normalization – Minimize redundancy and dependency (1NF, 2NF, 3NF, Boyce-Codd) -</a:t>
             </a:r>
             <a:r>
               <a:rPr lang="en-US" b="0" i="0" dirty="0">
@@ -23740,7 +23959,7 @@
                 </a:solidFill>
                 <a:effectLst/>
                 <a:latin typeface="Söhne"/>
-                <a:hlinkClick r:id="rId2">
+                <a:hlinkClick r:id="rId3">
                   <a:extLst>
                     <a:ext uri="{A12FA001-AC4F-418D-AE19-62706E023703}">
                       <ahyp:hlinkClr xmlns:ahyp="http://schemas.microsoft.com/office/drawing/2018/hyperlinkcolor" val="tx"/>
@@ -24762,18 +24981,18 @@
 </file>
 
 <file path=customXml/item1.xml><?xml version="1.0" encoding="utf-8"?>
-<p:properties xmlns:p="http://schemas.microsoft.com/office/2006/metadata/properties" xmlns:xsi="http://www.w3.org/2001/XMLSchema-instance" xmlns:pc="http://schemas.microsoft.com/office/infopath/2007/PartnerControls">
-  <documentManagement/>
-</p:properties>
-</file>
-
-<file path=customXml/item2.xml><?xml version="1.0" encoding="utf-8"?>
 <?mso-contentType ?>
 <FormTemplates xmlns="http://schemas.microsoft.com/sharepoint/v3/contenttype/forms">
   <Display>DocumentLibraryForm</Display>
   <Edit>DocumentLibraryForm</Edit>
   <New>DocumentLibraryForm</New>
 </FormTemplates>
+</file>
+
+<file path=customXml/item2.xml><?xml version="1.0" encoding="utf-8"?>
+<p:properties xmlns:p="http://schemas.microsoft.com/office/2006/metadata/properties" xmlns:xsi="http://www.w3.org/2001/XMLSchema-instance" xmlns:pc="http://schemas.microsoft.com/office/infopath/2007/PartnerControls">
+  <documentManagement/>
+</p:properties>
 </file>
 
 <file path=customXml/item3.xml><?xml version="1.0" encoding="utf-8"?>
@@ -24909,6 +25128,14 @@
 </file>
 
 <file path=customXml/itemProps1.xml><?xml version="1.0" encoding="utf-8"?>
+<ds:datastoreItem xmlns:ds="http://schemas.openxmlformats.org/officeDocument/2006/customXml" ds:itemID="{DE89EAE4-F0DF-4056-A4B5-87C04EEE6F62}">
+  <ds:schemaRefs>
+    <ds:schemaRef ds:uri="http://schemas.microsoft.com/sharepoint/v3/contenttype/forms"/>
+  </ds:schemaRefs>
+</ds:datastoreItem>
+</file>
+
+<file path=customXml/itemProps2.xml><?xml version="1.0" encoding="utf-8"?>
 <ds:datastoreItem xmlns:ds="http://schemas.openxmlformats.org/officeDocument/2006/customXml" ds:itemID="{5C56C71D-643B-4E04-9A6A-F76847701330}">
   <ds:schemaRefs>
     <ds:schemaRef ds:uri="http://schemas.microsoft.com/office/2006/documentManagement/types"/>
@@ -24920,14 +25147,6 @@
     <ds:schemaRef ds:uri="http://schemas.microsoft.com/office/2006/metadata/properties"/>
     <ds:schemaRef ds:uri="http://www.w3.org/XML/1998/namespace"/>
     <ds:schemaRef ds:uri="http://purl.org/dc/terms/"/>
-  </ds:schemaRefs>
-</ds:datastoreItem>
-</file>
-
-<file path=customXml/itemProps2.xml><?xml version="1.0" encoding="utf-8"?>
-<ds:datastoreItem xmlns:ds="http://schemas.openxmlformats.org/officeDocument/2006/customXml" ds:itemID="{DE89EAE4-F0DF-4056-A4B5-87C04EEE6F62}">
-  <ds:schemaRefs>
-    <ds:schemaRef ds:uri="http://schemas.microsoft.com/sharepoint/v3/contenttype/forms"/>
   </ds:schemaRefs>
 </ds:datastoreItem>
 </file>

</xml_diff>